<commit_message>
docs: Add Router Pattern IP - comparison vs BDA/Opus alternatives
- README.md: Added "Why Router Pattern?" section with comprehensive comparison
  vs Bedrock Data Automation, Claude Opus 4.5, and GPT-4 tool calling
- CLAUDE.md: Added "Architectural Design Rationale" section documenting
  key technical differentiators and when to use Router Pattern
- PowerPoint: Added new Slide 6 with cost comparison table and core insight
  quote (now 9 slides total)

Key differentiators documented:
- 92.5% cost reduction ($0.34 vs $4.55+ brute force)
- Intelligent page selection (not brute force processing)
- Specialized tools for each stage (Haiku→Textract→Haiku 3.5)
- Page-level audit trail
- Content deduplication with SHA-256
- Human-in-the-loop review workflow

Cost comparison at 10K docs/month:
- Router Pattern: $3,400
- BDA: ~$25,000
- Opus 4.5: ~$150,000+

🤖 Generated with [Claude Code](https://claude.com/claude-code)

Co-Authored-By: Claude <noreply@anthropic.com>
</commit_message>
<xml_diff>
--- a/docs/Financial-Documents-Processing-Router-Pattern.pptx
+++ b/docs/Financial-Documents-Processing-Router-Pattern.pptx
@@ -13,9 +13,10 @@
     <p:sldId id="261" r:id="rId7"/>
     <p:sldId id="262" r:id="rId8"/>
     <p:sldId id="263" r:id="rId9"/>
+    <p:sldId id="264" r:id="rId10"/>
   </p:sldIdLst>
   <p:notesMasterIdLst>
-    <p:notesMasterId r:id="rId10"/>
+    <p:notesMasterId r:id="rId11"/>
   </p:notesMasterIdLst>
   <p:sldSz cx="9144000" cy="5143500"/>
   <p:notesSz cx="5143500" cy="9144000"/>
@@ -1651,6 +1652,94 @@
             <a:fld id="{F7021451-1387-4CA6-816F-3879F97B5CBC}" type="slidenum">
               <a:rPr lang="en-US"/>
               <a:t>8</a:t>
+            </a:fld>
+            <a:endParaRPr lang="en-US"/>
+          </a:p>
+        </p:txBody>
+      </p:sp>
+    </p:spTree>
+    <p:extLst>
+      <p:ext uri="{BB962C8B-B14F-4D97-AF65-F5344CB8AC3E}">
+        <p14:creationId xmlns:p14="http://schemas.microsoft.com/office/powerpoint/2010/main" val="1024086991"/>
+      </p:ext>
+    </p:extLst>
+  </p:cSld>
+  <p:clrMapOvr>
+    <a:masterClrMapping/>
+  </p:clrMapOvr>
+</p:notes>
+</file>
+
+<file path=ppt/notesSlides/notesSlide9.xml><?xml version="1.0" encoding="utf-8"?>
+<p:notes xmlns:a="http://schemas.openxmlformats.org/drawingml/2006/main" xmlns:r="http://schemas.openxmlformats.org/officeDocument/2006/relationships" xmlns:p="http://schemas.openxmlformats.org/presentationml/2006/main">
+  <p:cSld>
+    <p:spTree>
+      <p:nvGrpSpPr>
+        <p:cNvPr id="1" name=""/>
+        <p:cNvGrpSpPr/>
+        <p:nvPr/>
+      </p:nvGrpSpPr>
+      <p:grpSpPr>
+        <a:xfrm>
+          <a:off x="0" y="0"/>
+          <a:ext cx="0" cy="0"/>
+          <a:chOff x="0" y="0"/>
+          <a:chExt cx="0" cy="0"/>
+        </a:xfrm>
+      </p:grpSpPr>
+      <p:sp>
+        <p:nvSpPr>
+          <p:cNvPr id="2" name="Slide Image Placeholder 1"/>
+          <p:cNvSpPr>
+            <a:spLocks noGrp="1" noRot="1" noChangeAspect="1"/>
+          </p:cNvSpPr>
+          <p:nvPr>
+            <p:ph type="sldImg"/>
+          </p:nvPr>
+        </p:nvSpPr>
+        <p:spPr/>
+      </p:sp>
+      <p:sp>
+        <p:nvSpPr>
+          <p:cNvPr id="3" name="Notes Placeholder 2"/>
+          <p:cNvSpPr>
+            <a:spLocks noGrp="1"/>
+          </p:cNvSpPr>
+          <p:nvPr>
+            <p:ph type="body" idx="1"/>
+          </p:nvPr>
+        </p:nvSpPr>
+        <p:spPr/>
+        <p:txBody>
+          <a:bodyPr/>
+          <a:lstStyle/>
+          <a:p>
+            <a:r>
+              <a:rPr lang="en-US" dirty="0"/>
+              <a:t/>
+            </a:r>
+            <a:endParaRPr lang="en-US" dirty="0"/>
+          </a:p>
+        </p:txBody>
+      </p:sp>
+      <p:sp>
+        <p:nvSpPr>
+          <p:cNvPr id="4" name="Slide Number Placeholder 3"/>
+          <p:cNvSpPr>
+            <a:spLocks noGrp="1"/>
+          </p:cNvSpPr>
+          <p:nvPr>
+            <p:ph type="sldNum" sz="quarter" idx="10"/>
+          </p:nvPr>
+        </p:nvSpPr>
+        <p:spPr/>
+        <p:txBody>
+          <a:bodyPr/>
+          <a:lstStyle/>
+          <a:p>
+            <a:fld id="{F7021451-1387-4CA6-816F-3879F97B5CBC}" type="slidenum">
+              <a:rPr lang="en-US"/>
+              <a:t>9</a:t>
             </a:fld>
             <a:endParaRPr lang="en-US"/>
           </a:p>
@@ -5442,7 +5531,7 @@
             <a:avLst/>
           </a:prstGeom>
           <a:solidFill>
-            <a:srgbClr val="8B5CF6"/>
+            <a:srgbClr val="EF4444"/>
           </a:solidFill>
           <a:ln/>
         </p:spPr>
@@ -5472,7 +5561,7 @@
               <a:buNone/>
             </a:pPr>
             <a:r>
-              <a:rPr lang="en-US" sz="3200" b="1" dirty="0">
+              <a:rPr lang="en-US" sz="2800" b="1" dirty="0">
                 <a:solidFill>
                   <a:srgbClr val="FFFFFF"/>
                 </a:solidFill>
@@ -5480,26 +5569,1874 @@
                 <a:ea typeface="Arial" pitchFamily="34" charset="-122"/>
                 <a:cs typeface="Arial" pitchFamily="34" charset="-120"/>
               </a:rPr>
-              <a:t>Key Differentiators</a:t>
-            </a:r>
-            <a:endParaRPr lang="en-US" sz="3200" dirty="0"/>
-          </a:p>
-        </p:txBody>
-      </p:sp>
-      <p:sp>
-        <p:nvSpPr>
-          <p:cNvPr id="4" name="Shape 2"/>
-          <p:cNvSpPr/>
-          <p:nvPr/>
-        </p:nvSpPr>
-        <p:spPr>
-          <a:xfrm>
-            <a:off x="365760" y="1280160"/>
-            <a:ext cx="4206240" cy="1051560"/>
+              <a:t>Why Router Pattern? vs Alternatives</a:t>
+            </a:r>
+            <a:endParaRPr lang="en-US" sz="2800" dirty="0"/>
+          </a:p>
+        </p:txBody>
+      </p:sp>
+      <p:graphicFrame>
+        <p:nvGraphicFramePr>
+          <p:cNvPr id="7" name="Table 0"/>
+          <p:cNvGraphicFramePr>
+            <a:graphicFrameLocks noGrp="1"/>
+          </p:cNvGraphicFramePr>
+          <p:nvPr>
+            <p:extLst>
+              <p:ext uri="{D42A27DB-BD31-4B8C-83A1-F6EECF244321}">
+                <p14:modId xmlns:p14="http://schemas.microsoft.com/office/powerpoint/2010/main" val="1579011935"/>
+              </p:ext>
+            </p:extLst>
+          </p:nvPr>
+        </p:nvGraphicFramePr>
+        <p:xfrm>
+          <a:off x="274320" y="1280160"/>
+          <a:ext cx="8595360" cy="1828800"/>
+        </p:xfrm>
+        <a:graphic>
+          <a:graphicData uri="http://schemas.openxmlformats.org/drawingml/2006/table">
+            <a:tbl>
+              <a:tblPr/>
+              <a:tblGrid>
+                <a:gridCol w="1828800"/>
+                <a:gridCol w="1188720"/>
+                <a:gridCol w="1371600"/>
+                <a:gridCol w="4206240"/>
+              </a:tblGrid>
+              <a:tr h="365760">
+                <a:tc>
+                  <a:txBody>
+                    <a:bodyPr/>
+                    <a:lstStyle/>
+                    <a:p>
+                      <a:pPr algn="ctr" indent="0" marL="0">
+                        <a:buNone/>
+                      </a:pPr>
+                      <a:r>
+                        <a:rPr lang="en-US" sz="1100" b="1" dirty="0">
+                          <a:solidFill>
+                            <a:srgbClr val="FFFFFF"/>
+                          </a:solidFill>
+                          <a:latin typeface="Arial" pitchFamily="34" charset="0"/>
+                          <a:ea typeface="Arial" pitchFamily="34" charset="-122"/>
+                          <a:cs typeface="Arial" pitchFamily="34" charset="-120"/>
+                        </a:rPr>
+                        <a:t>Approach</a:t>
+                      </a:r>
+                      <a:endParaRPr lang="en-US" sz="1100" dirty="0">
+                        <a:latin typeface="Arial" charset="0"/>
+                        <a:ea typeface="Arial" charset="0"/>
+                        <a:cs typeface="Arial" charset="0"/>
+                      </a:endParaRPr>
+                    </a:p>
+                  </a:txBody>
+                  <a:tcPr marL="91440" marR="91440" marT="45720" marB="45720" anchor="ctr">
+                    <a:lnL w="12700" cap="flat" cmpd="sng" algn="ctr">
+                      <a:solidFill>
+                        <a:srgbClr val="DDDDDD"/>
+                      </a:solidFill>
+                      <a:prstDash val="solid"/>
+                      <a:round/>
+                      <a:headEnd type="none" w="med" len="med"/>
+                      <a:tailEnd type="none" w="med" len="med"/>
+                    </a:lnL>
+                    <a:lnR w="12700" cap="flat" cmpd="sng" algn="ctr">
+                      <a:solidFill>
+                        <a:srgbClr val="DDDDDD"/>
+                      </a:solidFill>
+                      <a:prstDash val="solid"/>
+                      <a:round/>
+                      <a:headEnd type="none" w="med" len="med"/>
+                      <a:tailEnd type="none" w="med" len="med"/>
+                    </a:lnR>
+                    <a:lnT w="12700" cap="flat" cmpd="sng" algn="ctr">
+                      <a:solidFill>
+                        <a:srgbClr val="DDDDDD"/>
+                      </a:solidFill>
+                      <a:prstDash val="solid"/>
+                      <a:round/>
+                      <a:headEnd type="none" w="med" len="med"/>
+                      <a:tailEnd type="none" w="med" len="med"/>
+                    </a:lnT>
+                    <a:lnB w="12700" cap="flat" cmpd="sng" algn="ctr">
+                      <a:solidFill>
+                        <a:srgbClr val="DDDDDD"/>
+                      </a:solidFill>
+                      <a:prstDash val="solid"/>
+                      <a:round/>
+                      <a:headEnd type="none" w="med" len="med"/>
+                      <a:tailEnd type="none" w="med" len="med"/>
+                    </a:lnB>
+                    <a:solidFill>
+                      <a:srgbClr val="232F3E"/>
+                    </a:solidFill>
+                  </a:tcPr>
+                </a:tc>
+                <a:tc>
+                  <a:txBody>
+                    <a:bodyPr/>
+                    <a:lstStyle/>
+                    <a:p>
+                      <a:pPr algn="ctr" indent="0" marL="0">
+                        <a:buNone/>
+                      </a:pPr>
+                      <a:r>
+                        <a:rPr lang="en-US" sz="1100" b="1" dirty="0">
+                          <a:solidFill>
+                            <a:srgbClr val="FFFFFF"/>
+                          </a:solidFill>
+                          <a:latin typeface="Arial" pitchFamily="34" charset="0"/>
+                          <a:ea typeface="Arial" pitchFamily="34" charset="-122"/>
+                          <a:cs typeface="Arial" pitchFamily="34" charset="-120"/>
+                        </a:rPr>
+                        <a:t>Cost/Doc</a:t>
+                      </a:r>
+                      <a:endParaRPr lang="en-US" sz="1100" dirty="0">
+                        <a:latin typeface="Arial" charset="0"/>
+                        <a:ea typeface="Arial" charset="0"/>
+                        <a:cs typeface="Arial" charset="0"/>
+                      </a:endParaRPr>
+                    </a:p>
+                  </a:txBody>
+                  <a:tcPr marL="91440" marR="91440" marT="45720" marB="45720" anchor="ctr">
+                    <a:lnL w="12700" cap="flat" cmpd="sng" algn="ctr">
+                      <a:solidFill>
+                        <a:srgbClr val="DDDDDD"/>
+                      </a:solidFill>
+                      <a:prstDash val="solid"/>
+                      <a:round/>
+                      <a:headEnd type="none" w="med" len="med"/>
+                      <a:tailEnd type="none" w="med" len="med"/>
+                    </a:lnL>
+                    <a:lnR w="12700" cap="flat" cmpd="sng" algn="ctr">
+                      <a:solidFill>
+                        <a:srgbClr val="DDDDDD"/>
+                      </a:solidFill>
+                      <a:prstDash val="solid"/>
+                      <a:round/>
+                      <a:headEnd type="none" w="med" len="med"/>
+                      <a:tailEnd type="none" w="med" len="med"/>
+                    </a:lnR>
+                    <a:lnT w="12700" cap="flat" cmpd="sng" algn="ctr">
+                      <a:solidFill>
+                        <a:srgbClr val="DDDDDD"/>
+                      </a:solidFill>
+                      <a:prstDash val="solid"/>
+                      <a:round/>
+                      <a:headEnd type="none" w="med" len="med"/>
+                      <a:tailEnd type="none" w="med" len="med"/>
+                    </a:lnT>
+                    <a:lnB w="12700" cap="flat" cmpd="sng" algn="ctr">
+                      <a:solidFill>
+                        <a:srgbClr val="DDDDDD"/>
+                      </a:solidFill>
+                      <a:prstDash val="solid"/>
+                      <a:round/>
+                      <a:headEnd type="none" w="med" len="med"/>
+                      <a:tailEnd type="none" w="med" len="med"/>
+                    </a:lnB>
+                    <a:solidFill>
+                      <a:srgbClr val="232F3E"/>
+                    </a:solidFill>
+                  </a:tcPr>
+                </a:tc>
+                <a:tc>
+                  <a:txBody>
+                    <a:bodyPr/>
+                    <a:lstStyle/>
+                    <a:p>
+                      <a:pPr algn="ctr" indent="0" marL="0">
+                        <a:buNone/>
+                      </a:pPr>
+                      <a:r>
+                        <a:rPr lang="en-US" sz="1100" b="1" dirty="0">
+                          <a:solidFill>
+                            <a:srgbClr val="FFFFFF"/>
+                          </a:solidFill>
+                          <a:latin typeface="Arial" pitchFamily="34" charset="0"/>
+                          <a:ea typeface="Arial" pitchFamily="34" charset="-122"/>
+                          <a:cs typeface="Arial" pitchFamily="34" charset="-120"/>
+                        </a:rPr>
+                        <a:t>10K Docs/Mo</a:t>
+                      </a:r>
+                      <a:endParaRPr lang="en-US" sz="1100" dirty="0">
+                        <a:latin typeface="Arial" charset="0"/>
+                        <a:ea typeface="Arial" charset="0"/>
+                        <a:cs typeface="Arial" charset="0"/>
+                      </a:endParaRPr>
+                    </a:p>
+                  </a:txBody>
+                  <a:tcPr marL="91440" marR="91440" marT="45720" marB="45720" anchor="ctr">
+                    <a:lnL w="12700" cap="flat" cmpd="sng" algn="ctr">
+                      <a:solidFill>
+                        <a:srgbClr val="DDDDDD"/>
+                      </a:solidFill>
+                      <a:prstDash val="solid"/>
+                      <a:round/>
+                      <a:headEnd type="none" w="med" len="med"/>
+                      <a:tailEnd type="none" w="med" len="med"/>
+                    </a:lnL>
+                    <a:lnR w="12700" cap="flat" cmpd="sng" algn="ctr">
+                      <a:solidFill>
+                        <a:srgbClr val="DDDDDD"/>
+                      </a:solidFill>
+                      <a:prstDash val="solid"/>
+                      <a:round/>
+                      <a:headEnd type="none" w="med" len="med"/>
+                      <a:tailEnd type="none" w="med" len="med"/>
+                    </a:lnR>
+                    <a:lnT w="12700" cap="flat" cmpd="sng" algn="ctr">
+                      <a:solidFill>
+                        <a:srgbClr val="DDDDDD"/>
+                      </a:solidFill>
+                      <a:prstDash val="solid"/>
+                      <a:round/>
+                      <a:headEnd type="none" w="med" len="med"/>
+                      <a:tailEnd type="none" w="med" len="med"/>
+                    </a:lnT>
+                    <a:lnB w="12700" cap="flat" cmpd="sng" algn="ctr">
+                      <a:solidFill>
+                        <a:srgbClr val="DDDDDD"/>
+                      </a:solidFill>
+                      <a:prstDash val="solid"/>
+                      <a:round/>
+                      <a:headEnd type="none" w="med" len="med"/>
+                      <a:tailEnd type="none" w="med" len="med"/>
+                    </a:lnB>
+                    <a:solidFill>
+                      <a:srgbClr val="232F3E"/>
+                    </a:solidFill>
+                  </a:tcPr>
+                </a:tc>
+                <a:tc>
+                  <a:txBody>
+                    <a:bodyPr/>
+                    <a:lstStyle/>
+                    <a:p>
+                      <a:pPr algn="ctr" indent="0" marL="0">
+                        <a:buNone/>
+                      </a:pPr>
+                      <a:r>
+                        <a:rPr lang="en-US" sz="1100" b="1" dirty="0">
+                          <a:solidFill>
+                            <a:srgbClr val="FFFFFF"/>
+                          </a:solidFill>
+                          <a:latin typeface="Arial" pitchFamily="34" charset="0"/>
+                          <a:ea typeface="Arial" pitchFamily="34" charset="-122"/>
+                          <a:cs typeface="Arial" pitchFamily="34" charset="-120"/>
+                        </a:rPr>
+                        <a:t>Key Limitation</a:t>
+                      </a:r>
+                      <a:endParaRPr lang="en-US" sz="1100" dirty="0">
+                        <a:latin typeface="Arial" charset="0"/>
+                        <a:ea typeface="Arial" charset="0"/>
+                        <a:cs typeface="Arial" charset="0"/>
+                      </a:endParaRPr>
+                    </a:p>
+                  </a:txBody>
+                  <a:tcPr marL="91440" marR="91440" marT="45720" marB="45720" anchor="ctr">
+                    <a:lnL w="12700" cap="flat" cmpd="sng" algn="ctr">
+                      <a:solidFill>
+                        <a:srgbClr val="DDDDDD"/>
+                      </a:solidFill>
+                      <a:prstDash val="solid"/>
+                      <a:round/>
+                      <a:headEnd type="none" w="med" len="med"/>
+                      <a:tailEnd type="none" w="med" len="med"/>
+                    </a:lnL>
+                    <a:lnR w="12700" cap="flat" cmpd="sng" algn="ctr">
+                      <a:solidFill>
+                        <a:srgbClr val="DDDDDD"/>
+                      </a:solidFill>
+                      <a:prstDash val="solid"/>
+                      <a:round/>
+                      <a:headEnd type="none" w="med" len="med"/>
+                      <a:tailEnd type="none" w="med" len="med"/>
+                    </a:lnR>
+                    <a:lnT w="12700" cap="flat" cmpd="sng" algn="ctr">
+                      <a:solidFill>
+                        <a:srgbClr val="DDDDDD"/>
+                      </a:solidFill>
+                      <a:prstDash val="solid"/>
+                      <a:round/>
+                      <a:headEnd type="none" w="med" len="med"/>
+                      <a:tailEnd type="none" w="med" len="med"/>
+                    </a:lnT>
+                    <a:lnB w="12700" cap="flat" cmpd="sng" algn="ctr">
+                      <a:solidFill>
+                        <a:srgbClr val="DDDDDD"/>
+                      </a:solidFill>
+                      <a:prstDash val="solid"/>
+                      <a:round/>
+                      <a:headEnd type="none" w="med" len="med"/>
+                      <a:tailEnd type="none" w="med" len="med"/>
+                    </a:lnB>
+                    <a:solidFill>
+                      <a:srgbClr val="232F3E"/>
+                    </a:solidFill>
+                  </a:tcPr>
+                </a:tc>
+              </a:tr>
+              <a:tr h="365760">
+                <a:tc>
+                  <a:txBody>
+                    <a:bodyPr/>
+                    <a:lstStyle/>
+                    <a:p>
+                      <a:pPr algn="ctr" indent="0" marL="0">
+                        <a:buNone/>
+                      </a:pPr>
+                      <a:r>
+                        <a:rPr lang="en-US" sz="1000" dirty="0">
+                          <a:solidFill>
+                            <a:srgbClr val="000000"/>
+                          </a:solidFill>
+                          <a:latin typeface="Arial" pitchFamily="34" charset="0"/>
+                          <a:ea typeface="Arial" pitchFamily="34" charset="-122"/>
+                          <a:cs typeface="Arial" pitchFamily="34" charset="-120"/>
+                        </a:rPr>
+                        <a:t>Claude Opus 4.5</a:t>
+                      </a:r>
+                      <a:endParaRPr lang="en-US" sz="1000" dirty="0">
+                        <a:latin typeface="Arial" charset="0"/>
+                        <a:ea typeface="Arial" charset="0"/>
+                        <a:cs typeface="Arial" charset="0"/>
+                      </a:endParaRPr>
+                    </a:p>
+                    <a:p>
+                      <a:pPr algn="ctr" indent="0" marL="0">
+                        <a:buNone/>
+                      </a:pPr>
+                      <a:r>
+                        <a:rPr lang="en-US" sz="1000" dirty="0">
+                          <a:solidFill>
+                            <a:srgbClr val="000000"/>
+                          </a:solidFill>
+                          <a:latin typeface="Arial" pitchFamily="34" charset="0"/>
+                          <a:ea typeface="Arial" pitchFamily="34" charset="-122"/>
+                          <a:cs typeface="Arial" pitchFamily="34" charset="-120"/>
+                        </a:rPr>
+                        <a:t>(Tool Calling)</a:t>
+                      </a:r>
+                      <a:endParaRPr lang="en-US" sz="1000" dirty="0">
+                        <a:latin typeface="Arial" charset="0"/>
+                        <a:ea typeface="Arial" charset="0"/>
+                        <a:cs typeface="Arial" charset="0"/>
+                      </a:endParaRPr>
+                    </a:p>
+                  </a:txBody>
+                  <a:tcPr marL="91440" marR="91440" marT="45720" marB="45720" anchor="ctr">
+                    <a:lnL w="12700" cap="flat" cmpd="sng" algn="ctr">
+                      <a:solidFill>
+                        <a:srgbClr val="DDDDDD"/>
+                      </a:solidFill>
+                      <a:prstDash val="solid"/>
+                      <a:round/>
+                      <a:headEnd type="none" w="med" len="med"/>
+                      <a:tailEnd type="none" w="med" len="med"/>
+                    </a:lnL>
+                    <a:lnR w="12700" cap="flat" cmpd="sng" algn="ctr">
+                      <a:solidFill>
+                        <a:srgbClr val="DDDDDD"/>
+                      </a:solidFill>
+                      <a:prstDash val="solid"/>
+                      <a:round/>
+                      <a:headEnd type="none" w="med" len="med"/>
+                      <a:tailEnd type="none" w="med" len="med"/>
+                    </a:lnR>
+                    <a:lnT w="12700" cap="flat" cmpd="sng" algn="ctr">
+                      <a:solidFill>
+                        <a:srgbClr val="DDDDDD"/>
+                      </a:solidFill>
+                      <a:prstDash val="solid"/>
+                      <a:round/>
+                      <a:headEnd type="none" w="med" len="med"/>
+                      <a:tailEnd type="none" w="med" len="med"/>
+                    </a:lnT>
+                    <a:lnB w="12700" cap="flat" cmpd="sng" algn="ctr">
+                      <a:solidFill>
+                        <a:srgbClr val="DDDDDD"/>
+                      </a:solidFill>
+                      <a:prstDash val="solid"/>
+                      <a:round/>
+                      <a:headEnd type="none" w="med" len="med"/>
+                      <a:tailEnd type="none" w="med" len="med"/>
+                    </a:lnB>
+                    <a:solidFill>
+                      <a:srgbClr val="FEE2E2"/>
+                    </a:solidFill>
+                  </a:tcPr>
+                </a:tc>
+                <a:tc>
+                  <a:txBody>
+                    <a:bodyPr/>
+                    <a:lstStyle/>
+                    <a:p>
+                      <a:pPr algn="ctr" indent="0" marL="0">
+                        <a:buNone/>
+                      </a:pPr>
+                      <a:r>
+                        <a:rPr lang="en-US" sz="1000" b="1" dirty="0">
+                          <a:solidFill>
+                            <a:srgbClr val="EF4444"/>
+                          </a:solidFill>
+                          <a:latin typeface="Arial" pitchFamily="34" charset="0"/>
+                          <a:ea typeface="Arial" pitchFamily="34" charset="-122"/>
+                          <a:cs typeface="Arial" pitchFamily="34" charset="-120"/>
+                        </a:rPr>
+                        <a:t>$15-25</a:t>
+                      </a:r>
+                      <a:endParaRPr lang="en-US" sz="1000" dirty="0">
+                        <a:latin typeface="Arial" charset="0"/>
+                        <a:ea typeface="Arial" charset="0"/>
+                        <a:cs typeface="Arial" charset="0"/>
+                      </a:endParaRPr>
+                    </a:p>
+                  </a:txBody>
+                  <a:tcPr marL="91440" marR="91440" marT="45720" marB="45720" anchor="ctr">
+                    <a:lnL w="12700" cap="flat" cmpd="sng" algn="ctr">
+                      <a:solidFill>
+                        <a:srgbClr val="DDDDDD"/>
+                      </a:solidFill>
+                      <a:prstDash val="solid"/>
+                      <a:round/>
+                      <a:headEnd type="none" w="med" len="med"/>
+                      <a:tailEnd type="none" w="med" len="med"/>
+                    </a:lnL>
+                    <a:lnR w="12700" cap="flat" cmpd="sng" algn="ctr">
+                      <a:solidFill>
+                        <a:srgbClr val="DDDDDD"/>
+                      </a:solidFill>
+                      <a:prstDash val="solid"/>
+                      <a:round/>
+                      <a:headEnd type="none" w="med" len="med"/>
+                      <a:tailEnd type="none" w="med" len="med"/>
+                    </a:lnR>
+                    <a:lnT w="12700" cap="flat" cmpd="sng" algn="ctr">
+                      <a:solidFill>
+                        <a:srgbClr val="DDDDDD"/>
+                      </a:solidFill>
+                      <a:prstDash val="solid"/>
+                      <a:round/>
+                      <a:headEnd type="none" w="med" len="med"/>
+                      <a:tailEnd type="none" w="med" len="med"/>
+                    </a:lnT>
+                    <a:lnB w="12700" cap="flat" cmpd="sng" algn="ctr">
+                      <a:solidFill>
+                        <a:srgbClr val="DDDDDD"/>
+                      </a:solidFill>
+                      <a:prstDash val="solid"/>
+                      <a:round/>
+                      <a:headEnd type="none" w="med" len="med"/>
+                      <a:tailEnd type="none" w="med" len="med"/>
+                    </a:lnB>
+                    <a:solidFill>
+                      <a:srgbClr val="FEE2E2"/>
+                    </a:solidFill>
+                  </a:tcPr>
+                </a:tc>
+                <a:tc>
+                  <a:txBody>
+                    <a:bodyPr/>
+                    <a:lstStyle/>
+                    <a:p>
+                      <a:pPr algn="ctr" indent="0" marL="0">
+                        <a:buNone/>
+                      </a:pPr>
+                      <a:r>
+                        <a:rPr lang="en-US" sz="1000" dirty="0">
+                          <a:solidFill>
+                            <a:srgbClr val="000000"/>
+                          </a:solidFill>
+                          <a:latin typeface="Arial" pitchFamily="34" charset="0"/>
+                          <a:ea typeface="Arial" pitchFamily="34" charset="-122"/>
+                          <a:cs typeface="Arial" pitchFamily="34" charset="-120"/>
+                        </a:rPr>
+                        <a:t>$150K+</a:t>
+                      </a:r>
+                      <a:endParaRPr lang="en-US" sz="1000" dirty="0">
+                        <a:latin typeface="Arial" charset="0"/>
+                        <a:ea typeface="Arial" charset="0"/>
+                        <a:cs typeface="Arial" charset="0"/>
+                      </a:endParaRPr>
+                    </a:p>
+                  </a:txBody>
+                  <a:tcPr marL="91440" marR="91440" marT="45720" marB="45720" anchor="ctr">
+                    <a:lnL w="12700" cap="flat" cmpd="sng" algn="ctr">
+                      <a:solidFill>
+                        <a:srgbClr val="DDDDDD"/>
+                      </a:solidFill>
+                      <a:prstDash val="solid"/>
+                      <a:round/>
+                      <a:headEnd type="none" w="med" len="med"/>
+                      <a:tailEnd type="none" w="med" len="med"/>
+                    </a:lnL>
+                    <a:lnR w="12700" cap="flat" cmpd="sng" algn="ctr">
+                      <a:solidFill>
+                        <a:srgbClr val="DDDDDD"/>
+                      </a:solidFill>
+                      <a:prstDash val="solid"/>
+                      <a:round/>
+                      <a:headEnd type="none" w="med" len="med"/>
+                      <a:tailEnd type="none" w="med" len="med"/>
+                    </a:lnR>
+                    <a:lnT w="12700" cap="flat" cmpd="sng" algn="ctr">
+                      <a:solidFill>
+                        <a:srgbClr val="DDDDDD"/>
+                      </a:solidFill>
+                      <a:prstDash val="solid"/>
+                      <a:round/>
+                      <a:headEnd type="none" w="med" len="med"/>
+                      <a:tailEnd type="none" w="med" len="med"/>
+                    </a:lnT>
+                    <a:lnB w="12700" cap="flat" cmpd="sng" algn="ctr">
+                      <a:solidFill>
+                        <a:srgbClr val="DDDDDD"/>
+                      </a:solidFill>
+                      <a:prstDash val="solid"/>
+                      <a:round/>
+                      <a:headEnd type="none" w="med" len="med"/>
+                      <a:tailEnd type="none" w="med" len="med"/>
+                    </a:lnB>
+                    <a:solidFill>
+                      <a:srgbClr val="FEE2E2"/>
+                    </a:solidFill>
+                  </a:tcPr>
+                </a:tc>
+                <a:tc>
+                  <a:txBody>
+                    <a:bodyPr/>
+                    <a:lstStyle/>
+                    <a:p>
+                      <a:pPr algn="ctr" indent="0" marL="0">
+                        <a:buNone/>
+                      </a:pPr>
+                      <a:r>
+                        <a:rPr lang="en-US" sz="1000" dirty="0">
+                          <a:solidFill>
+                            <a:srgbClr val="000000"/>
+                          </a:solidFill>
+                          <a:latin typeface="Arial" pitchFamily="34" charset="0"/>
+                          <a:ea typeface="Arial" pitchFamily="34" charset="-122"/>
+                          <a:cs typeface="Arial" pitchFamily="34" charset="-120"/>
+                        </a:rPr>
+                        <a:t>Context limits; cost prohibitive</a:t>
+                      </a:r>
+                      <a:endParaRPr lang="en-US" sz="1000" dirty="0">
+                        <a:latin typeface="Arial" charset="0"/>
+                        <a:ea typeface="Arial" charset="0"/>
+                        <a:cs typeface="Arial" charset="0"/>
+                      </a:endParaRPr>
+                    </a:p>
+                  </a:txBody>
+                  <a:tcPr marL="91440" marR="91440" marT="45720" marB="45720" anchor="ctr">
+                    <a:lnL w="12700" cap="flat" cmpd="sng" algn="ctr">
+                      <a:solidFill>
+                        <a:srgbClr val="DDDDDD"/>
+                      </a:solidFill>
+                      <a:prstDash val="solid"/>
+                      <a:round/>
+                      <a:headEnd type="none" w="med" len="med"/>
+                      <a:tailEnd type="none" w="med" len="med"/>
+                    </a:lnL>
+                    <a:lnR w="12700" cap="flat" cmpd="sng" algn="ctr">
+                      <a:solidFill>
+                        <a:srgbClr val="DDDDDD"/>
+                      </a:solidFill>
+                      <a:prstDash val="solid"/>
+                      <a:round/>
+                      <a:headEnd type="none" w="med" len="med"/>
+                      <a:tailEnd type="none" w="med" len="med"/>
+                    </a:lnR>
+                    <a:lnT w="12700" cap="flat" cmpd="sng" algn="ctr">
+                      <a:solidFill>
+                        <a:srgbClr val="DDDDDD"/>
+                      </a:solidFill>
+                      <a:prstDash val="solid"/>
+                      <a:round/>
+                      <a:headEnd type="none" w="med" len="med"/>
+                      <a:tailEnd type="none" w="med" len="med"/>
+                    </a:lnT>
+                    <a:lnB w="12700" cap="flat" cmpd="sng" algn="ctr">
+                      <a:solidFill>
+                        <a:srgbClr val="DDDDDD"/>
+                      </a:solidFill>
+                      <a:prstDash val="solid"/>
+                      <a:round/>
+                      <a:headEnd type="none" w="med" len="med"/>
+                      <a:tailEnd type="none" w="med" len="med"/>
+                    </a:lnB>
+                    <a:solidFill>
+                      <a:srgbClr val="FEE2E2"/>
+                    </a:solidFill>
+                  </a:tcPr>
+                </a:tc>
+              </a:tr>
+              <a:tr h="365760">
+                <a:tc>
+                  <a:txBody>
+                    <a:bodyPr/>
+                    <a:lstStyle/>
+                    <a:p>
+                      <a:pPr algn="ctr" indent="0" marL="0">
+                        <a:buNone/>
+                      </a:pPr>
+                      <a:r>
+                        <a:rPr lang="en-US" sz="1000" dirty="0">
+                          <a:solidFill>
+                            <a:srgbClr val="000000"/>
+                          </a:solidFill>
+                          <a:latin typeface="Arial" pitchFamily="34" charset="0"/>
+                          <a:ea typeface="Arial" pitchFamily="34" charset="-122"/>
+                          <a:cs typeface="Arial" pitchFamily="34" charset="-120"/>
+                        </a:rPr>
+                        <a:t>Bedrock Data</a:t>
+                      </a:r>
+                      <a:endParaRPr lang="en-US" sz="1000" dirty="0">
+                        <a:latin typeface="Arial" charset="0"/>
+                        <a:ea typeface="Arial" charset="0"/>
+                        <a:cs typeface="Arial" charset="0"/>
+                      </a:endParaRPr>
+                    </a:p>
+                    <a:p>
+                      <a:pPr algn="ctr" indent="0" marL="0">
+                        <a:buNone/>
+                      </a:pPr>
+                      <a:r>
+                        <a:rPr lang="en-US" sz="1000" dirty="0">
+                          <a:solidFill>
+                            <a:srgbClr val="000000"/>
+                          </a:solidFill>
+                          <a:latin typeface="Arial" pitchFamily="34" charset="0"/>
+                          <a:ea typeface="Arial" pitchFamily="34" charset="-122"/>
+                          <a:cs typeface="Arial" pitchFamily="34" charset="-120"/>
+                        </a:rPr>
+                        <a:t>Automation (BDA)</a:t>
+                      </a:r>
+                      <a:endParaRPr lang="en-US" sz="1000" dirty="0">
+                        <a:latin typeface="Arial" charset="0"/>
+                        <a:ea typeface="Arial" charset="0"/>
+                        <a:cs typeface="Arial" charset="0"/>
+                      </a:endParaRPr>
+                    </a:p>
+                  </a:txBody>
+                  <a:tcPr marL="91440" marR="91440" marT="45720" marB="45720" anchor="ctr">
+                    <a:lnL w="12700" cap="flat" cmpd="sng" algn="ctr">
+                      <a:solidFill>
+                        <a:srgbClr val="DDDDDD"/>
+                      </a:solidFill>
+                      <a:prstDash val="solid"/>
+                      <a:round/>
+                      <a:headEnd type="none" w="med" len="med"/>
+                      <a:tailEnd type="none" w="med" len="med"/>
+                    </a:lnL>
+                    <a:lnR w="12700" cap="flat" cmpd="sng" algn="ctr">
+                      <a:solidFill>
+                        <a:srgbClr val="DDDDDD"/>
+                      </a:solidFill>
+                      <a:prstDash val="solid"/>
+                      <a:round/>
+                      <a:headEnd type="none" w="med" len="med"/>
+                      <a:tailEnd type="none" w="med" len="med"/>
+                    </a:lnR>
+                    <a:lnT w="12700" cap="flat" cmpd="sng" algn="ctr">
+                      <a:solidFill>
+                        <a:srgbClr val="DDDDDD"/>
+                      </a:solidFill>
+                      <a:prstDash val="solid"/>
+                      <a:round/>
+                      <a:headEnd type="none" w="med" len="med"/>
+                      <a:tailEnd type="none" w="med" len="med"/>
+                    </a:lnT>
+                    <a:lnB w="12700" cap="flat" cmpd="sng" algn="ctr">
+                      <a:solidFill>
+                        <a:srgbClr val="DDDDDD"/>
+                      </a:solidFill>
+                      <a:prstDash val="solid"/>
+                      <a:round/>
+                      <a:headEnd type="none" w="med" len="med"/>
+                      <a:tailEnd type="none" w="med" len="med"/>
+                    </a:lnB>
+                    <a:solidFill>
+                      <a:srgbClr val="FEF3C7"/>
+                    </a:solidFill>
+                  </a:tcPr>
+                </a:tc>
+                <a:tc>
+                  <a:txBody>
+                    <a:bodyPr/>
+                    <a:lstStyle/>
+                    <a:p>
+                      <a:pPr algn="ctr" indent="0" marL="0">
+                        <a:buNone/>
+                      </a:pPr>
+                      <a:r>
+                        <a:rPr lang="en-US" sz="1000" b="1" dirty="0">
+                          <a:solidFill>
+                            <a:srgbClr val="F59E0B"/>
+                          </a:solidFill>
+                          <a:latin typeface="Arial" pitchFamily="34" charset="0"/>
+                          <a:ea typeface="Arial" pitchFamily="34" charset="-122"/>
+                          <a:cs typeface="Arial" pitchFamily="34" charset="-120"/>
+                        </a:rPr>
+                        <a:t>$2-5</a:t>
+                      </a:r>
+                      <a:endParaRPr lang="en-US" sz="1000" dirty="0">
+                        <a:latin typeface="Arial" charset="0"/>
+                        <a:ea typeface="Arial" charset="0"/>
+                        <a:cs typeface="Arial" charset="0"/>
+                      </a:endParaRPr>
+                    </a:p>
+                  </a:txBody>
+                  <a:tcPr marL="91440" marR="91440" marT="45720" marB="45720" anchor="ctr">
+                    <a:lnL w="12700" cap="flat" cmpd="sng" algn="ctr">
+                      <a:solidFill>
+                        <a:srgbClr val="DDDDDD"/>
+                      </a:solidFill>
+                      <a:prstDash val="solid"/>
+                      <a:round/>
+                      <a:headEnd type="none" w="med" len="med"/>
+                      <a:tailEnd type="none" w="med" len="med"/>
+                    </a:lnL>
+                    <a:lnR w="12700" cap="flat" cmpd="sng" algn="ctr">
+                      <a:solidFill>
+                        <a:srgbClr val="DDDDDD"/>
+                      </a:solidFill>
+                      <a:prstDash val="solid"/>
+                      <a:round/>
+                      <a:headEnd type="none" w="med" len="med"/>
+                      <a:tailEnd type="none" w="med" len="med"/>
+                    </a:lnR>
+                    <a:lnT w="12700" cap="flat" cmpd="sng" algn="ctr">
+                      <a:solidFill>
+                        <a:srgbClr val="DDDDDD"/>
+                      </a:solidFill>
+                      <a:prstDash val="solid"/>
+                      <a:round/>
+                      <a:headEnd type="none" w="med" len="med"/>
+                      <a:tailEnd type="none" w="med" len="med"/>
+                    </a:lnT>
+                    <a:lnB w="12700" cap="flat" cmpd="sng" algn="ctr">
+                      <a:solidFill>
+                        <a:srgbClr val="DDDDDD"/>
+                      </a:solidFill>
+                      <a:prstDash val="solid"/>
+                      <a:round/>
+                      <a:headEnd type="none" w="med" len="med"/>
+                      <a:tailEnd type="none" w="med" len="med"/>
+                    </a:lnB>
+                    <a:solidFill>
+                      <a:srgbClr val="FEF3C7"/>
+                    </a:solidFill>
+                  </a:tcPr>
+                </a:tc>
+                <a:tc>
+                  <a:txBody>
+                    <a:bodyPr/>
+                    <a:lstStyle/>
+                    <a:p>
+                      <a:pPr algn="ctr" indent="0" marL="0">
+                        <a:buNone/>
+                      </a:pPr>
+                      <a:r>
+                        <a:rPr lang="en-US" sz="1000" dirty="0">
+                          <a:solidFill>
+                            <a:srgbClr val="000000"/>
+                          </a:solidFill>
+                          <a:latin typeface="Arial" pitchFamily="34" charset="0"/>
+                          <a:ea typeface="Arial" pitchFamily="34" charset="-122"/>
+                          <a:cs typeface="Arial" pitchFamily="34" charset="-120"/>
+                        </a:rPr>
+                        <a:t>$25K+</a:t>
+                      </a:r>
+                      <a:endParaRPr lang="en-US" sz="1000" dirty="0">
+                        <a:latin typeface="Arial" charset="0"/>
+                        <a:ea typeface="Arial" charset="0"/>
+                        <a:cs typeface="Arial" charset="0"/>
+                      </a:endParaRPr>
+                    </a:p>
+                  </a:txBody>
+                  <a:tcPr marL="91440" marR="91440" marT="45720" marB="45720" anchor="ctr">
+                    <a:lnL w="12700" cap="flat" cmpd="sng" algn="ctr">
+                      <a:solidFill>
+                        <a:srgbClr val="DDDDDD"/>
+                      </a:solidFill>
+                      <a:prstDash val="solid"/>
+                      <a:round/>
+                      <a:headEnd type="none" w="med" len="med"/>
+                      <a:tailEnd type="none" w="med" len="med"/>
+                    </a:lnL>
+                    <a:lnR w="12700" cap="flat" cmpd="sng" algn="ctr">
+                      <a:solidFill>
+                        <a:srgbClr val="DDDDDD"/>
+                      </a:solidFill>
+                      <a:prstDash val="solid"/>
+                      <a:round/>
+                      <a:headEnd type="none" w="med" len="med"/>
+                      <a:tailEnd type="none" w="med" len="med"/>
+                    </a:lnR>
+                    <a:lnT w="12700" cap="flat" cmpd="sng" algn="ctr">
+                      <a:solidFill>
+                        <a:srgbClr val="DDDDDD"/>
+                      </a:solidFill>
+                      <a:prstDash val="solid"/>
+                      <a:round/>
+                      <a:headEnd type="none" w="med" len="med"/>
+                      <a:tailEnd type="none" w="med" len="med"/>
+                    </a:lnT>
+                    <a:lnB w="12700" cap="flat" cmpd="sng" algn="ctr">
+                      <a:solidFill>
+                        <a:srgbClr val="DDDDDD"/>
+                      </a:solidFill>
+                      <a:prstDash val="solid"/>
+                      <a:round/>
+                      <a:headEnd type="none" w="med" len="med"/>
+                      <a:tailEnd type="none" w="med" len="med"/>
+                    </a:lnB>
+                    <a:solidFill>
+                      <a:srgbClr val="FEF3C7"/>
+                    </a:solidFill>
+                  </a:tcPr>
+                </a:tc>
+                <a:tc>
+                  <a:txBody>
+                    <a:bodyPr/>
+                    <a:lstStyle/>
+                    <a:p>
+                      <a:pPr algn="ctr" indent="0" marL="0">
+                        <a:buNone/>
+                      </a:pPr>
+                      <a:r>
+                        <a:rPr lang="en-US" sz="1000" dirty="0">
+                          <a:solidFill>
+                            <a:srgbClr val="000000"/>
+                          </a:solidFill>
+                          <a:latin typeface="Arial" pitchFamily="34" charset="0"/>
+                          <a:ea typeface="Arial" pitchFamily="34" charset="-122"/>
+                          <a:cs typeface="Arial" pitchFamily="34" charset="-120"/>
+                        </a:rPr>
+                        <a:t>No page selection; black-box</a:t>
+                      </a:r>
+                      <a:endParaRPr lang="en-US" sz="1000" dirty="0">
+                        <a:latin typeface="Arial" charset="0"/>
+                        <a:ea typeface="Arial" charset="0"/>
+                        <a:cs typeface="Arial" charset="0"/>
+                      </a:endParaRPr>
+                    </a:p>
+                  </a:txBody>
+                  <a:tcPr marL="91440" marR="91440" marT="45720" marB="45720" anchor="ctr">
+                    <a:lnL w="12700" cap="flat" cmpd="sng" algn="ctr">
+                      <a:solidFill>
+                        <a:srgbClr val="DDDDDD"/>
+                      </a:solidFill>
+                      <a:prstDash val="solid"/>
+                      <a:round/>
+                      <a:headEnd type="none" w="med" len="med"/>
+                      <a:tailEnd type="none" w="med" len="med"/>
+                    </a:lnL>
+                    <a:lnR w="12700" cap="flat" cmpd="sng" algn="ctr">
+                      <a:solidFill>
+                        <a:srgbClr val="DDDDDD"/>
+                      </a:solidFill>
+                      <a:prstDash val="solid"/>
+                      <a:round/>
+                      <a:headEnd type="none" w="med" len="med"/>
+                      <a:tailEnd type="none" w="med" len="med"/>
+                    </a:lnR>
+                    <a:lnT w="12700" cap="flat" cmpd="sng" algn="ctr">
+                      <a:solidFill>
+                        <a:srgbClr val="DDDDDD"/>
+                      </a:solidFill>
+                      <a:prstDash val="solid"/>
+                      <a:round/>
+                      <a:headEnd type="none" w="med" len="med"/>
+                      <a:tailEnd type="none" w="med" len="med"/>
+                    </a:lnT>
+                    <a:lnB w="12700" cap="flat" cmpd="sng" algn="ctr">
+                      <a:solidFill>
+                        <a:srgbClr val="DDDDDD"/>
+                      </a:solidFill>
+                      <a:prstDash val="solid"/>
+                      <a:round/>
+                      <a:headEnd type="none" w="med" len="med"/>
+                      <a:tailEnd type="none" w="med" len="med"/>
+                    </a:lnB>
+                    <a:solidFill>
+                      <a:srgbClr val="FEF3C7"/>
+                    </a:solidFill>
+                  </a:tcPr>
+                </a:tc>
+              </a:tr>
+              <a:tr h="365760">
+                <a:tc>
+                  <a:txBody>
+                    <a:bodyPr/>
+                    <a:lstStyle/>
+                    <a:p>
+                      <a:pPr algn="ctr" indent="0" marL="0">
+                        <a:buNone/>
+                      </a:pPr>
+                      <a:r>
+                        <a:rPr lang="en-US" sz="1000" dirty="0">
+                          <a:solidFill>
+                            <a:srgbClr val="000000"/>
+                          </a:solidFill>
+                          <a:latin typeface="Arial" pitchFamily="34" charset="0"/>
+                          <a:ea typeface="Arial" pitchFamily="34" charset="-122"/>
+                          <a:cs typeface="Arial" pitchFamily="34" charset="-120"/>
+                        </a:rPr>
+                        <a:t>Full Textract OCR</a:t>
+                      </a:r>
+                      <a:endParaRPr lang="en-US" sz="1000" dirty="0">
+                        <a:latin typeface="Arial" charset="0"/>
+                        <a:ea typeface="Arial" charset="0"/>
+                        <a:cs typeface="Arial" charset="0"/>
+                      </a:endParaRPr>
+                    </a:p>
+                    <a:p>
+                      <a:pPr algn="ctr" indent="0" marL="0">
+                        <a:buNone/>
+                      </a:pPr>
+                      <a:r>
+                        <a:rPr lang="en-US" sz="1000" dirty="0">
+                          <a:solidFill>
+                            <a:srgbClr val="000000"/>
+                          </a:solidFill>
+                          <a:latin typeface="Arial" pitchFamily="34" charset="0"/>
+                          <a:ea typeface="Arial" pitchFamily="34" charset="-122"/>
+                          <a:cs typeface="Arial" pitchFamily="34" charset="-120"/>
+                        </a:rPr>
+                        <a:t>(Brute Force)</a:t>
+                      </a:r>
+                      <a:endParaRPr lang="en-US" sz="1000" dirty="0">
+                        <a:latin typeface="Arial" charset="0"/>
+                        <a:ea typeface="Arial" charset="0"/>
+                        <a:cs typeface="Arial" charset="0"/>
+                      </a:endParaRPr>
+                    </a:p>
+                  </a:txBody>
+                  <a:tcPr marL="91440" marR="91440" marT="45720" marB="45720" anchor="ctr">
+                    <a:lnL w="12700" cap="flat" cmpd="sng" algn="ctr">
+                      <a:solidFill>
+                        <a:srgbClr val="DDDDDD"/>
+                      </a:solidFill>
+                      <a:prstDash val="solid"/>
+                      <a:round/>
+                      <a:headEnd type="none" w="med" len="med"/>
+                      <a:tailEnd type="none" w="med" len="med"/>
+                    </a:lnL>
+                    <a:lnR w="12700" cap="flat" cmpd="sng" algn="ctr">
+                      <a:solidFill>
+                        <a:srgbClr val="DDDDDD"/>
+                      </a:solidFill>
+                      <a:prstDash val="solid"/>
+                      <a:round/>
+                      <a:headEnd type="none" w="med" len="med"/>
+                      <a:tailEnd type="none" w="med" len="med"/>
+                    </a:lnR>
+                    <a:lnT w="12700" cap="flat" cmpd="sng" algn="ctr">
+                      <a:solidFill>
+                        <a:srgbClr val="DDDDDD"/>
+                      </a:solidFill>
+                      <a:prstDash val="solid"/>
+                      <a:round/>
+                      <a:headEnd type="none" w="med" len="med"/>
+                      <a:tailEnd type="none" w="med" len="med"/>
+                    </a:lnT>
+                    <a:lnB w="12700" cap="flat" cmpd="sng" algn="ctr">
+                      <a:solidFill>
+                        <a:srgbClr val="DDDDDD"/>
+                      </a:solidFill>
+                      <a:prstDash val="solid"/>
+                      <a:round/>
+                      <a:headEnd type="none" w="med" len="med"/>
+                      <a:tailEnd type="none" w="med" len="med"/>
+                    </a:lnB>
+                    <a:solidFill>
+                      <a:srgbClr val="FEF3C7"/>
+                    </a:solidFill>
+                  </a:tcPr>
+                </a:tc>
+                <a:tc>
+                  <a:txBody>
+                    <a:bodyPr/>
+                    <a:lstStyle/>
+                    <a:p>
+                      <a:pPr algn="ctr" indent="0" marL="0">
+                        <a:buNone/>
+                      </a:pPr>
+                      <a:r>
+                        <a:rPr lang="en-US" sz="1000" b="1" dirty="0">
+                          <a:solidFill>
+                            <a:srgbClr val="F59E0B"/>
+                          </a:solidFill>
+                          <a:latin typeface="Arial" pitchFamily="34" charset="0"/>
+                          <a:ea typeface="Arial" pitchFamily="34" charset="-122"/>
+                          <a:cs typeface="Arial" pitchFamily="34" charset="-120"/>
+                        </a:rPr>
+                        <a:t>$4.55</a:t>
+                      </a:r>
+                      <a:endParaRPr lang="en-US" sz="1000" dirty="0">
+                        <a:latin typeface="Arial" charset="0"/>
+                        <a:ea typeface="Arial" charset="0"/>
+                        <a:cs typeface="Arial" charset="0"/>
+                      </a:endParaRPr>
+                    </a:p>
+                  </a:txBody>
+                  <a:tcPr marL="91440" marR="91440" marT="45720" marB="45720" anchor="ctr">
+                    <a:lnL w="12700" cap="flat" cmpd="sng" algn="ctr">
+                      <a:solidFill>
+                        <a:srgbClr val="DDDDDD"/>
+                      </a:solidFill>
+                      <a:prstDash val="solid"/>
+                      <a:round/>
+                      <a:headEnd type="none" w="med" len="med"/>
+                      <a:tailEnd type="none" w="med" len="med"/>
+                    </a:lnL>
+                    <a:lnR w="12700" cap="flat" cmpd="sng" algn="ctr">
+                      <a:solidFill>
+                        <a:srgbClr val="DDDDDD"/>
+                      </a:solidFill>
+                      <a:prstDash val="solid"/>
+                      <a:round/>
+                      <a:headEnd type="none" w="med" len="med"/>
+                      <a:tailEnd type="none" w="med" len="med"/>
+                    </a:lnR>
+                    <a:lnT w="12700" cap="flat" cmpd="sng" algn="ctr">
+                      <a:solidFill>
+                        <a:srgbClr val="DDDDDD"/>
+                      </a:solidFill>
+                      <a:prstDash val="solid"/>
+                      <a:round/>
+                      <a:headEnd type="none" w="med" len="med"/>
+                      <a:tailEnd type="none" w="med" len="med"/>
+                    </a:lnT>
+                    <a:lnB w="12700" cap="flat" cmpd="sng" algn="ctr">
+                      <a:solidFill>
+                        <a:srgbClr val="DDDDDD"/>
+                      </a:solidFill>
+                      <a:prstDash val="solid"/>
+                      <a:round/>
+                      <a:headEnd type="none" w="med" len="med"/>
+                      <a:tailEnd type="none" w="med" len="med"/>
+                    </a:lnB>
+                    <a:solidFill>
+                      <a:srgbClr val="FEF3C7"/>
+                    </a:solidFill>
+                  </a:tcPr>
+                </a:tc>
+                <a:tc>
+                  <a:txBody>
+                    <a:bodyPr/>
+                    <a:lstStyle/>
+                    <a:p>
+                      <a:pPr algn="ctr" indent="0" marL="0">
+                        <a:buNone/>
+                      </a:pPr>
+                      <a:r>
+                        <a:rPr lang="en-US" sz="1000" dirty="0">
+                          <a:solidFill>
+                            <a:srgbClr val="000000"/>
+                          </a:solidFill>
+                          <a:latin typeface="Arial" pitchFamily="34" charset="0"/>
+                          <a:ea typeface="Arial" pitchFamily="34" charset="-122"/>
+                          <a:cs typeface="Arial" pitchFamily="34" charset="-120"/>
+                        </a:rPr>
+                        <a:t>$45K</a:t>
+                      </a:r>
+                      <a:endParaRPr lang="en-US" sz="1000" dirty="0">
+                        <a:latin typeface="Arial" charset="0"/>
+                        <a:ea typeface="Arial" charset="0"/>
+                        <a:cs typeface="Arial" charset="0"/>
+                      </a:endParaRPr>
+                    </a:p>
+                  </a:txBody>
+                  <a:tcPr marL="91440" marR="91440" marT="45720" marB="45720" anchor="ctr">
+                    <a:lnL w="12700" cap="flat" cmpd="sng" algn="ctr">
+                      <a:solidFill>
+                        <a:srgbClr val="DDDDDD"/>
+                      </a:solidFill>
+                      <a:prstDash val="solid"/>
+                      <a:round/>
+                      <a:headEnd type="none" w="med" len="med"/>
+                      <a:tailEnd type="none" w="med" len="med"/>
+                    </a:lnL>
+                    <a:lnR w="12700" cap="flat" cmpd="sng" algn="ctr">
+                      <a:solidFill>
+                        <a:srgbClr val="DDDDDD"/>
+                      </a:solidFill>
+                      <a:prstDash val="solid"/>
+                      <a:round/>
+                      <a:headEnd type="none" w="med" len="med"/>
+                      <a:tailEnd type="none" w="med" len="med"/>
+                    </a:lnR>
+                    <a:lnT w="12700" cap="flat" cmpd="sng" algn="ctr">
+                      <a:solidFill>
+                        <a:srgbClr val="DDDDDD"/>
+                      </a:solidFill>
+                      <a:prstDash val="solid"/>
+                      <a:round/>
+                      <a:headEnd type="none" w="med" len="med"/>
+                      <a:tailEnd type="none" w="med" len="med"/>
+                    </a:lnT>
+                    <a:lnB w="12700" cap="flat" cmpd="sng" algn="ctr">
+                      <a:solidFill>
+                        <a:srgbClr val="DDDDDD"/>
+                      </a:solidFill>
+                      <a:prstDash val="solid"/>
+                      <a:round/>
+                      <a:headEnd type="none" w="med" len="med"/>
+                      <a:tailEnd type="none" w="med" len="med"/>
+                    </a:lnB>
+                    <a:solidFill>
+                      <a:srgbClr val="FEF3C7"/>
+                    </a:solidFill>
+                  </a:tcPr>
+                </a:tc>
+                <a:tc>
+                  <a:txBody>
+                    <a:bodyPr/>
+                    <a:lstStyle/>
+                    <a:p>
+                      <a:pPr algn="ctr" indent="0" marL="0">
+                        <a:buNone/>
+                      </a:pPr>
+                      <a:r>
+                        <a:rPr lang="en-US" sz="1000" dirty="0">
+                          <a:solidFill>
+                            <a:srgbClr val="000000"/>
+                          </a:solidFill>
+                          <a:latin typeface="Arial" pitchFamily="34" charset="0"/>
+                          <a:ea typeface="Arial" pitchFamily="34" charset="-122"/>
+                          <a:cs typeface="Arial" pitchFamily="34" charset="-120"/>
+                        </a:rPr>
+                        <a:t>No intelligence; processes all pages</a:t>
+                      </a:r>
+                      <a:endParaRPr lang="en-US" sz="1000" dirty="0">
+                        <a:latin typeface="Arial" charset="0"/>
+                        <a:ea typeface="Arial" charset="0"/>
+                        <a:cs typeface="Arial" charset="0"/>
+                      </a:endParaRPr>
+                    </a:p>
+                  </a:txBody>
+                  <a:tcPr marL="91440" marR="91440" marT="45720" marB="45720" anchor="ctr">
+                    <a:lnL w="12700" cap="flat" cmpd="sng" algn="ctr">
+                      <a:solidFill>
+                        <a:srgbClr val="DDDDDD"/>
+                      </a:solidFill>
+                      <a:prstDash val="solid"/>
+                      <a:round/>
+                      <a:headEnd type="none" w="med" len="med"/>
+                      <a:tailEnd type="none" w="med" len="med"/>
+                    </a:lnL>
+                    <a:lnR w="12700" cap="flat" cmpd="sng" algn="ctr">
+                      <a:solidFill>
+                        <a:srgbClr val="DDDDDD"/>
+                      </a:solidFill>
+                      <a:prstDash val="solid"/>
+                      <a:round/>
+                      <a:headEnd type="none" w="med" len="med"/>
+                      <a:tailEnd type="none" w="med" len="med"/>
+                    </a:lnR>
+                    <a:lnT w="12700" cap="flat" cmpd="sng" algn="ctr">
+                      <a:solidFill>
+                        <a:srgbClr val="DDDDDD"/>
+                      </a:solidFill>
+                      <a:prstDash val="solid"/>
+                      <a:round/>
+                      <a:headEnd type="none" w="med" len="med"/>
+                      <a:tailEnd type="none" w="med" len="med"/>
+                    </a:lnT>
+                    <a:lnB w="12700" cap="flat" cmpd="sng" algn="ctr">
+                      <a:solidFill>
+                        <a:srgbClr val="DDDDDD"/>
+                      </a:solidFill>
+                      <a:prstDash val="solid"/>
+                      <a:round/>
+                      <a:headEnd type="none" w="med" len="med"/>
+                      <a:tailEnd type="none" w="med" len="med"/>
+                    </a:lnB>
+                    <a:solidFill>
+                      <a:srgbClr val="FEF3C7"/>
+                    </a:solidFill>
+                  </a:tcPr>
+                </a:tc>
+              </a:tr>
+              <a:tr h="365760">
+                <a:tc>
+                  <a:txBody>
+                    <a:bodyPr/>
+                    <a:lstStyle/>
+                    <a:p>
+                      <a:pPr algn="ctr" indent="0" marL="0">
+                        <a:buNone/>
+                      </a:pPr>
+                      <a:r>
+                        <a:rPr lang="en-US" sz="1000" b="1" dirty="0">
+                          <a:solidFill>
+                            <a:srgbClr val="000000"/>
+                          </a:solidFill>
+                          <a:latin typeface="Arial" pitchFamily="34" charset="0"/>
+                          <a:ea typeface="Arial" pitchFamily="34" charset="-122"/>
+                          <a:cs typeface="Arial" pitchFamily="34" charset="-120"/>
+                        </a:rPr>
+                        <a:t>Router Pattern</a:t>
+                      </a:r>
+                      <a:endParaRPr lang="en-US" sz="1000" dirty="0">
+                        <a:latin typeface="Arial" charset="0"/>
+                        <a:ea typeface="Arial" charset="0"/>
+                        <a:cs typeface="Arial" charset="0"/>
+                      </a:endParaRPr>
+                    </a:p>
+                  </a:txBody>
+                  <a:tcPr marL="91440" marR="91440" marT="45720" marB="45720" anchor="ctr">
+                    <a:lnL w="12700" cap="flat" cmpd="sng" algn="ctr">
+                      <a:solidFill>
+                        <a:srgbClr val="DDDDDD"/>
+                      </a:solidFill>
+                      <a:prstDash val="solid"/>
+                      <a:round/>
+                      <a:headEnd type="none" w="med" len="med"/>
+                      <a:tailEnd type="none" w="med" len="med"/>
+                    </a:lnL>
+                    <a:lnR w="12700" cap="flat" cmpd="sng" algn="ctr">
+                      <a:solidFill>
+                        <a:srgbClr val="DDDDDD"/>
+                      </a:solidFill>
+                      <a:prstDash val="solid"/>
+                      <a:round/>
+                      <a:headEnd type="none" w="med" len="med"/>
+                      <a:tailEnd type="none" w="med" len="med"/>
+                    </a:lnR>
+                    <a:lnT w="12700" cap="flat" cmpd="sng" algn="ctr">
+                      <a:solidFill>
+                        <a:srgbClr val="DDDDDD"/>
+                      </a:solidFill>
+                      <a:prstDash val="solid"/>
+                      <a:round/>
+                      <a:headEnd type="none" w="med" len="med"/>
+                      <a:tailEnd type="none" w="med" len="med"/>
+                    </a:lnT>
+                    <a:lnB w="12700" cap="flat" cmpd="sng" algn="ctr">
+                      <a:solidFill>
+                        <a:srgbClr val="DDDDDD"/>
+                      </a:solidFill>
+                      <a:prstDash val="solid"/>
+                      <a:round/>
+                      <a:headEnd type="none" w="med" len="med"/>
+                      <a:tailEnd type="none" w="med" len="med"/>
+                    </a:lnB>
+                    <a:solidFill>
+                      <a:srgbClr val="DCFCE7"/>
+                    </a:solidFill>
+                  </a:tcPr>
+                </a:tc>
+                <a:tc>
+                  <a:txBody>
+                    <a:bodyPr/>
+                    <a:lstStyle/>
+                    <a:p>
+                      <a:pPr algn="ctr" indent="0" marL="0">
+                        <a:buNone/>
+                      </a:pPr>
+                      <a:r>
+                        <a:rPr lang="en-US" sz="1000" b="1" dirty="0">
+                          <a:solidFill>
+                            <a:srgbClr val="22C55E"/>
+                          </a:solidFill>
+                          <a:latin typeface="Arial" pitchFamily="34" charset="0"/>
+                          <a:ea typeface="Arial" pitchFamily="34" charset="-122"/>
+                          <a:cs typeface="Arial" pitchFamily="34" charset="-120"/>
+                        </a:rPr>
+                        <a:t>$0.34</a:t>
+                      </a:r>
+                      <a:endParaRPr lang="en-US" sz="1000" dirty="0">
+                        <a:latin typeface="Arial" charset="0"/>
+                        <a:ea typeface="Arial" charset="0"/>
+                        <a:cs typeface="Arial" charset="0"/>
+                      </a:endParaRPr>
+                    </a:p>
+                  </a:txBody>
+                  <a:tcPr marL="91440" marR="91440" marT="45720" marB="45720" anchor="ctr">
+                    <a:lnL w="12700" cap="flat" cmpd="sng" algn="ctr">
+                      <a:solidFill>
+                        <a:srgbClr val="DDDDDD"/>
+                      </a:solidFill>
+                      <a:prstDash val="solid"/>
+                      <a:round/>
+                      <a:headEnd type="none" w="med" len="med"/>
+                      <a:tailEnd type="none" w="med" len="med"/>
+                    </a:lnL>
+                    <a:lnR w="12700" cap="flat" cmpd="sng" algn="ctr">
+                      <a:solidFill>
+                        <a:srgbClr val="DDDDDD"/>
+                      </a:solidFill>
+                      <a:prstDash val="solid"/>
+                      <a:round/>
+                      <a:headEnd type="none" w="med" len="med"/>
+                      <a:tailEnd type="none" w="med" len="med"/>
+                    </a:lnR>
+                    <a:lnT w="12700" cap="flat" cmpd="sng" algn="ctr">
+                      <a:solidFill>
+                        <a:srgbClr val="DDDDDD"/>
+                      </a:solidFill>
+                      <a:prstDash val="solid"/>
+                      <a:round/>
+                      <a:headEnd type="none" w="med" len="med"/>
+                      <a:tailEnd type="none" w="med" len="med"/>
+                    </a:lnT>
+                    <a:lnB w="12700" cap="flat" cmpd="sng" algn="ctr">
+                      <a:solidFill>
+                        <a:srgbClr val="DDDDDD"/>
+                      </a:solidFill>
+                      <a:prstDash val="solid"/>
+                      <a:round/>
+                      <a:headEnd type="none" w="med" len="med"/>
+                      <a:tailEnd type="none" w="med" len="med"/>
+                    </a:lnB>
+                    <a:solidFill>
+                      <a:srgbClr val="DCFCE7"/>
+                    </a:solidFill>
+                  </a:tcPr>
+                </a:tc>
+                <a:tc>
+                  <a:txBody>
+                    <a:bodyPr/>
+                    <a:lstStyle/>
+                    <a:p>
+                      <a:pPr algn="ctr" indent="0" marL="0">
+                        <a:buNone/>
+                      </a:pPr>
+                      <a:r>
+                        <a:rPr lang="en-US" sz="1000" b="1" dirty="0">
+                          <a:solidFill>
+                            <a:srgbClr val="000000"/>
+                          </a:solidFill>
+                          <a:latin typeface="Arial" pitchFamily="34" charset="0"/>
+                          <a:ea typeface="Arial" pitchFamily="34" charset="-122"/>
+                          <a:cs typeface="Arial" pitchFamily="34" charset="-120"/>
+                        </a:rPr>
+                        <a:t>$3,400</a:t>
+                      </a:r>
+                      <a:endParaRPr lang="en-US" sz="1000" dirty="0">
+                        <a:latin typeface="Arial" charset="0"/>
+                        <a:ea typeface="Arial" charset="0"/>
+                        <a:cs typeface="Arial" charset="0"/>
+                      </a:endParaRPr>
+                    </a:p>
+                  </a:txBody>
+                  <a:tcPr marL="91440" marR="91440" marT="45720" marB="45720" anchor="ctr">
+                    <a:lnL w="12700" cap="flat" cmpd="sng" algn="ctr">
+                      <a:solidFill>
+                        <a:srgbClr val="DDDDDD"/>
+                      </a:solidFill>
+                      <a:prstDash val="solid"/>
+                      <a:round/>
+                      <a:headEnd type="none" w="med" len="med"/>
+                      <a:tailEnd type="none" w="med" len="med"/>
+                    </a:lnL>
+                    <a:lnR w="12700" cap="flat" cmpd="sng" algn="ctr">
+                      <a:solidFill>
+                        <a:srgbClr val="DDDDDD"/>
+                      </a:solidFill>
+                      <a:prstDash val="solid"/>
+                      <a:round/>
+                      <a:headEnd type="none" w="med" len="med"/>
+                      <a:tailEnd type="none" w="med" len="med"/>
+                    </a:lnR>
+                    <a:lnT w="12700" cap="flat" cmpd="sng" algn="ctr">
+                      <a:solidFill>
+                        <a:srgbClr val="DDDDDD"/>
+                      </a:solidFill>
+                      <a:prstDash val="solid"/>
+                      <a:round/>
+                      <a:headEnd type="none" w="med" len="med"/>
+                      <a:tailEnd type="none" w="med" len="med"/>
+                    </a:lnT>
+                    <a:lnB w="12700" cap="flat" cmpd="sng" algn="ctr">
+                      <a:solidFill>
+                        <a:srgbClr val="DDDDDD"/>
+                      </a:solidFill>
+                      <a:prstDash val="solid"/>
+                      <a:round/>
+                      <a:headEnd type="none" w="med" len="med"/>
+                      <a:tailEnd type="none" w="med" len="med"/>
+                    </a:lnB>
+                    <a:solidFill>
+                      <a:srgbClr val="DCFCE7"/>
+                    </a:solidFill>
+                  </a:tcPr>
+                </a:tc>
+                <a:tc>
+                  <a:txBody>
+                    <a:bodyPr/>
+                    <a:lstStyle/>
+                    <a:p>
+                      <a:pPr algn="ctr" indent="0" marL="0">
+                        <a:buNone/>
+                      </a:pPr>
+                      <a:r>
+                        <a:rPr lang="en-US" sz="1000" b="1" dirty="0">
+                          <a:solidFill>
+                            <a:srgbClr val="22C55E"/>
+                          </a:solidFill>
+                          <a:latin typeface="Arial" pitchFamily="34" charset="0"/>
+                          <a:ea typeface="Arial" pitchFamily="34" charset="-122"/>
+                          <a:cs typeface="Arial" pitchFamily="34" charset="-120"/>
+                        </a:rPr>
+                        <a:t>Surgical precision; 92.5% savings</a:t>
+                      </a:r>
+                      <a:endParaRPr lang="en-US" sz="1000" dirty="0">
+                        <a:latin typeface="Arial" charset="0"/>
+                        <a:ea typeface="Arial" charset="0"/>
+                        <a:cs typeface="Arial" charset="0"/>
+                      </a:endParaRPr>
+                    </a:p>
+                  </a:txBody>
+                  <a:tcPr marL="91440" marR="91440" marT="45720" marB="45720" anchor="ctr">
+                    <a:lnL w="12700" cap="flat" cmpd="sng" algn="ctr">
+                      <a:solidFill>
+                        <a:srgbClr val="DDDDDD"/>
+                      </a:solidFill>
+                      <a:prstDash val="solid"/>
+                      <a:round/>
+                      <a:headEnd type="none" w="med" len="med"/>
+                      <a:tailEnd type="none" w="med" len="med"/>
+                    </a:lnL>
+                    <a:lnR w="12700" cap="flat" cmpd="sng" algn="ctr">
+                      <a:solidFill>
+                        <a:srgbClr val="DDDDDD"/>
+                      </a:solidFill>
+                      <a:prstDash val="solid"/>
+                      <a:round/>
+                      <a:headEnd type="none" w="med" len="med"/>
+                      <a:tailEnd type="none" w="med" len="med"/>
+                    </a:lnR>
+                    <a:lnT w="12700" cap="flat" cmpd="sng" algn="ctr">
+                      <a:solidFill>
+                        <a:srgbClr val="DDDDDD"/>
+                      </a:solidFill>
+                      <a:prstDash val="solid"/>
+                      <a:round/>
+                      <a:headEnd type="none" w="med" len="med"/>
+                      <a:tailEnd type="none" w="med" len="med"/>
+                    </a:lnT>
+                    <a:lnB w="12700" cap="flat" cmpd="sng" algn="ctr">
+                      <a:solidFill>
+                        <a:srgbClr val="DDDDDD"/>
+                      </a:solidFill>
+                      <a:prstDash val="solid"/>
+                      <a:round/>
+                      <a:headEnd type="none" w="med" len="med"/>
+                      <a:tailEnd type="none" w="med" len="med"/>
+                    </a:lnB>
+                    <a:solidFill>
+                      <a:srgbClr val="DCFCE7"/>
+                    </a:solidFill>
+                  </a:tcPr>
+                </a:tc>
+              </a:tr>
+            </a:tbl>
+          </a:graphicData>
+        </a:graphic>
+      </p:graphicFrame>
+      <p:sp>
+        <p:nvSpPr>
+          <p:cNvPr id="5" name="Shape 2"/>
+          <p:cNvSpPr/>
+          <p:nvPr/>
+        </p:nvSpPr>
+        <p:spPr>
+          <a:xfrm>
+            <a:off x="274320" y="3291840"/>
+            <a:ext cx="8595360" cy="640080"/>
           </a:xfrm>
           <a:prstGeom prst="roundRect">
             <a:avLst>
-              <a:gd name="adj" fmla="val 6957"/>
+              <a:gd name="adj" fmla="val 14286"/>
+            </a:avLst>
+          </a:prstGeom>
+          <a:solidFill>
+            <a:srgbClr val="1A73E8"/>
+          </a:solidFill>
+          <a:ln/>
+        </p:spPr>
+      </p:sp>
+      <p:sp>
+        <p:nvSpPr>
+          <p:cNvPr id="6" name="Text 3"/>
+          <p:cNvSpPr/>
+          <p:nvPr/>
+        </p:nvSpPr>
+        <p:spPr>
+          <a:xfrm>
+            <a:off x="365760" y="3383280"/>
+            <a:ext cx="8412480" cy="457200"/>
+          </a:xfrm>
+          <a:prstGeom prst="rect">
+            <a:avLst/>
+          </a:prstGeom>
+          <a:noFill/>
+          <a:ln/>
+        </p:spPr>
+        <p:txBody>
+          <a:bodyPr wrap="square" rtlCol="0" anchor="ctr"/>
+          <a:lstStyle/>
+          <a:p>
+            <a:pPr algn="ctr" indent="0" marL="0">
+              <a:buNone/>
+            </a:pPr>
+            <a:r>
+              <a:rPr lang="en-US" sz="1300" i="1" dirty="0">
+                <a:solidFill>
+                  <a:srgbClr val="FFFFFF"/>
+                </a:solidFill>
+                <a:latin typeface="Arial" pitchFamily="34" charset="0"/>
+                <a:ea typeface="Arial" pitchFamily="34" charset="-122"/>
+                <a:cs typeface="Arial" pitchFamily="34" charset="-120"/>
+              </a:rPr>
+              <a:t>"Use a cheap model to figure out WHERE to look, then use specialized tools to extract WHAT you need."</a:t>
+            </a:r>
+            <a:endParaRPr lang="en-US" sz="1300" dirty="0"/>
+          </a:p>
+        </p:txBody>
+      </p:sp>
+      <p:sp>
+        <p:nvSpPr>
+          <p:cNvPr id="7" name="Shape 4"/>
+          <p:cNvSpPr/>
+          <p:nvPr/>
+        </p:nvSpPr>
+        <p:spPr>
+          <a:xfrm>
+            <a:off x="365760" y="4114800"/>
+            <a:ext cx="2743200" cy="914400"/>
+          </a:xfrm>
+          <a:prstGeom prst="roundRect">
+            <a:avLst>
+              <a:gd name="adj" fmla="val 8000"/>
+            </a:avLst>
+          </a:prstGeom>
+          <a:solidFill>
+            <a:srgbClr val="FFFFFF"/>
+          </a:solidFill>
+          <a:ln w="12700">
+            <a:solidFill>
+              <a:srgbClr val="1A73E8"/>
+            </a:solidFill>
+            <a:prstDash val="solid"/>
+          </a:ln>
+        </p:spPr>
+      </p:sp>
+      <p:sp>
+        <p:nvSpPr>
+          <p:cNvPr id="8" name="Text 5"/>
+          <p:cNvSpPr/>
+          <p:nvPr/>
+        </p:nvSpPr>
+        <p:spPr>
+          <a:xfrm>
+            <a:off x="365760" y="4160520"/>
+            <a:ext cx="2743200" cy="274320"/>
+          </a:xfrm>
+          <a:prstGeom prst="rect">
+            <a:avLst/>
+          </a:prstGeom>
+          <a:noFill/>
+          <a:ln/>
+        </p:spPr>
+        <p:txBody>
+          <a:bodyPr wrap="square" rtlCol="0" anchor="ctr"/>
+          <a:lstStyle/>
+          <a:p>
+            <a:pPr algn="ctr" indent="0" marL="0">
+              <a:buNone/>
+            </a:pPr>
+            <a:r>
+              <a:rPr lang="en-US" sz="1100" b="1" dirty="0">
+                <a:solidFill>
+                  <a:srgbClr val="1A73E8"/>
+                </a:solidFill>
+                <a:latin typeface="Arial" pitchFamily="34" charset="0"/>
+                <a:ea typeface="Arial" pitchFamily="34" charset="-122"/>
+                <a:cs typeface="Arial" pitchFamily="34" charset="-120"/>
+              </a:rPr>
+              <a:t>Classification is CHEAP</a:t>
+            </a:r>
+            <a:endParaRPr lang="en-US" sz="1100" dirty="0"/>
+          </a:p>
+        </p:txBody>
+      </p:sp>
+      <p:sp>
+        <p:nvSpPr>
+          <p:cNvPr id="9" name="Text 6"/>
+          <p:cNvSpPr/>
+          <p:nvPr/>
+        </p:nvSpPr>
+        <p:spPr>
+          <a:xfrm>
+            <a:off x="365760" y="4434840"/>
+            <a:ext cx="2743200" cy="365760"/>
+          </a:xfrm>
+          <a:prstGeom prst="rect">
+            <a:avLst/>
+          </a:prstGeom>
+          <a:noFill/>
+          <a:ln/>
+        </p:spPr>
+        <p:txBody>
+          <a:bodyPr wrap="square" rtlCol="0" anchor="ctr"/>
+          <a:lstStyle/>
+          <a:p>
+            <a:pPr algn="ctr" indent="0" marL="0">
+              <a:buNone/>
+            </a:pPr>
+            <a:r>
+              <a:rPr lang="en-US" sz="900" dirty="0">
+                <a:solidFill>
+                  <a:srgbClr val="1E293B"/>
+                </a:solidFill>
+                <a:latin typeface="Arial" pitchFamily="34" charset="0"/>
+                <a:ea typeface="Arial" pitchFamily="34" charset="-122"/>
+                <a:cs typeface="Arial" pitchFamily="34" charset="-120"/>
+              </a:rPr>
+              <a:t>Claude Haiku excels at</a:t>
+            </a:r>
+            <a:endParaRPr lang="en-US" sz="900" dirty="0"/>
+          </a:p>
+          <a:p>
+            <a:pPr algn="ctr" indent="0" marL="0">
+              <a:buNone/>
+            </a:pPr>
+            <a:r>
+              <a:rPr lang="en-US" sz="900" dirty="0">
+                <a:solidFill>
+                  <a:srgbClr val="1E293B"/>
+                </a:solidFill>
+                <a:latin typeface="Arial" pitchFamily="34" charset="0"/>
+                <a:ea typeface="Arial" pitchFamily="34" charset="-122"/>
+                <a:cs typeface="Arial" pitchFamily="34" charset="-120"/>
+              </a:rPr>
+              <a:t>document structure</a:t>
+            </a:r>
+            <a:endParaRPr lang="en-US" sz="900" dirty="0"/>
+          </a:p>
+        </p:txBody>
+      </p:sp>
+      <p:sp>
+        <p:nvSpPr>
+          <p:cNvPr id="10" name="Text 7"/>
+          <p:cNvSpPr/>
+          <p:nvPr/>
+        </p:nvSpPr>
+        <p:spPr>
+          <a:xfrm>
+            <a:off x="365760" y="4800600"/>
+            <a:ext cx="2743200" cy="182880"/>
+          </a:xfrm>
+          <a:prstGeom prst="rect">
+            <a:avLst/>
+          </a:prstGeom>
+          <a:noFill/>
+          <a:ln/>
+        </p:spPr>
+        <p:txBody>
+          <a:bodyPr wrap="square" rtlCol="0" anchor="ctr"/>
+          <a:lstStyle/>
+          <a:p>
+            <a:pPr algn="ctr" indent="0" marL="0">
+              <a:buNone/>
+            </a:pPr>
+            <a:r>
+              <a:rPr lang="en-US" sz="1000" b="1" dirty="0">
+                <a:solidFill>
+                  <a:srgbClr val="22C55E"/>
+                </a:solidFill>
+                <a:latin typeface="Arial" pitchFamily="34" charset="0"/>
+                <a:ea typeface="Arial" pitchFamily="34" charset="-122"/>
+                <a:cs typeface="Arial" pitchFamily="34" charset="-120"/>
+              </a:rPr>
+              <a:t>$0.006</a:t>
+            </a:r>
+            <a:endParaRPr lang="en-US" sz="1000" dirty="0"/>
+          </a:p>
+        </p:txBody>
+      </p:sp>
+      <p:sp>
+        <p:nvSpPr>
+          <p:cNvPr id="11" name="Shape 8"/>
+          <p:cNvSpPr/>
+          <p:nvPr/>
+        </p:nvSpPr>
+        <p:spPr>
+          <a:xfrm>
+            <a:off x="3291840" y="4114800"/>
+            <a:ext cx="2743200" cy="914400"/>
+          </a:xfrm>
+          <a:prstGeom prst="roundRect">
+            <a:avLst>
+              <a:gd name="adj" fmla="val 8000"/>
+            </a:avLst>
+          </a:prstGeom>
+          <a:solidFill>
+            <a:srgbClr val="FFFFFF"/>
+          </a:solidFill>
+          <a:ln w="12700">
+            <a:solidFill>
+              <a:srgbClr val="14B8A6"/>
+            </a:solidFill>
+            <a:prstDash val="solid"/>
+          </a:ln>
+        </p:spPr>
+      </p:sp>
+      <p:sp>
+        <p:nvSpPr>
+          <p:cNvPr id="12" name="Text 9"/>
+          <p:cNvSpPr/>
+          <p:nvPr/>
+        </p:nvSpPr>
+        <p:spPr>
+          <a:xfrm>
+            <a:off x="3291840" y="4160520"/>
+            <a:ext cx="2743200" cy="274320"/>
+          </a:xfrm>
+          <a:prstGeom prst="rect">
+            <a:avLst/>
+          </a:prstGeom>
+          <a:noFill/>
+          <a:ln/>
+        </p:spPr>
+        <p:txBody>
+          <a:bodyPr wrap="square" rtlCol="0" anchor="ctr"/>
+          <a:lstStyle/>
+          <a:p>
+            <a:pPr algn="ctr" indent="0" marL="0">
+              <a:buNone/>
+            </a:pPr>
+            <a:r>
+              <a:rPr lang="en-US" sz="1100" b="1" dirty="0">
+                <a:solidFill>
+                  <a:srgbClr val="14B8A6"/>
+                </a:solidFill>
+                <a:latin typeface="Arial" pitchFamily="34" charset="0"/>
+                <a:ea typeface="Arial" pitchFamily="34" charset="-122"/>
+                <a:cs typeface="Arial" pitchFamily="34" charset="-120"/>
+              </a:rPr>
+              <a:t>OCR is SPECIALIZED</a:t>
+            </a:r>
+            <a:endParaRPr lang="en-US" sz="1100" dirty="0"/>
+          </a:p>
+        </p:txBody>
+      </p:sp>
+      <p:sp>
+        <p:nvSpPr>
+          <p:cNvPr id="13" name="Text 10"/>
+          <p:cNvSpPr/>
+          <p:nvPr/>
+        </p:nvSpPr>
+        <p:spPr>
+          <a:xfrm>
+            <a:off x="3291840" y="4434840"/>
+            <a:ext cx="2743200" cy="365760"/>
+          </a:xfrm>
+          <a:prstGeom prst="rect">
+            <a:avLst/>
+          </a:prstGeom>
+          <a:noFill/>
+          <a:ln/>
+        </p:spPr>
+        <p:txBody>
+          <a:bodyPr wrap="square" rtlCol="0" anchor="ctr"/>
+          <a:lstStyle/>
+          <a:p>
+            <a:pPr algn="ctr" indent="0" marL="0">
+              <a:buNone/>
+            </a:pPr>
+            <a:r>
+              <a:rPr lang="en-US" sz="900" dirty="0">
+                <a:solidFill>
+                  <a:srgbClr val="1E293B"/>
+                </a:solidFill>
+                <a:latin typeface="Arial" pitchFamily="34" charset="0"/>
+                <a:ea typeface="Arial" pitchFamily="34" charset="-122"/>
+                <a:cs typeface="Arial" pitchFamily="34" charset="-120"/>
+              </a:rPr>
+              <a:t>Textract beats LLM</a:t>
+            </a:r>
+            <a:endParaRPr lang="en-US" sz="900" dirty="0"/>
+          </a:p>
+          <a:p>
+            <a:pPr algn="ctr" indent="0" marL="0">
+              <a:buNone/>
+            </a:pPr>
+            <a:r>
+              <a:rPr lang="en-US" sz="900" dirty="0">
+                <a:solidFill>
+                  <a:srgbClr val="1E293B"/>
+                </a:solidFill>
+                <a:latin typeface="Arial" pitchFamily="34" charset="0"/>
+                <a:ea typeface="Arial" pitchFamily="34" charset="-122"/>
+                <a:cs typeface="Arial" pitchFamily="34" charset="-120"/>
+              </a:rPr>
+              <a:t>vision for tables</a:t>
+            </a:r>
+            <a:endParaRPr lang="en-US" sz="900" dirty="0"/>
+          </a:p>
+        </p:txBody>
+      </p:sp>
+      <p:sp>
+        <p:nvSpPr>
+          <p:cNvPr id="14" name="Text 11"/>
+          <p:cNvSpPr/>
+          <p:nvPr/>
+        </p:nvSpPr>
+        <p:spPr>
+          <a:xfrm>
+            <a:off x="3291840" y="4800600"/>
+            <a:ext cx="2743200" cy="182880"/>
+          </a:xfrm>
+          <a:prstGeom prst="rect">
+            <a:avLst/>
+          </a:prstGeom>
+          <a:noFill/>
+          <a:ln/>
+        </p:spPr>
+        <p:txBody>
+          <a:bodyPr wrap="square" rtlCol="0" anchor="ctr"/>
+          <a:lstStyle/>
+          <a:p>
+            <a:pPr algn="ctr" indent="0" marL="0">
+              <a:buNone/>
+            </a:pPr>
+            <a:r>
+              <a:rPr lang="en-US" sz="1000" b="1" dirty="0">
+                <a:solidFill>
+                  <a:srgbClr val="22C55E"/>
+                </a:solidFill>
+                <a:latin typeface="Arial" pitchFamily="34" charset="0"/>
+                <a:ea typeface="Arial" pitchFamily="34" charset="-122"/>
+                <a:cs typeface="Arial" pitchFamily="34" charset="-120"/>
+              </a:rPr>
+              <a:t>$0.02/pg</a:t>
+            </a:r>
+            <a:endParaRPr lang="en-US" sz="1000" dirty="0"/>
+          </a:p>
+        </p:txBody>
+      </p:sp>
+      <p:sp>
+        <p:nvSpPr>
+          <p:cNvPr id="15" name="Shape 12"/>
+          <p:cNvSpPr/>
+          <p:nvPr/>
+        </p:nvSpPr>
+        <p:spPr>
+          <a:xfrm>
+            <a:off x="6217920" y="4114800"/>
+            <a:ext cx="2743200" cy="914400"/>
+          </a:xfrm>
+          <a:prstGeom prst="roundRect">
+            <a:avLst>
+              <a:gd name="adj" fmla="val 8000"/>
             </a:avLst>
           </a:prstGeom>
           <a:solidFill>
@@ -5515,14 +7452,14 @@
       </p:sp>
       <p:sp>
         <p:nvSpPr>
-          <p:cNvPr id="5" name="Text 3"/>
-          <p:cNvSpPr/>
-          <p:nvPr/>
-        </p:nvSpPr>
-        <p:spPr>
-          <a:xfrm>
-            <a:off x="457200" y="1508760"/>
-            <a:ext cx="548640" cy="548640"/>
+          <p:cNvPr id="16" name="Text 13"/>
+          <p:cNvSpPr/>
+          <p:nvPr/>
+        </p:nvSpPr>
+        <p:spPr>
+          <a:xfrm>
+            <a:off x="6217920" y="4160520"/>
+            <a:ext cx="2743200" cy="274320"/>
           </a:xfrm>
           <a:prstGeom prst="rect">
             <a:avLst/>
@@ -5534,31 +7471,34 @@
           <a:bodyPr wrap="square" rtlCol="0" anchor="ctr"/>
           <a:lstStyle/>
           <a:p>
-            <a:pPr indent="0" marL="0">
-              <a:buNone/>
-            </a:pPr>
-            <a:r>
-              <a:rPr lang="en-US" sz="2400" dirty="0">
-                <a:solidFill>
-                  <a:srgbClr val="000000"/>
-                </a:solidFill>
-              </a:rPr>
-              <a:t>🧠</a:t>
-            </a:r>
-            <a:endParaRPr lang="en-US" sz="2400" dirty="0"/>
-          </a:p>
-        </p:txBody>
-      </p:sp>
-      <p:sp>
-        <p:nvSpPr>
-          <p:cNvPr id="6" name="Text 4"/>
-          <p:cNvSpPr/>
-          <p:nvPr/>
-        </p:nvSpPr>
-        <p:spPr>
-          <a:xfrm>
-            <a:off x="1097280" y="1417320"/>
-            <a:ext cx="3291840" cy="320040"/>
+            <a:pPr algn="ctr" indent="0" marL="0">
+              <a:buNone/>
+            </a:pPr>
+            <a:r>
+              <a:rPr lang="en-US" sz="1100" b="1" dirty="0">
+                <a:solidFill>
+                  <a:srgbClr val="8B5CF6"/>
+                </a:solidFill>
+                <a:latin typeface="Arial" pitchFamily="34" charset="0"/>
+                <a:ea typeface="Arial" pitchFamily="34" charset="-122"/>
+                <a:cs typeface="Arial" pitchFamily="34" charset="-120"/>
+              </a:rPr>
+              <a:t>Normalization needs SOME intelligence</a:t>
+            </a:r>
+            <a:endParaRPr lang="en-US" sz="1100" dirty="0"/>
+          </a:p>
+        </p:txBody>
+      </p:sp>
+      <p:sp>
+        <p:nvSpPr>
+          <p:cNvPr id="17" name="Text 14"/>
+          <p:cNvSpPr/>
+          <p:nvPr/>
+        </p:nvSpPr>
+        <p:spPr>
+          <a:xfrm>
+            <a:off x="6217920" y="4434840"/>
+            <a:ext cx="2743200" cy="365760"/>
           </a:xfrm>
           <a:prstGeom prst="rect">
             <a:avLst/>
@@ -5570,11 +7510,11 @@
           <a:bodyPr wrap="square" rtlCol="0" anchor="ctr"/>
           <a:lstStyle/>
           <a:p>
-            <a:pPr indent="0" marL="0">
-              <a:buNone/>
-            </a:pPr>
-            <a:r>
-              <a:rPr lang="en-US" sz="1400" b="1" dirty="0">
+            <a:pPr algn="ctr" indent="0" marL="0">
+              <a:buNone/>
+            </a:pPr>
+            <a:r>
+              <a:rPr lang="en-US" sz="900" dirty="0">
                 <a:solidFill>
                   <a:srgbClr val="1E293B"/>
                 </a:solidFill>
@@ -5582,22 +7522,39 @@
                 <a:ea typeface="Arial" pitchFamily="34" charset="-122"/>
                 <a:cs typeface="Arial" pitchFamily="34" charset="-120"/>
               </a:rPr>
-              <a:t>Intelligent Classification</a:t>
-            </a:r>
-            <a:endParaRPr lang="en-US" sz="1400" dirty="0"/>
-          </a:p>
-        </p:txBody>
-      </p:sp>
-      <p:sp>
-        <p:nvSpPr>
-          <p:cNvPr id="7" name="Text 5"/>
-          <p:cNvSpPr/>
-          <p:nvPr/>
-        </p:nvSpPr>
-        <p:spPr>
-          <a:xfrm>
-            <a:off x="1097280" y="1783080"/>
-            <a:ext cx="3291840" cy="457200"/>
+              <a:t>But not $75/M</a:t>
+            </a:r>
+            <a:endParaRPr lang="en-US" sz="900" dirty="0"/>
+          </a:p>
+          <a:p>
+            <a:pPr algn="ctr" indent="0" marL="0">
+              <a:buNone/>
+            </a:pPr>
+            <a:r>
+              <a:rPr lang="en-US" sz="900" dirty="0">
+                <a:solidFill>
+                  <a:srgbClr val="1E293B"/>
+                </a:solidFill>
+                <a:latin typeface="Arial" pitchFamily="34" charset="0"/>
+                <a:ea typeface="Arial" pitchFamily="34" charset="-122"/>
+                <a:cs typeface="Arial" pitchFamily="34" charset="-120"/>
+              </a:rPr>
+              <a:t>output token intelligence</a:t>
+            </a:r>
+            <a:endParaRPr lang="en-US" sz="900" dirty="0"/>
+          </a:p>
+        </p:txBody>
+      </p:sp>
+      <p:sp>
+        <p:nvSpPr>
+          <p:cNvPr id="18" name="Text 15"/>
+          <p:cNvSpPr/>
+          <p:nvPr/>
+        </p:nvSpPr>
+        <p:spPr>
+          <a:xfrm>
+            <a:off x="6217920" y="4800600"/>
+            <a:ext cx="2743200" cy="182880"/>
           </a:xfrm>
           <a:prstGeom prst="rect">
             <a:avLst/>
@@ -5609,726 +7566,21 @@
           <a:bodyPr wrap="square" rtlCol="0" anchor="ctr"/>
           <a:lstStyle/>
           <a:p>
-            <a:pPr indent="0" marL="0">
-              <a:buNone/>
-            </a:pPr>
-            <a:r>
-              <a:rPr lang="en-US" sz="1100" dirty="0">
-                <a:solidFill>
-                  <a:srgbClr val="232F3E"/>
-                </a:solidFill>
-                <a:latin typeface="Arial" pitchFamily="34" charset="0"/>
-                <a:ea typeface="Arial" pitchFamily="34" charset="-122"/>
-                <a:cs typeface="Arial" pitchFamily="34" charset="-120"/>
-              </a:rPr>
-              <a:t>AI identifies document types &amp; relevant pages before expensive OCR</a:t>
-            </a:r>
-            <a:endParaRPr lang="en-US" sz="1100" dirty="0"/>
-          </a:p>
-        </p:txBody>
-      </p:sp>
-      <p:sp>
-        <p:nvSpPr>
-          <p:cNvPr id="8" name="Shape 6"/>
-          <p:cNvSpPr/>
-          <p:nvPr/>
-        </p:nvSpPr>
-        <p:spPr>
-          <a:xfrm>
-            <a:off x="4754880" y="1280160"/>
-            <a:ext cx="4206240" cy="1051560"/>
-          </a:xfrm>
-          <a:prstGeom prst="roundRect">
-            <a:avLst>
-              <a:gd name="adj" fmla="val 6957"/>
-            </a:avLst>
-          </a:prstGeom>
-          <a:solidFill>
-            <a:srgbClr val="FFFFFF"/>
-          </a:solidFill>
-          <a:ln w="12700">
-            <a:solidFill>
-              <a:srgbClr val="8B5CF6"/>
-            </a:solidFill>
-            <a:prstDash val="solid"/>
-          </a:ln>
-        </p:spPr>
-      </p:sp>
-      <p:sp>
-        <p:nvSpPr>
-          <p:cNvPr id="9" name="Text 7"/>
-          <p:cNvSpPr/>
-          <p:nvPr/>
-        </p:nvSpPr>
-        <p:spPr>
-          <a:xfrm>
-            <a:off x="4846320" y="1508760"/>
-            <a:ext cx="548640" cy="548640"/>
-          </a:xfrm>
-          <a:prstGeom prst="rect">
-            <a:avLst/>
-          </a:prstGeom>
-          <a:noFill/>
-          <a:ln/>
-        </p:spPr>
-        <p:txBody>
-          <a:bodyPr wrap="square" rtlCol="0" anchor="ctr"/>
-          <a:lstStyle/>
-          <a:p>
-            <a:pPr indent="0" marL="0">
-              <a:buNone/>
-            </a:pPr>
-            <a:r>
-              <a:rPr lang="en-US" sz="2400" dirty="0">
-                <a:solidFill>
-                  <a:srgbClr val="000000"/>
-                </a:solidFill>
-              </a:rPr>
-              <a:t>🎯</a:t>
-            </a:r>
-            <a:endParaRPr lang="en-US" sz="2400" dirty="0"/>
-          </a:p>
-        </p:txBody>
-      </p:sp>
-      <p:sp>
-        <p:nvSpPr>
-          <p:cNvPr id="10" name="Text 8"/>
-          <p:cNvSpPr/>
-          <p:nvPr/>
-        </p:nvSpPr>
-        <p:spPr>
-          <a:xfrm>
-            <a:off x="5486400" y="1417320"/>
-            <a:ext cx="3291840" cy="320040"/>
-          </a:xfrm>
-          <a:prstGeom prst="rect">
-            <a:avLst/>
-          </a:prstGeom>
-          <a:noFill/>
-          <a:ln/>
-        </p:spPr>
-        <p:txBody>
-          <a:bodyPr wrap="square" rtlCol="0" anchor="ctr"/>
-          <a:lstStyle/>
-          <a:p>
-            <a:pPr indent="0" marL="0">
-              <a:buNone/>
-            </a:pPr>
-            <a:r>
-              <a:rPr lang="en-US" sz="1400" b="1" dirty="0">
-                <a:solidFill>
-                  <a:srgbClr val="1E293B"/>
-                </a:solidFill>
-                <a:latin typeface="Arial" pitchFamily="34" charset="0"/>
-                <a:ea typeface="Arial" pitchFamily="34" charset="-122"/>
-                <a:cs typeface="Arial" pitchFamily="34" charset="-120"/>
-              </a:rPr>
-              <a:t>Targeted Extraction</a:t>
-            </a:r>
-            <a:endParaRPr lang="en-US" sz="1400" dirty="0"/>
-          </a:p>
-        </p:txBody>
-      </p:sp>
-      <p:sp>
-        <p:nvSpPr>
-          <p:cNvPr id="11" name="Text 9"/>
-          <p:cNvSpPr/>
-          <p:nvPr/>
-        </p:nvSpPr>
-        <p:spPr>
-          <a:xfrm>
-            <a:off x="5486400" y="1783080"/>
-            <a:ext cx="3291840" cy="457200"/>
-          </a:xfrm>
-          <a:prstGeom prst="rect">
-            <a:avLst/>
-          </a:prstGeom>
-          <a:noFill/>
-          <a:ln/>
-        </p:spPr>
-        <p:txBody>
-          <a:bodyPr wrap="square" rtlCol="0" anchor="ctr"/>
-          <a:lstStyle/>
-          <a:p>
-            <a:pPr indent="0" marL="0">
-              <a:buNone/>
-            </a:pPr>
-            <a:r>
-              <a:rPr lang="en-US" sz="1100" dirty="0">
-                <a:solidFill>
-                  <a:srgbClr val="232F3E"/>
-                </a:solidFill>
-                <a:latin typeface="Arial" pitchFamily="34" charset="0"/>
-                <a:ea typeface="Arial" pitchFamily="34" charset="-122"/>
-                <a:cs typeface="Arial" pitchFamily="34" charset="-120"/>
-              </a:rPr>
-              <a:t>Process only pages that matter - not the entire document</a:t>
-            </a:r>
-            <a:endParaRPr lang="en-US" sz="1100" dirty="0"/>
-          </a:p>
-        </p:txBody>
-      </p:sp>
-      <p:sp>
-        <p:nvSpPr>
-          <p:cNvPr id="12" name="Shape 10"/>
-          <p:cNvSpPr/>
-          <p:nvPr/>
-        </p:nvSpPr>
-        <p:spPr>
-          <a:xfrm>
-            <a:off x="365760" y="2468880"/>
-            <a:ext cx="4206240" cy="1051560"/>
-          </a:xfrm>
-          <a:prstGeom prst="roundRect">
-            <a:avLst>
-              <a:gd name="adj" fmla="val 6957"/>
-            </a:avLst>
-          </a:prstGeom>
-          <a:solidFill>
-            <a:srgbClr val="FFFFFF"/>
-          </a:solidFill>
-          <a:ln w="12700">
-            <a:solidFill>
-              <a:srgbClr val="8B5CF6"/>
-            </a:solidFill>
-            <a:prstDash val="solid"/>
-          </a:ln>
-        </p:spPr>
-      </p:sp>
-      <p:sp>
-        <p:nvSpPr>
-          <p:cNvPr id="13" name="Text 11"/>
-          <p:cNvSpPr/>
-          <p:nvPr/>
-        </p:nvSpPr>
-        <p:spPr>
-          <a:xfrm>
-            <a:off x="457200" y="2697480"/>
-            <a:ext cx="548640" cy="548640"/>
-          </a:xfrm>
-          <a:prstGeom prst="rect">
-            <a:avLst/>
-          </a:prstGeom>
-          <a:noFill/>
-          <a:ln/>
-        </p:spPr>
-        <p:txBody>
-          <a:bodyPr wrap="square" rtlCol="0" anchor="ctr"/>
-          <a:lstStyle/>
-          <a:p>
-            <a:pPr indent="0" marL="0">
-              <a:buNone/>
-            </a:pPr>
-            <a:r>
-              <a:rPr lang="en-US" sz="2400" dirty="0">
-                <a:solidFill>
-                  <a:srgbClr val="000000"/>
-                </a:solidFill>
-              </a:rPr>
-              <a:t>🔒</a:t>
-            </a:r>
-            <a:endParaRPr lang="en-US" sz="2400" dirty="0"/>
-          </a:p>
-        </p:txBody>
-      </p:sp>
-      <p:sp>
-        <p:nvSpPr>
-          <p:cNvPr id="14" name="Text 12"/>
-          <p:cNvSpPr/>
-          <p:nvPr/>
-        </p:nvSpPr>
-        <p:spPr>
-          <a:xfrm>
-            <a:off x="1097280" y="2606040"/>
-            <a:ext cx="3291840" cy="320040"/>
-          </a:xfrm>
-          <a:prstGeom prst="rect">
-            <a:avLst/>
-          </a:prstGeom>
-          <a:noFill/>
-          <a:ln/>
-        </p:spPr>
-        <p:txBody>
-          <a:bodyPr wrap="square" rtlCol="0" anchor="ctr"/>
-          <a:lstStyle/>
-          <a:p>
-            <a:pPr indent="0" marL="0">
-              <a:buNone/>
-            </a:pPr>
-            <a:r>
-              <a:rPr lang="en-US" sz="1400" b="1" dirty="0">
-                <a:solidFill>
-                  <a:srgbClr val="1E293B"/>
-                </a:solidFill>
-                <a:latin typeface="Arial" pitchFamily="34" charset="0"/>
-                <a:ea typeface="Arial" pitchFamily="34" charset="-122"/>
-                <a:cs typeface="Arial" pitchFamily="34" charset="-120"/>
-              </a:rPr>
-              <a:t>Content Deduplication</a:t>
-            </a:r>
-            <a:endParaRPr lang="en-US" sz="1400" dirty="0"/>
-          </a:p>
-        </p:txBody>
-      </p:sp>
-      <p:sp>
-        <p:nvSpPr>
-          <p:cNvPr id="15" name="Text 13"/>
-          <p:cNvSpPr/>
-          <p:nvPr/>
-        </p:nvSpPr>
-        <p:spPr>
-          <a:xfrm>
-            <a:off x="1097280" y="2971800"/>
-            <a:ext cx="3291840" cy="457200"/>
-          </a:xfrm>
-          <a:prstGeom prst="rect">
-            <a:avLst/>
-          </a:prstGeom>
-          <a:noFill/>
-          <a:ln/>
-        </p:spPr>
-        <p:txBody>
-          <a:bodyPr wrap="square" rtlCol="0" anchor="ctr"/>
-          <a:lstStyle/>
-          <a:p>
-            <a:pPr indent="0" marL="0">
-              <a:buNone/>
-            </a:pPr>
-            <a:r>
-              <a:rPr lang="en-US" sz="1100" dirty="0">
-                <a:solidFill>
-                  <a:srgbClr val="232F3E"/>
-                </a:solidFill>
-                <a:latin typeface="Arial" pitchFamily="34" charset="0"/>
-                <a:ea typeface="Arial" pitchFamily="34" charset="-122"/>
-                <a:cs typeface="Arial" pitchFamily="34" charset="-120"/>
-              </a:rPr>
-              <a:t>SHA-256 hashing prevents reprocessing identical documents</a:t>
-            </a:r>
-            <a:endParaRPr lang="en-US" sz="1100" dirty="0"/>
-          </a:p>
-        </p:txBody>
-      </p:sp>
-      <p:sp>
-        <p:nvSpPr>
-          <p:cNvPr id="16" name="Shape 14"/>
-          <p:cNvSpPr/>
-          <p:nvPr/>
-        </p:nvSpPr>
-        <p:spPr>
-          <a:xfrm>
-            <a:off x="4754880" y="2468880"/>
-            <a:ext cx="4206240" cy="1051560"/>
-          </a:xfrm>
-          <a:prstGeom prst="roundRect">
-            <a:avLst>
-              <a:gd name="adj" fmla="val 6957"/>
-            </a:avLst>
-          </a:prstGeom>
-          <a:solidFill>
-            <a:srgbClr val="FFFFFF"/>
-          </a:solidFill>
-          <a:ln w="12700">
-            <a:solidFill>
-              <a:srgbClr val="8B5CF6"/>
-            </a:solidFill>
-            <a:prstDash val="solid"/>
-          </a:ln>
-        </p:spPr>
-      </p:sp>
-      <p:sp>
-        <p:nvSpPr>
-          <p:cNvPr id="17" name="Text 15"/>
-          <p:cNvSpPr/>
-          <p:nvPr/>
-        </p:nvSpPr>
-        <p:spPr>
-          <a:xfrm>
-            <a:off x="4846320" y="2697480"/>
-            <a:ext cx="548640" cy="548640"/>
-          </a:xfrm>
-          <a:prstGeom prst="rect">
-            <a:avLst/>
-          </a:prstGeom>
-          <a:noFill/>
-          <a:ln/>
-        </p:spPr>
-        <p:txBody>
-          <a:bodyPr wrap="square" rtlCol="0" anchor="ctr"/>
-          <a:lstStyle/>
-          <a:p>
-            <a:pPr indent="0" marL="0">
-              <a:buNone/>
-            </a:pPr>
-            <a:r>
-              <a:rPr lang="en-US" sz="2400" dirty="0">
-                <a:solidFill>
-                  <a:srgbClr val="000000"/>
-                </a:solidFill>
-              </a:rPr>
-              <a:t>📊</a:t>
-            </a:r>
-            <a:endParaRPr lang="en-US" sz="2400" dirty="0"/>
-          </a:p>
-        </p:txBody>
-      </p:sp>
-      <p:sp>
-        <p:nvSpPr>
-          <p:cNvPr id="18" name="Text 16"/>
-          <p:cNvSpPr/>
-          <p:nvPr/>
-        </p:nvSpPr>
-        <p:spPr>
-          <a:xfrm>
-            <a:off x="5486400" y="2606040"/>
-            <a:ext cx="3291840" cy="320040"/>
-          </a:xfrm>
-          <a:prstGeom prst="rect">
-            <a:avLst/>
-          </a:prstGeom>
-          <a:noFill/>
-          <a:ln/>
-        </p:spPr>
-        <p:txBody>
-          <a:bodyPr wrap="square" rtlCol="0" anchor="ctr"/>
-          <a:lstStyle/>
-          <a:p>
-            <a:pPr indent="0" marL="0">
-              <a:buNone/>
-            </a:pPr>
-            <a:r>
-              <a:rPr lang="en-US" sz="1400" b="1" dirty="0">
-                <a:solidFill>
-                  <a:srgbClr val="1E293B"/>
-                </a:solidFill>
-                <a:latin typeface="Arial" pitchFamily="34" charset="0"/>
-                <a:ea typeface="Arial" pitchFamily="34" charset="-122"/>
-                <a:cs typeface="Arial" pitchFamily="34" charset="-120"/>
-              </a:rPr>
-              <a:t>Complete Audit Trail</a:t>
-            </a:r>
-            <a:endParaRPr lang="en-US" sz="1400" dirty="0"/>
-          </a:p>
-        </p:txBody>
-      </p:sp>
-      <p:sp>
-        <p:nvSpPr>
-          <p:cNvPr id="19" name="Text 17"/>
-          <p:cNvSpPr/>
-          <p:nvPr/>
-        </p:nvSpPr>
-        <p:spPr>
-          <a:xfrm>
-            <a:off x="5486400" y="2971800"/>
-            <a:ext cx="3291840" cy="457200"/>
-          </a:xfrm>
-          <a:prstGeom prst="rect">
-            <a:avLst/>
-          </a:prstGeom>
-          <a:noFill/>
-          <a:ln/>
-        </p:spPr>
-        <p:txBody>
-          <a:bodyPr wrap="square" rtlCol="0" anchor="ctr"/>
-          <a:lstStyle/>
-          <a:p>
-            <a:pPr indent="0" marL="0">
-              <a:buNone/>
-            </a:pPr>
-            <a:r>
-              <a:rPr lang="en-US" sz="1100" dirty="0">
-                <a:solidFill>
-                  <a:srgbClr val="232F3E"/>
-                </a:solidFill>
-                <a:latin typeface="Arial" pitchFamily="34" charset="0"/>
-                <a:ea typeface="Arial" pitchFamily="34" charset="-122"/>
-                <a:cs typeface="Arial" pitchFamily="34" charset="-120"/>
-              </a:rPr>
-              <a:t>Track exactly which page each data point originated from</a:t>
-            </a:r>
-            <a:endParaRPr lang="en-US" sz="1100" dirty="0"/>
-          </a:p>
-        </p:txBody>
-      </p:sp>
-      <p:sp>
-        <p:nvSpPr>
-          <p:cNvPr id="20" name="Shape 18"/>
-          <p:cNvSpPr/>
-          <p:nvPr/>
-        </p:nvSpPr>
-        <p:spPr>
-          <a:xfrm>
-            <a:off x="365760" y="3657600"/>
-            <a:ext cx="4206240" cy="1051560"/>
-          </a:xfrm>
-          <a:prstGeom prst="roundRect">
-            <a:avLst>
-              <a:gd name="adj" fmla="val 6957"/>
-            </a:avLst>
-          </a:prstGeom>
-          <a:solidFill>
-            <a:srgbClr val="FFFFFF"/>
-          </a:solidFill>
-          <a:ln w="12700">
-            <a:solidFill>
-              <a:srgbClr val="8B5CF6"/>
-            </a:solidFill>
-            <a:prstDash val="solid"/>
-          </a:ln>
-        </p:spPr>
-      </p:sp>
-      <p:sp>
-        <p:nvSpPr>
-          <p:cNvPr id="21" name="Text 19"/>
-          <p:cNvSpPr/>
-          <p:nvPr/>
-        </p:nvSpPr>
-        <p:spPr>
-          <a:xfrm>
-            <a:off x="457200" y="3886200"/>
-            <a:ext cx="548640" cy="548640"/>
-          </a:xfrm>
-          <a:prstGeom prst="rect">
-            <a:avLst/>
-          </a:prstGeom>
-          <a:noFill/>
-          <a:ln/>
-        </p:spPr>
-        <p:txBody>
-          <a:bodyPr wrap="square" rtlCol="0" anchor="ctr"/>
-          <a:lstStyle/>
-          <a:p>
-            <a:pPr indent="0" marL="0">
-              <a:buNone/>
-            </a:pPr>
-            <a:r>
-              <a:rPr lang="en-US" sz="2400" dirty="0">
-                <a:solidFill>
-                  <a:srgbClr val="000000"/>
-                </a:solidFill>
-              </a:rPr>
-              <a:t>✅</a:t>
-            </a:r>
-            <a:endParaRPr lang="en-US" sz="2400" dirty="0"/>
-          </a:p>
-        </p:txBody>
-      </p:sp>
-      <p:sp>
-        <p:nvSpPr>
-          <p:cNvPr id="22" name="Text 20"/>
-          <p:cNvSpPr/>
-          <p:nvPr/>
-        </p:nvSpPr>
-        <p:spPr>
-          <a:xfrm>
-            <a:off x="1097280" y="3794760"/>
-            <a:ext cx="3291840" cy="320040"/>
-          </a:xfrm>
-          <a:prstGeom prst="rect">
-            <a:avLst/>
-          </a:prstGeom>
-          <a:noFill/>
-          <a:ln/>
-        </p:spPr>
-        <p:txBody>
-          <a:bodyPr wrap="square" rtlCol="0" anchor="ctr"/>
-          <a:lstStyle/>
-          <a:p>
-            <a:pPr indent="0" marL="0">
-              <a:buNone/>
-            </a:pPr>
-            <a:r>
-              <a:rPr lang="en-US" sz="1400" b="1" dirty="0">
-                <a:solidFill>
-                  <a:srgbClr val="1E293B"/>
-                </a:solidFill>
-                <a:latin typeface="Arial" pitchFamily="34" charset="0"/>
-                <a:ea typeface="Arial" pitchFamily="34" charset="-122"/>
-                <a:cs typeface="Arial" pitchFamily="34" charset="-120"/>
-              </a:rPr>
-              <a:t>Review Workflow</a:t>
-            </a:r>
-            <a:endParaRPr lang="en-US" sz="1400" dirty="0"/>
-          </a:p>
-        </p:txBody>
-      </p:sp>
-      <p:sp>
-        <p:nvSpPr>
-          <p:cNvPr id="23" name="Text 21"/>
-          <p:cNvSpPr/>
-          <p:nvPr/>
-        </p:nvSpPr>
-        <p:spPr>
-          <a:xfrm>
-            <a:off x="1097280" y="4160520"/>
-            <a:ext cx="3291840" cy="457200"/>
-          </a:xfrm>
-          <a:prstGeom prst="rect">
-            <a:avLst/>
-          </a:prstGeom>
-          <a:noFill/>
-          <a:ln/>
-        </p:spPr>
-        <p:txBody>
-          <a:bodyPr wrap="square" rtlCol="0" anchor="ctr"/>
-          <a:lstStyle/>
-          <a:p>
-            <a:pPr indent="0" marL="0">
-              <a:buNone/>
-            </a:pPr>
-            <a:r>
-              <a:rPr lang="en-US" sz="1100" dirty="0">
-                <a:solidFill>
-                  <a:srgbClr val="232F3E"/>
-                </a:solidFill>
-                <a:latin typeface="Arial" pitchFamily="34" charset="0"/>
-                <a:ea typeface="Arial" pitchFamily="34" charset="-122"/>
-                <a:cs typeface="Arial" pitchFamily="34" charset="-120"/>
-              </a:rPr>
-              <a:t>Human-in-the-loop: Approve, Reject, or Correct extracted data</a:t>
-            </a:r>
-            <a:endParaRPr lang="en-US" sz="1100" dirty="0"/>
-          </a:p>
-        </p:txBody>
-      </p:sp>
-      <p:sp>
-        <p:nvSpPr>
-          <p:cNvPr id="24" name="Shape 22"/>
-          <p:cNvSpPr/>
-          <p:nvPr/>
-        </p:nvSpPr>
-        <p:spPr>
-          <a:xfrm>
-            <a:off x="4754880" y="3657600"/>
-            <a:ext cx="4206240" cy="1051560"/>
-          </a:xfrm>
-          <a:prstGeom prst="roundRect">
-            <a:avLst>
-              <a:gd name="adj" fmla="val 6957"/>
-            </a:avLst>
-          </a:prstGeom>
-          <a:solidFill>
-            <a:srgbClr val="FFFFFF"/>
-          </a:solidFill>
-          <a:ln w="12700">
-            <a:solidFill>
-              <a:srgbClr val="8B5CF6"/>
-            </a:solidFill>
-            <a:prstDash val="solid"/>
-          </a:ln>
-        </p:spPr>
-      </p:sp>
-      <p:sp>
-        <p:nvSpPr>
-          <p:cNvPr id="25" name="Text 23"/>
-          <p:cNvSpPr/>
-          <p:nvPr/>
-        </p:nvSpPr>
-        <p:spPr>
-          <a:xfrm>
-            <a:off x="4846320" y="3886200"/>
-            <a:ext cx="548640" cy="548640"/>
-          </a:xfrm>
-          <a:prstGeom prst="rect">
-            <a:avLst/>
-          </a:prstGeom>
-          <a:noFill/>
-          <a:ln/>
-        </p:spPr>
-        <p:txBody>
-          <a:bodyPr wrap="square" rtlCol="0" anchor="ctr"/>
-          <a:lstStyle/>
-          <a:p>
-            <a:pPr indent="0" marL="0">
-              <a:buNone/>
-            </a:pPr>
-            <a:r>
-              <a:rPr lang="en-US" sz="2400" dirty="0">
-                <a:solidFill>
-                  <a:srgbClr val="000000"/>
-                </a:solidFill>
-              </a:rPr>
-              <a:t>☁️</a:t>
-            </a:r>
-            <a:endParaRPr lang="en-US" sz="2400" dirty="0"/>
-          </a:p>
-        </p:txBody>
-      </p:sp>
-      <p:sp>
-        <p:nvSpPr>
-          <p:cNvPr id="26" name="Text 24"/>
-          <p:cNvSpPr/>
-          <p:nvPr/>
-        </p:nvSpPr>
-        <p:spPr>
-          <a:xfrm>
-            <a:off x="5486400" y="3794760"/>
-            <a:ext cx="3291840" cy="320040"/>
-          </a:xfrm>
-          <a:prstGeom prst="rect">
-            <a:avLst/>
-          </a:prstGeom>
-          <a:noFill/>
-          <a:ln/>
-        </p:spPr>
-        <p:txBody>
-          <a:bodyPr wrap="square" rtlCol="0" anchor="ctr"/>
-          <a:lstStyle/>
-          <a:p>
-            <a:pPr indent="0" marL="0">
-              <a:buNone/>
-            </a:pPr>
-            <a:r>
-              <a:rPr lang="en-US" sz="1400" b="1" dirty="0">
-                <a:solidFill>
-                  <a:srgbClr val="1E293B"/>
-                </a:solidFill>
-                <a:latin typeface="Arial" pitchFamily="34" charset="0"/>
-                <a:ea typeface="Arial" pitchFamily="34" charset="-122"/>
-                <a:cs typeface="Arial" pitchFamily="34" charset="-120"/>
-              </a:rPr>
-              <a:t>Serverless &amp; Scalable</a:t>
-            </a:r>
-            <a:endParaRPr lang="en-US" sz="1400" dirty="0"/>
-          </a:p>
-        </p:txBody>
-      </p:sp>
-      <p:sp>
-        <p:nvSpPr>
-          <p:cNvPr id="27" name="Text 25"/>
-          <p:cNvSpPr/>
-          <p:nvPr/>
-        </p:nvSpPr>
-        <p:spPr>
-          <a:xfrm>
-            <a:off x="5486400" y="4160520"/>
-            <a:ext cx="3291840" cy="457200"/>
-          </a:xfrm>
-          <a:prstGeom prst="rect">
-            <a:avLst/>
-          </a:prstGeom>
-          <a:noFill/>
-          <a:ln/>
-        </p:spPr>
-        <p:txBody>
-          <a:bodyPr wrap="square" rtlCol="0" anchor="ctr"/>
-          <a:lstStyle/>
-          <a:p>
-            <a:pPr indent="0" marL="0">
-              <a:buNone/>
-            </a:pPr>
-            <a:r>
-              <a:rPr lang="en-US" sz="1100" dirty="0">
-                <a:solidFill>
-                  <a:srgbClr val="232F3E"/>
-                </a:solidFill>
-                <a:latin typeface="Arial" pitchFamily="34" charset="0"/>
-                <a:ea typeface="Arial" pitchFamily="34" charset="-122"/>
-                <a:cs typeface="Arial" pitchFamily="34" charset="-120"/>
-              </a:rPr>
-              <a:t>Zero infrastructure management, auto-scales to any volume</a:t>
-            </a:r>
-            <a:endParaRPr lang="en-US" sz="1100" dirty="0"/>
+            <a:pPr algn="ctr" indent="0" marL="0">
+              <a:buNone/>
+            </a:pPr>
+            <a:r>
+              <a:rPr lang="en-US" sz="1000" b="1" dirty="0">
+                <a:solidFill>
+                  <a:srgbClr val="22C55E"/>
+                </a:solidFill>
+                <a:latin typeface="Arial" pitchFamily="34" charset="0"/>
+                <a:ea typeface="Arial" pitchFamily="34" charset="-122"/>
+                <a:cs typeface="Arial" pitchFamily="34" charset="-120"/>
+              </a:rPr>
+              <a:t>$0.03</a:t>
+            </a:r>
+            <a:endParaRPr lang="en-US" sz="1000" dirty="0"/>
           </a:p>
         </p:txBody>
       </p:sp>
@@ -6372,7 +7624,7 @@
             <a:avLst/>
           </a:prstGeom>
           <a:solidFill>
-            <a:srgbClr val="14B8A6"/>
+            <a:srgbClr val="8B5CF6"/>
           </a:solidFill>
           <a:ln/>
         </p:spPr>
@@ -6410,7 +7662,7 @@
                 <a:ea typeface="Arial" pitchFamily="34" charset="-122"/>
                 <a:cs typeface="Arial" pitchFamily="34" charset="-120"/>
               </a:rPr>
-              <a:t>Supported Document Types</a:t>
+              <a:t>Key Differentiators</a:t>
             </a:r>
             <a:endParaRPr lang="en-US" sz="3200" dirty="0"/>
           </a:p>
@@ -6425,160 +7677,15 @@
         <p:spPr>
           <a:xfrm>
             <a:off x="365760" y="1280160"/>
-            <a:ext cx="4206240" cy="3474720"/>
+            <a:ext cx="4206240" cy="1051560"/>
           </a:xfrm>
           <a:prstGeom prst="roundRect">
             <a:avLst>
-              <a:gd name="adj" fmla="val 2632"/>
+              <a:gd name="adj" fmla="val 6957"/>
             </a:avLst>
           </a:prstGeom>
           <a:solidFill>
-            <a:srgbClr val="F0FDFA"/>
-          </a:solidFill>
-          <a:ln w="12700">
-            <a:solidFill>
-              <a:srgbClr val="14B8A6"/>
-            </a:solidFill>
-            <a:prstDash val="solid"/>
-          </a:ln>
-        </p:spPr>
-      </p:sp>
-      <p:sp>
-        <p:nvSpPr>
-          <p:cNvPr id="5" name="Text 3"/>
-          <p:cNvSpPr/>
-          <p:nvPr/>
-        </p:nvSpPr>
-        <p:spPr>
-          <a:xfrm>
-            <a:off x="457200" y="1417320"/>
-            <a:ext cx="4023360" cy="365760"/>
-          </a:xfrm>
-          <a:prstGeom prst="rect">
-            <a:avLst/>
-          </a:prstGeom>
-          <a:noFill/>
-          <a:ln/>
-        </p:spPr>
-        <p:txBody>
-          <a:bodyPr wrap="square" rtlCol="0" anchor="ctr"/>
-          <a:lstStyle/>
-          <a:p>
-            <a:pPr indent="0" marL="0">
-              <a:buNone/>
-            </a:pPr>
-            <a:r>
-              <a:rPr lang="en-US" sz="1800" b="1" dirty="0">
-                <a:solidFill>
-                  <a:srgbClr val="14B8A6"/>
-                </a:solidFill>
-                <a:latin typeface="Arial" pitchFamily="34" charset="0"/>
-                <a:ea typeface="Arial" pitchFamily="34" charset="-122"/>
-                <a:cs typeface="Arial" pitchFamily="34" charset="-120"/>
-              </a:rPr>
-              <a:t>📄 Loan Packages</a:t>
-            </a:r>
-            <a:endParaRPr lang="en-US" sz="1800" dirty="0"/>
-          </a:p>
-        </p:txBody>
-      </p:sp>
-      <p:sp>
-        <p:nvSpPr>
-          <p:cNvPr id="6" name="Text 4"/>
-          <p:cNvSpPr/>
-          <p:nvPr/>
-        </p:nvSpPr>
-        <p:spPr>
-          <a:xfrm>
-            <a:off x="548640" y="1920240"/>
-            <a:ext cx="3840480" cy="2560320"/>
-          </a:xfrm>
-          <a:prstGeom prst="rect">
-            <a:avLst/>
-          </a:prstGeom>
-          <a:noFill/>
-          <a:ln/>
-        </p:spPr>
-        <p:txBody>
-          <a:bodyPr wrap="square" rtlCol="0" anchor="ctr"/>
-          <a:lstStyle/>
-          <a:p>
-            <a:pPr>
-              <a:spcBef>
-                <a:spcPts val="800"/>
-              </a:spcBef>
-            </a:pPr>
-            <a:r>
-              <a:rPr lang="en-US" sz="1200" dirty="0">
-                <a:solidFill>
-                  <a:srgbClr val="1E293B"/>
-                </a:solidFill>
-                <a:latin typeface="Arial" pitchFamily="34" charset="0"/>
-                <a:ea typeface="Arial" pitchFamily="34" charset="-122"/>
-                <a:cs typeface="Arial" pitchFamily="34" charset="-120"/>
-              </a:rPr>
-              <a:t>Promissory Note - Interest rate, principal, borrower names, maturity date</a:t>
-            </a:r>
-            <a:endParaRPr lang="en-US" sz="1200" dirty="0"/>
-          </a:p>
-          <a:p>
-            <a:pPr>
-              <a:spcBef>
-                <a:spcPts val="800"/>
-              </a:spcBef>
-            </a:pPr>
-            <a:r>
-              <a:rPr lang="en-US" sz="1200" dirty="0">
-                <a:solidFill>
-                  <a:srgbClr val="1E293B"/>
-                </a:solidFill>
-                <a:latin typeface="Arial" pitchFamily="34" charset="0"/>
-                <a:ea typeface="Arial" pitchFamily="34" charset="-122"/>
-                <a:cs typeface="Arial" pitchFamily="34" charset="-120"/>
-              </a:rPr>
-              <a:t>Closing Disclosure - Loan amount, fees, cash to close</a:t>
-            </a:r>
-            <a:endParaRPr lang="en-US" sz="1200" dirty="0"/>
-          </a:p>
-          <a:p>
-            <a:pPr>
-              <a:spcBef>
-                <a:spcPts val="800"/>
-              </a:spcBef>
-            </a:pPr>
-            <a:r>
-              <a:rPr lang="en-US" sz="1200" dirty="0">
-                <a:solidFill>
-                  <a:srgbClr val="1E293B"/>
-                </a:solidFill>
-                <a:latin typeface="Arial" pitchFamily="34" charset="0"/>
-                <a:ea typeface="Arial" pitchFamily="34" charset="-122"/>
-                <a:cs typeface="Arial" pitchFamily="34" charset="-120"/>
-              </a:rPr>
-              <a:t>Form 1003 - Borrower info, property address, employment</a:t>
-            </a:r>
-            <a:endParaRPr lang="en-US" sz="1200" dirty="0"/>
-          </a:p>
-        </p:txBody>
-      </p:sp>
-      <p:sp>
-        <p:nvSpPr>
-          <p:cNvPr id="7" name="Shape 5"/>
-          <p:cNvSpPr/>
-          <p:nvPr/>
-        </p:nvSpPr>
-        <p:spPr>
-          <a:xfrm>
-            <a:off x="4572000" y="1280160"/>
-            <a:ext cx="4206240" cy="3474720"/>
-          </a:xfrm>
-          <a:prstGeom prst="roundRect">
-            <a:avLst>
-              <a:gd name="adj" fmla="val 2632"/>
-            </a:avLst>
-          </a:prstGeom>
-          <a:solidFill>
-            <a:srgbClr val="FAF5FF"/>
+            <a:srgbClr val="FFFFFF"/>
           </a:solidFill>
           <a:ln w="12700">
             <a:solidFill>
@@ -6590,14 +7697,14 @@
       </p:sp>
       <p:sp>
         <p:nvSpPr>
-          <p:cNvPr id="8" name="Text 6"/>
-          <p:cNvSpPr/>
-          <p:nvPr/>
-        </p:nvSpPr>
-        <p:spPr>
-          <a:xfrm>
-            <a:off x="4663440" y="1417320"/>
-            <a:ext cx="4023360" cy="365760"/>
+          <p:cNvPr id="5" name="Text 3"/>
+          <p:cNvSpPr/>
+          <p:nvPr/>
+        </p:nvSpPr>
+        <p:spPr>
+          <a:xfrm>
+            <a:off x="457200" y="1508760"/>
+            <a:ext cx="548640" cy="548640"/>
           </a:xfrm>
           <a:prstGeom prst="rect">
             <a:avLst/>
@@ -6613,19 +7720,121 @@
               <a:buNone/>
             </a:pPr>
             <a:r>
-              <a:rPr lang="en-US" sz="1800" b="1" dirty="0">
-                <a:solidFill>
-                  <a:srgbClr val="8B5CF6"/>
-                </a:solidFill>
-                <a:latin typeface="Arial" pitchFamily="34" charset="0"/>
-                <a:ea typeface="Arial" pitchFamily="34" charset="-122"/>
-                <a:cs typeface="Arial" pitchFamily="34" charset="-120"/>
-              </a:rPr>
-              <a:t>📋 Credit Agreements</a:t>
-            </a:r>
-            <a:endParaRPr lang="en-US" sz="1800" dirty="0"/>
-          </a:p>
-        </p:txBody>
+              <a:rPr lang="en-US" sz="2400" dirty="0">
+                <a:solidFill>
+                  <a:srgbClr val="000000"/>
+                </a:solidFill>
+              </a:rPr>
+              <a:t>🧠</a:t>
+            </a:r>
+            <a:endParaRPr lang="en-US" sz="2400" dirty="0"/>
+          </a:p>
+        </p:txBody>
+      </p:sp>
+      <p:sp>
+        <p:nvSpPr>
+          <p:cNvPr id="6" name="Text 4"/>
+          <p:cNvSpPr/>
+          <p:nvPr/>
+        </p:nvSpPr>
+        <p:spPr>
+          <a:xfrm>
+            <a:off x="1097280" y="1417320"/>
+            <a:ext cx="3291840" cy="320040"/>
+          </a:xfrm>
+          <a:prstGeom prst="rect">
+            <a:avLst/>
+          </a:prstGeom>
+          <a:noFill/>
+          <a:ln/>
+        </p:spPr>
+        <p:txBody>
+          <a:bodyPr wrap="square" rtlCol="0" anchor="ctr"/>
+          <a:lstStyle/>
+          <a:p>
+            <a:pPr indent="0" marL="0">
+              <a:buNone/>
+            </a:pPr>
+            <a:r>
+              <a:rPr lang="en-US" sz="1400" b="1" dirty="0">
+                <a:solidFill>
+                  <a:srgbClr val="1E293B"/>
+                </a:solidFill>
+                <a:latin typeface="Arial" pitchFamily="34" charset="0"/>
+                <a:ea typeface="Arial" pitchFamily="34" charset="-122"/>
+                <a:cs typeface="Arial" pitchFamily="34" charset="-120"/>
+              </a:rPr>
+              <a:t>Intelligent Classification</a:t>
+            </a:r>
+            <a:endParaRPr lang="en-US" sz="1400" dirty="0"/>
+          </a:p>
+        </p:txBody>
+      </p:sp>
+      <p:sp>
+        <p:nvSpPr>
+          <p:cNvPr id="7" name="Text 5"/>
+          <p:cNvSpPr/>
+          <p:nvPr/>
+        </p:nvSpPr>
+        <p:spPr>
+          <a:xfrm>
+            <a:off x="1097280" y="1783080"/>
+            <a:ext cx="3291840" cy="457200"/>
+          </a:xfrm>
+          <a:prstGeom prst="rect">
+            <a:avLst/>
+          </a:prstGeom>
+          <a:noFill/>
+          <a:ln/>
+        </p:spPr>
+        <p:txBody>
+          <a:bodyPr wrap="square" rtlCol="0" anchor="ctr"/>
+          <a:lstStyle/>
+          <a:p>
+            <a:pPr indent="0" marL="0">
+              <a:buNone/>
+            </a:pPr>
+            <a:r>
+              <a:rPr lang="en-US" sz="1100" dirty="0">
+                <a:solidFill>
+                  <a:srgbClr val="232F3E"/>
+                </a:solidFill>
+                <a:latin typeface="Arial" pitchFamily="34" charset="0"/>
+                <a:ea typeface="Arial" pitchFamily="34" charset="-122"/>
+                <a:cs typeface="Arial" pitchFamily="34" charset="-120"/>
+              </a:rPr>
+              <a:t>AI identifies document types &amp; relevant pages before expensive OCR</a:t>
+            </a:r>
+            <a:endParaRPr lang="en-US" sz="1100" dirty="0"/>
+          </a:p>
+        </p:txBody>
+      </p:sp>
+      <p:sp>
+        <p:nvSpPr>
+          <p:cNvPr id="8" name="Shape 6"/>
+          <p:cNvSpPr/>
+          <p:nvPr/>
+        </p:nvSpPr>
+        <p:spPr>
+          <a:xfrm>
+            <a:off x="4754880" y="1280160"/>
+            <a:ext cx="4206240" cy="1051560"/>
+          </a:xfrm>
+          <a:prstGeom prst="roundRect">
+            <a:avLst>
+              <a:gd name="adj" fmla="val 6957"/>
+            </a:avLst>
+          </a:prstGeom>
+          <a:solidFill>
+            <a:srgbClr val="FFFFFF"/>
+          </a:solidFill>
+          <a:ln w="12700">
+            <a:solidFill>
+              <a:srgbClr val="8B5CF6"/>
+            </a:solidFill>
+            <a:prstDash val="solid"/>
+          </a:ln>
+        </p:spPr>
       </p:sp>
       <p:sp>
         <p:nvSpPr>
@@ -6635,8 +7844,8 @@
         </p:nvSpPr>
         <p:spPr>
           <a:xfrm>
-            <a:off x="4754880" y="1920240"/>
-            <a:ext cx="3840480" cy="2560320"/>
+            <a:off x="4846320" y="1508760"/>
+            <a:ext cx="548640" cy="548640"/>
           </a:xfrm>
           <a:prstGeom prst="rect">
             <a:avLst/>
@@ -6648,116 +7857,658 @@
           <a:bodyPr wrap="square" rtlCol="0" anchor="ctr"/>
           <a:lstStyle/>
           <a:p>
-            <a:pPr>
-              <a:spcBef>
-                <a:spcPts val="600"/>
-              </a:spcBef>
+            <a:pPr indent="0" marL="0">
+              <a:buNone/>
+            </a:pPr>
+            <a:r>
+              <a:rPr lang="en-US" sz="2400" dirty="0">
+                <a:solidFill>
+                  <a:srgbClr val="000000"/>
+                </a:solidFill>
+              </a:rPr>
+              <a:t>🎯</a:t>
+            </a:r>
+            <a:endParaRPr lang="en-US" sz="2400" dirty="0"/>
+          </a:p>
+        </p:txBody>
+      </p:sp>
+      <p:sp>
+        <p:nvSpPr>
+          <p:cNvPr id="10" name="Text 8"/>
+          <p:cNvSpPr/>
+          <p:nvPr/>
+        </p:nvSpPr>
+        <p:spPr>
+          <a:xfrm>
+            <a:off x="5486400" y="1417320"/>
+            <a:ext cx="3291840" cy="320040"/>
+          </a:xfrm>
+          <a:prstGeom prst="rect">
+            <a:avLst/>
+          </a:prstGeom>
+          <a:noFill/>
+          <a:ln/>
+        </p:spPr>
+        <p:txBody>
+          <a:bodyPr wrap="square" rtlCol="0" anchor="ctr"/>
+          <a:lstStyle/>
+          <a:p>
+            <a:pPr indent="0" marL="0">
+              <a:buNone/>
+            </a:pPr>
+            <a:r>
+              <a:rPr lang="en-US" sz="1400" b="1" dirty="0">
+                <a:solidFill>
+                  <a:srgbClr val="1E293B"/>
+                </a:solidFill>
+                <a:latin typeface="Arial" pitchFamily="34" charset="0"/>
+                <a:ea typeface="Arial" pitchFamily="34" charset="-122"/>
+                <a:cs typeface="Arial" pitchFamily="34" charset="-120"/>
+              </a:rPr>
+              <a:t>Targeted Extraction</a:t>
+            </a:r>
+            <a:endParaRPr lang="en-US" sz="1400" dirty="0"/>
+          </a:p>
+        </p:txBody>
+      </p:sp>
+      <p:sp>
+        <p:nvSpPr>
+          <p:cNvPr id="11" name="Text 9"/>
+          <p:cNvSpPr/>
+          <p:nvPr/>
+        </p:nvSpPr>
+        <p:spPr>
+          <a:xfrm>
+            <a:off x="5486400" y="1783080"/>
+            <a:ext cx="3291840" cy="457200"/>
+          </a:xfrm>
+          <a:prstGeom prst="rect">
+            <a:avLst/>
+          </a:prstGeom>
+          <a:noFill/>
+          <a:ln/>
+        </p:spPr>
+        <p:txBody>
+          <a:bodyPr wrap="square" rtlCol="0" anchor="ctr"/>
+          <a:lstStyle/>
+          <a:p>
+            <a:pPr indent="0" marL="0">
+              <a:buNone/>
             </a:pPr>
             <a:r>
               <a:rPr lang="en-US" sz="1100" dirty="0">
                 <a:solidFill>
+                  <a:srgbClr val="232F3E"/>
+                </a:solidFill>
+                <a:latin typeface="Arial" pitchFamily="34" charset="0"/>
+                <a:ea typeface="Arial" pitchFamily="34" charset="-122"/>
+                <a:cs typeface="Arial" pitchFamily="34" charset="-120"/>
+              </a:rPr>
+              <a:t>Process only pages that matter - not the entire document</a:t>
+            </a:r>
+            <a:endParaRPr lang="en-US" sz="1100" dirty="0"/>
+          </a:p>
+        </p:txBody>
+      </p:sp>
+      <p:sp>
+        <p:nvSpPr>
+          <p:cNvPr id="12" name="Shape 10"/>
+          <p:cNvSpPr/>
+          <p:nvPr/>
+        </p:nvSpPr>
+        <p:spPr>
+          <a:xfrm>
+            <a:off x="365760" y="2468880"/>
+            <a:ext cx="4206240" cy="1051560"/>
+          </a:xfrm>
+          <a:prstGeom prst="roundRect">
+            <a:avLst>
+              <a:gd name="adj" fmla="val 6957"/>
+            </a:avLst>
+          </a:prstGeom>
+          <a:solidFill>
+            <a:srgbClr val="FFFFFF"/>
+          </a:solidFill>
+          <a:ln w="12700">
+            <a:solidFill>
+              <a:srgbClr val="8B5CF6"/>
+            </a:solidFill>
+            <a:prstDash val="solid"/>
+          </a:ln>
+        </p:spPr>
+      </p:sp>
+      <p:sp>
+        <p:nvSpPr>
+          <p:cNvPr id="13" name="Text 11"/>
+          <p:cNvSpPr/>
+          <p:nvPr/>
+        </p:nvSpPr>
+        <p:spPr>
+          <a:xfrm>
+            <a:off x="457200" y="2697480"/>
+            <a:ext cx="548640" cy="548640"/>
+          </a:xfrm>
+          <a:prstGeom prst="rect">
+            <a:avLst/>
+          </a:prstGeom>
+          <a:noFill/>
+          <a:ln/>
+        </p:spPr>
+        <p:txBody>
+          <a:bodyPr wrap="square" rtlCol="0" anchor="ctr"/>
+          <a:lstStyle/>
+          <a:p>
+            <a:pPr indent="0" marL="0">
+              <a:buNone/>
+            </a:pPr>
+            <a:r>
+              <a:rPr lang="en-US" sz="2400" dirty="0">
+                <a:solidFill>
+                  <a:srgbClr val="000000"/>
+                </a:solidFill>
+              </a:rPr>
+              <a:t>🔒</a:t>
+            </a:r>
+            <a:endParaRPr lang="en-US" sz="2400" dirty="0"/>
+          </a:p>
+        </p:txBody>
+      </p:sp>
+      <p:sp>
+        <p:nvSpPr>
+          <p:cNvPr id="14" name="Text 12"/>
+          <p:cNvSpPr/>
+          <p:nvPr/>
+        </p:nvSpPr>
+        <p:spPr>
+          <a:xfrm>
+            <a:off x="1097280" y="2606040"/>
+            <a:ext cx="3291840" cy="320040"/>
+          </a:xfrm>
+          <a:prstGeom prst="rect">
+            <a:avLst/>
+          </a:prstGeom>
+          <a:noFill/>
+          <a:ln/>
+        </p:spPr>
+        <p:txBody>
+          <a:bodyPr wrap="square" rtlCol="0" anchor="ctr"/>
+          <a:lstStyle/>
+          <a:p>
+            <a:pPr indent="0" marL="0">
+              <a:buNone/>
+            </a:pPr>
+            <a:r>
+              <a:rPr lang="en-US" sz="1400" b="1" dirty="0">
+                <a:solidFill>
                   <a:srgbClr val="1E293B"/>
                 </a:solidFill>
                 <a:latin typeface="Arial" pitchFamily="34" charset="0"/>
                 <a:ea typeface="Arial" pitchFamily="34" charset="-122"/>
                 <a:cs typeface="Arial" pitchFamily="34" charset="-120"/>
               </a:rPr>
-              <a:t>Agreement Info - Type, dates, amendment number</a:t>
+              <a:t>Content Deduplication</a:t>
+            </a:r>
+            <a:endParaRPr lang="en-US" sz="1400" dirty="0"/>
+          </a:p>
+        </p:txBody>
+      </p:sp>
+      <p:sp>
+        <p:nvSpPr>
+          <p:cNvPr id="15" name="Text 13"/>
+          <p:cNvSpPr/>
+          <p:nvPr/>
+        </p:nvSpPr>
+        <p:spPr>
+          <a:xfrm>
+            <a:off x="1097280" y="2971800"/>
+            <a:ext cx="3291840" cy="457200"/>
+          </a:xfrm>
+          <a:prstGeom prst="rect">
+            <a:avLst/>
+          </a:prstGeom>
+          <a:noFill/>
+          <a:ln/>
+        </p:spPr>
+        <p:txBody>
+          <a:bodyPr wrap="square" rtlCol="0" anchor="ctr"/>
+          <a:lstStyle/>
+          <a:p>
+            <a:pPr indent="0" marL="0">
+              <a:buNone/>
+            </a:pPr>
+            <a:r>
+              <a:rPr lang="en-US" sz="1100" dirty="0">
+                <a:solidFill>
+                  <a:srgbClr val="232F3E"/>
+                </a:solidFill>
+                <a:latin typeface="Arial" pitchFamily="34" charset="0"/>
+                <a:ea typeface="Arial" pitchFamily="34" charset="-122"/>
+                <a:cs typeface="Arial" pitchFamily="34" charset="-120"/>
+              </a:rPr>
+              <a:t>SHA-256 hashing prevents reprocessing identical documents</a:t>
             </a:r>
             <a:endParaRPr lang="en-US" sz="1100" dirty="0"/>
           </a:p>
-          <a:p>
-            <a:pPr>
-              <a:spcBef>
-                <a:spcPts val="600"/>
-              </a:spcBef>
+        </p:txBody>
+      </p:sp>
+      <p:sp>
+        <p:nvSpPr>
+          <p:cNvPr id="16" name="Shape 14"/>
+          <p:cNvSpPr/>
+          <p:nvPr/>
+        </p:nvSpPr>
+        <p:spPr>
+          <a:xfrm>
+            <a:off x="4754880" y="2468880"/>
+            <a:ext cx="4206240" cy="1051560"/>
+          </a:xfrm>
+          <a:prstGeom prst="roundRect">
+            <a:avLst>
+              <a:gd name="adj" fmla="val 6957"/>
+            </a:avLst>
+          </a:prstGeom>
+          <a:solidFill>
+            <a:srgbClr val="FFFFFF"/>
+          </a:solidFill>
+          <a:ln w="12700">
+            <a:solidFill>
+              <a:srgbClr val="8B5CF6"/>
+            </a:solidFill>
+            <a:prstDash val="solid"/>
+          </a:ln>
+        </p:spPr>
+      </p:sp>
+      <p:sp>
+        <p:nvSpPr>
+          <p:cNvPr id="17" name="Text 15"/>
+          <p:cNvSpPr/>
+          <p:nvPr/>
+        </p:nvSpPr>
+        <p:spPr>
+          <a:xfrm>
+            <a:off x="4846320" y="2697480"/>
+            <a:ext cx="548640" cy="548640"/>
+          </a:xfrm>
+          <a:prstGeom prst="rect">
+            <a:avLst/>
+          </a:prstGeom>
+          <a:noFill/>
+          <a:ln/>
+        </p:spPr>
+        <p:txBody>
+          <a:bodyPr wrap="square" rtlCol="0" anchor="ctr"/>
+          <a:lstStyle/>
+          <a:p>
+            <a:pPr indent="0" marL="0">
+              <a:buNone/>
+            </a:pPr>
+            <a:r>
+              <a:rPr lang="en-US" sz="2400" dirty="0">
+                <a:solidFill>
+                  <a:srgbClr val="000000"/>
+                </a:solidFill>
+              </a:rPr>
+              <a:t>📊</a:t>
+            </a:r>
+            <a:endParaRPr lang="en-US" sz="2400" dirty="0"/>
+          </a:p>
+        </p:txBody>
+      </p:sp>
+      <p:sp>
+        <p:nvSpPr>
+          <p:cNvPr id="18" name="Text 16"/>
+          <p:cNvSpPr/>
+          <p:nvPr/>
+        </p:nvSpPr>
+        <p:spPr>
+          <a:xfrm>
+            <a:off x="5486400" y="2606040"/>
+            <a:ext cx="3291840" cy="320040"/>
+          </a:xfrm>
+          <a:prstGeom prst="rect">
+            <a:avLst/>
+          </a:prstGeom>
+          <a:noFill/>
+          <a:ln/>
+        </p:spPr>
+        <p:txBody>
+          <a:bodyPr wrap="square" rtlCol="0" anchor="ctr"/>
+          <a:lstStyle/>
+          <a:p>
+            <a:pPr indent="0" marL="0">
+              <a:buNone/>
+            </a:pPr>
+            <a:r>
+              <a:rPr lang="en-US" sz="1400" b="1" dirty="0">
+                <a:solidFill>
+                  <a:srgbClr val="1E293B"/>
+                </a:solidFill>
+                <a:latin typeface="Arial" pitchFamily="34" charset="0"/>
+                <a:ea typeface="Arial" pitchFamily="34" charset="-122"/>
+                <a:cs typeface="Arial" pitchFamily="34" charset="-120"/>
+              </a:rPr>
+              <a:t>Complete Audit Trail</a:t>
+            </a:r>
+            <a:endParaRPr lang="en-US" sz="1400" dirty="0"/>
+          </a:p>
+        </p:txBody>
+      </p:sp>
+      <p:sp>
+        <p:nvSpPr>
+          <p:cNvPr id="19" name="Text 17"/>
+          <p:cNvSpPr/>
+          <p:nvPr/>
+        </p:nvSpPr>
+        <p:spPr>
+          <a:xfrm>
+            <a:off x="5486400" y="2971800"/>
+            <a:ext cx="3291840" cy="457200"/>
+          </a:xfrm>
+          <a:prstGeom prst="rect">
+            <a:avLst/>
+          </a:prstGeom>
+          <a:noFill/>
+          <a:ln/>
+        </p:spPr>
+        <p:txBody>
+          <a:bodyPr wrap="square" rtlCol="0" anchor="ctr"/>
+          <a:lstStyle/>
+          <a:p>
+            <a:pPr indent="0" marL="0">
+              <a:buNone/>
             </a:pPr>
             <a:r>
               <a:rPr lang="en-US" sz="1100" dirty="0">
                 <a:solidFill>
+                  <a:srgbClr val="232F3E"/>
+                </a:solidFill>
+                <a:latin typeface="Arial" pitchFamily="34" charset="0"/>
+                <a:ea typeface="Arial" pitchFamily="34" charset="-122"/>
+                <a:cs typeface="Arial" pitchFamily="34" charset="-120"/>
+              </a:rPr>
+              <a:t>Track exactly which page each data point originated from</a:t>
+            </a:r>
+            <a:endParaRPr lang="en-US" sz="1100" dirty="0"/>
+          </a:p>
+        </p:txBody>
+      </p:sp>
+      <p:sp>
+        <p:nvSpPr>
+          <p:cNvPr id="20" name="Shape 18"/>
+          <p:cNvSpPr/>
+          <p:nvPr/>
+        </p:nvSpPr>
+        <p:spPr>
+          <a:xfrm>
+            <a:off x="365760" y="3657600"/>
+            <a:ext cx="4206240" cy="1051560"/>
+          </a:xfrm>
+          <a:prstGeom prst="roundRect">
+            <a:avLst>
+              <a:gd name="adj" fmla="val 6957"/>
+            </a:avLst>
+          </a:prstGeom>
+          <a:solidFill>
+            <a:srgbClr val="FFFFFF"/>
+          </a:solidFill>
+          <a:ln w="12700">
+            <a:solidFill>
+              <a:srgbClr val="8B5CF6"/>
+            </a:solidFill>
+            <a:prstDash val="solid"/>
+          </a:ln>
+        </p:spPr>
+      </p:sp>
+      <p:sp>
+        <p:nvSpPr>
+          <p:cNvPr id="21" name="Text 19"/>
+          <p:cNvSpPr/>
+          <p:nvPr/>
+        </p:nvSpPr>
+        <p:spPr>
+          <a:xfrm>
+            <a:off x="457200" y="3886200"/>
+            <a:ext cx="548640" cy="548640"/>
+          </a:xfrm>
+          <a:prstGeom prst="rect">
+            <a:avLst/>
+          </a:prstGeom>
+          <a:noFill/>
+          <a:ln/>
+        </p:spPr>
+        <p:txBody>
+          <a:bodyPr wrap="square" rtlCol="0" anchor="ctr"/>
+          <a:lstStyle/>
+          <a:p>
+            <a:pPr indent="0" marL="0">
+              <a:buNone/>
+            </a:pPr>
+            <a:r>
+              <a:rPr lang="en-US" sz="2400" dirty="0">
+                <a:solidFill>
+                  <a:srgbClr val="000000"/>
+                </a:solidFill>
+              </a:rPr>
+              <a:t>✅</a:t>
+            </a:r>
+            <a:endParaRPr lang="en-US" sz="2400" dirty="0"/>
+          </a:p>
+        </p:txBody>
+      </p:sp>
+      <p:sp>
+        <p:nvSpPr>
+          <p:cNvPr id="22" name="Text 20"/>
+          <p:cNvSpPr/>
+          <p:nvPr/>
+        </p:nvSpPr>
+        <p:spPr>
+          <a:xfrm>
+            <a:off x="1097280" y="3794760"/>
+            <a:ext cx="3291840" cy="320040"/>
+          </a:xfrm>
+          <a:prstGeom prst="rect">
+            <a:avLst/>
+          </a:prstGeom>
+          <a:noFill/>
+          <a:ln/>
+        </p:spPr>
+        <p:txBody>
+          <a:bodyPr wrap="square" rtlCol="0" anchor="ctr"/>
+          <a:lstStyle/>
+          <a:p>
+            <a:pPr indent="0" marL="0">
+              <a:buNone/>
+            </a:pPr>
+            <a:r>
+              <a:rPr lang="en-US" sz="1400" b="1" dirty="0">
+                <a:solidFill>
                   <a:srgbClr val="1E293B"/>
                 </a:solidFill>
                 <a:latin typeface="Arial" pitchFamily="34" charset="0"/>
                 <a:ea typeface="Arial" pitchFamily="34" charset="-122"/>
                 <a:cs typeface="Arial" pitchFamily="34" charset="-120"/>
               </a:rPr>
-              <a:t>Parties - Borrower, agent, arrangers, guarantors</a:t>
+              <a:t>Review Workflow</a:t>
+            </a:r>
+            <a:endParaRPr lang="en-US" sz="1400" dirty="0"/>
+          </a:p>
+        </p:txBody>
+      </p:sp>
+      <p:sp>
+        <p:nvSpPr>
+          <p:cNvPr id="23" name="Text 21"/>
+          <p:cNvSpPr/>
+          <p:nvPr/>
+        </p:nvSpPr>
+        <p:spPr>
+          <a:xfrm>
+            <a:off x="1097280" y="4160520"/>
+            <a:ext cx="3291840" cy="457200"/>
+          </a:xfrm>
+          <a:prstGeom prst="rect">
+            <a:avLst/>
+          </a:prstGeom>
+          <a:noFill/>
+          <a:ln/>
+        </p:spPr>
+        <p:txBody>
+          <a:bodyPr wrap="square" rtlCol="0" anchor="ctr"/>
+          <a:lstStyle/>
+          <a:p>
+            <a:pPr indent="0" marL="0">
+              <a:buNone/>
+            </a:pPr>
+            <a:r>
+              <a:rPr lang="en-US" sz="1100" dirty="0">
+                <a:solidFill>
+                  <a:srgbClr val="232F3E"/>
+                </a:solidFill>
+                <a:latin typeface="Arial" pitchFamily="34" charset="0"/>
+                <a:ea typeface="Arial" pitchFamily="34" charset="-122"/>
+                <a:cs typeface="Arial" pitchFamily="34" charset="-120"/>
+              </a:rPr>
+              <a:t>Human-in-the-loop: Approve, Reject, or Correct extracted data</a:t>
             </a:r>
             <a:endParaRPr lang="en-US" sz="1100" dirty="0"/>
           </a:p>
-          <a:p>
-            <a:pPr>
-              <a:spcBef>
-                <a:spcPts val="600"/>
-              </a:spcBef>
+        </p:txBody>
+      </p:sp>
+      <p:sp>
+        <p:nvSpPr>
+          <p:cNvPr id="24" name="Shape 22"/>
+          <p:cNvSpPr/>
+          <p:nvPr/>
+        </p:nvSpPr>
+        <p:spPr>
+          <a:xfrm>
+            <a:off x="4754880" y="3657600"/>
+            <a:ext cx="4206240" cy="1051560"/>
+          </a:xfrm>
+          <a:prstGeom prst="roundRect">
+            <a:avLst>
+              <a:gd name="adj" fmla="val 6957"/>
+            </a:avLst>
+          </a:prstGeom>
+          <a:solidFill>
+            <a:srgbClr val="FFFFFF"/>
+          </a:solidFill>
+          <a:ln w="12700">
+            <a:solidFill>
+              <a:srgbClr val="8B5CF6"/>
+            </a:solidFill>
+            <a:prstDash val="solid"/>
+          </a:ln>
+        </p:spPr>
+      </p:sp>
+      <p:sp>
+        <p:nvSpPr>
+          <p:cNvPr id="25" name="Text 23"/>
+          <p:cNvSpPr/>
+          <p:nvPr/>
+        </p:nvSpPr>
+        <p:spPr>
+          <a:xfrm>
+            <a:off x="4846320" y="3886200"/>
+            <a:ext cx="548640" cy="548640"/>
+          </a:xfrm>
+          <a:prstGeom prst="rect">
+            <a:avLst/>
+          </a:prstGeom>
+          <a:noFill/>
+          <a:ln/>
+        </p:spPr>
+        <p:txBody>
+          <a:bodyPr wrap="square" rtlCol="0" anchor="ctr"/>
+          <a:lstStyle/>
+          <a:p>
+            <a:pPr indent="0" marL="0">
+              <a:buNone/>
+            </a:pPr>
+            <a:r>
+              <a:rPr lang="en-US" sz="2400" dirty="0">
+                <a:solidFill>
+                  <a:srgbClr val="000000"/>
+                </a:solidFill>
+              </a:rPr>
+              <a:t>☁️</a:t>
+            </a:r>
+            <a:endParaRPr lang="en-US" sz="2400" dirty="0"/>
+          </a:p>
+        </p:txBody>
+      </p:sp>
+      <p:sp>
+        <p:nvSpPr>
+          <p:cNvPr id="26" name="Text 24"/>
+          <p:cNvSpPr/>
+          <p:nvPr/>
+        </p:nvSpPr>
+        <p:spPr>
+          <a:xfrm>
+            <a:off x="5486400" y="3794760"/>
+            <a:ext cx="3291840" cy="320040"/>
+          </a:xfrm>
+          <a:prstGeom prst="rect">
+            <a:avLst/>
+          </a:prstGeom>
+          <a:noFill/>
+          <a:ln/>
+        </p:spPr>
+        <p:txBody>
+          <a:bodyPr wrap="square" rtlCol="0" anchor="ctr"/>
+          <a:lstStyle/>
+          <a:p>
+            <a:pPr indent="0" marL="0">
+              <a:buNone/>
+            </a:pPr>
+            <a:r>
+              <a:rPr lang="en-US" sz="1400" b="1" dirty="0">
+                <a:solidFill>
+                  <a:srgbClr val="1E293B"/>
+                </a:solidFill>
+                <a:latin typeface="Arial" pitchFamily="34" charset="0"/>
+                <a:ea typeface="Arial" pitchFamily="34" charset="-122"/>
+                <a:cs typeface="Arial" pitchFamily="34" charset="-120"/>
+              </a:rPr>
+              <a:t>Serverless &amp; Scalable</a:t>
+            </a:r>
+            <a:endParaRPr lang="en-US" sz="1400" dirty="0"/>
+          </a:p>
+        </p:txBody>
+      </p:sp>
+      <p:sp>
+        <p:nvSpPr>
+          <p:cNvPr id="27" name="Text 25"/>
+          <p:cNvSpPr/>
+          <p:nvPr/>
+        </p:nvSpPr>
+        <p:spPr>
+          <a:xfrm>
+            <a:off x="5486400" y="4160520"/>
+            <a:ext cx="3291840" cy="457200"/>
+          </a:xfrm>
+          <a:prstGeom prst="rect">
+            <a:avLst/>
+          </a:prstGeom>
+          <a:noFill/>
+          <a:ln/>
+        </p:spPr>
+        <p:txBody>
+          <a:bodyPr wrap="square" rtlCol="0" anchor="ctr"/>
+          <a:lstStyle/>
+          <a:p>
+            <a:pPr indent="0" marL="0">
+              <a:buNone/>
             </a:pPr>
             <a:r>
               <a:rPr lang="en-US" sz="1100" dirty="0">
                 <a:solidFill>
-                  <a:srgbClr val="1E293B"/>
-                </a:solidFill>
-                <a:latin typeface="Arial" pitchFamily="34" charset="0"/>
-                <a:ea typeface="Arial" pitchFamily="34" charset="-122"/>
-                <a:cs typeface="Arial" pitchFamily="34" charset="-120"/>
-              </a:rPr>
-              <a:t>Facility Terms - Revolving credit, LC commitments</a:t>
-            </a:r>
-            <a:endParaRPr lang="en-US" sz="1100" dirty="0"/>
-          </a:p>
-          <a:p>
-            <a:pPr>
-              <a:spcBef>
-                <a:spcPts val="600"/>
-              </a:spcBef>
-            </a:pPr>
-            <a:r>
-              <a:rPr lang="en-US" sz="1100" dirty="0">
-                <a:solidFill>
-                  <a:srgbClr val="1E293B"/>
-                </a:solidFill>
-                <a:latin typeface="Arial" pitchFamily="34" charset="0"/>
-                <a:ea typeface="Arial" pitchFamily="34" charset="-122"/>
-                <a:cs typeface="Arial" pitchFamily="34" charset="-120"/>
-              </a:rPr>
-              <a:t>Pricing Grid - SOFR spreads, ABR spreads, tiers</a:t>
-            </a:r>
-            <a:endParaRPr lang="en-US" sz="1100" dirty="0"/>
-          </a:p>
-          <a:p>
-            <a:pPr>
-              <a:spcBef>
-                <a:spcPts val="600"/>
-              </a:spcBef>
-            </a:pPr>
-            <a:r>
-              <a:rPr lang="en-US" sz="1100" dirty="0">
-                <a:solidFill>
-                  <a:srgbClr val="1E293B"/>
-                </a:solidFill>
-                <a:latin typeface="Arial" pitchFamily="34" charset="0"/>
-                <a:ea typeface="Arial" pitchFamily="34" charset="-122"/>
-                <a:cs typeface="Arial" pitchFamily="34" charset="-120"/>
-              </a:rPr>
-              <a:t>Lender Commitments - Per-lender allocations</a:t>
-            </a:r>
-            <a:endParaRPr lang="en-US" sz="1100" dirty="0"/>
-          </a:p>
-          <a:p>
-            <a:pPr>
-              <a:spcBef>
-                <a:spcPts val="600"/>
-              </a:spcBef>
-            </a:pPr>
-            <a:r>
-              <a:rPr lang="en-US" sz="1100" dirty="0">
-                <a:solidFill>
-                  <a:srgbClr val="1E293B"/>
-                </a:solidFill>
-                <a:latin typeface="Arial" pitchFamily="34" charset="0"/>
-                <a:ea typeface="Arial" pitchFamily="34" charset="-122"/>
-                <a:cs typeface="Arial" pitchFamily="34" charset="-120"/>
-              </a:rPr>
-              <a:t>Covenants - Financial ratios, requirements</a:t>
+                  <a:srgbClr val="232F3E"/>
+                </a:solidFill>
+                <a:latin typeface="Arial" pitchFamily="34" charset="0"/>
+                <a:ea typeface="Arial" pitchFamily="34" charset="-122"/>
+                <a:cs typeface="Arial" pitchFamily="34" charset="-120"/>
+              </a:rPr>
+              <a:t>Zero infrastructure management, auto-scales to any volume</a:t>
             </a:r>
             <a:endParaRPr lang="en-US" sz="1100" dirty="0"/>
           </a:p>
@@ -6774,6 +8525,437 @@
 <file path=ppt/slides/slide8.xml><?xml version="1.0" encoding="utf-8"?>
 <p:sld xmlns:a="http://schemas.openxmlformats.org/drawingml/2006/main" xmlns:r="http://schemas.openxmlformats.org/officeDocument/2006/relationships" xmlns:p="http://schemas.openxmlformats.org/presentationml/2006/main">
   <p:cSld name="Slide 8">
+    <p:spTree>
+      <p:nvGrpSpPr>
+        <p:cNvPr id="1" name=""/>
+        <p:cNvGrpSpPr/>
+        <p:nvPr/>
+      </p:nvGrpSpPr>
+      <p:grpSpPr>
+        <a:xfrm>
+          <a:off x="0" y="0"/>
+          <a:ext cx="0" cy="0"/>
+          <a:chOff x="0" y="0"/>
+          <a:chExt cx="0" cy="0"/>
+        </a:xfrm>
+      </p:grpSpPr>
+      <p:sp>
+        <p:nvSpPr>
+          <p:cNvPr id="2" name="Shape 0"/>
+          <p:cNvSpPr/>
+          <p:nvPr/>
+        </p:nvSpPr>
+        <p:spPr>
+          <a:xfrm>
+            <a:off x="0" y="0"/>
+            <a:ext cx="9144000" cy="1097280"/>
+          </a:xfrm>
+          <a:prstGeom prst="rect">
+            <a:avLst/>
+          </a:prstGeom>
+          <a:solidFill>
+            <a:srgbClr val="14B8A6"/>
+          </a:solidFill>
+          <a:ln/>
+        </p:spPr>
+      </p:sp>
+      <p:sp>
+        <p:nvSpPr>
+          <p:cNvPr id="3" name="Text 1"/>
+          <p:cNvSpPr/>
+          <p:nvPr/>
+        </p:nvSpPr>
+        <p:spPr>
+          <a:xfrm>
+            <a:off x="457200" y="365760"/>
+            <a:ext cx="8229600" cy="457200"/>
+          </a:xfrm>
+          <a:prstGeom prst="rect">
+            <a:avLst/>
+          </a:prstGeom>
+          <a:noFill/>
+          <a:ln/>
+        </p:spPr>
+        <p:txBody>
+          <a:bodyPr wrap="square" rtlCol="0" anchor="ctr"/>
+          <a:lstStyle/>
+          <a:p>
+            <a:pPr indent="0" marL="0">
+              <a:buNone/>
+            </a:pPr>
+            <a:r>
+              <a:rPr lang="en-US" sz="3200" b="1" dirty="0">
+                <a:solidFill>
+                  <a:srgbClr val="FFFFFF"/>
+                </a:solidFill>
+                <a:latin typeface="Arial" pitchFamily="34" charset="0"/>
+                <a:ea typeface="Arial" pitchFamily="34" charset="-122"/>
+                <a:cs typeface="Arial" pitchFamily="34" charset="-120"/>
+              </a:rPr>
+              <a:t>Supported Document Types</a:t>
+            </a:r>
+            <a:endParaRPr lang="en-US" sz="3200" dirty="0"/>
+          </a:p>
+        </p:txBody>
+      </p:sp>
+      <p:sp>
+        <p:nvSpPr>
+          <p:cNvPr id="4" name="Shape 2"/>
+          <p:cNvSpPr/>
+          <p:nvPr/>
+        </p:nvSpPr>
+        <p:spPr>
+          <a:xfrm>
+            <a:off x="365760" y="1280160"/>
+            <a:ext cx="4206240" cy="3474720"/>
+          </a:xfrm>
+          <a:prstGeom prst="roundRect">
+            <a:avLst>
+              <a:gd name="adj" fmla="val 2632"/>
+            </a:avLst>
+          </a:prstGeom>
+          <a:solidFill>
+            <a:srgbClr val="F0FDFA"/>
+          </a:solidFill>
+          <a:ln w="12700">
+            <a:solidFill>
+              <a:srgbClr val="14B8A6"/>
+            </a:solidFill>
+            <a:prstDash val="solid"/>
+          </a:ln>
+        </p:spPr>
+      </p:sp>
+      <p:sp>
+        <p:nvSpPr>
+          <p:cNvPr id="5" name="Text 3"/>
+          <p:cNvSpPr/>
+          <p:nvPr/>
+        </p:nvSpPr>
+        <p:spPr>
+          <a:xfrm>
+            <a:off x="457200" y="1417320"/>
+            <a:ext cx="4023360" cy="365760"/>
+          </a:xfrm>
+          <a:prstGeom prst="rect">
+            <a:avLst/>
+          </a:prstGeom>
+          <a:noFill/>
+          <a:ln/>
+        </p:spPr>
+        <p:txBody>
+          <a:bodyPr wrap="square" rtlCol="0" anchor="ctr"/>
+          <a:lstStyle/>
+          <a:p>
+            <a:pPr indent="0" marL="0">
+              <a:buNone/>
+            </a:pPr>
+            <a:r>
+              <a:rPr lang="en-US" sz="1800" b="1" dirty="0">
+                <a:solidFill>
+                  <a:srgbClr val="14B8A6"/>
+                </a:solidFill>
+                <a:latin typeface="Arial" pitchFamily="34" charset="0"/>
+                <a:ea typeface="Arial" pitchFamily="34" charset="-122"/>
+                <a:cs typeface="Arial" pitchFamily="34" charset="-120"/>
+              </a:rPr>
+              <a:t>📄 Loan Packages</a:t>
+            </a:r>
+            <a:endParaRPr lang="en-US" sz="1800" dirty="0"/>
+          </a:p>
+        </p:txBody>
+      </p:sp>
+      <p:sp>
+        <p:nvSpPr>
+          <p:cNvPr id="6" name="Text 4"/>
+          <p:cNvSpPr/>
+          <p:nvPr/>
+        </p:nvSpPr>
+        <p:spPr>
+          <a:xfrm>
+            <a:off x="548640" y="1920240"/>
+            <a:ext cx="3840480" cy="2560320"/>
+          </a:xfrm>
+          <a:prstGeom prst="rect">
+            <a:avLst/>
+          </a:prstGeom>
+          <a:noFill/>
+          <a:ln/>
+        </p:spPr>
+        <p:txBody>
+          <a:bodyPr wrap="square" rtlCol="0" anchor="ctr"/>
+          <a:lstStyle/>
+          <a:p>
+            <a:pPr>
+              <a:spcBef>
+                <a:spcPts val="800"/>
+              </a:spcBef>
+            </a:pPr>
+            <a:r>
+              <a:rPr lang="en-US" sz="1200" dirty="0">
+                <a:solidFill>
+                  <a:srgbClr val="1E293B"/>
+                </a:solidFill>
+                <a:latin typeface="Arial" pitchFamily="34" charset="0"/>
+                <a:ea typeface="Arial" pitchFamily="34" charset="-122"/>
+                <a:cs typeface="Arial" pitchFamily="34" charset="-120"/>
+              </a:rPr>
+              <a:t>Promissory Note - Interest rate, principal, borrower names, maturity date</a:t>
+            </a:r>
+            <a:endParaRPr lang="en-US" sz="1200" dirty="0"/>
+          </a:p>
+          <a:p>
+            <a:pPr>
+              <a:spcBef>
+                <a:spcPts val="800"/>
+              </a:spcBef>
+            </a:pPr>
+            <a:r>
+              <a:rPr lang="en-US" sz="1200" dirty="0">
+                <a:solidFill>
+                  <a:srgbClr val="1E293B"/>
+                </a:solidFill>
+                <a:latin typeface="Arial" pitchFamily="34" charset="0"/>
+                <a:ea typeface="Arial" pitchFamily="34" charset="-122"/>
+                <a:cs typeface="Arial" pitchFamily="34" charset="-120"/>
+              </a:rPr>
+              <a:t>Closing Disclosure - Loan amount, fees, cash to close</a:t>
+            </a:r>
+            <a:endParaRPr lang="en-US" sz="1200" dirty="0"/>
+          </a:p>
+          <a:p>
+            <a:pPr>
+              <a:spcBef>
+                <a:spcPts val="800"/>
+              </a:spcBef>
+            </a:pPr>
+            <a:r>
+              <a:rPr lang="en-US" sz="1200" dirty="0">
+                <a:solidFill>
+                  <a:srgbClr val="1E293B"/>
+                </a:solidFill>
+                <a:latin typeface="Arial" pitchFamily="34" charset="0"/>
+                <a:ea typeface="Arial" pitchFamily="34" charset="-122"/>
+                <a:cs typeface="Arial" pitchFamily="34" charset="-120"/>
+              </a:rPr>
+              <a:t>Form 1003 - Borrower info, property address, employment</a:t>
+            </a:r>
+            <a:endParaRPr lang="en-US" sz="1200" dirty="0"/>
+          </a:p>
+        </p:txBody>
+      </p:sp>
+      <p:sp>
+        <p:nvSpPr>
+          <p:cNvPr id="7" name="Shape 5"/>
+          <p:cNvSpPr/>
+          <p:nvPr/>
+        </p:nvSpPr>
+        <p:spPr>
+          <a:xfrm>
+            <a:off x="4572000" y="1280160"/>
+            <a:ext cx="4206240" cy="3474720"/>
+          </a:xfrm>
+          <a:prstGeom prst="roundRect">
+            <a:avLst>
+              <a:gd name="adj" fmla="val 2632"/>
+            </a:avLst>
+          </a:prstGeom>
+          <a:solidFill>
+            <a:srgbClr val="FAF5FF"/>
+          </a:solidFill>
+          <a:ln w="12700">
+            <a:solidFill>
+              <a:srgbClr val="8B5CF6"/>
+            </a:solidFill>
+            <a:prstDash val="solid"/>
+          </a:ln>
+        </p:spPr>
+      </p:sp>
+      <p:sp>
+        <p:nvSpPr>
+          <p:cNvPr id="8" name="Text 6"/>
+          <p:cNvSpPr/>
+          <p:nvPr/>
+        </p:nvSpPr>
+        <p:spPr>
+          <a:xfrm>
+            <a:off x="4663440" y="1417320"/>
+            <a:ext cx="4023360" cy="365760"/>
+          </a:xfrm>
+          <a:prstGeom prst="rect">
+            <a:avLst/>
+          </a:prstGeom>
+          <a:noFill/>
+          <a:ln/>
+        </p:spPr>
+        <p:txBody>
+          <a:bodyPr wrap="square" rtlCol="0" anchor="ctr"/>
+          <a:lstStyle/>
+          <a:p>
+            <a:pPr indent="0" marL="0">
+              <a:buNone/>
+            </a:pPr>
+            <a:r>
+              <a:rPr lang="en-US" sz="1800" b="1" dirty="0">
+                <a:solidFill>
+                  <a:srgbClr val="8B5CF6"/>
+                </a:solidFill>
+                <a:latin typeface="Arial" pitchFamily="34" charset="0"/>
+                <a:ea typeface="Arial" pitchFamily="34" charset="-122"/>
+                <a:cs typeface="Arial" pitchFamily="34" charset="-120"/>
+              </a:rPr>
+              <a:t>📋 Credit Agreements</a:t>
+            </a:r>
+            <a:endParaRPr lang="en-US" sz="1800" dirty="0"/>
+          </a:p>
+        </p:txBody>
+      </p:sp>
+      <p:sp>
+        <p:nvSpPr>
+          <p:cNvPr id="9" name="Text 7"/>
+          <p:cNvSpPr/>
+          <p:nvPr/>
+        </p:nvSpPr>
+        <p:spPr>
+          <a:xfrm>
+            <a:off x="4754880" y="1920240"/>
+            <a:ext cx="3840480" cy="2560320"/>
+          </a:xfrm>
+          <a:prstGeom prst="rect">
+            <a:avLst/>
+          </a:prstGeom>
+          <a:noFill/>
+          <a:ln/>
+        </p:spPr>
+        <p:txBody>
+          <a:bodyPr wrap="square" rtlCol="0" anchor="ctr"/>
+          <a:lstStyle/>
+          <a:p>
+            <a:pPr>
+              <a:spcBef>
+                <a:spcPts val="600"/>
+              </a:spcBef>
+            </a:pPr>
+            <a:r>
+              <a:rPr lang="en-US" sz="1100" dirty="0">
+                <a:solidFill>
+                  <a:srgbClr val="1E293B"/>
+                </a:solidFill>
+                <a:latin typeface="Arial" pitchFamily="34" charset="0"/>
+                <a:ea typeface="Arial" pitchFamily="34" charset="-122"/>
+                <a:cs typeface="Arial" pitchFamily="34" charset="-120"/>
+              </a:rPr>
+              <a:t>Agreement Info - Type, dates, amendment number</a:t>
+            </a:r>
+            <a:endParaRPr lang="en-US" sz="1100" dirty="0"/>
+          </a:p>
+          <a:p>
+            <a:pPr>
+              <a:spcBef>
+                <a:spcPts val="600"/>
+              </a:spcBef>
+            </a:pPr>
+            <a:r>
+              <a:rPr lang="en-US" sz="1100" dirty="0">
+                <a:solidFill>
+                  <a:srgbClr val="1E293B"/>
+                </a:solidFill>
+                <a:latin typeface="Arial" pitchFamily="34" charset="0"/>
+                <a:ea typeface="Arial" pitchFamily="34" charset="-122"/>
+                <a:cs typeface="Arial" pitchFamily="34" charset="-120"/>
+              </a:rPr>
+              <a:t>Parties - Borrower, agent, arrangers, guarantors</a:t>
+            </a:r>
+            <a:endParaRPr lang="en-US" sz="1100" dirty="0"/>
+          </a:p>
+          <a:p>
+            <a:pPr>
+              <a:spcBef>
+                <a:spcPts val="600"/>
+              </a:spcBef>
+            </a:pPr>
+            <a:r>
+              <a:rPr lang="en-US" sz="1100" dirty="0">
+                <a:solidFill>
+                  <a:srgbClr val="1E293B"/>
+                </a:solidFill>
+                <a:latin typeface="Arial" pitchFamily="34" charset="0"/>
+                <a:ea typeface="Arial" pitchFamily="34" charset="-122"/>
+                <a:cs typeface="Arial" pitchFamily="34" charset="-120"/>
+              </a:rPr>
+              <a:t>Facility Terms - Revolving credit, LC commitments</a:t>
+            </a:r>
+            <a:endParaRPr lang="en-US" sz="1100" dirty="0"/>
+          </a:p>
+          <a:p>
+            <a:pPr>
+              <a:spcBef>
+                <a:spcPts val="600"/>
+              </a:spcBef>
+            </a:pPr>
+            <a:r>
+              <a:rPr lang="en-US" sz="1100" dirty="0">
+                <a:solidFill>
+                  <a:srgbClr val="1E293B"/>
+                </a:solidFill>
+                <a:latin typeface="Arial" pitchFamily="34" charset="0"/>
+                <a:ea typeface="Arial" pitchFamily="34" charset="-122"/>
+                <a:cs typeface="Arial" pitchFamily="34" charset="-120"/>
+              </a:rPr>
+              <a:t>Pricing Grid - SOFR spreads, ABR spreads, tiers</a:t>
+            </a:r>
+            <a:endParaRPr lang="en-US" sz="1100" dirty="0"/>
+          </a:p>
+          <a:p>
+            <a:pPr>
+              <a:spcBef>
+                <a:spcPts val="600"/>
+              </a:spcBef>
+            </a:pPr>
+            <a:r>
+              <a:rPr lang="en-US" sz="1100" dirty="0">
+                <a:solidFill>
+                  <a:srgbClr val="1E293B"/>
+                </a:solidFill>
+                <a:latin typeface="Arial" pitchFamily="34" charset="0"/>
+                <a:ea typeface="Arial" pitchFamily="34" charset="-122"/>
+                <a:cs typeface="Arial" pitchFamily="34" charset="-120"/>
+              </a:rPr>
+              <a:t>Lender Commitments - Per-lender allocations</a:t>
+            </a:r>
+            <a:endParaRPr lang="en-US" sz="1100" dirty="0"/>
+          </a:p>
+          <a:p>
+            <a:pPr>
+              <a:spcBef>
+                <a:spcPts val="600"/>
+              </a:spcBef>
+            </a:pPr>
+            <a:r>
+              <a:rPr lang="en-US" sz="1100" dirty="0">
+                <a:solidFill>
+                  <a:srgbClr val="1E293B"/>
+                </a:solidFill>
+                <a:latin typeface="Arial" pitchFamily="34" charset="0"/>
+                <a:ea typeface="Arial" pitchFamily="34" charset="-122"/>
+                <a:cs typeface="Arial" pitchFamily="34" charset="-120"/>
+              </a:rPr>
+              <a:t>Covenants - Financial ratios, requirements</a:t>
+            </a:r>
+            <a:endParaRPr lang="en-US" sz="1100" dirty="0"/>
+          </a:p>
+        </p:txBody>
+      </p:sp>
+    </p:spTree>
+  </p:cSld>
+  <p:clrMapOvr>
+    <a:masterClrMapping/>
+  </p:clrMapOvr>
+</p:sld>
+</file>
+
+<file path=ppt/slides/slide9.xml><?xml version="1.0" encoding="utf-8"?>
+<p:sld xmlns:a="http://schemas.openxmlformats.org/drawingml/2006/main" xmlns:r="http://schemas.openxmlformats.org/officeDocument/2006/relationships" xmlns:p="http://schemas.openxmlformats.org/presentationml/2006/main">
+  <p:cSld name="Slide 9">
     <p:spTree>
       <p:nvGrpSpPr>
         <p:cNvPr id="1" name=""/>

</xml_diff>

<commit_message>
docs: Add Step Functions workflow slide to presentation
- Added new Slide 5 showing Step Functions execution graph from AWS console
- Includes workflow highlights: Smart Routing, Parallel Extraction, Error Handling
- Presentation now has 10 slides (was 9)
- Added stepfunctions_graph.png to docs/

Slide order now:
1. Title
2. The Problem
3. The Solution: Router Pattern
4. Architecture Overview
5. Step Functions Workflow (NEW)
6. Cost Comparison
7. Why Router Pattern? vs Alternatives
8. Key Differentiators
9. Supported Document Types
10. Built on AWS / Call to Action

🤖 Generated with [Claude Code](https://claude.com/claude-code)

Co-Authored-By: Claude <noreply@anthropic.com>
</commit_message>
<xml_diff>
--- a/docs/Financial-Documents-Processing-Router-Pattern.pptx
+++ b/docs/Financial-Documents-Processing-Router-Pattern.pptx
@@ -14,9 +14,10 @@
     <p:sldId id="262" r:id="rId8"/>
     <p:sldId id="263" r:id="rId9"/>
     <p:sldId id="264" r:id="rId10"/>
+    <p:sldId id="265" r:id="rId11"/>
   </p:sldIdLst>
   <p:notesMasterIdLst>
-    <p:notesMasterId r:id="rId11"/>
+    <p:notesMasterId r:id="rId12"/>
   </p:notesMasterIdLst>
   <p:sldSz cx="9144000" cy="5143500"/>
   <p:notesSz cx="5143500" cy="9144000"/>
@@ -1036,6 +1037,94 @@
             <a:fld id="{F7021451-1387-4CA6-816F-3879F97B5CBC}" type="slidenum">
               <a:rPr lang="en-US"/>
               <a:t>1</a:t>
+            </a:fld>
+            <a:endParaRPr lang="en-US"/>
+          </a:p>
+        </p:txBody>
+      </p:sp>
+    </p:spTree>
+    <p:extLst>
+      <p:ext uri="{BB962C8B-B14F-4D97-AF65-F5344CB8AC3E}">
+        <p14:creationId xmlns:p14="http://schemas.microsoft.com/office/powerpoint/2010/main" val="1024086991"/>
+      </p:ext>
+    </p:extLst>
+  </p:cSld>
+  <p:clrMapOvr>
+    <a:masterClrMapping/>
+  </p:clrMapOvr>
+</p:notes>
+</file>
+
+<file path=ppt/notesSlides/notesSlide10.xml><?xml version="1.0" encoding="utf-8"?>
+<p:notes xmlns:a="http://schemas.openxmlformats.org/drawingml/2006/main" xmlns:r="http://schemas.openxmlformats.org/officeDocument/2006/relationships" xmlns:p="http://schemas.openxmlformats.org/presentationml/2006/main">
+  <p:cSld>
+    <p:spTree>
+      <p:nvGrpSpPr>
+        <p:cNvPr id="1" name=""/>
+        <p:cNvGrpSpPr/>
+        <p:nvPr/>
+      </p:nvGrpSpPr>
+      <p:grpSpPr>
+        <a:xfrm>
+          <a:off x="0" y="0"/>
+          <a:ext cx="0" cy="0"/>
+          <a:chOff x="0" y="0"/>
+          <a:chExt cx="0" cy="0"/>
+        </a:xfrm>
+      </p:grpSpPr>
+      <p:sp>
+        <p:nvSpPr>
+          <p:cNvPr id="2" name="Slide Image Placeholder 1"/>
+          <p:cNvSpPr>
+            <a:spLocks noGrp="1" noRot="1" noChangeAspect="1"/>
+          </p:cNvSpPr>
+          <p:nvPr>
+            <p:ph type="sldImg"/>
+          </p:nvPr>
+        </p:nvSpPr>
+        <p:spPr/>
+      </p:sp>
+      <p:sp>
+        <p:nvSpPr>
+          <p:cNvPr id="3" name="Notes Placeholder 2"/>
+          <p:cNvSpPr>
+            <a:spLocks noGrp="1"/>
+          </p:cNvSpPr>
+          <p:nvPr>
+            <p:ph type="body" idx="1"/>
+          </p:nvPr>
+        </p:nvSpPr>
+        <p:spPr/>
+        <p:txBody>
+          <a:bodyPr/>
+          <a:lstStyle/>
+          <a:p>
+            <a:r>
+              <a:rPr lang="en-US" dirty="0"/>
+              <a:t/>
+            </a:r>
+            <a:endParaRPr lang="en-US" dirty="0"/>
+          </a:p>
+        </p:txBody>
+      </p:sp>
+      <p:sp>
+        <p:nvSpPr>
+          <p:cNvPr id="4" name="Slide Number Placeholder 3"/>
+          <p:cNvSpPr>
+            <a:spLocks noGrp="1"/>
+          </p:cNvSpPr>
+          <p:nvPr>
+            <p:ph type="sldNum" sz="quarter" idx="10"/>
+          </p:nvPr>
+        </p:nvSpPr>
+        <p:spPr/>
+        <p:txBody>
+          <a:bodyPr/>
+          <a:lstStyle/>
+          <a:p>
+            <a:fld id="{F7021451-1387-4CA6-816F-3879F97B5CBC}" type="slidenum">
+              <a:rPr lang="en-US"/>
+              <a:t>10</a:t>
             </a:fld>
             <a:endParaRPr lang="en-US"/>
           </a:p>
@@ -2362,6 +2451,896 @@
 </p:sld>
 </file>
 
+<file path=ppt/slides/slide10.xml><?xml version="1.0" encoding="utf-8"?>
+<p:sld xmlns:a="http://schemas.openxmlformats.org/drawingml/2006/main" xmlns:r="http://schemas.openxmlformats.org/officeDocument/2006/relationships" xmlns:p="http://schemas.openxmlformats.org/presentationml/2006/main">
+  <p:cSld name="Slide 10">
+    <p:spTree>
+      <p:nvGrpSpPr>
+        <p:cNvPr id="1" name=""/>
+        <p:cNvGrpSpPr/>
+        <p:nvPr/>
+      </p:nvGrpSpPr>
+      <p:grpSpPr>
+        <a:xfrm>
+          <a:off x="0" y="0"/>
+          <a:ext cx="0" cy="0"/>
+          <a:chOff x="0" y="0"/>
+          <a:chExt cx="0" cy="0"/>
+        </a:xfrm>
+      </p:grpSpPr>
+      <p:sp>
+        <p:nvSpPr>
+          <p:cNvPr id="2" name="Shape 0"/>
+          <p:cNvSpPr/>
+          <p:nvPr/>
+        </p:nvSpPr>
+        <p:spPr>
+          <a:xfrm>
+            <a:off x="0" y="0"/>
+            <a:ext cx="9144000" cy="5143500"/>
+          </a:xfrm>
+          <a:prstGeom prst="rect">
+            <a:avLst/>
+          </a:prstGeom>
+          <a:solidFill>
+            <a:srgbClr val="232F3E"/>
+          </a:solidFill>
+          <a:ln/>
+        </p:spPr>
+      </p:sp>
+      <p:sp>
+        <p:nvSpPr>
+          <p:cNvPr id="3" name="Text 1"/>
+          <p:cNvSpPr/>
+          <p:nvPr/>
+        </p:nvSpPr>
+        <p:spPr>
+          <a:xfrm>
+            <a:off x="457200" y="365760"/>
+            <a:ext cx="8229600" cy="457200"/>
+          </a:xfrm>
+          <a:prstGeom prst="rect">
+            <a:avLst/>
+          </a:prstGeom>
+          <a:noFill/>
+          <a:ln/>
+        </p:spPr>
+        <p:txBody>
+          <a:bodyPr wrap="square" rtlCol="0" anchor="ctr"/>
+          <a:lstStyle/>
+          <a:p>
+            <a:pPr indent="0" marL="0">
+              <a:buNone/>
+            </a:pPr>
+            <a:r>
+              <a:rPr lang="en-US" sz="3200" b="1" dirty="0">
+                <a:solidFill>
+                  <a:srgbClr val="FFFFFF"/>
+                </a:solidFill>
+                <a:latin typeface="Arial" pitchFamily="34" charset="0"/>
+                <a:ea typeface="Arial" pitchFamily="34" charset="-122"/>
+                <a:cs typeface="Arial" pitchFamily="34" charset="-120"/>
+              </a:rPr>
+              <a:t>Built on AWS</a:t>
+            </a:r>
+            <a:endParaRPr lang="en-US" sz="3200" dirty="0"/>
+          </a:p>
+        </p:txBody>
+      </p:sp>
+      <p:sp>
+        <p:nvSpPr>
+          <p:cNvPr id="4" name="Shape 2"/>
+          <p:cNvSpPr/>
+          <p:nvPr/>
+        </p:nvSpPr>
+        <p:spPr>
+          <a:xfrm>
+            <a:off x="457200" y="1097280"/>
+            <a:ext cx="2743200" cy="868680"/>
+          </a:xfrm>
+          <a:prstGeom prst="roundRect">
+            <a:avLst>
+              <a:gd name="adj" fmla="val 8421"/>
+            </a:avLst>
+          </a:prstGeom>
+          <a:solidFill>
+            <a:srgbClr val="FF9900"/>
+          </a:solidFill>
+          <a:ln/>
+        </p:spPr>
+      </p:sp>
+      <p:sp>
+        <p:nvSpPr>
+          <p:cNvPr id="5" name="Text 3"/>
+          <p:cNvSpPr/>
+          <p:nvPr/>
+        </p:nvSpPr>
+        <p:spPr>
+          <a:xfrm>
+            <a:off x="457200" y="1234440"/>
+            <a:ext cx="2743200" cy="320040"/>
+          </a:xfrm>
+          <a:prstGeom prst="rect">
+            <a:avLst/>
+          </a:prstGeom>
+          <a:noFill/>
+          <a:ln/>
+        </p:spPr>
+        <p:txBody>
+          <a:bodyPr wrap="square" rtlCol="0" anchor="ctr"/>
+          <a:lstStyle/>
+          <a:p>
+            <a:pPr algn="ctr" indent="0" marL="0">
+              <a:buNone/>
+            </a:pPr>
+            <a:r>
+              <a:rPr lang="en-US" sz="1300" b="1" dirty="0">
+                <a:solidFill>
+                  <a:srgbClr val="FFFFFF"/>
+                </a:solidFill>
+                <a:latin typeface="Arial" pitchFamily="34" charset="0"/>
+                <a:ea typeface="Arial" pitchFamily="34" charset="-122"/>
+                <a:cs typeface="Arial" pitchFamily="34" charset="-120"/>
+              </a:rPr>
+              <a:t>CloudFront + S3</a:t>
+            </a:r>
+            <a:endParaRPr lang="en-US" sz="1300" dirty="0"/>
+          </a:p>
+        </p:txBody>
+      </p:sp>
+      <p:sp>
+        <p:nvSpPr>
+          <p:cNvPr id="6" name="Text 4"/>
+          <p:cNvSpPr/>
+          <p:nvPr/>
+        </p:nvSpPr>
+        <p:spPr>
+          <a:xfrm>
+            <a:off x="457200" y="1554480"/>
+            <a:ext cx="2743200" cy="274320"/>
+          </a:xfrm>
+          <a:prstGeom prst="rect">
+            <a:avLst/>
+          </a:prstGeom>
+          <a:noFill/>
+          <a:ln/>
+        </p:spPr>
+        <p:txBody>
+          <a:bodyPr wrap="square" rtlCol="0" anchor="ctr"/>
+          <a:lstStyle/>
+          <a:p>
+            <a:pPr algn="ctr" indent="0" marL="0">
+              <a:buNone/>
+            </a:pPr>
+            <a:r>
+              <a:rPr lang="en-US" sz="1100" dirty="0">
+                <a:solidFill>
+                  <a:srgbClr val="FFFFFF"/>
+                </a:solidFill>
+                <a:latin typeface="Arial" pitchFamily="34" charset="0"/>
+                <a:ea typeface="Arial" pitchFamily="34" charset="-122"/>
+                <a:cs typeface="Arial" pitchFamily="34" charset="-120"/>
+              </a:rPr>
+              <a:t>React Dashboard</a:t>
+            </a:r>
+            <a:endParaRPr lang="en-US" sz="1100" dirty="0"/>
+          </a:p>
+        </p:txBody>
+      </p:sp>
+      <p:sp>
+        <p:nvSpPr>
+          <p:cNvPr id="7" name="Shape 5"/>
+          <p:cNvSpPr/>
+          <p:nvPr/>
+        </p:nvSpPr>
+        <p:spPr>
+          <a:xfrm>
+            <a:off x="3337560" y="1097280"/>
+            <a:ext cx="2743200" cy="868680"/>
+          </a:xfrm>
+          <a:prstGeom prst="roundRect">
+            <a:avLst>
+              <a:gd name="adj" fmla="val 8421"/>
+            </a:avLst>
+          </a:prstGeom>
+          <a:solidFill>
+            <a:srgbClr val="FF9900"/>
+          </a:solidFill>
+          <a:ln/>
+        </p:spPr>
+      </p:sp>
+      <p:sp>
+        <p:nvSpPr>
+          <p:cNvPr id="8" name="Text 6"/>
+          <p:cNvSpPr/>
+          <p:nvPr/>
+        </p:nvSpPr>
+        <p:spPr>
+          <a:xfrm>
+            <a:off x="3337560" y="1234440"/>
+            <a:ext cx="2743200" cy="320040"/>
+          </a:xfrm>
+          <a:prstGeom prst="rect">
+            <a:avLst/>
+          </a:prstGeom>
+          <a:noFill/>
+          <a:ln/>
+        </p:spPr>
+        <p:txBody>
+          <a:bodyPr wrap="square" rtlCol="0" anchor="ctr"/>
+          <a:lstStyle/>
+          <a:p>
+            <a:pPr algn="ctr" indent="0" marL="0">
+              <a:buNone/>
+            </a:pPr>
+            <a:r>
+              <a:rPr lang="en-US" sz="1300" b="1" dirty="0">
+                <a:solidFill>
+                  <a:srgbClr val="FFFFFF"/>
+                </a:solidFill>
+                <a:latin typeface="Arial" pitchFamily="34" charset="0"/>
+                <a:ea typeface="Arial" pitchFamily="34" charset="-122"/>
+                <a:cs typeface="Arial" pitchFamily="34" charset="-120"/>
+              </a:rPr>
+              <a:t>API Gateway + Lambda</a:t>
+            </a:r>
+            <a:endParaRPr lang="en-US" sz="1300" dirty="0"/>
+          </a:p>
+        </p:txBody>
+      </p:sp>
+      <p:sp>
+        <p:nvSpPr>
+          <p:cNvPr id="9" name="Text 7"/>
+          <p:cNvSpPr/>
+          <p:nvPr/>
+        </p:nvSpPr>
+        <p:spPr>
+          <a:xfrm>
+            <a:off x="3337560" y="1554480"/>
+            <a:ext cx="2743200" cy="274320"/>
+          </a:xfrm>
+          <a:prstGeom prst="rect">
+            <a:avLst/>
+          </a:prstGeom>
+          <a:noFill/>
+          <a:ln/>
+        </p:spPr>
+        <p:txBody>
+          <a:bodyPr wrap="square" rtlCol="0" anchor="ctr"/>
+          <a:lstStyle/>
+          <a:p>
+            <a:pPr algn="ctr" indent="0" marL="0">
+              <a:buNone/>
+            </a:pPr>
+            <a:r>
+              <a:rPr lang="en-US" sz="1100" dirty="0">
+                <a:solidFill>
+                  <a:srgbClr val="FFFFFF"/>
+                </a:solidFill>
+                <a:latin typeface="Arial" pitchFamily="34" charset="0"/>
+                <a:ea typeface="Arial" pitchFamily="34" charset="-122"/>
+                <a:cs typeface="Arial" pitchFamily="34" charset="-120"/>
+              </a:rPr>
+              <a:t>REST API</a:t>
+            </a:r>
+            <a:endParaRPr lang="en-US" sz="1100" dirty="0"/>
+          </a:p>
+        </p:txBody>
+      </p:sp>
+      <p:sp>
+        <p:nvSpPr>
+          <p:cNvPr id="10" name="Shape 8"/>
+          <p:cNvSpPr/>
+          <p:nvPr/>
+        </p:nvSpPr>
+        <p:spPr>
+          <a:xfrm>
+            <a:off x="6217920" y="1097280"/>
+            <a:ext cx="2743200" cy="868680"/>
+          </a:xfrm>
+          <a:prstGeom prst="roundRect">
+            <a:avLst>
+              <a:gd name="adj" fmla="val 8421"/>
+            </a:avLst>
+          </a:prstGeom>
+          <a:solidFill>
+            <a:srgbClr val="FF9900"/>
+          </a:solidFill>
+          <a:ln/>
+        </p:spPr>
+      </p:sp>
+      <p:sp>
+        <p:nvSpPr>
+          <p:cNvPr id="11" name="Text 9"/>
+          <p:cNvSpPr/>
+          <p:nvPr/>
+        </p:nvSpPr>
+        <p:spPr>
+          <a:xfrm>
+            <a:off x="6217920" y="1234440"/>
+            <a:ext cx="2743200" cy="320040"/>
+          </a:xfrm>
+          <a:prstGeom prst="rect">
+            <a:avLst/>
+          </a:prstGeom>
+          <a:noFill/>
+          <a:ln/>
+        </p:spPr>
+        <p:txBody>
+          <a:bodyPr wrap="square" rtlCol="0" anchor="ctr"/>
+          <a:lstStyle/>
+          <a:p>
+            <a:pPr algn="ctr" indent="0" marL="0">
+              <a:buNone/>
+            </a:pPr>
+            <a:r>
+              <a:rPr lang="en-US" sz="1300" b="1" dirty="0">
+                <a:solidFill>
+                  <a:srgbClr val="FFFFFF"/>
+                </a:solidFill>
+                <a:latin typeface="Arial" pitchFamily="34" charset="0"/>
+                <a:ea typeface="Arial" pitchFamily="34" charset="-122"/>
+                <a:cs typeface="Arial" pitchFamily="34" charset="-120"/>
+              </a:rPr>
+              <a:t>Step Functions</a:t>
+            </a:r>
+            <a:endParaRPr lang="en-US" sz="1300" dirty="0"/>
+          </a:p>
+        </p:txBody>
+      </p:sp>
+      <p:sp>
+        <p:nvSpPr>
+          <p:cNvPr id="12" name="Text 10"/>
+          <p:cNvSpPr/>
+          <p:nvPr/>
+        </p:nvSpPr>
+        <p:spPr>
+          <a:xfrm>
+            <a:off x="6217920" y="1554480"/>
+            <a:ext cx="2743200" cy="274320"/>
+          </a:xfrm>
+          <a:prstGeom prst="rect">
+            <a:avLst/>
+          </a:prstGeom>
+          <a:noFill/>
+          <a:ln/>
+        </p:spPr>
+        <p:txBody>
+          <a:bodyPr wrap="square" rtlCol="0" anchor="ctr"/>
+          <a:lstStyle/>
+          <a:p>
+            <a:pPr algn="ctr" indent="0" marL="0">
+              <a:buNone/>
+            </a:pPr>
+            <a:r>
+              <a:rPr lang="en-US" sz="1100" dirty="0">
+                <a:solidFill>
+                  <a:srgbClr val="FFFFFF"/>
+                </a:solidFill>
+                <a:latin typeface="Arial" pitchFamily="34" charset="0"/>
+                <a:ea typeface="Arial" pitchFamily="34" charset="-122"/>
+                <a:cs typeface="Arial" pitchFamily="34" charset="-120"/>
+              </a:rPr>
+              <a:t>Orchestration</a:t>
+            </a:r>
+            <a:endParaRPr lang="en-US" sz="1100" dirty="0"/>
+          </a:p>
+        </p:txBody>
+      </p:sp>
+      <p:sp>
+        <p:nvSpPr>
+          <p:cNvPr id="13" name="Shape 11"/>
+          <p:cNvSpPr/>
+          <p:nvPr/>
+        </p:nvSpPr>
+        <p:spPr>
+          <a:xfrm>
+            <a:off x="457200" y="2103120"/>
+            <a:ext cx="2743200" cy="868680"/>
+          </a:xfrm>
+          <a:prstGeom prst="roundRect">
+            <a:avLst>
+              <a:gd name="adj" fmla="val 8421"/>
+            </a:avLst>
+          </a:prstGeom>
+          <a:solidFill>
+            <a:srgbClr val="FF9900"/>
+          </a:solidFill>
+          <a:ln/>
+        </p:spPr>
+      </p:sp>
+      <p:sp>
+        <p:nvSpPr>
+          <p:cNvPr id="14" name="Text 12"/>
+          <p:cNvSpPr/>
+          <p:nvPr/>
+        </p:nvSpPr>
+        <p:spPr>
+          <a:xfrm>
+            <a:off x="457200" y="2240280"/>
+            <a:ext cx="2743200" cy="320040"/>
+          </a:xfrm>
+          <a:prstGeom prst="rect">
+            <a:avLst/>
+          </a:prstGeom>
+          <a:noFill/>
+          <a:ln/>
+        </p:spPr>
+        <p:txBody>
+          <a:bodyPr wrap="square" rtlCol="0" anchor="ctr"/>
+          <a:lstStyle/>
+          <a:p>
+            <a:pPr algn="ctr" indent="0" marL="0">
+              <a:buNone/>
+            </a:pPr>
+            <a:r>
+              <a:rPr lang="en-US" sz="1300" b="1" dirty="0">
+                <a:solidFill>
+                  <a:srgbClr val="FFFFFF"/>
+                </a:solidFill>
+                <a:latin typeface="Arial" pitchFamily="34" charset="0"/>
+                <a:ea typeface="Arial" pitchFamily="34" charset="-122"/>
+                <a:cs typeface="Arial" pitchFamily="34" charset="-120"/>
+              </a:rPr>
+              <a:t>Bedrock (Claude Haiku)</a:t>
+            </a:r>
+            <a:endParaRPr lang="en-US" sz="1300" dirty="0"/>
+          </a:p>
+        </p:txBody>
+      </p:sp>
+      <p:sp>
+        <p:nvSpPr>
+          <p:cNvPr id="15" name="Text 13"/>
+          <p:cNvSpPr/>
+          <p:nvPr/>
+        </p:nvSpPr>
+        <p:spPr>
+          <a:xfrm>
+            <a:off x="457200" y="2560320"/>
+            <a:ext cx="2743200" cy="274320"/>
+          </a:xfrm>
+          <a:prstGeom prst="rect">
+            <a:avLst/>
+          </a:prstGeom>
+          <a:noFill/>
+          <a:ln/>
+        </p:spPr>
+        <p:txBody>
+          <a:bodyPr wrap="square" rtlCol="0" anchor="ctr"/>
+          <a:lstStyle/>
+          <a:p>
+            <a:pPr algn="ctr" indent="0" marL="0">
+              <a:buNone/>
+            </a:pPr>
+            <a:r>
+              <a:rPr lang="en-US" sz="1100" dirty="0">
+                <a:solidFill>
+                  <a:srgbClr val="FFFFFF"/>
+                </a:solidFill>
+                <a:latin typeface="Arial" pitchFamily="34" charset="0"/>
+                <a:ea typeface="Arial" pitchFamily="34" charset="-122"/>
+                <a:cs typeface="Arial" pitchFamily="34" charset="-120"/>
+              </a:rPr>
+              <a:t>AI Classification</a:t>
+            </a:r>
+            <a:endParaRPr lang="en-US" sz="1100" dirty="0"/>
+          </a:p>
+        </p:txBody>
+      </p:sp>
+      <p:sp>
+        <p:nvSpPr>
+          <p:cNvPr id="16" name="Shape 14"/>
+          <p:cNvSpPr/>
+          <p:nvPr/>
+        </p:nvSpPr>
+        <p:spPr>
+          <a:xfrm>
+            <a:off x="3337560" y="2103120"/>
+            <a:ext cx="2743200" cy="868680"/>
+          </a:xfrm>
+          <a:prstGeom prst="roundRect">
+            <a:avLst>
+              <a:gd name="adj" fmla="val 8421"/>
+            </a:avLst>
+          </a:prstGeom>
+          <a:solidFill>
+            <a:srgbClr val="FF9900"/>
+          </a:solidFill>
+          <a:ln/>
+        </p:spPr>
+      </p:sp>
+      <p:sp>
+        <p:nvSpPr>
+          <p:cNvPr id="17" name="Text 15"/>
+          <p:cNvSpPr/>
+          <p:nvPr/>
+        </p:nvSpPr>
+        <p:spPr>
+          <a:xfrm>
+            <a:off x="3337560" y="2240280"/>
+            <a:ext cx="2743200" cy="320040"/>
+          </a:xfrm>
+          <a:prstGeom prst="rect">
+            <a:avLst/>
+          </a:prstGeom>
+          <a:noFill/>
+          <a:ln/>
+        </p:spPr>
+        <p:txBody>
+          <a:bodyPr wrap="square" rtlCol="0" anchor="ctr"/>
+          <a:lstStyle/>
+          <a:p>
+            <a:pPr algn="ctr" indent="0" marL="0">
+              <a:buNone/>
+            </a:pPr>
+            <a:r>
+              <a:rPr lang="en-US" sz="1300" b="1" dirty="0">
+                <a:solidFill>
+                  <a:srgbClr val="FFFFFF"/>
+                </a:solidFill>
+                <a:latin typeface="Arial" pitchFamily="34" charset="0"/>
+                <a:ea typeface="Arial" pitchFamily="34" charset="-122"/>
+                <a:cs typeface="Arial" pitchFamily="34" charset="-120"/>
+              </a:rPr>
+              <a:t>Textract</a:t>
+            </a:r>
+            <a:endParaRPr lang="en-US" sz="1300" dirty="0"/>
+          </a:p>
+        </p:txBody>
+      </p:sp>
+      <p:sp>
+        <p:nvSpPr>
+          <p:cNvPr id="18" name="Text 16"/>
+          <p:cNvSpPr/>
+          <p:nvPr/>
+        </p:nvSpPr>
+        <p:spPr>
+          <a:xfrm>
+            <a:off x="3337560" y="2560320"/>
+            <a:ext cx="2743200" cy="274320"/>
+          </a:xfrm>
+          <a:prstGeom prst="rect">
+            <a:avLst/>
+          </a:prstGeom>
+          <a:noFill/>
+          <a:ln/>
+        </p:spPr>
+        <p:txBody>
+          <a:bodyPr wrap="square" rtlCol="0" anchor="ctr"/>
+          <a:lstStyle/>
+          <a:p>
+            <a:pPr algn="ctr" indent="0" marL="0">
+              <a:buNone/>
+            </a:pPr>
+            <a:r>
+              <a:rPr lang="en-US" sz="1100" dirty="0">
+                <a:solidFill>
+                  <a:srgbClr val="FFFFFF"/>
+                </a:solidFill>
+                <a:latin typeface="Arial" pitchFamily="34" charset="0"/>
+                <a:ea typeface="Arial" pitchFamily="34" charset="-122"/>
+                <a:cs typeface="Arial" pitchFamily="34" charset="-120"/>
+              </a:rPr>
+              <a:t>OCR Extraction</a:t>
+            </a:r>
+            <a:endParaRPr lang="en-US" sz="1100" dirty="0"/>
+          </a:p>
+        </p:txBody>
+      </p:sp>
+      <p:sp>
+        <p:nvSpPr>
+          <p:cNvPr id="19" name="Shape 17"/>
+          <p:cNvSpPr/>
+          <p:nvPr/>
+        </p:nvSpPr>
+        <p:spPr>
+          <a:xfrm>
+            <a:off x="6217920" y="2103120"/>
+            <a:ext cx="2743200" cy="868680"/>
+          </a:xfrm>
+          <a:prstGeom prst="roundRect">
+            <a:avLst>
+              <a:gd name="adj" fmla="val 8421"/>
+            </a:avLst>
+          </a:prstGeom>
+          <a:solidFill>
+            <a:srgbClr val="FF9900"/>
+          </a:solidFill>
+          <a:ln/>
+        </p:spPr>
+      </p:sp>
+      <p:sp>
+        <p:nvSpPr>
+          <p:cNvPr id="20" name="Text 18"/>
+          <p:cNvSpPr/>
+          <p:nvPr/>
+        </p:nvSpPr>
+        <p:spPr>
+          <a:xfrm>
+            <a:off x="6217920" y="2240280"/>
+            <a:ext cx="2743200" cy="320040"/>
+          </a:xfrm>
+          <a:prstGeom prst="rect">
+            <a:avLst/>
+          </a:prstGeom>
+          <a:noFill/>
+          <a:ln/>
+        </p:spPr>
+        <p:txBody>
+          <a:bodyPr wrap="square" rtlCol="0" anchor="ctr"/>
+          <a:lstStyle/>
+          <a:p>
+            <a:pPr algn="ctr" indent="0" marL="0">
+              <a:buNone/>
+            </a:pPr>
+            <a:r>
+              <a:rPr lang="en-US" sz="1300" b="1" dirty="0">
+                <a:solidFill>
+                  <a:srgbClr val="FFFFFF"/>
+                </a:solidFill>
+                <a:latin typeface="Arial" pitchFamily="34" charset="0"/>
+                <a:ea typeface="Arial" pitchFamily="34" charset="-122"/>
+                <a:cs typeface="Arial" pitchFamily="34" charset="-120"/>
+              </a:rPr>
+              <a:t>DynamoDB + S3</a:t>
+            </a:r>
+            <a:endParaRPr lang="en-US" sz="1300" dirty="0"/>
+          </a:p>
+        </p:txBody>
+      </p:sp>
+      <p:sp>
+        <p:nvSpPr>
+          <p:cNvPr id="21" name="Text 19"/>
+          <p:cNvSpPr/>
+          <p:nvPr/>
+        </p:nvSpPr>
+        <p:spPr>
+          <a:xfrm>
+            <a:off x="6217920" y="2560320"/>
+            <a:ext cx="2743200" cy="274320"/>
+          </a:xfrm>
+          <a:prstGeom prst="rect">
+            <a:avLst/>
+          </a:prstGeom>
+          <a:noFill/>
+          <a:ln/>
+        </p:spPr>
+        <p:txBody>
+          <a:bodyPr wrap="square" rtlCol="0" anchor="ctr"/>
+          <a:lstStyle/>
+          <a:p>
+            <a:pPr algn="ctr" indent="0" marL="0">
+              <a:buNone/>
+            </a:pPr>
+            <a:r>
+              <a:rPr lang="en-US" sz="1100" dirty="0">
+                <a:solidFill>
+                  <a:srgbClr val="FFFFFF"/>
+                </a:solidFill>
+                <a:latin typeface="Arial" pitchFamily="34" charset="0"/>
+                <a:ea typeface="Arial" pitchFamily="34" charset="-122"/>
+                <a:cs typeface="Arial" pitchFamily="34" charset="-120"/>
+              </a:rPr>
+              <a:t>Data Storage</a:t>
+            </a:r>
+            <a:endParaRPr lang="en-US" sz="1100" dirty="0"/>
+          </a:p>
+        </p:txBody>
+      </p:sp>
+      <p:sp>
+        <p:nvSpPr>
+          <p:cNvPr id="22" name="Shape 20"/>
+          <p:cNvSpPr/>
+          <p:nvPr/>
+        </p:nvSpPr>
+        <p:spPr>
+          <a:xfrm>
+            <a:off x="1371600" y="3291840"/>
+            <a:ext cx="6400800" cy="1645920"/>
+          </a:xfrm>
+          <a:prstGeom prst="roundRect">
+            <a:avLst>
+              <a:gd name="adj" fmla="val 8333"/>
+            </a:avLst>
+          </a:prstGeom>
+          <a:solidFill>
+            <a:srgbClr val="FFFFFF"/>
+          </a:solidFill>
+          <a:ln/>
+        </p:spPr>
+      </p:sp>
+      <p:sp>
+        <p:nvSpPr>
+          <p:cNvPr id="23" name="Text 21"/>
+          <p:cNvSpPr/>
+          <p:nvPr/>
+        </p:nvSpPr>
+        <p:spPr>
+          <a:xfrm>
+            <a:off x="1371600" y="3429000"/>
+            <a:ext cx="6400800" cy="365760"/>
+          </a:xfrm>
+          <a:prstGeom prst="rect">
+            <a:avLst/>
+          </a:prstGeom>
+          <a:noFill/>
+          <a:ln/>
+        </p:spPr>
+        <p:txBody>
+          <a:bodyPr wrap="square" rtlCol="0" anchor="ctr"/>
+          <a:lstStyle/>
+          <a:p>
+            <a:pPr algn="ctr" indent="0" marL="0">
+              <a:buNone/>
+            </a:pPr>
+            <a:r>
+              <a:rPr lang="en-US" sz="2200" b="1" dirty="0">
+                <a:solidFill>
+                  <a:srgbClr val="FF9900"/>
+                </a:solidFill>
+                <a:latin typeface="Arial" pitchFamily="34" charset="0"/>
+                <a:ea typeface="Arial" pitchFamily="34" charset="-122"/>
+                <a:cs typeface="Arial" pitchFamily="34" charset="-120"/>
+              </a:rPr>
+              <a:t>Get Started</a:t>
+            </a:r>
+            <a:endParaRPr lang="en-US" sz="2200" dirty="0"/>
+          </a:p>
+        </p:txBody>
+      </p:sp>
+      <p:sp>
+        <p:nvSpPr>
+          <p:cNvPr id="24" name="Text 22"/>
+          <p:cNvSpPr/>
+          <p:nvPr/>
+        </p:nvSpPr>
+        <p:spPr>
+          <a:xfrm>
+            <a:off x="1371600" y="3840480"/>
+            <a:ext cx="6400800" cy="320040"/>
+          </a:xfrm>
+          <a:prstGeom prst="rect">
+            <a:avLst/>
+          </a:prstGeom>
+          <a:noFill/>
+          <a:ln/>
+        </p:spPr>
+        <p:txBody>
+          <a:bodyPr wrap="square" rtlCol="0" anchor="ctr"/>
+          <a:lstStyle/>
+          <a:p>
+            <a:pPr algn="ctr" indent="0" marL="0">
+              <a:buNone/>
+            </a:pPr>
+            <a:r>
+              <a:rPr lang="en-US" sz="1400" b="1" dirty="0">
+                <a:solidFill>
+                  <a:srgbClr val="1E293B"/>
+                </a:solidFill>
+                <a:latin typeface="Arial" pitchFamily="34" charset="0"/>
+                <a:ea typeface="Arial" pitchFamily="34" charset="-122"/>
+                <a:cs typeface="Arial" pitchFamily="34" charset="-120"/>
+              </a:rPr>
+              <a:t>GitHub: </a:t>
+            </a:r>
+            <a:pPr algn="ctr" indent="0" marL="0">
+              <a:buNone/>
+            </a:pPr>
+            <a:r>
+              <a:rPr lang="en-US" sz="1400" dirty="0">
+                <a:solidFill>
+                  <a:srgbClr val="1E293B"/>
+                </a:solidFill>
+                <a:latin typeface="Arial" pitchFamily="34" charset="0"/>
+                <a:ea typeface="Arial" pitchFamily="34" charset="-122"/>
+                <a:cs typeface="Arial" pitchFamily="34" charset="-120"/>
+              </a:rPr>
+              <a:t>github.com/vibhupb/financial-documents-processing</a:t>
+            </a:r>
+            <a:endParaRPr lang="en-US" sz="1400" dirty="0"/>
+          </a:p>
+        </p:txBody>
+      </p:sp>
+      <p:sp>
+        <p:nvSpPr>
+          <p:cNvPr id="25" name="Text 23"/>
+          <p:cNvSpPr/>
+          <p:nvPr/>
+        </p:nvSpPr>
+        <p:spPr>
+          <a:xfrm>
+            <a:off x="1371600" y="4206240"/>
+            <a:ext cx="6400800" cy="320040"/>
+          </a:xfrm>
+          <a:prstGeom prst="rect">
+            <a:avLst/>
+          </a:prstGeom>
+          <a:noFill/>
+          <a:ln/>
+        </p:spPr>
+        <p:txBody>
+          <a:bodyPr wrap="square" rtlCol="0" anchor="ctr"/>
+          <a:lstStyle/>
+          <a:p>
+            <a:pPr algn="ctr" indent="0" marL="0">
+              <a:buNone/>
+            </a:pPr>
+            <a:r>
+              <a:rPr lang="en-US" sz="1400" b="1" dirty="0">
+                <a:solidFill>
+                  <a:srgbClr val="1E293B"/>
+                </a:solidFill>
+                <a:latin typeface="Arial" pitchFamily="34" charset="0"/>
+                <a:ea typeface="Arial" pitchFamily="34" charset="-122"/>
+                <a:cs typeface="Arial" pitchFamily="34" charset="-120"/>
+              </a:rPr>
+              <a:t>Deploy: </a:t>
+            </a:r>
+            <a:pPr algn="ctr" indent="0" marL="0">
+              <a:buNone/>
+            </a:pPr>
+            <a:r>
+              <a:rPr lang="en-US" sz="1400" dirty="0">
+                <a:solidFill>
+                  <a:srgbClr val="1E293B"/>
+                </a:solidFill>
+                <a:latin typeface="Arial" pitchFamily="34" charset="0"/>
+                <a:ea typeface="Arial" pitchFamily="34" charset="-122"/>
+                <a:cs typeface="Arial" pitchFamily="34" charset="-120"/>
+              </a:rPr>
+              <a:t>npm install &amp;&amp; cdk deploy --all</a:t>
+            </a:r>
+            <a:endParaRPr lang="en-US" sz="1400" dirty="0"/>
+          </a:p>
+        </p:txBody>
+      </p:sp>
+      <p:sp>
+        <p:nvSpPr>
+          <p:cNvPr id="26" name="Text 24"/>
+          <p:cNvSpPr/>
+          <p:nvPr/>
+        </p:nvSpPr>
+        <p:spPr>
+          <a:xfrm>
+            <a:off x="1371600" y="4663440"/>
+            <a:ext cx="6400800" cy="274320"/>
+          </a:xfrm>
+          <a:prstGeom prst="rect">
+            <a:avLst/>
+          </a:prstGeom>
+          <a:noFill/>
+          <a:ln/>
+        </p:spPr>
+        <p:txBody>
+          <a:bodyPr wrap="square" rtlCol="0" anchor="ctr"/>
+          <a:lstStyle/>
+          <a:p>
+            <a:pPr algn="ctr" indent="0" marL="0">
+              <a:buNone/>
+            </a:pPr>
+            <a:r>
+              <a:rPr lang="en-US" sz="1200" b="1" dirty="0">
+                <a:solidFill>
+                  <a:srgbClr val="22C55E"/>
+                </a:solidFill>
+                <a:latin typeface="Arial" pitchFamily="34" charset="0"/>
+                <a:ea typeface="Arial" pitchFamily="34" charset="-122"/>
+                <a:cs typeface="Arial" pitchFamily="34" charset="-120"/>
+              </a:rPr>
+              <a:t>~$0.34/doc  |  92.5% savings  |  Production ready</a:t>
+            </a:r>
+            <a:endParaRPr lang="en-US" sz="1200" dirty="0"/>
+          </a:p>
+        </p:txBody>
+      </p:sp>
+    </p:spTree>
+  </p:cSld>
+  <p:clrMapOvr>
+    <a:masterClrMapping/>
+  </p:clrMapOvr>
+</p:sld>
+</file>
+
 <file path=ppt/slides/slide2.xml><?xml version="1.0" encoding="utf-8"?>
 <p:sld xmlns:a="http://schemas.openxmlformats.org/drawingml/2006/main" xmlns:r="http://schemas.openxmlformats.org/officeDocument/2006/relationships" xmlns:p="http://schemas.openxmlformats.org/presentationml/2006/main">
   <p:cSld name="Slide 2">
@@ -4248,6 +5227,429 @@
             <a:avLst/>
           </a:prstGeom>
           <a:solidFill>
+            <a:srgbClr val="FF9900"/>
+          </a:solidFill>
+          <a:ln/>
+        </p:spPr>
+      </p:sp>
+      <p:sp>
+        <p:nvSpPr>
+          <p:cNvPr id="3" name="Text 1"/>
+          <p:cNvSpPr/>
+          <p:nvPr/>
+        </p:nvSpPr>
+        <p:spPr>
+          <a:xfrm>
+            <a:off x="457200" y="365760"/>
+            <a:ext cx="8229600" cy="457200"/>
+          </a:xfrm>
+          <a:prstGeom prst="rect">
+            <a:avLst/>
+          </a:prstGeom>
+          <a:noFill/>
+          <a:ln/>
+        </p:spPr>
+        <p:txBody>
+          <a:bodyPr wrap="square" rtlCol="0" anchor="ctr"/>
+          <a:lstStyle/>
+          <a:p>
+            <a:pPr indent="0" marL="0">
+              <a:buNone/>
+            </a:pPr>
+            <a:r>
+              <a:rPr lang="en-US" sz="3200" b="1" dirty="0">
+                <a:solidFill>
+                  <a:srgbClr val="FFFFFF"/>
+                </a:solidFill>
+                <a:latin typeface="Arial" pitchFamily="34" charset="0"/>
+                <a:ea typeface="Arial" pitchFamily="34" charset="-122"/>
+                <a:cs typeface="Arial" pitchFamily="34" charset="-120"/>
+              </a:rPr>
+              <a:t>Step Functions Workflow</a:t>
+            </a:r>
+            <a:endParaRPr lang="en-US" sz="3200" dirty="0"/>
+          </a:p>
+        </p:txBody>
+      </p:sp>
+      <p:pic>
+        <p:nvPicPr>
+          <p:cNvPr id="4" name="Image 0" descr="/Users/vibhupb/financial-documents-processing/docs/stepfunctions_graph.png">    </p:cNvPr>
+          <p:cNvPicPr>
+            <a:picLocks noChangeAspect="1"/>
+          </p:cNvPicPr>
+          <p:nvPr/>
+        </p:nvPicPr>
+        <p:blipFill>
+          <a:blip r:embed="rId1"/>
+          <a:stretch>
+            <a:fillRect/>
+          </a:stretch>
+        </p:blipFill>
+        <p:spPr>
+          <a:xfrm>
+            <a:off x="182880" y="1234440"/>
+            <a:ext cx="8778240" cy="2560320"/>
+          </a:xfrm>
+          <a:prstGeom prst="rect">
+            <a:avLst/>
+          </a:prstGeom>
+        </p:spPr>
+      </p:pic>
+      <p:sp>
+        <p:nvSpPr>
+          <p:cNvPr id="5" name="Shape 2"/>
+          <p:cNvSpPr/>
+          <p:nvPr/>
+        </p:nvSpPr>
+        <p:spPr>
+          <a:xfrm>
+            <a:off x="365760" y="3931920"/>
+            <a:ext cx="2743200" cy="1097280"/>
+          </a:xfrm>
+          <a:prstGeom prst="roundRect">
+            <a:avLst>
+              <a:gd name="adj" fmla="val 6667"/>
+            </a:avLst>
+          </a:prstGeom>
+          <a:solidFill>
+            <a:srgbClr val="FFFFFF"/>
+          </a:solidFill>
+          <a:ln w="12700">
+            <a:solidFill>
+              <a:srgbClr val="1A73E8"/>
+            </a:solidFill>
+            <a:prstDash val="solid"/>
+          </a:ln>
+        </p:spPr>
+      </p:sp>
+      <p:sp>
+        <p:nvSpPr>
+          <p:cNvPr id="6" name="Text 3"/>
+          <p:cNvSpPr/>
+          <p:nvPr/>
+        </p:nvSpPr>
+        <p:spPr>
+          <a:xfrm>
+            <a:off x="365760" y="4023360"/>
+            <a:ext cx="2743200" cy="320040"/>
+          </a:xfrm>
+          <a:prstGeom prst="rect">
+            <a:avLst/>
+          </a:prstGeom>
+          <a:noFill/>
+          <a:ln/>
+        </p:spPr>
+        <p:txBody>
+          <a:bodyPr wrap="square" rtlCol="0" anchor="ctr"/>
+          <a:lstStyle/>
+          <a:p>
+            <a:pPr algn="ctr" indent="0" marL="0">
+              <a:buNone/>
+            </a:pPr>
+            <a:r>
+              <a:rPr lang="en-US" sz="1300" b="1" dirty="0">
+                <a:solidFill>
+                  <a:srgbClr val="1A73E8"/>
+                </a:solidFill>
+                <a:latin typeface="Arial" pitchFamily="34" charset="0"/>
+                <a:ea typeface="Arial" pitchFamily="34" charset="-122"/>
+                <a:cs typeface="Arial" pitchFamily="34" charset="-120"/>
+              </a:rPr>
+              <a:t>Smart Routing</a:t>
+            </a:r>
+            <a:endParaRPr lang="en-US" sz="1300" dirty="0"/>
+          </a:p>
+        </p:txBody>
+      </p:sp>
+      <p:sp>
+        <p:nvSpPr>
+          <p:cNvPr id="7" name="Text 4"/>
+          <p:cNvSpPr/>
+          <p:nvPr/>
+        </p:nvSpPr>
+        <p:spPr>
+          <a:xfrm>
+            <a:off x="457200" y="4389120"/>
+            <a:ext cx="2560320" cy="548640"/>
+          </a:xfrm>
+          <a:prstGeom prst="rect">
+            <a:avLst/>
+          </a:prstGeom>
+          <a:noFill/>
+          <a:ln/>
+        </p:spPr>
+        <p:txBody>
+          <a:bodyPr wrap="square" rtlCol="0" anchor="ctr"/>
+          <a:lstStyle/>
+          <a:p>
+            <a:pPr algn="ctr" indent="0" marL="0">
+              <a:buNone/>
+            </a:pPr>
+            <a:r>
+              <a:rPr lang="en-US" sz="1000" dirty="0">
+                <a:solidFill>
+                  <a:srgbClr val="1E293B"/>
+                </a:solidFill>
+                <a:latin typeface="Arial" pitchFamily="34" charset="0"/>
+                <a:ea typeface="Arial" pitchFamily="34" charset="-122"/>
+                <a:cs typeface="Arial" pitchFamily="34" charset="-120"/>
+              </a:rPr>
+              <a:t>DocumentTypeChoice branches to Loan or Credit Agreement path</a:t>
+            </a:r>
+            <a:endParaRPr lang="en-US" sz="1000" dirty="0"/>
+          </a:p>
+        </p:txBody>
+      </p:sp>
+      <p:sp>
+        <p:nvSpPr>
+          <p:cNvPr id="8" name="Shape 5"/>
+          <p:cNvSpPr/>
+          <p:nvPr/>
+        </p:nvSpPr>
+        <p:spPr>
+          <a:xfrm>
+            <a:off x="3291840" y="3931920"/>
+            <a:ext cx="2743200" cy="1097280"/>
+          </a:xfrm>
+          <a:prstGeom prst="roundRect">
+            <a:avLst>
+              <a:gd name="adj" fmla="val 6667"/>
+            </a:avLst>
+          </a:prstGeom>
+          <a:solidFill>
+            <a:srgbClr val="FFFFFF"/>
+          </a:solidFill>
+          <a:ln w="12700">
+            <a:solidFill>
+              <a:srgbClr val="14B8A6"/>
+            </a:solidFill>
+            <a:prstDash val="solid"/>
+          </a:ln>
+        </p:spPr>
+      </p:sp>
+      <p:sp>
+        <p:nvSpPr>
+          <p:cNvPr id="9" name="Text 6"/>
+          <p:cNvSpPr/>
+          <p:nvPr/>
+        </p:nvSpPr>
+        <p:spPr>
+          <a:xfrm>
+            <a:off x="3291840" y="4023360"/>
+            <a:ext cx="2743200" cy="320040"/>
+          </a:xfrm>
+          <a:prstGeom prst="rect">
+            <a:avLst/>
+          </a:prstGeom>
+          <a:noFill/>
+          <a:ln/>
+        </p:spPr>
+        <p:txBody>
+          <a:bodyPr wrap="square" rtlCol="0" anchor="ctr"/>
+          <a:lstStyle/>
+          <a:p>
+            <a:pPr algn="ctr" indent="0" marL="0">
+              <a:buNone/>
+            </a:pPr>
+            <a:r>
+              <a:rPr lang="en-US" sz="1300" b="1" dirty="0">
+                <a:solidFill>
+                  <a:srgbClr val="14B8A6"/>
+                </a:solidFill>
+                <a:latin typeface="Arial" pitchFamily="34" charset="0"/>
+                <a:ea typeface="Arial" pitchFamily="34" charset="-122"/>
+                <a:cs typeface="Arial" pitchFamily="34" charset="-120"/>
+              </a:rPr>
+              <a:t>Parallel Extraction</a:t>
+            </a:r>
+            <a:endParaRPr lang="en-US" sz="1300" dirty="0"/>
+          </a:p>
+        </p:txBody>
+      </p:sp>
+      <p:sp>
+        <p:nvSpPr>
+          <p:cNvPr id="10" name="Text 7"/>
+          <p:cNvSpPr/>
+          <p:nvPr/>
+        </p:nvSpPr>
+        <p:spPr>
+          <a:xfrm>
+            <a:off x="3383280" y="4389120"/>
+            <a:ext cx="2560320" cy="548640"/>
+          </a:xfrm>
+          <a:prstGeom prst="rect">
+            <a:avLst/>
+          </a:prstGeom>
+          <a:noFill/>
+          <a:ln/>
+        </p:spPr>
+        <p:txBody>
+          <a:bodyPr wrap="square" rtlCol="0" anchor="ctr"/>
+          <a:lstStyle/>
+          <a:p>
+            <a:pPr algn="ctr" indent="0" marL="0">
+              <a:buNone/>
+            </a:pPr>
+            <a:r>
+              <a:rPr lang="en-US" sz="1000" dirty="0">
+                <a:solidFill>
+                  <a:srgbClr val="1E293B"/>
+                </a:solidFill>
+                <a:latin typeface="Arial" pitchFamily="34" charset="0"/>
+                <a:ea typeface="Arial" pitchFamily="34" charset="-122"/>
+                <a:cs typeface="Arial" pitchFamily="34" charset="-120"/>
+              </a:rPr>
+              <a:t>Multiple Textract tasks run simultaneously for speed</a:t>
+            </a:r>
+            <a:endParaRPr lang="en-US" sz="1000" dirty="0"/>
+          </a:p>
+        </p:txBody>
+      </p:sp>
+      <p:sp>
+        <p:nvSpPr>
+          <p:cNvPr id="11" name="Shape 8"/>
+          <p:cNvSpPr/>
+          <p:nvPr/>
+        </p:nvSpPr>
+        <p:spPr>
+          <a:xfrm>
+            <a:off x="6217920" y="3931920"/>
+            <a:ext cx="2743200" cy="1097280"/>
+          </a:xfrm>
+          <a:prstGeom prst="roundRect">
+            <a:avLst>
+              <a:gd name="adj" fmla="val 6667"/>
+            </a:avLst>
+          </a:prstGeom>
+          <a:solidFill>
+            <a:srgbClr val="FFFFFF"/>
+          </a:solidFill>
+          <a:ln w="12700">
+            <a:solidFill>
+              <a:srgbClr val="EF4444"/>
+            </a:solidFill>
+            <a:prstDash val="solid"/>
+          </a:ln>
+        </p:spPr>
+      </p:sp>
+      <p:sp>
+        <p:nvSpPr>
+          <p:cNvPr id="12" name="Text 9"/>
+          <p:cNvSpPr/>
+          <p:nvPr/>
+        </p:nvSpPr>
+        <p:spPr>
+          <a:xfrm>
+            <a:off x="6217920" y="4023360"/>
+            <a:ext cx="2743200" cy="320040"/>
+          </a:xfrm>
+          <a:prstGeom prst="rect">
+            <a:avLst/>
+          </a:prstGeom>
+          <a:noFill/>
+          <a:ln/>
+        </p:spPr>
+        <p:txBody>
+          <a:bodyPr wrap="square" rtlCol="0" anchor="ctr"/>
+          <a:lstStyle/>
+          <a:p>
+            <a:pPr algn="ctr" indent="0" marL="0">
+              <a:buNone/>
+            </a:pPr>
+            <a:r>
+              <a:rPr lang="en-US" sz="1300" b="1" dirty="0">
+                <a:solidFill>
+                  <a:srgbClr val="EF4444"/>
+                </a:solidFill>
+                <a:latin typeface="Arial" pitchFamily="34" charset="0"/>
+                <a:ea typeface="Arial" pitchFamily="34" charset="-122"/>
+                <a:cs typeface="Arial" pitchFamily="34" charset="-120"/>
+              </a:rPr>
+              <a:t>Error Handling</a:t>
+            </a:r>
+            <a:endParaRPr lang="en-US" sz="1300" dirty="0"/>
+          </a:p>
+        </p:txBody>
+      </p:sp>
+      <p:sp>
+        <p:nvSpPr>
+          <p:cNvPr id="13" name="Text 10"/>
+          <p:cNvSpPr/>
+          <p:nvPr/>
+        </p:nvSpPr>
+        <p:spPr>
+          <a:xfrm>
+            <a:off x="6309360" y="4389120"/>
+            <a:ext cx="2560320" cy="548640"/>
+          </a:xfrm>
+          <a:prstGeom prst="rect">
+            <a:avLst/>
+          </a:prstGeom>
+          <a:noFill/>
+          <a:ln/>
+        </p:spPr>
+        <p:txBody>
+          <a:bodyPr wrap="square" rtlCol="0" anchor="ctr"/>
+          <a:lstStyle/>
+          <a:p>
+            <a:pPr algn="ctr" indent="0" marL="0">
+              <a:buNone/>
+            </a:pPr>
+            <a:r>
+              <a:rPr lang="en-US" sz="1000" dirty="0">
+                <a:solidFill>
+                  <a:srgbClr val="1E293B"/>
+                </a:solidFill>
+                <a:latin typeface="Arial" pitchFamily="34" charset="0"/>
+                <a:ea typeface="Arial" pitchFamily="34" charset="-122"/>
+                <a:cs typeface="Arial" pitchFamily="34" charset="-120"/>
+              </a:rPr>
+              <a:t>Built-in error handling with graceful failure recovery</a:t>
+            </a:r>
+            <a:endParaRPr lang="en-US" sz="1000" dirty="0"/>
+          </a:p>
+        </p:txBody>
+      </p:sp>
+    </p:spTree>
+  </p:cSld>
+  <p:clrMapOvr>
+    <a:masterClrMapping/>
+  </p:clrMapOvr>
+</p:sld>
+</file>
+
+<file path=ppt/slides/slide6.xml><?xml version="1.0" encoding="utf-8"?>
+<p:sld xmlns:a="http://schemas.openxmlformats.org/drawingml/2006/main" xmlns:r="http://schemas.openxmlformats.org/officeDocument/2006/relationships" xmlns:p="http://schemas.openxmlformats.org/presentationml/2006/main">
+  <p:cSld name="Slide 6">
+    <p:spTree>
+      <p:nvGrpSpPr>
+        <p:cNvPr id="1" name=""/>
+        <p:cNvGrpSpPr/>
+        <p:nvPr/>
+      </p:nvGrpSpPr>
+      <p:grpSpPr>
+        <a:xfrm>
+          <a:off x="0" y="0"/>
+          <a:ext cx="0" cy="0"/>
+          <a:chOff x="0" y="0"/>
+          <a:chExt cx="0" cy="0"/>
+        </a:xfrm>
+      </p:grpSpPr>
+      <p:sp>
+        <p:nvSpPr>
+          <p:cNvPr id="2" name="Shape 0"/>
+          <p:cNvSpPr/>
+          <p:nvPr/>
+        </p:nvSpPr>
+        <p:spPr>
+          <a:xfrm>
+            <a:off x="0" y="0"/>
+            <a:ext cx="9144000" cy="1097280"/>
+          </a:xfrm>
+          <a:prstGeom prst="rect">
+            <a:avLst/>
+          </a:prstGeom>
+          <a:solidFill>
             <a:srgbClr val="22C55E"/>
           </a:solidFill>
           <a:ln/>
@@ -4294,7 +5696,7 @@
       </p:sp>
       <p:graphicFrame>
         <p:nvGraphicFramePr>
-          <p:cNvPr id="6" name="Table 0"/>
+          <p:cNvPr id="7" name="Table 0"/>
           <p:cNvGraphicFramePr>
             <a:graphicFrameLocks noGrp="1"/>
           </p:cNvGraphicFramePr>
@@ -5499,9 +6901,9 @@
 </p:sld>
 </file>
 
-<file path=ppt/slides/slide6.xml><?xml version="1.0" encoding="utf-8"?>
+<file path=ppt/slides/slide7.xml><?xml version="1.0" encoding="utf-8"?>
 <p:sld xmlns:a="http://schemas.openxmlformats.org/drawingml/2006/main" xmlns:r="http://schemas.openxmlformats.org/officeDocument/2006/relationships" xmlns:p="http://schemas.openxmlformats.org/presentationml/2006/main">
-  <p:cSld name="Slide 6">
+  <p:cSld name="Slide 7">
     <p:spTree>
       <p:nvGrpSpPr>
         <p:cNvPr id="1" name=""/>
@@ -5577,7 +6979,7 @@
       </p:sp>
       <p:graphicFrame>
         <p:nvGraphicFramePr>
-          <p:cNvPr id="7" name="Table 0"/>
+          <p:cNvPr id="8" name="Table 0"/>
           <p:cNvGraphicFramePr>
             <a:graphicFrameLocks noGrp="1"/>
           </p:cNvGraphicFramePr>
@@ -7592,936 +8994,6 @@
 </p:sld>
 </file>
 
-<file path=ppt/slides/slide7.xml><?xml version="1.0" encoding="utf-8"?>
-<p:sld xmlns:a="http://schemas.openxmlformats.org/drawingml/2006/main" xmlns:r="http://schemas.openxmlformats.org/officeDocument/2006/relationships" xmlns:p="http://schemas.openxmlformats.org/presentationml/2006/main">
-  <p:cSld name="Slide 7">
-    <p:spTree>
-      <p:nvGrpSpPr>
-        <p:cNvPr id="1" name=""/>
-        <p:cNvGrpSpPr/>
-        <p:nvPr/>
-      </p:nvGrpSpPr>
-      <p:grpSpPr>
-        <a:xfrm>
-          <a:off x="0" y="0"/>
-          <a:ext cx="0" cy="0"/>
-          <a:chOff x="0" y="0"/>
-          <a:chExt cx="0" cy="0"/>
-        </a:xfrm>
-      </p:grpSpPr>
-      <p:sp>
-        <p:nvSpPr>
-          <p:cNvPr id="2" name="Shape 0"/>
-          <p:cNvSpPr/>
-          <p:nvPr/>
-        </p:nvSpPr>
-        <p:spPr>
-          <a:xfrm>
-            <a:off x="0" y="0"/>
-            <a:ext cx="9144000" cy="1097280"/>
-          </a:xfrm>
-          <a:prstGeom prst="rect">
-            <a:avLst/>
-          </a:prstGeom>
-          <a:solidFill>
-            <a:srgbClr val="8B5CF6"/>
-          </a:solidFill>
-          <a:ln/>
-        </p:spPr>
-      </p:sp>
-      <p:sp>
-        <p:nvSpPr>
-          <p:cNvPr id="3" name="Text 1"/>
-          <p:cNvSpPr/>
-          <p:nvPr/>
-        </p:nvSpPr>
-        <p:spPr>
-          <a:xfrm>
-            <a:off x="457200" y="365760"/>
-            <a:ext cx="8229600" cy="457200"/>
-          </a:xfrm>
-          <a:prstGeom prst="rect">
-            <a:avLst/>
-          </a:prstGeom>
-          <a:noFill/>
-          <a:ln/>
-        </p:spPr>
-        <p:txBody>
-          <a:bodyPr wrap="square" rtlCol="0" anchor="ctr"/>
-          <a:lstStyle/>
-          <a:p>
-            <a:pPr indent="0" marL="0">
-              <a:buNone/>
-            </a:pPr>
-            <a:r>
-              <a:rPr lang="en-US" sz="3200" b="1" dirty="0">
-                <a:solidFill>
-                  <a:srgbClr val="FFFFFF"/>
-                </a:solidFill>
-                <a:latin typeface="Arial" pitchFamily="34" charset="0"/>
-                <a:ea typeface="Arial" pitchFamily="34" charset="-122"/>
-                <a:cs typeface="Arial" pitchFamily="34" charset="-120"/>
-              </a:rPr>
-              <a:t>Key Differentiators</a:t>
-            </a:r>
-            <a:endParaRPr lang="en-US" sz="3200" dirty="0"/>
-          </a:p>
-        </p:txBody>
-      </p:sp>
-      <p:sp>
-        <p:nvSpPr>
-          <p:cNvPr id="4" name="Shape 2"/>
-          <p:cNvSpPr/>
-          <p:nvPr/>
-        </p:nvSpPr>
-        <p:spPr>
-          <a:xfrm>
-            <a:off x="365760" y="1280160"/>
-            <a:ext cx="4206240" cy="1051560"/>
-          </a:xfrm>
-          <a:prstGeom prst="roundRect">
-            <a:avLst>
-              <a:gd name="adj" fmla="val 6957"/>
-            </a:avLst>
-          </a:prstGeom>
-          <a:solidFill>
-            <a:srgbClr val="FFFFFF"/>
-          </a:solidFill>
-          <a:ln w="12700">
-            <a:solidFill>
-              <a:srgbClr val="8B5CF6"/>
-            </a:solidFill>
-            <a:prstDash val="solid"/>
-          </a:ln>
-        </p:spPr>
-      </p:sp>
-      <p:sp>
-        <p:nvSpPr>
-          <p:cNvPr id="5" name="Text 3"/>
-          <p:cNvSpPr/>
-          <p:nvPr/>
-        </p:nvSpPr>
-        <p:spPr>
-          <a:xfrm>
-            <a:off x="457200" y="1508760"/>
-            <a:ext cx="548640" cy="548640"/>
-          </a:xfrm>
-          <a:prstGeom prst="rect">
-            <a:avLst/>
-          </a:prstGeom>
-          <a:noFill/>
-          <a:ln/>
-        </p:spPr>
-        <p:txBody>
-          <a:bodyPr wrap="square" rtlCol="0" anchor="ctr"/>
-          <a:lstStyle/>
-          <a:p>
-            <a:pPr indent="0" marL="0">
-              <a:buNone/>
-            </a:pPr>
-            <a:r>
-              <a:rPr lang="en-US" sz="2400" dirty="0">
-                <a:solidFill>
-                  <a:srgbClr val="000000"/>
-                </a:solidFill>
-              </a:rPr>
-              <a:t>🧠</a:t>
-            </a:r>
-            <a:endParaRPr lang="en-US" sz="2400" dirty="0"/>
-          </a:p>
-        </p:txBody>
-      </p:sp>
-      <p:sp>
-        <p:nvSpPr>
-          <p:cNvPr id="6" name="Text 4"/>
-          <p:cNvSpPr/>
-          <p:nvPr/>
-        </p:nvSpPr>
-        <p:spPr>
-          <a:xfrm>
-            <a:off x="1097280" y="1417320"/>
-            <a:ext cx="3291840" cy="320040"/>
-          </a:xfrm>
-          <a:prstGeom prst="rect">
-            <a:avLst/>
-          </a:prstGeom>
-          <a:noFill/>
-          <a:ln/>
-        </p:spPr>
-        <p:txBody>
-          <a:bodyPr wrap="square" rtlCol="0" anchor="ctr"/>
-          <a:lstStyle/>
-          <a:p>
-            <a:pPr indent="0" marL="0">
-              <a:buNone/>
-            </a:pPr>
-            <a:r>
-              <a:rPr lang="en-US" sz="1400" b="1" dirty="0">
-                <a:solidFill>
-                  <a:srgbClr val="1E293B"/>
-                </a:solidFill>
-                <a:latin typeface="Arial" pitchFamily="34" charset="0"/>
-                <a:ea typeface="Arial" pitchFamily="34" charset="-122"/>
-                <a:cs typeface="Arial" pitchFamily="34" charset="-120"/>
-              </a:rPr>
-              <a:t>Intelligent Classification</a:t>
-            </a:r>
-            <a:endParaRPr lang="en-US" sz="1400" dirty="0"/>
-          </a:p>
-        </p:txBody>
-      </p:sp>
-      <p:sp>
-        <p:nvSpPr>
-          <p:cNvPr id="7" name="Text 5"/>
-          <p:cNvSpPr/>
-          <p:nvPr/>
-        </p:nvSpPr>
-        <p:spPr>
-          <a:xfrm>
-            <a:off x="1097280" y="1783080"/>
-            <a:ext cx="3291840" cy="457200"/>
-          </a:xfrm>
-          <a:prstGeom prst="rect">
-            <a:avLst/>
-          </a:prstGeom>
-          <a:noFill/>
-          <a:ln/>
-        </p:spPr>
-        <p:txBody>
-          <a:bodyPr wrap="square" rtlCol="0" anchor="ctr"/>
-          <a:lstStyle/>
-          <a:p>
-            <a:pPr indent="0" marL="0">
-              <a:buNone/>
-            </a:pPr>
-            <a:r>
-              <a:rPr lang="en-US" sz="1100" dirty="0">
-                <a:solidFill>
-                  <a:srgbClr val="232F3E"/>
-                </a:solidFill>
-                <a:latin typeface="Arial" pitchFamily="34" charset="0"/>
-                <a:ea typeface="Arial" pitchFamily="34" charset="-122"/>
-                <a:cs typeface="Arial" pitchFamily="34" charset="-120"/>
-              </a:rPr>
-              <a:t>AI identifies document types &amp; relevant pages before expensive OCR</a:t>
-            </a:r>
-            <a:endParaRPr lang="en-US" sz="1100" dirty="0"/>
-          </a:p>
-        </p:txBody>
-      </p:sp>
-      <p:sp>
-        <p:nvSpPr>
-          <p:cNvPr id="8" name="Shape 6"/>
-          <p:cNvSpPr/>
-          <p:nvPr/>
-        </p:nvSpPr>
-        <p:spPr>
-          <a:xfrm>
-            <a:off x="4754880" y="1280160"/>
-            <a:ext cx="4206240" cy="1051560"/>
-          </a:xfrm>
-          <a:prstGeom prst="roundRect">
-            <a:avLst>
-              <a:gd name="adj" fmla="val 6957"/>
-            </a:avLst>
-          </a:prstGeom>
-          <a:solidFill>
-            <a:srgbClr val="FFFFFF"/>
-          </a:solidFill>
-          <a:ln w="12700">
-            <a:solidFill>
-              <a:srgbClr val="8B5CF6"/>
-            </a:solidFill>
-            <a:prstDash val="solid"/>
-          </a:ln>
-        </p:spPr>
-      </p:sp>
-      <p:sp>
-        <p:nvSpPr>
-          <p:cNvPr id="9" name="Text 7"/>
-          <p:cNvSpPr/>
-          <p:nvPr/>
-        </p:nvSpPr>
-        <p:spPr>
-          <a:xfrm>
-            <a:off x="4846320" y="1508760"/>
-            <a:ext cx="548640" cy="548640"/>
-          </a:xfrm>
-          <a:prstGeom prst="rect">
-            <a:avLst/>
-          </a:prstGeom>
-          <a:noFill/>
-          <a:ln/>
-        </p:spPr>
-        <p:txBody>
-          <a:bodyPr wrap="square" rtlCol="0" anchor="ctr"/>
-          <a:lstStyle/>
-          <a:p>
-            <a:pPr indent="0" marL="0">
-              <a:buNone/>
-            </a:pPr>
-            <a:r>
-              <a:rPr lang="en-US" sz="2400" dirty="0">
-                <a:solidFill>
-                  <a:srgbClr val="000000"/>
-                </a:solidFill>
-              </a:rPr>
-              <a:t>🎯</a:t>
-            </a:r>
-            <a:endParaRPr lang="en-US" sz="2400" dirty="0"/>
-          </a:p>
-        </p:txBody>
-      </p:sp>
-      <p:sp>
-        <p:nvSpPr>
-          <p:cNvPr id="10" name="Text 8"/>
-          <p:cNvSpPr/>
-          <p:nvPr/>
-        </p:nvSpPr>
-        <p:spPr>
-          <a:xfrm>
-            <a:off x="5486400" y="1417320"/>
-            <a:ext cx="3291840" cy="320040"/>
-          </a:xfrm>
-          <a:prstGeom prst="rect">
-            <a:avLst/>
-          </a:prstGeom>
-          <a:noFill/>
-          <a:ln/>
-        </p:spPr>
-        <p:txBody>
-          <a:bodyPr wrap="square" rtlCol="0" anchor="ctr"/>
-          <a:lstStyle/>
-          <a:p>
-            <a:pPr indent="0" marL="0">
-              <a:buNone/>
-            </a:pPr>
-            <a:r>
-              <a:rPr lang="en-US" sz="1400" b="1" dirty="0">
-                <a:solidFill>
-                  <a:srgbClr val="1E293B"/>
-                </a:solidFill>
-                <a:latin typeface="Arial" pitchFamily="34" charset="0"/>
-                <a:ea typeface="Arial" pitchFamily="34" charset="-122"/>
-                <a:cs typeface="Arial" pitchFamily="34" charset="-120"/>
-              </a:rPr>
-              <a:t>Targeted Extraction</a:t>
-            </a:r>
-            <a:endParaRPr lang="en-US" sz="1400" dirty="0"/>
-          </a:p>
-        </p:txBody>
-      </p:sp>
-      <p:sp>
-        <p:nvSpPr>
-          <p:cNvPr id="11" name="Text 9"/>
-          <p:cNvSpPr/>
-          <p:nvPr/>
-        </p:nvSpPr>
-        <p:spPr>
-          <a:xfrm>
-            <a:off x="5486400" y="1783080"/>
-            <a:ext cx="3291840" cy="457200"/>
-          </a:xfrm>
-          <a:prstGeom prst="rect">
-            <a:avLst/>
-          </a:prstGeom>
-          <a:noFill/>
-          <a:ln/>
-        </p:spPr>
-        <p:txBody>
-          <a:bodyPr wrap="square" rtlCol="0" anchor="ctr"/>
-          <a:lstStyle/>
-          <a:p>
-            <a:pPr indent="0" marL="0">
-              <a:buNone/>
-            </a:pPr>
-            <a:r>
-              <a:rPr lang="en-US" sz="1100" dirty="0">
-                <a:solidFill>
-                  <a:srgbClr val="232F3E"/>
-                </a:solidFill>
-                <a:latin typeface="Arial" pitchFamily="34" charset="0"/>
-                <a:ea typeface="Arial" pitchFamily="34" charset="-122"/>
-                <a:cs typeface="Arial" pitchFamily="34" charset="-120"/>
-              </a:rPr>
-              <a:t>Process only pages that matter - not the entire document</a:t>
-            </a:r>
-            <a:endParaRPr lang="en-US" sz="1100" dirty="0"/>
-          </a:p>
-        </p:txBody>
-      </p:sp>
-      <p:sp>
-        <p:nvSpPr>
-          <p:cNvPr id="12" name="Shape 10"/>
-          <p:cNvSpPr/>
-          <p:nvPr/>
-        </p:nvSpPr>
-        <p:spPr>
-          <a:xfrm>
-            <a:off x="365760" y="2468880"/>
-            <a:ext cx="4206240" cy="1051560"/>
-          </a:xfrm>
-          <a:prstGeom prst="roundRect">
-            <a:avLst>
-              <a:gd name="adj" fmla="val 6957"/>
-            </a:avLst>
-          </a:prstGeom>
-          <a:solidFill>
-            <a:srgbClr val="FFFFFF"/>
-          </a:solidFill>
-          <a:ln w="12700">
-            <a:solidFill>
-              <a:srgbClr val="8B5CF6"/>
-            </a:solidFill>
-            <a:prstDash val="solid"/>
-          </a:ln>
-        </p:spPr>
-      </p:sp>
-      <p:sp>
-        <p:nvSpPr>
-          <p:cNvPr id="13" name="Text 11"/>
-          <p:cNvSpPr/>
-          <p:nvPr/>
-        </p:nvSpPr>
-        <p:spPr>
-          <a:xfrm>
-            <a:off x="457200" y="2697480"/>
-            <a:ext cx="548640" cy="548640"/>
-          </a:xfrm>
-          <a:prstGeom prst="rect">
-            <a:avLst/>
-          </a:prstGeom>
-          <a:noFill/>
-          <a:ln/>
-        </p:spPr>
-        <p:txBody>
-          <a:bodyPr wrap="square" rtlCol="0" anchor="ctr"/>
-          <a:lstStyle/>
-          <a:p>
-            <a:pPr indent="0" marL="0">
-              <a:buNone/>
-            </a:pPr>
-            <a:r>
-              <a:rPr lang="en-US" sz="2400" dirty="0">
-                <a:solidFill>
-                  <a:srgbClr val="000000"/>
-                </a:solidFill>
-              </a:rPr>
-              <a:t>🔒</a:t>
-            </a:r>
-            <a:endParaRPr lang="en-US" sz="2400" dirty="0"/>
-          </a:p>
-        </p:txBody>
-      </p:sp>
-      <p:sp>
-        <p:nvSpPr>
-          <p:cNvPr id="14" name="Text 12"/>
-          <p:cNvSpPr/>
-          <p:nvPr/>
-        </p:nvSpPr>
-        <p:spPr>
-          <a:xfrm>
-            <a:off x="1097280" y="2606040"/>
-            <a:ext cx="3291840" cy="320040"/>
-          </a:xfrm>
-          <a:prstGeom prst="rect">
-            <a:avLst/>
-          </a:prstGeom>
-          <a:noFill/>
-          <a:ln/>
-        </p:spPr>
-        <p:txBody>
-          <a:bodyPr wrap="square" rtlCol="0" anchor="ctr"/>
-          <a:lstStyle/>
-          <a:p>
-            <a:pPr indent="0" marL="0">
-              <a:buNone/>
-            </a:pPr>
-            <a:r>
-              <a:rPr lang="en-US" sz="1400" b="1" dirty="0">
-                <a:solidFill>
-                  <a:srgbClr val="1E293B"/>
-                </a:solidFill>
-                <a:latin typeface="Arial" pitchFamily="34" charset="0"/>
-                <a:ea typeface="Arial" pitchFamily="34" charset="-122"/>
-                <a:cs typeface="Arial" pitchFamily="34" charset="-120"/>
-              </a:rPr>
-              <a:t>Content Deduplication</a:t>
-            </a:r>
-            <a:endParaRPr lang="en-US" sz="1400" dirty="0"/>
-          </a:p>
-        </p:txBody>
-      </p:sp>
-      <p:sp>
-        <p:nvSpPr>
-          <p:cNvPr id="15" name="Text 13"/>
-          <p:cNvSpPr/>
-          <p:nvPr/>
-        </p:nvSpPr>
-        <p:spPr>
-          <a:xfrm>
-            <a:off x="1097280" y="2971800"/>
-            <a:ext cx="3291840" cy="457200"/>
-          </a:xfrm>
-          <a:prstGeom prst="rect">
-            <a:avLst/>
-          </a:prstGeom>
-          <a:noFill/>
-          <a:ln/>
-        </p:spPr>
-        <p:txBody>
-          <a:bodyPr wrap="square" rtlCol="0" anchor="ctr"/>
-          <a:lstStyle/>
-          <a:p>
-            <a:pPr indent="0" marL="0">
-              <a:buNone/>
-            </a:pPr>
-            <a:r>
-              <a:rPr lang="en-US" sz="1100" dirty="0">
-                <a:solidFill>
-                  <a:srgbClr val="232F3E"/>
-                </a:solidFill>
-                <a:latin typeface="Arial" pitchFamily="34" charset="0"/>
-                <a:ea typeface="Arial" pitchFamily="34" charset="-122"/>
-                <a:cs typeface="Arial" pitchFamily="34" charset="-120"/>
-              </a:rPr>
-              <a:t>SHA-256 hashing prevents reprocessing identical documents</a:t>
-            </a:r>
-            <a:endParaRPr lang="en-US" sz="1100" dirty="0"/>
-          </a:p>
-        </p:txBody>
-      </p:sp>
-      <p:sp>
-        <p:nvSpPr>
-          <p:cNvPr id="16" name="Shape 14"/>
-          <p:cNvSpPr/>
-          <p:nvPr/>
-        </p:nvSpPr>
-        <p:spPr>
-          <a:xfrm>
-            <a:off x="4754880" y="2468880"/>
-            <a:ext cx="4206240" cy="1051560"/>
-          </a:xfrm>
-          <a:prstGeom prst="roundRect">
-            <a:avLst>
-              <a:gd name="adj" fmla="val 6957"/>
-            </a:avLst>
-          </a:prstGeom>
-          <a:solidFill>
-            <a:srgbClr val="FFFFFF"/>
-          </a:solidFill>
-          <a:ln w="12700">
-            <a:solidFill>
-              <a:srgbClr val="8B5CF6"/>
-            </a:solidFill>
-            <a:prstDash val="solid"/>
-          </a:ln>
-        </p:spPr>
-      </p:sp>
-      <p:sp>
-        <p:nvSpPr>
-          <p:cNvPr id="17" name="Text 15"/>
-          <p:cNvSpPr/>
-          <p:nvPr/>
-        </p:nvSpPr>
-        <p:spPr>
-          <a:xfrm>
-            <a:off x="4846320" y="2697480"/>
-            <a:ext cx="548640" cy="548640"/>
-          </a:xfrm>
-          <a:prstGeom prst="rect">
-            <a:avLst/>
-          </a:prstGeom>
-          <a:noFill/>
-          <a:ln/>
-        </p:spPr>
-        <p:txBody>
-          <a:bodyPr wrap="square" rtlCol="0" anchor="ctr"/>
-          <a:lstStyle/>
-          <a:p>
-            <a:pPr indent="0" marL="0">
-              <a:buNone/>
-            </a:pPr>
-            <a:r>
-              <a:rPr lang="en-US" sz="2400" dirty="0">
-                <a:solidFill>
-                  <a:srgbClr val="000000"/>
-                </a:solidFill>
-              </a:rPr>
-              <a:t>📊</a:t>
-            </a:r>
-            <a:endParaRPr lang="en-US" sz="2400" dirty="0"/>
-          </a:p>
-        </p:txBody>
-      </p:sp>
-      <p:sp>
-        <p:nvSpPr>
-          <p:cNvPr id="18" name="Text 16"/>
-          <p:cNvSpPr/>
-          <p:nvPr/>
-        </p:nvSpPr>
-        <p:spPr>
-          <a:xfrm>
-            <a:off x="5486400" y="2606040"/>
-            <a:ext cx="3291840" cy="320040"/>
-          </a:xfrm>
-          <a:prstGeom prst="rect">
-            <a:avLst/>
-          </a:prstGeom>
-          <a:noFill/>
-          <a:ln/>
-        </p:spPr>
-        <p:txBody>
-          <a:bodyPr wrap="square" rtlCol="0" anchor="ctr"/>
-          <a:lstStyle/>
-          <a:p>
-            <a:pPr indent="0" marL="0">
-              <a:buNone/>
-            </a:pPr>
-            <a:r>
-              <a:rPr lang="en-US" sz="1400" b="1" dirty="0">
-                <a:solidFill>
-                  <a:srgbClr val="1E293B"/>
-                </a:solidFill>
-                <a:latin typeface="Arial" pitchFamily="34" charset="0"/>
-                <a:ea typeface="Arial" pitchFamily="34" charset="-122"/>
-                <a:cs typeface="Arial" pitchFamily="34" charset="-120"/>
-              </a:rPr>
-              <a:t>Complete Audit Trail</a:t>
-            </a:r>
-            <a:endParaRPr lang="en-US" sz="1400" dirty="0"/>
-          </a:p>
-        </p:txBody>
-      </p:sp>
-      <p:sp>
-        <p:nvSpPr>
-          <p:cNvPr id="19" name="Text 17"/>
-          <p:cNvSpPr/>
-          <p:nvPr/>
-        </p:nvSpPr>
-        <p:spPr>
-          <a:xfrm>
-            <a:off x="5486400" y="2971800"/>
-            <a:ext cx="3291840" cy="457200"/>
-          </a:xfrm>
-          <a:prstGeom prst="rect">
-            <a:avLst/>
-          </a:prstGeom>
-          <a:noFill/>
-          <a:ln/>
-        </p:spPr>
-        <p:txBody>
-          <a:bodyPr wrap="square" rtlCol="0" anchor="ctr"/>
-          <a:lstStyle/>
-          <a:p>
-            <a:pPr indent="0" marL="0">
-              <a:buNone/>
-            </a:pPr>
-            <a:r>
-              <a:rPr lang="en-US" sz="1100" dirty="0">
-                <a:solidFill>
-                  <a:srgbClr val="232F3E"/>
-                </a:solidFill>
-                <a:latin typeface="Arial" pitchFamily="34" charset="0"/>
-                <a:ea typeface="Arial" pitchFamily="34" charset="-122"/>
-                <a:cs typeface="Arial" pitchFamily="34" charset="-120"/>
-              </a:rPr>
-              <a:t>Track exactly which page each data point originated from</a:t>
-            </a:r>
-            <a:endParaRPr lang="en-US" sz="1100" dirty="0"/>
-          </a:p>
-        </p:txBody>
-      </p:sp>
-      <p:sp>
-        <p:nvSpPr>
-          <p:cNvPr id="20" name="Shape 18"/>
-          <p:cNvSpPr/>
-          <p:nvPr/>
-        </p:nvSpPr>
-        <p:spPr>
-          <a:xfrm>
-            <a:off x="365760" y="3657600"/>
-            <a:ext cx="4206240" cy="1051560"/>
-          </a:xfrm>
-          <a:prstGeom prst="roundRect">
-            <a:avLst>
-              <a:gd name="adj" fmla="val 6957"/>
-            </a:avLst>
-          </a:prstGeom>
-          <a:solidFill>
-            <a:srgbClr val="FFFFFF"/>
-          </a:solidFill>
-          <a:ln w="12700">
-            <a:solidFill>
-              <a:srgbClr val="8B5CF6"/>
-            </a:solidFill>
-            <a:prstDash val="solid"/>
-          </a:ln>
-        </p:spPr>
-      </p:sp>
-      <p:sp>
-        <p:nvSpPr>
-          <p:cNvPr id="21" name="Text 19"/>
-          <p:cNvSpPr/>
-          <p:nvPr/>
-        </p:nvSpPr>
-        <p:spPr>
-          <a:xfrm>
-            <a:off x="457200" y="3886200"/>
-            <a:ext cx="548640" cy="548640"/>
-          </a:xfrm>
-          <a:prstGeom prst="rect">
-            <a:avLst/>
-          </a:prstGeom>
-          <a:noFill/>
-          <a:ln/>
-        </p:spPr>
-        <p:txBody>
-          <a:bodyPr wrap="square" rtlCol="0" anchor="ctr"/>
-          <a:lstStyle/>
-          <a:p>
-            <a:pPr indent="0" marL="0">
-              <a:buNone/>
-            </a:pPr>
-            <a:r>
-              <a:rPr lang="en-US" sz="2400" dirty="0">
-                <a:solidFill>
-                  <a:srgbClr val="000000"/>
-                </a:solidFill>
-              </a:rPr>
-              <a:t>✅</a:t>
-            </a:r>
-            <a:endParaRPr lang="en-US" sz="2400" dirty="0"/>
-          </a:p>
-        </p:txBody>
-      </p:sp>
-      <p:sp>
-        <p:nvSpPr>
-          <p:cNvPr id="22" name="Text 20"/>
-          <p:cNvSpPr/>
-          <p:nvPr/>
-        </p:nvSpPr>
-        <p:spPr>
-          <a:xfrm>
-            <a:off x="1097280" y="3794760"/>
-            <a:ext cx="3291840" cy="320040"/>
-          </a:xfrm>
-          <a:prstGeom prst="rect">
-            <a:avLst/>
-          </a:prstGeom>
-          <a:noFill/>
-          <a:ln/>
-        </p:spPr>
-        <p:txBody>
-          <a:bodyPr wrap="square" rtlCol="0" anchor="ctr"/>
-          <a:lstStyle/>
-          <a:p>
-            <a:pPr indent="0" marL="0">
-              <a:buNone/>
-            </a:pPr>
-            <a:r>
-              <a:rPr lang="en-US" sz="1400" b="1" dirty="0">
-                <a:solidFill>
-                  <a:srgbClr val="1E293B"/>
-                </a:solidFill>
-                <a:latin typeface="Arial" pitchFamily="34" charset="0"/>
-                <a:ea typeface="Arial" pitchFamily="34" charset="-122"/>
-                <a:cs typeface="Arial" pitchFamily="34" charset="-120"/>
-              </a:rPr>
-              <a:t>Review Workflow</a:t>
-            </a:r>
-            <a:endParaRPr lang="en-US" sz="1400" dirty="0"/>
-          </a:p>
-        </p:txBody>
-      </p:sp>
-      <p:sp>
-        <p:nvSpPr>
-          <p:cNvPr id="23" name="Text 21"/>
-          <p:cNvSpPr/>
-          <p:nvPr/>
-        </p:nvSpPr>
-        <p:spPr>
-          <a:xfrm>
-            <a:off x="1097280" y="4160520"/>
-            <a:ext cx="3291840" cy="457200"/>
-          </a:xfrm>
-          <a:prstGeom prst="rect">
-            <a:avLst/>
-          </a:prstGeom>
-          <a:noFill/>
-          <a:ln/>
-        </p:spPr>
-        <p:txBody>
-          <a:bodyPr wrap="square" rtlCol="0" anchor="ctr"/>
-          <a:lstStyle/>
-          <a:p>
-            <a:pPr indent="0" marL="0">
-              <a:buNone/>
-            </a:pPr>
-            <a:r>
-              <a:rPr lang="en-US" sz="1100" dirty="0">
-                <a:solidFill>
-                  <a:srgbClr val="232F3E"/>
-                </a:solidFill>
-                <a:latin typeface="Arial" pitchFamily="34" charset="0"/>
-                <a:ea typeface="Arial" pitchFamily="34" charset="-122"/>
-                <a:cs typeface="Arial" pitchFamily="34" charset="-120"/>
-              </a:rPr>
-              <a:t>Human-in-the-loop: Approve, Reject, or Correct extracted data</a:t>
-            </a:r>
-            <a:endParaRPr lang="en-US" sz="1100" dirty="0"/>
-          </a:p>
-        </p:txBody>
-      </p:sp>
-      <p:sp>
-        <p:nvSpPr>
-          <p:cNvPr id="24" name="Shape 22"/>
-          <p:cNvSpPr/>
-          <p:nvPr/>
-        </p:nvSpPr>
-        <p:spPr>
-          <a:xfrm>
-            <a:off x="4754880" y="3657600"/>
-            <a:ext cx="4206240" cy="1051560"/>
-          </a:xfrm>
-          <a:prstGeom prst="roundRect">
-            <a:avLst>
-              <a:gd name="adj" fmla="val 6957"/>
-            </a:avLst>
-          </a:prstGeom>
-          <a:solidFill>
-            <a:srgbClr val="FFFFFF"/>
-          </a:solidFill>
-          <a:ln w="12700">
-            <a:solidFill>
-              <a:srgbClr val="8B5CF6"/>
-            </a:solidFill>
-            <a:prstDash val="solid"/>
-          </a:ln>
-        </p:spPr>
-      </p:sp>
-      <p:sp>
-        <p:nvSpPr>
-          <p:cNvPr id="25" name="Text 23"/>
-          <p:cNvSpPr/>
-          <p:nvPr/>
-        </p:nvSpPr>
-        <p:spPr>
-          <a:xfrm>
-            <a:off x="4846320" y="3886200"/>
-            <a:ext cx="548640" cy="548640"/>
-          </a:xfrm>
-          <a:prstGeom prst="rect">
-            <a:avLst/>
-          </a:prstGeom>
-          <a:noFill/>
-          <a:ln/>
-        </p:spPr>
-        <p:txBody>
-          <a:bodyPr wrap="square" rtlCol="0" anchor="ctr"/>
-          <a:lstStyle/>
-          <a:p>
-            <a:pPr indent="0" marL="0">
-              <a:buNone/>
-            </a:pPr>
-            <a:r>
-              <a:rPr lang="en-US" sz="2400" dirty="0">
-                <a:solidFill>
-                  <a:srgbClr val="000000"/>
-                </a:solidFill>
-              </a:rPr>
-              <a:t>☁️</a:t>
-            </a:r>
-            <a:endParaRPr lang="en-US" sz="2400" dirty="0"/>
-          </a:p>
-        </p:txBody>
-      </p:sp>
-      <p:sp>
-        <p:nvSpPr>
-          <p:cNvPr id="26" name="Text 24"/>
-          <p:cNvSpPr/>
-          <p:nvPr/>
-        </p:nvSpPr>
-        <p:spPr>
-          <a:xfrm>
-            <a:off x="5486400" y="3794760"/>
-            <a:ext cx="3291840" cy="320040"/>
-          </a:xfrm>
-          <a:prstGeom prst="rect">
-            <a:avLst/>
-          </a:prstGeom>
-          <a:noFill/>
-          <a:ln/>
-        </p:spPr>
-        <p:txBody>
-          <a:bodyPr wrap="square" rtlCol="0" anchor="ctr"/>
-          <a:lstStyle/>
-          <a:p>
-            <a:pPr indent="0" marL="0">
-              <a:buNone/>
-            </a:pPr>
-            <a:r>
-              <a:rPr lang="en-US" sz="1400" b="1" dirty="0">
-                <a:solidFill>
-                  <a:srgbClr val="1E293B"/>
-                </a:solidFill>
-                <a:latin typeface="Arial" pitchFamily="34" charset="0"/>
-                <a:ea typeface="Arial" pitchFamily="34" charset="-122"/>
-                <a:cs typeface="Arial" pitchFamily="34" charset="-120"/>
-              </a:rPr>
-              <a:t>Serverless &amp; Scalable</a:t>
-            </a:r>
-            <a:endParaRPr lang="en-US" sz="1400" dirty="0"/>
-          </a:p>
-        </p:txBody>
-      </p:sp>
-      <p:sp>
-        <p:nvSpPr>
-          <p:cNvPr id="27" name="Text 25"/>
-          <p:cNvSpPr/>
-          <p:nvPr/>
-        </p:nvSpPr>
-        <p:spPr>
-          <a:xfrm>
-            <a:off x="5486400" y="4160520"/>
-            <a:ext cx="3291840" cy="457200"/>
-          </a:xfrm>
-          <a:prstGeom prst="rect">
-            <a:avLst/>
-          </a:prstGeom>
-          <a:noFill/>
-          <a:ln/>
-        </p:spPr>
-        <p:txBody>
-          <a:bodyPr wrap="square" rtlCol="0" anchor="ctr"/>
-          <a:lstStyle/>
-          <a:p>
-            <a:pPr indent="0" marL="0">
-              <a:buNone/>
-            </a:pPr>
-            <a:r>
-              <a:rPr lang="en-US" sz="1100" dirty="0">
-                <a:solidFill>
-                  <a:srgbClr val="232F3E"/>
-                </a:solidFill>
-                <a:latin typeface="Arial" pitchFamily="34" charset="0"/>
-                <a:ea typeface="Arial" pitchFamily="34" charset="-122"/>
-                <a:cs typeface="Arial" pitchFamily="34" charset="-120"/>
-              </a:rPr>
-              <a:t>Zero infrastructure management, auto-scales to any volume</a:t>
-            </a:r>
-            <a:endParaRPr lang="en-US" sz="1100" dirty="0"/>
-          </a:p>
-        </p:txBody>
-      </p:sp>
-    </p:spTree>
-  </p:cSld>
-  <p:clrMapOvr>
-    <a:masterClrMapping/>
-  </p:clrMapOvr>
-</p:sld>
-</file>
-
 <file path=ppt/slides/slide8.xml><?xml version="1.0" encoding="utf-8"?>
 <p:sld xmlns:a="http://schemas.openxmlformats.org/drawingml/2006/main" xmlns:r="http://schemas.openxmlformats.org/officeDocument/2006/relationships" xmlns:p="http://schemas.openxmlformats.org/presentationml/2006/main">
   <p:cSld name="Slide 8">
@@ -8554,7 +9026,7 @@
             <a:avLst/>
           </a:prstGeom>
           <a:solidFill>
-            <a:srgbClr val="14B8A6"/>
+            <a:srgbClr val="8B5CF6"/>
           </a:solidFill>
           <a:ln/>
         </p:spPr>
@@ -8592,7 +9064,7 @@
                 <a:ea typeface="Arial" pitchFamily="34" charset="-122"/>
                 <a:cs typeface="Arial" pitchFamily="34" charset="-120"/>
               </a:rPr>
-              <a:t>Supported Document Types</a:t>
+              <a:t>Key Differentiators</a:t>
             </a:r>
             <a:endParaRPr lang="en-US" sz="3200" dirty="0"/>
           </a:p>
@@ -8607,160 +9079,15 @@
         <p:spPr>
           <a:xfrm>
             <a:off x="365760" y="1280160"/>
-            <a:ext cx="4206240" cy="3474720"/>
+            <a:ext cx="4206240" cy="1051560"/>
           </a:xfrm>
           <a:prstGeom prst="roundRect">
             <a:avLst>
-              <a:gd name="adj" fmla="val 2632"/>
+              <a:gd name="adj" fmla="val 6957"/>
             </a:avLst>
           </a:prstGeom>
           <a:solidFill>
-            <a:srgbClr val="F0FDFA"/>
-          </a:solidFill>
-          <a:ln w="12700">
-            <a:solidFill>
-              <a:srgbClr val="14B8A6"/>
-            </a:solidFill>
-            <a:prstDash val="solid"/>
-          </a:ln>
-        </p:spPr>
-      </p:sp>
-      <p:sp>
-        <p:nvSpPr>
-          <p:cNvPr id="5" name="Text 3"/>
-          <p:cNvSpPr/>
-          <p:nvPr/>
-        </p:nvSpPr>
-        <p:spPr>
-          <a:xfrm>
-            <a:off x="457200" y="1417320"/>
-            <a:ext cx="4023360" cy="365760"/>
-          </a:xfrm>
-          <a:prstGeom prst="rect">
-            <a:avLst/>
-          </a:prstGeom>
-          <a:noFill/>
-          <a:ln/>
-        </p:spPr>
-        <p:txBody>
-          <a:bodyPr wrap="square" rtlCol="0" anchor="ctr"/>
-          <a:lstStyle/>
-          <a:p>
-            <a:pPr indent="0" marL="0">
-              <a:buNone/>
-            </a:pPr>
-            <a:r>
-              <a:rPr lang="en-US" sz="1800" b="1" dirty="0">
-                <a:solidFill>
-                  <a:srgbClr val="14B8A6"/>
-                </a:solidFill>
-                <a:latin typeface="Arial" pitchFamily="34" charset="0"/>
-                <a:ea typeface="Arial" pitchFamily="34" charset="-122"/>
-                <a:cs typeface="Arial" pitchFamily="34" charset="-120"/>
-              </a:rPr>
-              <a:t>📄 Loan Packages</a:t>
-            </a:r>
-            <a:endParaRPr lang="en-US" sz="1800" dirty="0"/>
-          </a:p>
-        </p:txBody>
-      </p:sp>
-      <p:sp>
-        <p:nvSpPr>
-          <p:cNvPr id="6" name="Text 4"/>
-          <p:cNvSpPr/>
-          <p:nvPr/>
-        </p:nvSpPr>
-        <p:spPr>
-          <a:xfrm>
-            <a:off x="548640" y="1920240"/>
-            <a:ext cx="3840480" cy="2560320"/>
-          </a:xfrm>
-          <a:prstGeom prst="rect">
-            <a:avLst/>
-          </a:prstGeom>
-          <a:noFill/>
-          <a:ln/>
-        </p:spPr>
-        <p:txBody>
-          <a:bodyPr wrap="square" rtlCol="0" anchor="ctr"/>
-          <a:lstStyle/>
-          <a:p>
-            <a:pPr>
-              <a:spcBef>
-                <a:spcPts val="800"/>
-              </a:spcBef>
-            </a:pPr>
-            <a:r>
-              <a:rPr lang="en-US" sz="1200" dirty="0">
-                <a:solidFill>
-                  <a:srgbClr val="1E293B"/>
-                </a:solidFill>
-                <a:latin typeface="Arial" pitchFamily="34" charset="0"/>
-                <a:ea typeface="Arial" pitchFamily="34" charset="-122"/>
-                <a:cs typeface="Arial" pitchFamily="34" charset="-120"/>
-              </a:rPr>
-              <a:t>Promissory Note - Interest rate, principal, borrower names, maturity date</a:t>
-            </a:r>
-            <a:endParaRPr lang="en-US" sz="1200" dirty="0"/>
-          </a:p>
-          <a:p>
-            <a:pPr>
-              <a:spcBef>
-                <a:spcPts val="800"/>
-              </a:spcBef>
-            </a:pPr>
-            <a:r>
-              <a:rPr lang="en-US" sz="1200" dirty="0">
-                <a:solidFill>
-                  <a:srgbClr val="1E293B"/>
-                </a:solidFill>
-                <a:latin typeface="Arial" pitchFamily="34" charset="0"/>
-                <a:ea typeface="Arial" pitchFamily="34" charset="-122"/>
-                <a:cs typeface="Arial" pitchFamily="34" charset="-120"/>
-              </a:rPr>
-              <a:t>Closing Disclosure - Loan amount, fees, cash to close</a:t>
-            </a:r>
-            <a:endParaRPr lang="en-US" sz="1200" dirty="0"/>
-          </a:p>
-          <a:p>
-            <a:pPr>
-              <a:spcBef>
-                <a:spcPts val="800"/>
-              </a:spcBef>
-            </a:pPr>
-            <a:r>
-              <a:rPr lang="en-US" sz="1200" dirty="0">
-                <a:solidFill>
-                  <a:srgbClr val="1E293B"/>
-                </a:solidFill>
-                <a:latin typeface="Arial" pitchFamily="34" charset="0"/>
-                <a:ea typeface="Arial" pitchFamily="34" charset="-122"/>
-                <a:cs typeface="Arial" pitchFamily="34" charset="-120"/>
-              </a:rPr>
-              <a:t>Form 1003 - Borrower info, property address, employment</a:t>
-            </a:r>
-            <a:endParaRPr lang="en-US" sz="1200" dirty="0"/>
-          </a:p>
-        </p:txBody>
-      </p:sp>
-      <p:sp>
-        <p:nvSpPr>
-          <p:cNvPr id="7" name="Shape 5"/>
-          <p:cNvSpPr/>
-          <p:nvPr/>
-        </p:nvSpPr>
-        <p:spPr>
-          <a:xfrm>
-            <a:off x="4572000" y="1280160"/>
-            <a:ext cx="4206240" cy="3474720"/>
-          </a:xfrm>
-          <a:prstGeom prst="roundRect">
-            <a:avLst>
-              <a:gd name="adj" fmla="val 2632"/>
-            </a:avLst>
-          </a:prstGeom>
-          <a:solidFill>
-            <a:srgbClr val="FAF5FF"/>
+            <a:srgbClr val="FFFFFF"/>
           </a:solidFill>
           <a:ln w="12700">
             <a:solidFill>
@@ -8772,14 +9099,14 @@
       </p:sp>
       <p:sp>
         <p:nvSpPr>
-          <p:cNvPr id="8" name="Text 6"/>
-          <p:cNvSpPr/>
-          <p:nvPr/>
-        </p:nvSpPr>
-        <p:spPr>
-          <a:xfrm>
-            <a:off x="4663440" y="1417320"/>
-            <a:ext cx="4023360" cy="365760"/>
+          <p:cNvPr id="5" name="Text 3"/>
+          <p:cNvSpPr/>
+          <p:nvPr/>
+        </p:nvSpPr>
+        <p:spPr>
+          <a:xfrm>
+            <a:off x="457200" y="1508760"/>
+            <a:ext cx="548640" cy="548640"/>
           </a:xfrm>
           <a:prstGeom prst="rect">
             <a:avLst/>
@@ -8795,19 +9122,121 @@
               <a:buNone/>
             </a:pPr>
             <a:r>
-              <a:rPr lang="en-US" sz="1800" b="1" dirty="0">
-                <a:solidFill>
-                  <a:srgbClr val="8B5CF6"/>
-                </a:solidFill>
-                <a:latin typeface="Arial" pitchFamily="34" charset="0"/>
-                <a:ea typeface="Arial" pitchFamily="34" charset="-122"/>
-                <a:cs typeface="Arial" pitchFamily="34" charset="-120"/>
-              </a:rPr>
-              <a:t>📋 Credit Agreements</a:t>
-            </a:r>
-            <a:endParaRPr lang="en-US" sz="1800" dirty="0"/>
-          </a:p>
-        </p:txBody>
+              <a:rPr lang="en-US" sz="2400" dirty="0">
+                <a:solidFill>
+                  <a:srgbClr val="000000"/>
+                </a:solidFill>
+              </a:rPr>
+              <a:t>🧠</a:t>
+            </a:r>
+            <a:endParaRPr lang="en-US" sz="2400" dirty="0"/>
+          </a:p>
+        </p:txBody>
+      </p:sp>
+      <p:sp>
+        <p:nvSpPr>
+          <p:cNvPr id="6" name="Text 4"/>
+          <p:cNvSpPr/>
+          <p:nvPr/>
+        </p:nvSpPr>
+        <p:spPr>
+          <a:xfrm>
+            <a:off x="1097280" y="1417320"/>
+            <a:ext cx="3291840" cy="320040"/>
+          </a:xfrm>
+          <a:prstGeom prst="rect">
+            <a:avLst/>
+          </a:prstGeom>
+          <a:noFill/>
+          <a:ln/>
+        </p:spPr>
+        <p:txBody>
+          <a:bodyPr wrap="square" rtlCol="0" anchor="ctr"/>
+          <a:lstStyle/>
+          <a:p>
+            <a:pPr indent="0" marL="0">
+              <a:buNone/>
+            </a:pPr>
+            <a:r>
+              <a:rPr lang="en-US" sz="1400" b="1" dirty="0">
+                <a:solidFill>
+                  <a:srgbClr val="1E293B"/>
+                </a:solidFill>
+                <a:latin typeface="Arial" pitchFamily="34" charset="0"/>
+                <a:ea typeface="Arial" pitchFamily="34" charset="-122"/>
+                <a:cs typeface="Arial" pitchFamily="34" charset="-120"/>
+              </a:rPr>
+              <a:t>Intelligent Classification</a:t>
+            </a:r>
+            <a:endParaRPr lang="en-US" sz="1400" dirty="0"/>
+          </a:p>
+        </p:txBody>
+      </p:sp>
+      <p:sp>
+        <p:nvSpPr>
+          <p:cNvPr id="7" name="Text 5"/>
+          <p:cNvSpPr/>
+          <p:nvPr/>
+        </p:nvSpPr>
+        <p:spPr>
+          <a:xfrm>
+            <a:off x="1097280" y="1783080"/>
+            <a:ext cx="3291840" cy="457200"/>
+          </a:xfrm>
+          <a:prstGeom prst="rect">
+            <a:avLst/>
+          </a:prstGeom>
+          <a:noFill/>
+          <a:ln/>
+        </p:spPr>
+        <p:txBody>
+          <a:bodyPr wrap="square" rtlCol="0" anchor="ctr"/>
+          <a:lstStyle/>
+          <a:p>
+            <a:pPr indent="0" marL="0">
+              <a:buNone/>
+            </a:pPr>
+            <a:r>
+              <a:rPr lang="en-US" sz="1100" dirty="0">
+                <a:solidFill>
+                  <a:srgbClr val="232F3E"/>
+                </a:solidFill>
+                <a:latin typeface="Arial" pitchFamily="34" charset="0"/>
+                <a:ea typeface="Arial" pitchFamily="34" charset="-122"/>
+                <a:cs typeface="Arial" pitchFamily="34" charset="-120"/>
+              </a:rPr>
+              <a:t>AI identifies document types &amp; relevant pages before expensive OCR</a:t>
+            </a:r>
+            <a:endParaRPr lang="en-US" sz="1100" dirty="0"/>
+          </a:p>
+        </p:txBody>
+      </p:sp>
+      <p:sp>
+        <p:nvSpPr>
+          <p:cNvPr id="8" name="Shape 6"/>
+          <p:cNvSpPr/>
+          <p:nvPr/>
+        </p:nvSpPr>
+        <p:spPr>
+          <a:xfrm>
+            <a:off x="4754880" y="1280160"/>
+            <a:ext cx="4206240" cy="1051560"/>
+          </a:xfrm>
+          <a:prstGeom prst="roundRect">
+            <a:avLst>
+              <a:gd name="adj" fmla="val 6957"/>
+            </a:avLst>
+          </a:prstGeom>
+          <a:solidFill>
+            <a:srgbClr val="FFFFFF"/>
+          </a:solidFill>
+          <a:ln w="12700">
+            <a:solidFill>
+              <a:srgbClr val="8B5CF6"/>
+            </a:solidFill>
+            <a:prstDash val="solid"/>
+          </a:ln>
+        </p:spPr>
       </p:sp>
       <p:sp>
         <p:nvSpPr>
@@ -8817,8 +9246,8 @@
         </p:nvSpPr>
         <p:spPr>
           <a:xfrm>
-            <a:off x="4754880" y="1920240"/>
-            <a:ext cx="3840480" cy="2560320"/>
+            <a:off x="4846320" y="1508760"/>
+            <a:ext cx="548640" cy="548640"/>
           </a:xfrm>
           <a:prstGeom prst="rect">
             <a:avLst/>
@@ -8830,116 +9259,658 @@
           <a:bodyPr wrap="square" rtlCol="0" anchor="ctr"/>
           <a:lstStyle/>
           <a:p>
-            <a:pPr>
-              <a:spcBef>
-                <a:spcPts val="600"/>
-              </a:spcBef>
+            <a:pPr indent="0" marL="0">
+              <a:buNone/>
+            </a:pPr>
+            <a:r>
+              <a:rPr lang="en-US" sz="2400" dirty="0">
+                <a:solidFill>
+                  <a:srgbClr val="000000"/>
+                </a:solidFill>
+              </a:rPr>
+              <a:t>🎯</a:t>
+            </a:r>
+            <a:endParaRPr lang="en-US" sz="2400" dirty="0"/>
+          </a:p>
+        </p:txBody>
+      </p:sp>
+      <p:sp>
+        <p:nvSpPr>
+          <p:cNvPr id="10" name="Text 8"/>
+          <p:cNvSpPr/>
+          <p:nvPr/>
+        </p:nvSpPr>
+        <p:spPr>
+          <a:xfrm>
+            <a:off x="5486400" y="1417320"/>
+            <a:ext cx="3291840" cy="320040"/>
+          </a:xfrm>
+          <a:prstGeom prst="rect">
+            <a:avLst/>
+          </a:prstGeom>
+          <a:noFill/>
+          <a:ln/>
+        </p:spPr>
+        <p:txBody>
+          <a:bodyPr wrap="square" rtlCol="0" anchor="ctr"/>
+          <a:lstStyle/>
+          <a:p>
+            <a:pPr indent="0" marL="0">
+              <a:buNone/>
+            </a:pPr>
+            <a:r>
+              <a:rPr lang="en-US" sz="1400" b="1" dirty="0">
+                <a:solidFill>
+                  <a:srgbClr val="1E293B"/>
+                </a:solidFill>
+                <a:latin typeface="Arial" pitchFamily="34" charset="0"/>
+                <a:ea typeface="Arial" pitchFamily="34" charset="-122"/>
+                <a:cs typeface="Arial" pitchFamily="34" charset="-120"/>
+              </a:rPr>
+              <a:t>Targeted Extraction</a:t>
+            </a:r>
+            <a:endParaRPr lang="en-US" sz="1400" dirty="0"/>
+          </a:p>
+        </p:txBody>
+      </p:sp>
+      <p:sp>
+        <p:nvSpPr>
+          <p:cNvPr id="11" name="Text 9"/>
+          <p:cNvSpPr/>
+          <p:nvPr/>
+        </p:nvSpPr>
+        <p:spPr>
+          <a:xfrm>
+            <a:off x="5486400" y="1783080"/>
+            <a:ext cx="3291840" cy="457200"/>
+          </a:xfrm>
+          <a:prstGeom prst="rect">
+            <a:avLst/>
+          </a:prstGeom>
+          <a:noFill/>
+          <a:ln/>
+        </p:spPr>
+        <p:txBody>
+          <a:bodyPr wrap="square" rtlCol="0" anchor="ctr"/>
+          <a:lstStyle/>
+          <a:p>
+            <a:pPr indent="0" marL="0">
+              <a:buNone/>
             </a:pPr>
             <a:r>
               <a:rPr lang="en-US" sz="1100" dirty="0">
                 <a:solidFill>
+                  <a:srgbClr val="232F3E"/>
+                </a:solidFill>
+                <a:latin typeface="Arial" pitchFamily="34" charset="0"/>
+                <a:ea typeface="Arial" pitchFamily="34" charset="-122"/>
+                <a:cs typeface="Arial" pitchFamily="34" charset="-120"/>
+              </a:rPr>
+              <a:t>Process only pages that matter - not the entire document</a:t>
+            </a:r>
+            <a:endParaRPr lang="en-US" sz="1100" dirty="0"/>
+          </a:p>
+        </p:txBody>
+      </p:sp>
+      <p:sp>
+        <p:nvSpPr>
+          <p:cNvPr id="12" name="Shape 10"/>
+          <p:cNvSpPr/>
+          <p:nvPr/>
+        </p:nvSpPr>
+        <p:spPr>
+          <a:xfrm>
+            <a:off x="365760" y="2468880"/>
+            <a:ext cx="4206240" cy="1051560"/>
+          </a:xfrm>
+          <a:prstGeom prst="roundRect">
+            <a:avLst>
+              <a:gd name="adj" fmla="val 6957"/>
+            </a:avLst>
+          </a:prstGeom>
+          <a:solidFill>
+            <a:srgbClr val="FFFFFF"/>
+          </a:solidFill>
+          <a:ln w="12700">
+            <a:solidFill>
+              <a:srgbClr val="8B5CF6"/>
+            </a:solidFill>
+            <a:prstDash val="solid"/>
+          </a:ln>
+        </p:spPr>
+      </p:sp>
+      <p:sp>
+        <p:nvSpPr>
+          <p:cNvPr id="13" name="Text 11"/>
+          <p:cNvSpPr/>
+          <p:nvPr/>
+        </p:nvSpPr>
+        <p:spPr>
+          <a:xfrm>
+            <a:off x="457200" y="2697480"/>
+            <a:ext cx="548640" cy="548640"/>
+          </a:xfrm>
+          <a:prstGeom prst="rect">
+            <a:avLst/>
+          </a:prstGeom>
+          <a:noFill/>
+          <a:ln/>
+        </p:spPr>
+        <p:txBody>
+          <a:bodyPr wrap="square" rtlCol="0" anchor="ctr"/>
+          <a:lstStyle/>
+          <a:p>
+            <a:pPr indent="0" marL="0">
+              <a:buNone/>
+            </a:pPr>
+            <a:r>
+              <a:rPr lang="en-US" sz="2400" dirty="0">
+                <a:solidFill>
+                  <a:srgbClr val="000000"/>
+                </a:solidFill>
+              </a:rPr>
+              <a:t>🔒</a:t>
+            </a:r>
+            <a:endParaRPr lang="en-US" sz="2400" dirty="0"/>
+          </a:p>
+        </p:txBody>
+      </p:sp>
+      <p:sp>
+        <p:nvSpPr>
+          <p:cNvPr id="14" name="Text 12"/>
+          <p:cNvSpPr/>
+          <p:nvPr/>
+        </p:nvSpPr>
+        <p:spPr>
+          <a:xfrm>
+            <a:off x="1097280" y="2606040"/>
+            <a:ext cx="3291840" cy="320040"/>
+          </a:xfrm>
+          <a:prstGeom prst="rect">
+            <a:avLst/>
+          </a:prstGeom>
+          <a:noFill/>
+          <a:ln/>
+        </p:spPr>
+        <p:txBody>
+          <a:bodyPr wrap="square" rtlCol="0" anchor="ctr"/>
+          <a:lstStyle/>
+          <a:p>
+            <a:pPr indent="0" marL="0">
+              <a:buNone/>
+            </a:pPr>
+            <a:r>
+              <a:rPr lang="en-US" sz="1400" b="1" dirty="0">
+                <a:solidFill>
                   <a:srgbClr val="1E293B"/>
                 </a:solidFill>
                 <a:latin typeface="Arial" pitchFamily="34" charset="0"/>
                 <a:ea typeface="Arial" pitchFamily="34" charset="-122"/>
                 <a:cs typeface="Arial" pitchFamily="34" charset="-120"/>
               </a:rPr>
-              <a:t>Agreement Info - Type, dates, amendment number</a:t>
+              <a:t>Content Deduplication</a:t>
+            </a:r>
+            <a:endParaRPr lang="en-US" sz="1400" dirty="0"/>
+          </a:p>
+        </p:txBody>
+      </p:sp>
+      <p:sp>
+        <p:nvSpPr>
+          <p:cNvPr id="15" name="Text 13"/>
+          <p:cNvSpPr/>
+          <p:nvPr/>
+        </p:nvSpPr>
+        <p:spPr>
+          <a:xfrm>
+            <a:off x="1097280" y="2971800"/>
+            <a:ext cx="3291840" cy="457200"/>
+          </a:xfrm>
+          <a:prstGeom prst="rect">
+            <a:avLst/>
+          </a:prstGeom>
+          <a:noFill/>
+          <a:ln/>
+        </p:spPr>
+        <p:txBody>
+          <a:bodyPr wrap="square" rtlCol="0" anchor="ctr"/>
+          <a:lstStyle/>
+          <a:p>
+            <a:pPr indent="0" marL="0">
+              <a:buNone/>
+            </a:pPr>
+            <a:r>
+              <a:rPr lang="en-US" sz="1100" dirty="0">
+                <a:solidFill>
+                  <a:srgbClr val="232F3E"/>
+                </a:solidFill>
+                <a:latin typeface="Arial" pitchFamily="34" charset="0"/>
+                <a:ea typeface="Arial" pitchFamily="34" charset="-122"/>
+                <a:cs typeface="Arial" pitchFamily="34" charset="-120"/>
+              </a:rPr>
+              <a:t>SHA-256 hashing prevents reprocessing identical documents</a:t>
             </a:r>
             <a:endParaRPr lang="en-US" sz="1100" dirty="0"/>
           </a:p>
-          <a:p>
-            <a:pPr>
-              <a:spcBef>
-                <a:spcPts val="600"/>
-              </a:spcBef>
+        </p:txBody>
+      </p:sp>
+      <p:sp>
+        <p:nvSpPr>
+          <p:cNvPr id="16" name="Shape 14"/>
+          <p:cNvSpPr/>
+          <p:nvPr/>
+        </p:nvSpPr>
+        <p:spPr>
+          <a:xfrm>
+            <a:off x="4754880" y="2468880"/>
+            <a:ext cx="4206240" cy="1051560"/>
+          </a:xfrm>
+          <a:prstGeom prst="roundRect">
+            <a:avLst>
+              <a:gd name="adj" fmla="val 6957"/>
+            </a:avLst>
+          </a:prstGeom>
+          <a:solidFill>
+            <a:srgbClr val="FFFFFF"/>
+          </a:solidFill>
+          <a:ln w="12700">
+            <a:solidFill>
+              <a:srgbClr val="8B5CF6"/>
+            </a:solidFill>
+            <a:prstDash val="solid"/>
+          </a:ln>
+        </p:spPr>
+      </p:sp>
+      <p:sp>
+        <p:nvSpPr>
+          <p:cNvPr id="17" name="Text 15"/>
+          <p:cNvSpPr/>
+          <p:nvPr/>
+        </p:nvSpPr>
+        <p:spPr>
+          <a:xfrm>
+            <a:off x="4846320" y="2697480"/>
+            <a:ext cx="548640" cy="548640"/>
+          </a:xfrm>
+          <a:prstGeom prst="rect">
+            <a:avLst/>
+          </a:prstGeom>
+          <a:noFill/>
+          <a:ln/>
+        </p:spPr>
+        <p:txBody>
+          <a:bodyPr wrap="square" rtlCol="0" anchor="ctr"/>
+          <a:lstStyle/>
+          <a:p>
+            <a:pPr indent="0" marL="0">
+              <a:buNone/>
+            </a:pPr>
+            <a:r>
+              <a:rPr lang="en-US" sz="2400" dirty="0">
+                <a:solidFill>
+                  <a:srgbClr val="000000"/>
+                </a:solidFill>
+              </a:rPr>
+              <a:t>📊</a:t>
+            </a:r>
+            <a:endParaRPr lang="en-US" sz="2400" dirty="0"/>
+          </a:p>
+        </p:txBody>
+      </p:sp>
+      <p:sp>
+        <p:nvSpPr>
+          <p:cNvPr id="18" name="Text 16"/>
+          <p:cNvSpPr/>
+          <p:nvPr/>
+        </p:nvSpPr>
+        <p:spPr>
+          <a:xfrm>
+            <a:off x="5486400" y="2606040"/>
+            <a:ext cx="3291840" cy="320040"/>
+          </a:xfrm>
+          <a:prstGeom prst="rect">
+            <a:avLst/>
+          </a:prstGeom>
+          <a:noFill/>
+          <a:ln/>
+        </p:spPr>
+        <p:txBody>
+          <a:bodyPr wrap="square" rtlCol="0" anchor="ctr"/>
+          <a:lstStyle/>
+          <a:p>
+            <a:pPr indent="0" marL="0">
+              <a:buNone/>
+            </a:pPr>
+            <a:r>
+              <a:rPr lang="en-US" sz="1400" b="1" dirty="0">
+                <a:solidFill>
+                  <a:srgbClr val="1E293B"/>
+                </a:solidFill>
+                <a:latin typeface="Arial" pitchFamily="34" charset="0"/>
+                <a:ea typeface="Arial" pitchFamily="34" charset="-122"/>
+                <a:cs typeface="Arial" pitchFamily="34" charset="-120"/>
+              </a:rPr>
+              <a:t>Complete Audit Trail</a:t>
+            </a:r>
+            <a:endParaRPr lang="en-US" sz="1400" dirty="0"/>
+          </a:p>
+        </p:txBody>
+      </p:sp>
+      <p:sp>
+        <p:nvSpPr>
+          <p:cNvPr id="19" name="Text 17"/>
+          <p:cNvSpPr/>
+          <p:nvPr/>
+        </p:nvSpPr>
+        <p:spPr>
+          <a:xfrm>
+            <a:off x="5486400" y="2971800"/>
+            <a:ext cx="3291840" cy="457200"/>
+          </a:xfrm>
+          <a:prstGeom prst="rect">
+            <a:avLst/>
+          </a:prstGeom>
+          <a:noFill/>
+          <a:ln/>
+        </p:spPr>
+        <p:txBody>
+          <a:bodyPr wrap="square" rtlCol="0" anchor="ctr"/>
+          <a:lstStyle/>
+          <a:p>
+            <a:pPr indent="0" marL="0">
+              <a:buNone/>
             </a:pPr>
             <a:r>
               <a:rPr lang="en-US" sz="1100" dirty="0">
                 <a:solidFill>
+                  <a:srgbClr val="232F3E"/>
+                </a:solidFill>
+                <a:latin typeface="Arial" pitchFamily="34" charset="0"/>
+                <a:ea typeface="Arial" pitchFamily="34" charset="-122"/>
+                <a:cs typeface="Arial" pitchFamily="34" charset="-120"/>
+              </a:rPr>
+              <a:t>Track exactly which page each data point originated from</a:t>
+            </a:r>
+            <a:endParaRPr lang="en-US" sz="1100" dirty="0"/>
+          </a:p>
+        </p:txBody>
+      </p:sp>
+      <p:sp>
+        <p:nvSpPr>
+          <p:cNvPr id="20" name="Shape 18"/>
+          <p:cNvSpPr/>
+          <p:nvPr/>
+        </p:nvSpPr>
+        <p:spPr>
+          <a:xfrm>
+            <a:off x="365760" y="3657600"/>
+            <a:ext cx="4206240" cy="1051560"/>
+          </a:xfrm>
+          <a:prstGeom prst="roundRect">
+            <a:avLst>
+              <a:gd name="adj" fmla="val 6957"/>
+            </a:avLst>
+          </a:prstGeom>
+          <a:solidFill>
+            <a:srgbClr val="FFFFFF"/>
+          </a:solidFill>
+          <a:ln w="12700">
+            <a:solidFill>
+              <a:srgbClr val="8B5CF6"/>
+            </a:solidFill>
+            <a:prstDash val="solid"/>
+          </a:ln>
+        </p:spPr>
+      </p:sp>
+      <p:sp>
+        <p:nvSpPr>
+          <p:cNvPr id="21" name="Text 19"/>
+          <p:cNvSpPr/>
+          <p:nvPr/>
+        </p:nvSpPr>
+        <p:spPr>
+          <a:xfrm>
+            <a:off x="457200" y="3886200"/>
+            <a:ext cx="548640" cy="548640"/>
+          </a:xfrm>
+          <a:prstGeom prst="rect">
+            <a:avLst/>
+          </a:prstGeom>
+          <a:noFill/>
+          <a:ln/>
+        </p:spPr>
+        <p:txBody>
+          <a:bodyPr wrap="square" rtlCol="0" anchor="ctr"/>
+          <a:lstStyle/>
+          <a:p>
+            <a:pPr indent="0" marL="0">
+              <a:buNone/>
+            </a:pPr>
+            <a:r>
+              <a:rPr lang="en-US" sz="2400" dirty="0">
+                <a:solidFill>
+                  <a:srgbClr val="000000"/>
+                </a:solidFill>
+              </a:rPr>
+              <a:t>✅</a:t>
+            </a:r>
+            <a:endParaRPr lang="en-US" sz="2400" dirty="0"/>
+          </a:p>
+        </p:txBody>
+      </p:sp>
+      <p:sp>
+        <p:nvSpPr>
+          <p:cNvPr id="22" name="Text 20"/>
+          <p:cNvSpPr/>
+          <p:nvPr/>
+        </p:nvSpPr>
+        <p:spPr>
+          <a:xfrm>
+            <a:off x="1097280" y="3794760"/>
+            <a:ext cx="3291840" cy="320040"/>
+          </a:xfrm>
+          <a:prstGeom prst="rect">
+            <a:avLst/>
+          </a:prstGeom>
+          <a:noFill/>
+          <a:ln/>
+        </p:spPr>
+        <p:txBody>
+          <a:bodyPr wrap="square" rtlCol="0" anchor="ctr"/>
+          <a:lstStyle/>
+          <a:p>
+            <a:pPr indent="0" marL="0">
+              <a:buNone/>
+            </a:pPr>
+            <a:r>
+              <a:rPr lang="en-US" sz="1400" b="1" dirty="0">
+                <a:solidFill>
                   <a:srgbClr val="1E293B"/>
                 </a:solidFill>
                 <a:latin typeface="Arial" pitchFamily="34" charset="0"/>
                 <a:ea typeface="Arial" pitchFamily="34" charset="-122"/>
                 <a:cs typeface="Arial" pitchFamily="34" charset="-120"/>
               </a:rPr>
-              <a:t>Parties - Borrower, agent, arrangers, guarantors</a:t>
+              <a:t>Review Workflow</a:t>
+            </a:r>
+            <a:endParaRPr lang="en-US" sz="1400" dirty="0"/>
+          </a:p>
+        </p:txBody>
+      </p:sp>
+      <p:sp>
+        <p:nvSpPr>
+          <p:cNvPr id="23" name="Text 21"/>
+          <p:cNvSpPr/>
+          <p:nvPr/>
+        </p:nvSpPr>
+        <p:spPr>
+          <a:xfrm>
+            <a:off x="1097280" y="4160520"/>
+            <a:ext cx="3291840" cy="457200"/>
+          </a:xfrm>
+          <a:prstGeom prst="rect">
+            <a:avLst/>
+          </a:prstGeom>
+          <a:noFill/>
+          <a:ln/>
+        </p:spPr>
+        <p:txBody>
+          <a:bodyPr wrap="square" rtlCol="0" anchor="ctr"/>
+          <a:lstStyle/>
+          <a:p>
+            <a:pPr indent="0" marL="0">
+              <a:buNone/>
+            </a:pPr>
+            <a:r>
+              <a:rPr lang="en-US" sz="1100" dirty="0">
+                <a:solidFill>
+                  <a:srgbClr val="232F3E"/>
+                </a:solidFill>
+                <a:latin typeface="Arial" pitchFamily="34" charset="0"/>
+                <a:ea typeface="Arial" pitchFamily="34" charset="-122"/>
+                <a:cs typeface="Arial" pitchFamily="34" charset="-120"/>
+              </a:rPr>
+              <a:t>Human-in-the-loop: Approve, Reject, or Correct extracted data</a:t>
             </a:r>
             <a:endParaRPr lang="en-US" sz="1100" dirty="0"/>
           </a:p>
-          <a:p>
-            <a:pPr>
-              <a:spcBef>
-                <a:spcPts val="600"/>
-              </a:spcBef>
+        </p:txBody>
+      </p:sp>
+      <p:sp>
+        <p:nvSpPr>
+          <p:cNvPr id="24" name="Shape 22"/>
+          <p:cNvSpPr/>
+          <p:nvPr/>
+        </p:nvSpPr>
+        <p:spPr>
+          <a:xfrm>
+            <a:off x="4754880" y="3657600"/>
+            <a:ext cx="4206240" cy="1051560"/>
+          </a:xfrm>
+          <a:prstGeom prst="roundRect">
+            <a:avLst>
+              <a:gd name="adj" fmla="val 6957"/>
+            </a:avLst>
+          </a:prstGeom>
+          <a:solidFill>
+            <a:srgbClr val="FFFFFF"/>
+          </a:solidFill>
+          <a:ln w="12700">
+            <a:solidFill>
+              <a:srgbClr val="8B5CF6"/>
+            </a:solidFill>
+            <a:prstDash val="solid"/>
+          </a:ln>
+        </p:spPr>
+      </p:sp>
+      <p:sp>
+        <p:nvSpPr>
+          <p:cNvPr id="25" name="Text 23"/>
+          <p:cNvSpPr/>
+          <p:nvPr/>
+        </p:nvSpPr>
+        <p:spPr>
+          <a:xfrm>
+            <a:off x="4846320" y="3886200"/>
+            <a:ext cx="548640" cy="548640"/>
+          </a:xfrm>
+          <a:prstGeom prst="rect">
+            <a:avLst/>
+          </a:prstGeom>
+          <a:noFill/>
+          <a:ln/>
+        </p:spPr>
+        <p:txBody>
+          <a:bodyPr wrap="square" rtlCol="0" anchor="ctr"/>
+          <a:lstStyle/>
+          <a:p>
+            <a:pPr indent="0" marL="0">
+              <a:buNone/>
+            </a:pPr>
+            <a:r>
+              <a:rPr lang="en-US" sz="2400" dirty="0">
+                <a:solidFill>
+                  <a:srgbClr val="000000"/>
+                </a:solidFill>
+              </a:rPr>
+              <a:t>☁️</a:t>
+            </a:r>
+            <a:endParaRPr lang="en-US" sz="2400" dirty="0"/>
+          </a:p>
+        </p:txBody>
+      </p:sp>
+      <p:sp>
+        <p:nvSpPr>
+          <p:cNvPr id="26" name="Text 24"/>
+          <p:cNvSpPr/>
+          <p:nvPr/>
+        </p:nvSpPr>
+        <p:spPr>
+          <a:xfrm>
+            <a:off x="5486400" y="3794760"/>
+            <a:ext cx="3291840" cy="320040"/>
+          </a:xfrm>
+          <a:prstGeom prst="rect">
+            <a:avLst/>
+          </a:prstGeom>
+          <a:noFill/>
+          <a:ln/>
+        </p:spPr>
+        <p:txBody>
+          <a:bodyPr wrap="square" rtlCol="0" anchor="ctr"/>
+          <a:lstStyle/>
+          <a:p>
+            <a:pPr indent="0" marL="0">
+              <a:buNone/>
+            </a:pPr>
+            <a:r>
+              <a:rPr lang="en-US" sz="1400" b="1" dirty="0">
+                <a:solidFill>
+                  <a:srgbClr val="1E293B"/>
+                </a:solidFill>
+                <a:latin typeface="Arial" pitchFamily="34" charset="0"/>
+                <a:ea typeface="Arial" pitchFamily="34" charset="-122"/>
+                <a:cs typeface="Arial" pitchFamily="34" charset="-120"/>
+              </a:rPr>
+              <a:t>Serverless &amp; Scalable</a:t>
+            </a:r>
+            <a:endParaRPr lang="en-US" sz="1400" dirty="0"/>
+          </a:p>
+        </p:txBody>
+      </p:sp>
+      <p:sp>
+        <p:nvSpPr>
+          <p:cNvPr id="27" name="Text 25"/>
+          <p:cNvSpPr/>
+          <p:nvPr/>
+        </p:nvSpPr>
+        <p:spPr>
+          <a:xfrm>
+            <a:off x="5486400" y="4160520"/>
+            <a:ext cx="3291840" cy="457200"/>
+          </a:xfrm>
+          <a:prstGeom prst="rect">
+            <a:avLst/>
+          </a:prstGeom>
+          <a:noFill/>
+          <a:ln/>
+        </p:spPr>
+        <p:txBody>
+          <a:bodyPr wrap="square" rtlCol="0" anchor="ctr"/>
+          <a:lstStyle/>
+          <a:p>
+            <a:pPr indent="0" marL="0">
+              <a:buNone/>
             </a:pPr>
             <a:r>
               <a:rPr lang="en-US" sz="1100" dirty="0">
                 <a:solidFill>
-                  <a:srgbClr val="1E293B"/>
-                </a:solidFill>
-                <a:latin typeface="Arial" pitchFamily="34" charset="0"/>
-                <a:ea typeface="Arial" pitchFamily="34" charset="-122"/>
-                <a:cs typeface="Arial" pitchFamily="34" charset="-120"/>
-              </a:rPr>
-              <a:t>Facility Terms - Revolving credit, LC commitments</a:t>
-            </a:r>
-            <a:endParaRPr lang="en-US" sz="1100" dirty="0"/>
-          </a:p>
-          <a:p>
-            <a:pPr>
-              <a:spcBef>
-                <a:spcPts val="600"/>
-              </a:spcBef>
-            </a:pPr>
-            <a:r>
-              <a:rPr lang="en-US" sz="1100" dirty="0">
-                <a:solidFill>
-                  <a:srgbClr val="1E293B"/>
-                </a:solidFill>
-                <a:latin typeface="Arial" pitchFamily="34" charset="0"/>
-                <a:ea typeface="Arial" pitchFamily="34" charset="-122"/>
-                <a:cs typeface="Arial" pitchFamily="34" charset="-120"/>
-              </a:rPr>
-              <a:t>Pricing Grid - SOFR spreads, ABR spreads, tiers</a:t>
-            </a:r>
-            <a:endParaRPr lang="en-US" sz="1100" dirty="0"/>
-          </a:p>
-          <a:p>
-            <a:pPr>
-              <a:spcBef>
-                <a:spcPts val="600"/>
-              </a:spcBef>
-            </a:pPr>
-            <a:r>
-              <a:rPr lang="en-US" sz="1100" dirty="0">
-                <a:solidFill>
-                  <a:srgbClr val="1E293B"/>
-                </a:solidFill>
-                <a:latin typeface="Arial" pitchFamily="34" charset="0"/>
-                <a:ea typeface="Arial" pitchFamily="34" charset="-122"/>
-                <a:cs typeface="Arial" pitchFamily="34" charset="-120"/>
-              </a:rPr>
-              <a:t>Lender Commitments - Per-lender allocations</a:t>
-            </a:r>
-            <a:endParaRPr lang="en-US" sz="1100" dirty="0"/>
-          </a:p>
-          <a:p>
-            <a:pPr>
-              <a:spcBef>
-                <a:spcPts val="600"/>
-              </a:spcBef>
-            </a:pPr>
-            <a:r>
-              <a:rPr lang="en-US" sz="1100" dirty="0">
-                <a:solidFill>
-                  <a:srgbClr val="1E293B"/>
-                </a:solidFill>
-                <a:latin typeface="Arial" pitchFamily="34" charset="0"/>
-                <a:ea typeface="Arial" pitchFamily="34" charset="-122"/>
-                <a:cs typeface="Arial" pitchFamily="34" charset="-120"/>
-              </a:rPr>
-              <a:t>Covenants - Financial ratios, requirements</a:t>
+                  <a:srgbClr val="232F3E"/>
+                </a:solidFill>
+                <a:latin typeface="Arial" pitchFamily="34" charset="0"/>
+                <a:ea typeface="Arial" pitchFamily="34" charset="-122"/>
+                <a:cs typeface="Arial" pitchFamily="34" charset="-120"/>
+              </a:rPr>
+              <a:t>Zero infrastructure management, auto-scales to any volume</a:t>
             </a:r>
             <a:endParaRPr lang="en-US" sz="1100" dirty="0"/>
           </a:p>
@@ -8979,13 +9950,13 @@
         <p:spPr>
           <a:xfrm>
             <a:off x="0" y="0"/>
-            <a:ext cx="9144000" cy="5143500"/>
+            <a:ext cx="9144000" cy="1097280"/>
           </a:xfrm>
           <a:prstGeom prst="rect">
             <a:avLst/>
           </a:prstGeom>
           <a:solidFill>
-            <a:srgbClr val="232F3E"/>
+            <a:srgbClr val="14B8A6"/>
           </a:solidFill>
           <a:ln/>
         </p:spPr>
@@ -9023,7 +9994,7 @@
                 <a:ea typeface="Arial" pitchFamily="34" charset="-122"/>
                 <a:cs typeface="Arial" pitchFamily="34" charset="-120"/>
               </a:rPr>
-              <a:t>Built on AWS</a:t>
+              <a:t>Supported Document Types</a:t>
             </a:r>
             <a:endParaRPr lang="en-US" sz="3200" dirty="0"/>
           </a:p>
@@ -9037,18 +10008,23 @@
         </p:nvSpPr>
         <p:spPr>
           <a:xfrm>
-            <a:off x="457200" y="1097280"/>
-            <a:ext cx="2743200" cy="868680"/>
+            <a:off x="365760" y="1280160"/>
+            <a:ext cx="4206240" cy="3474720"/>
           </a:xfrm>
           <a:prstGeom prst="roundRect">
             <a:avLst>
-              <a:gd name="adj" fmla="val 8421"/>
+              <a:gd name="adj" fmla="val 2632"/>
             </a:avLst>
           </a:prstGeom>
           <a:solidFill>
-            <a:srgbClr val="FF9900"/>
+            <a:srgbClr val="F0FDFA"/>
           </a:solidFill>
-          <a:ln/>
+          <a:ln w="12700">
+            <a:solidFill>
+              <a:srgbClr val="14B8A6"/>
+            </a:solidFill>
+            <a:prstDash val="solid"/>
+          </a:ln>
         </p:spPr>
       </p:sp>
       <p:sp>
@@ -9059,8 +10035,8 @@
         </p:nvSpPr>
         <p:spPr>
           <a:xfrm>
-            <a:off x="457200" y="1234440"/>
-            <a:ext cx="2743200" cy="320040"/>
+            <a:off x="457200" y="1417320"/>
+            <a:ext cx="4023360" cy="365760"/>
           </a:xfrm>
           <a:prstGeom prst="rect">
             <a:avLst/>
@@ -9072,21 +10048,21 @@
           <a:bodyPr wrap="square" rtlCol="0" anchor="ctr"/>
           <a:lstStyle/>
           <a:p>
-            <a:pPr algn="ctr" indent="0" marL="0">
-              <a:buNone/>
-            </a:pPr>
-            <a:r>
-              <a:rPr lang="en-US" sz="1300" b="1" dirty="0">
-                <a:solidFill>
-                  <a:srgbClr val="FFFFFF"/>
-                </a:solidFill>
-                <a:latin typeface="Arial" pitchFamily="34" charset="0"/>
-                <a:ea typeface="Arial" pitchFamily="34" charset="-122"/>
-                <a:cs typeface="Arial" pitchFamily="34" charset="-120"/>
-              </a:rPr>
-              <a:t>CloudFront + S3</a:t>
-            </a:r>
-            <a:endParaRPr lang="en-US" sz="1300" dirty="0"/>
+            <a:pPr indent="0" marL="0">
+              <a:buNone/>
+            </a:pPr>
+            <a:r>
+              <a:rPr lang="en-US" sz="1800" b="1" dirty="0">
+                <a:solidFill>
+                  <a:srgbClr val="14B8A6"/>
+                </a:solidFill>
+                <a:latin typeface="Arial" pitchFamily="34" charset="0"/>
+                <a:ea typeface="Arial" pitchFamily="34" charset="-122"/>
+                <a:cs typeface="Arial" pitchFamily="34" charset="-120"/>
+              </a:rPr>
+              <a:t>📄 Loan Packages</a:t>
+            </a:r>
+            <a:endParaRPr lang="en-US" sz="1800" dirty="0"/>
           </a:p>
         </p:txBody>
       </p:sp>
@@ -9098,8 +10074,8 @@
         </p:nvSpPr>
         <p:spPr>
           <a:xfrm>
-            <a:off x="457200" y="1554480"/>
-            <a:ext cx="2743200" cy="274320"/>
+            <a:off x="548640" y="1920240"/>
+            <a:ext cx="3840480" cy="2560320"/>
           </a:xfrm>
           <a:prstGeom prst="rect">
             <a:avLst/>
@@ -9111,21 +10087,61 @@
           <a:bodyPr wrap="square" rtlCol="0" anchor="ctr"/>
           <a:lstStyle/>
           <a:p>
-            <a:pPr algn="ctr" indent="0" marL="0">
-              <a:buNone/>
-            </a:pPr>
-            <a:r>
-              <a:rPr lang="en-US" sz="1100" dirty="0">
-                <a:solidFill>
-                  <a:srgbClr val="FFFFFF"/>
-                </a:solidFill>
-                <a:latin typeface="Arial" pitchFamily="34" charset="0"/>
-                <a:ea typeface="Arial" pitchFamily="34" charset="-122"/>
-                <a:cs typeface="Arial" pitchFamily="34" charset="-120"/>
-              </a:rPr>
-              <a:t>React Dashboard</a:t>
-            </a:r>
-            <a:endParaRPr lang="en-US" sz="1100" dirty="0"/>
+            <a:pPr>
+              <a:spcBef>
+                <a:spcPts val="800"/>
+              </a:spcBef>
+            </a:pPr>
+            <a:r>
+              <a:rPr lang="en-US" sz="1200" dirty="0">
+                <a:solidFill>
+                  <a:srgbClr val="1E293B"/>
+                </a:solidFill>
+                <a:latin typeface="Arial" pitchFamily="34" charset="0"/>
+                <a:ea typeface="Arial" pitchFamily="34" charset="-122"/>
+                <a:cs typeface="Arial" pitchFamily="34" charset="-120"/>
+              </a:rPr>
+              <a:t>Promissory Note - Interest rate, principal, borrower names, maturity date</a:t>
+            </a:r>
+            <a:endParaRPr lang="en-US" sz="1200" dirty="0"/>
+          </a:p>
+          <a:p>
+            <a:pPr>
+              <a:spcBef>
+                <a:spcPts val="800"/>
+              </a:spcBef>
+            </a:pPr>
+            <a:r>
+              <a:rPr lang="en-US" sz="1200" dirty="0">
+                <a:solidFill>
+                  <a:srgbClr val="1E293B"/>
+                </a:solidFill>
+                <a:latin typeface="Arial" pitchFamily="34" charset="0"/>
+                <a:ea typeface="Arial" pitchFamily="34" charset="-122"/>
+                <a:cs typeface="Arial" pitchFamily="34" charset="-120"/>
+              </a:rPr>
+              <a:t>Closing Disclosure - Loan amount, fees, cash to close</a:t>
+            </a:r>
+            <a:endParaRPr lang="en-US" sz="1200" dirty="0"/>
+          </a:p>
+          <a:p>
+            <a:pPr>
+              <a:spcBef>
+                <a:spcPts val="800"/>
+              </a:spcBef>
+            </a:pPr>
+            <a:r>
+              <a:rPr lang="en-US" sz="1200" dirty="0">
+                <a:solidFill>
+                  <a:srgbClr val="1E293B"/>
+                </a:solidFill>
+                <a:latin typeface="Arial" pitchFamily="34" charset="0"/>
+                <a:ea typeface="Arial" pitchFamily="34" charset="-122"/>
+                <a:cs typeface="Arial" pitchFamily="34" charset="-120"/>
+              </a:rPr>
+              <a:t>Form 1003 - Borrower info, property address, employment</a:t>
+            </a:r>
+            <a:endParaRPr lang="en-US" sz="1200" dirty="0"/>
           </a:p>
         </p:txBody>
       </p:sp>
@@ -9137,18 +10153,23 @@
         </p:nvSpPr>
         <p:spPr>
           <a:xfrm>
-            <a:off x="3337560" y="1097280"/>
-            <a:ext cx="2743200" cy="868680"/>
+            <a:off x="4572000" y="1280160"/>
+            <a:ext cx="4206240" cy="3474720"/>
           </a:xfrm>
           <a:prstGeom prst="roundRect">
             <a:avLst>
-              <a:gd name="adj" fmla="val 8421"/>
+              <a:gd name="adj" fmla="val 2632"/>
             </a:avLst>
           </a:prstGeom>
           <a:solidFill>
-            <a:srgbClr val="FF9900"/>
+            <a:srgbClr val="FAF5FF"/>
           </a:solidFill>
-          <a:ln/>
+          <a:ln w="12700">
+            <a:solidFill>
+              <a:srgbClr val="8B5CF6"/>
+            </a:solidFill>
+            <a:prstDash val="solid"/>
+          </a:ln>
         </p:spPr>
       </p:sp>
       <p:sp>
@@ -9159,8 +10180,8 @@
         </p:nvSpPr>
         <p:spPr>
           <a:xfrm>
-            <a:off x="3337560" y="1234440"/>
-            <a:ext cx="2743200" cy="320040"/>
+            <a:off x="4663440" y="1417320"/>
+            <a:ext cx="4023360" cy="365760"/>
           </a:xfrm>
           <a:prstGeom prst="rect">
             <a:avLst/>
@@ -9172,21 +10193,21 @@
           <a:bodyPr wrap="square" rtlCol="0" anchor="ctr"/>
           <a:lstStyle/>
           <a:p>
-            <a:pPr algn="ctr" indent="0" marL="0">
-              <a:buNone/>
-            </a:pPr>
-            <a:r>
-              <a:rPr lang="en-US" sz="1300" b="1" dirty="0">
-                <a:solidFill>
-                  <a:srgbClr val="FFFFFF"/>
-                </a:solidFill>
-                <a:latin typeface="Arial" pitchFamily="34" charset="0"/>
-                <a:ea typeface="Arial" pitchFamily="34" charset="-122"/>
-                <a:cs typeface="Arial" pitchFamily="34" charset="-120"/>
-              </a:rPr>
-              <a:t>API Gateway + Lambda</a:t>
-            </a:r>
-            <a:endParaRPr lang="en-US" sz="1300" dirty="0"/>
+            <a:pPr indent="0" marL="0">
+              <a:buNone/>
+            </a:pPr>
+            <a:r>
+              <a:rPr lang="en-US" sz="1800" b="1" dirty="0">
+                <a:solidFill>
+                  <a:srgbClr val="8B5CF6"/>
+                </a:solidFill>
+                <a:latin typeface="Arial" pitchFamily="34" charset="0"/>
+                <a:ea typeface="Arial" pitchFamily="34" charset="-122"/>
+                <a:cs typeface="Arial" pitchFamily="34" charset="-120"/>
+              </a:rPr>
+              <a:t>📋 Credit Agreements</a:t>
+            </a:r>
+            <a:endParaRPr lang="en-US" sz="1800" dirty="0"/>
           </a:p>
         </p:txBody>
       </p:sp>
@@ -9198,8 +10219,8 @@
         </p:nvSpPr>
         <p:spPr>
           <a:xfrm>
-            <a:off x="3337560" y="1554480"/>
-            <a:ext cx="2743200" cy="274320"/>
+            <a:off x="4754880" y="1920240"/>
+            <a:ext cx="3840480" cy="2560320"/>
           </a:xfrm>
           <a:prstGeom prst="rect">
             <a:avLst/>
@@ -9211,511 +10232,108 @@
           <a:bodyPr wrap="square" rtlCol="0" anchor="ctr"/>
           <a:lstStyle/>
           <a:p>
-            <a:pPr algn="ctr" indent="0" marL="0">
-              <a:buNone/>
+            <a:pPr>
+              <a:spcBef>
+                <a:spcPts val="600"/>
+              </a:spcBef>
             </a:pPr>
             <a:r>
               <a:rPr lang="en-US" sz="1100" dirty="0">
                 <a:solidFill>
-                  <a:srgbClr val="FFFFFF"/>
-                </a:solidFill>
-                <a:latin typeface="Arial" pitchFamily="34" charset="0"/>
-                <a:ea typeface="Arial" pitchFamily="34" charset="-122"/>
-                <a:cs typeface="Arial" pitchFamily="34" charset="-120"/>
-              </a:rPr>
-              <a:t>REST API</a:t>
+                  <a:srgbClr val="1E293B"/>
+                </a:solidFill>
+                <a:latin typeface="Arial" pitchFamily="34" charset="0"/>
+                <a:ea typeface="Arial" pitchFamily="34" charset="-122"/>
+                <a:cs typeface="Arial" pitchFamily="34" charset="-120"/>
+              </a:rPr>
+              <a:t>Agreement Info - Type, dates, amendment number</a:t>
             </a:r>
             <a:endParaRPr lang="en-US" sz="1100" dirty="0"/>
           </a:p>
-        </p:txBody>
-      </p:sp>
-      <p:sp>
-        <p:nvSpPr>
-          <p:cNvPr id="10" name="Shape 8"/>
-          <p:cNvSpPr/>
-          <p:nvPr/>
-        </p:nvSpPr>
-        <p:spPr>
-          <a:xfrm>
-            <a:off x="6217920" y="1097280"/>
-            <a:ext cx="2743200" cy="868680"/>
-          </a:xfrm>
-          <a:prstGeom prst="roundRect">
-            <a:avLst>
-              <a:gd name="adj" fmla="val 8421"/>
-            </a:avLst>
-          </a:prstGeom>
-          <a:solidFill>
-            <a:srgbClr val="FF9900"/>
-          </a:solidFill>
-          <a:ln/>
-        </p:spPr>
-      </p:sp>
-      <p:sp>
-        <p:nvSpPr>
-          <p:cNvPr id="11" name="Text 9"/>
-          <p:cNvSpPr/>
-          <p:nvPr/>
-        </p:nvSpPr>
-        <p:spPr>
-          <a:xfrm>
-            <a:off x="6217920" y="1234440"/>
-            <a:ext cx="2743200" cy="320040"/>
-          </a:xfrm>
-          <a:prstGeom prst="rect">
-            <a:avLst/>
-          </a:prstGeom>
-          <a:noFill/>
-          <a:ln/>
-        </p:spPr>
-        <p:txBody>
-          <a:bodyPr wrap="square" rtlCol="0" anchor="ctr"/>
-          <a:lstStyle/>
-          <a:p>
-            <a:pPr algn="ctr" indent="0" marL="0">
-              <a:buNone/>
-            </a:pPr>
-            <a:r>
-              <a:rPr lang="en-US" sz="1300" b="1" dirty="0">
-                <a:solidFill>
-                  <a:srgbClr val="FFFFFF"/>
-                </a:solidFill>
-                <a:latin typeface="Arial" pitchFamily="34" charset="0"/>
-                <a:ea typeface="Arial" pitchFamily="34" charset="-122"/>
-                <a:cs typeface="Arial" pitchFamily="34" charset="-120"/>
-              </a:rPr>
-              <a:t>Step Functions</a:t>
-            </a:r>
-            <a:endParaRPr lang="en-US" sz="1300" dirty="0"/>
-          </a:p>
-        </p:txBody>
-      </p:sp>
-      <p:sp>
-        <p:nvSpPr>
-          <p:cNvPr id="12" name="Text 10"/>
-          <p:cNvSpPr/>
-          <p:nvPr/>
-        </p:nvSpPr>
-        <p:spPr>
-          <a:xfrm>
-            <a:off x="6217920" y="1554480"/>
-            <a:ext cx="2743200" cy="274320"/>
-          </a:xfrm>
-          <a:prstGeom prst="rect">
-            <a:avLst/>
-          </a:prstGeom>
-          <a:noFill/>
-          <a:ln/>
-        </p:spPr>
-        <p:txBody>
-          <a:bodyPr wrap="square" rtlCol="0" anchor="ctr"/>
-          <a:lstStyle/>
-          <a:p>
-            <a:pPr algn="ctr" indent="0" marL="0">
-              <a:buNone/>
+          <a:p>
+            <a:pPr>
+              <a:spcBef>
+                <a:spcPts val="600"/>
+              </a:spcBef>
             </a:pPr>
             <a:r>
               <a:rPr lang="en-US" sz="1100" dirty="0">
                 <a:solidFill>
-                  <a:srgbClr val="FFFFFF"/>
-                </a:solidFill>
-                <a:latin typeface="Arial" pitchFamily="34" charset="0"/>
-                <a:ea typeface="Arial" pitchFamily="34" charset="-122"/>
-                <a:cs typeface="Arial" pitchFamily="34" charset="-120"/>
-              </a:rPr>
-              <a:t>Orchestration</a:t>
+                  <a:srgbClr val="1E293B"/>
+                </a:solidFill>
+                <a:latin typeface="Arial" pitchFamily="34" charset="0"/>
+                <a:ea typeface="Arial" pitchFamily="34" charset="-122"/>
+                <a:cs typeface="Arial" pitchFamily="34" charset="-120"/>
+              </a:rPr>
+              <a:t>Parties - Borrower, agent, arrangers, guarantors</a:t>
             </a:r>
             <a:endParaRPr lang="en-US" sz="1100" dirty="0"/>
           </a:p>
-        </p:txBody>
-      </p:sp>
-      <p:sp>
-        <p:nvSpPr>
-          <p:cNvPr id="13" name="Shape 11"/>
-          <p:cNvSpPr/>
-          <p:nvPr/>
-        </p:nvSpPr>
-        <p:spPr>
-          <a:xfrm>
-            <a:off x="457200" y="2103120"/>
-            <a:ext cx="2743200" cy="868680"/>
-          </a:xfrm>
-          <a:prstGeom prst="roundRect">
-            <a:avLst>
-              <a:gd name="adj" fmla="val 8421"/>
-            </a:avLst>
-          </a:prstGeom>
-          <a:solidFill>
-            <a:srgbClr val="FF9900"/>
-          </a:solidFill>
-          <a:ln/>
-        </p:spPr>
-      </p:sp>
-      <p:sp>
-        <p:nvSpPr>
-          <p:cNvPr id="14" name="Text 12"/>
-          <p:cNvSpPr/>
-          <p:nvPr/>
-        </p:nvSpPr>
-        <p:spPr>
-          <a:xfrm>
-            <a:off x="457200" y="2240280"/>
-            <a:ext cx="2743200" cy="320040"/>
-          </a:xfrm>
-          <a:prstGeom prst="rect">
-            <a:avLst/>
-          </a:prstGeom>
-          <a:noFill/>
-          <a:ln/>
-        </p:spPr>
-        <p:txBody>
-          <a:bodyPr wrap="square" rtlCol="0" anchor="ctr"/>
-          <a:lstStyle/>
-          <a:p>
-            <a:pPr algn="ctr" indent="0" marL="0">
-              <a:buNone/>
-            </a:pPr>
-            <a:r>
-              <a:rPr lang="en-US" sz="1300" b="1" dirty="0">
-                <a:solidFill>
-                  <a:srgbClr val="FFFFFF"/>
-                </a:solidFill>
-                <a:latin typeface="Arial" pitchFamily="34" charset="0"/>
-                <a:ea typeface="Arial" pitchFamily="34" charset="-122"/>
-                <a:cs typeface="Arial" pitchFamily="34" charset="-120"/>
-              </a:rPr>
-              <a:t>Bedrock (Claude Haiku)</a:t>
-            </a:r>
-            <a:endParaRPr lang="en-US" sz="1300" dirty="0"/>
-          </a:p>
-        </p:txBody>
-      </p:sp>
-      <p:sp>
-        <p:nvSpPr>
-          <p:cNvPr id="15" name="Text 13"/>
-          <p:cNvSpPr/>
-          <p:nvPr/>
-        </p:nvSpPr>
-        <p:spPr>
-          <a:xfrm>
-            <a:off x="457200" y="2560320"/>
-            <a:ext cx="2743200" cy="274320"/>
-          </a:xfrm>
-          <a:prstGeom prst="rect">
-            <a:avLst/>
-          </a:prstGeom>
-          <a:noFill/>
-          <a:ln/>
-        </p:spPr>
-        <p:txBody>
-          <a:bodyPr wrap="square" rtlCol="0" anchor="ctr"/>
-          <a:lstStyle/>
-          <a:p>
-            <a:pPr algn="ctr" indent="0" marL="0">
-              <a:buNone/>
+          <a:p>
+            <a:pPr>
+              <a:spcBef>
+                <a:spcPts val="600"/>
+              </a:spcBef>
             </a:pPr>
             <a:r>
               <a:rPr lang="en-US" sz="1100" dirty="0">
                 <a:solidFill>
-                  <a:srgbClr val="FFFFFF"/>
-                </a:solidFill>
-                <a:latin typeface="Arial" pitchFamily="34" charset="0"/>
-                <a:ea typeface="Arial" pitchFamily="34" charset="-122"/>
-                <a:cs typeface="Arial" pitchFamily="34" charset="-120"/>
-              </a:rPr>
-              <a:t>AI Classification</a:t>
+                  <a:srgbClr val="1E293B"/>
+                </a:solidFill>
+                <a:latin typeface="Arial" pitchFamily="34" charset="0"/>
+                <a:ea typeface="Arial" pitchFamily="34" charset="-122"/>
+                <a:cs typeface="Arial" pitchFamily="34" charset="-120"/>
+              </a:rPr>
+              <a:t>Facility Terms - Revolving credit, LC commitments</a:t>
             </a:r>
             <a:endParaRPr lang="en-US" sz="1100" dirty="0"/>
           </a:p>
-        </p:txBody>
-      </p:sp>
-      <p:sp>
-        <p:nvSpPr>
-          <p:cNvPr id="16" name="Shape 14"/>
-          <p:cNvSpPr/>
-          <p:nvPr/>
-        </p:nvSpPr>
-        <p:spPr>
-          <a:xfrm>
-            <a:off x="3337560" y="2103120"/>
-            <a:ext cx="2743200" cy="868680"/>
-          </a:xfrm>
-          <a:prstGeom prst="roundRect">
-            <a:avLst>
-              <a:gd name="adj" fmla="val 8421"/>
-            </a:avLst>
-          </a:prstGeom>
-          <a:solidFill>
-            <a:srgbClr val="FF9900"/>
-          </a:solidFill>
-          <a:ln/>
-        </p:spPr>
-      </p:sp>
-      <p:sp>
-        <p:nvSpPr>
-          <p:cNvPr id="17" name="Text 15"/>
-          <p:cNvSpPr/>
-          <p:nvPr/>
-        </p:nvSpPr>
-        <p:spPr>
-          <a:xfrm>
-            <a:off x="3337560" y="2240280"/>
-            <a:ext cx="2743200" cy="320040"/>
-          </a:xfrm>
-          <a:prstGeom prst="rect">
-            <a:avLst/>
-          </a:prstGeom>
-          <a:noFill/>
-          <a:ln/>
-        </p:spPr>
-        <p:txBody>
-          <a:bodyPr wrap="square" rtlCol="0" anchor="ctr"/>
-          <a:lstStyle/>
-          <a:p>
-            <a:pPr algn="ctr" indent="0" marL="0">
-              <a:buNone/>
-            </a:pPr>
-            <a:r>
-              <a:rPr lang="en-US" sz="1300" b="1" dirty="0">
-                <a:solidFill>
-                  <a:srgbClr val="FFFFFF"/>
-                </a:solidFill>
-                <a:latin typeface="Arial" pitchFamily="34" charset="0"/>
-                <a:ea typeface="Arial" pitchFamily="34" charset="-122"/>
-                <a:cs typeface="Arial" pitchFamily="34" charset="-120"/>
-              </a:rPr>
-              <a:t>Textract</a:t>
-            </a:r>
-            <a:endParaRPr lang="en-US" sz="1300" dirty="0"/>
-          </a:p>
-        </p:txBody>
-      </p:sp>
-      <p:sp>
-        <p:nvSpPr>
-          <p:cNvPr id="18" name="Text 16"/>
-          <p:cNvSpPr/>
-          <p:nvPr/>
-        </p:nvSpPr>
-        <p:spPr>
-          <a:xfrm>
-            <a:off x="3337560" y="2560320"/>
-            <a:ext cx="2743200" cy="274320"/>
-          </a:xfrm>
-          <a:prstGeom prst="rect">
-            <a:avLst/>
-          </a:prstGeom>
-          <a:noFill/>
-          <a:ln/>
-        </p:spPr>
-        <p:txBody>
-          <a:bodyPr wrap="square" rtlCol="0" anchor="ctr"/>
-          <a:lstStyle/>
-          <a:p>
-            <a:pPr algn="ctr" indent="0" marL="0">
-              <a:buNone/>
+          <a:p>
+            <a:pPr>
+              <a:spcBef>
+                <a:spcPts val="600"/>
+              </a:spcBef>
             </a:pPr>
             <a:r>
               <a:rPr lang="en-US" sz="1100" dirty="0">
                 <a:solidFill>
-                  <a:srgbClr val="FFFFFF"/>
-                </a:solidFill>
-                <a:latin typeface="Arial" pitchFamily="34" charset="0"/>
-                <a:ea typeface="Arial" pitchFamily="34" charset="-122"/>
-                <a:cs typeface="Arial" pitchFamily="34" charset="-120"/>
-              </a:rPr>
-              <a:t>OCR Extraction</a:t>
+                  <a:srgbClr val="1E293B"/>
+                </a:solidFill>
+                <a:latin typeface="Arial" pitchFamily="34" charset="0"/>
+                <a:ea typeface="Arial" pitchFamily="34" charset="-122"/>
+                <a:cs typeface="Arial" pitchFamily="34" charset="-120"/>
+              </a:rPr>
+              <a:t>Pricing Grid - SOFR spreads, ABR spreads, tiers</a:t>
             </a:r>
             <a:endParaRPr lang="en-US" sz="1100" dirty="0"/>
           </a:p>
-        </p:txBody>
-      </p:sp>
-      <p:sp>
-        <p:nvSpPr>
-          <p:cNvPr id="19" name="Shape 17"/>
-          <p:cNvSpPr/>
-          <p:nvPr/>
-        </p:nvSpPr>
-        <p:spPr>
-          <a:xfrm>
-            <a:off x="6217920" y="2103120"/>
-            <a:ext cx="2743200" cy="868680"/>
-          </a:xfrm>
-          <a:prstGeom prst="roundRect">
-            <a:avLst>
-              <a:gd name="adj" fmla="val 8421"/>
-            </a:avLst>
-          </a:prstGeom>
-          <a:solidFill>
-            <a:srgbClr val="FF9900"/>
-          </a:solidFill>
-          <a:ln/>
-        </p:spPr>
-      </p:sp>
-      <p:sp>
-        <p:nvSpPr>
-          <p:cNvPr id="20" name="Text 18"/>
-          <p:cNvSpPr/>
-          <p:nvPr/>
-        </p:nvSpPr>
-        <p:spPr>
-          <a:xfrm>
-            <a:off x="6217920" y="2240280"/>
-            <a:ext cx="2743200" cy="320040"/>
-          </a:xfrm>
-          <a:prstGeom prst="rect">
-            <a:avLst/>
-          </a:prstGeom>
-          <a:noFill/>
-          <a:ln/>
-        </p:spPr>
-        <p:txBody>
-          <a:bodyPr wrap="square" rtlCol="0" anchor="ctr"/>
-          <a:lstStyle/>
-          <a:p>
-            <a:pPr algn="ctr" indent="0" marL="0">
-              <a:buNone/>
-            </a:pPr>
-            <a:r>
-              <a:rPr lang="en-US" sz="1300" b="1" dirty="0">
-                <a:solidFill>
-                  <a:srgbClr val="FFFFFF"/>
-                </a:solidFill>
-                <a:latin typeface="Arial" pitchFamily="34" charset="0"/>
-                <a:ea typeface="Arial" pitchFamily="34" charset="-122"/>
-                <a:cs typeface="Arial" pitchFamily="34" charset="-120"/>
-              </a:rPr>
-              <a:t>DynamoDB + S3</a:t>
-            </a:r>
-            <a:endParaRPr lang="en-US" sz="1300" dirty="0"/>
-          </a:p>
-        </p:txBody>
-      </p:sp>
-      <p:sp>
-        <p:nvSpPr>
-          <p:cNvPr id="21" name="Text 19"/>
-          <p:cNvSpPr/>
-          <p:nvPr/>
-        </p:nvSpPr>
-        <p:spPr>
-          <a:xfrm>
-            <a:off x="6217920" y="2560320"/>
-            <a:ext cx="2743200" cy="274320"/>
-          </a:xfrm>
-          <a:prstGeom prst="rect">
-            <a:avLst/>
-          </a:prstGeom>
-          <a:noFill/>
-          <a:ln/>
-        </p:spPr>
-        <p:txBody>
-          <a:bodyPr wrap="square" rtlCol="0" anchor="ctr"/>
-          <a:lstStyle/>
-          <a:p>
-            <a:pPr algn="ctr" indent="0" marL="0">
-              <a:buNone/>
+          <a:p>
+            <a:pPr>
+              <a:spcBef>
+                <a:spcPts val="600"/>
+              </a:spcBef>
             </a:pPr>
             <a:r>
               <a:rPr lang="en-US" sz="1100" dirty="0">
                 <a:solidFill>
-                  <a:srgbClr val="FFFFFF"/>
-                </a:solidFill>
-                <a:latin typeface="Arial" pitchFamily="34" charset="0"/>
-                <a:ea typeface="Arial" pitchFamily="34" charset="-122"/>
-                <a:cs typeface="Arial" pitchFamily="34" charset="-120"/>
-              </a:rPr>
-              <a:t>Data Storage</a:t>
+                  <a:srgbClr val="1E293B"/>
+                </a:solidFill>
+                <a:latin typeface="Arial" pitchFamily="34" charset="0"/>
+                <a:ea typeface="Arial" pitchFamily="34" charset="-122"/>
+                <a:cs typeface="Arial" pitchFamily="34" charset="-120"/>
+              </a:rPr>
+              <a:t>Lender Commitments - Per-lender allocations</a:t>
             </a:r>
             <a:endParaRPr lang="en-US" sz="1100" dirty="0"/>
           </a:p>
-        </p:txBody>
-      </p:sp>
-      <p:sp>
-        <p:nvSpPr>
-          <p:cNvPr id="22" name="Shape 20"/>
-          <p:cNvSpPr/>
-          <p:nvPr/>
-        </p:nvSpPr>
-        <p:spPr>
-          <a:xfrm>
-            <a:off x="1371600" y="3291840"/>
-            <a:ext cx="6400800" cy="1645920"/>
-          </a:xfrm>
-          <a:prstGeom prst="roundRect">
-            <a:avLst>
-              <a:gd name="adj" fmla="val 8333"/>
-            </a:avLst>
-          </a:prstGeom>
-          <a:solidFill>
-            <a:srgbClr val="FFFFFF"/>
-          </a:solidFill>
-          <a:ln/>
-        </p:spPr>
-      </p:sp>
-      <p:sp>
-        <p:nvSpPr>
-          <p:cNvPr id="23" name="Text 21"/>
-          <p:cNvSpPr/>
-          <p:nvPr/>
-        </p:nvSpPr>
-        <p:spPr>
-          <a:xfrm>
-            <a:off x="1371600" y="3429000"/>
-            <a:ext cx="6400800" cy="365760"/>
-          </a:xfrm>
-          <a:prstGeom prst="rect">
-            <a:avLst/>
-          </a:prstGeom>
-          <a:noFill/>
-          <a:ln/>
-        </p:spPr>
-        <p:txBody>
-          <a:bodyPr wrap="square" rtlCol="0" anchor="ctr"/>
-          <a:lstStyle/>
-          <a:p>
-            <a:pPr algn="ctr" indent="0" marL="0">
-              <a:buNone/>
-            </a:pPr>
-            <a:r>
-              <a:rPr lang="en-US" sz="2200" b="1" dirty="0">
-                <a:solidFill>
-                  <a:srgbClr val="FF9900"/>
-                </a:solidFill>
-                <a:latin typeface="Arial" pitchFamily="34" charset="0"/>
-                <a:ea typeface="Arial" pitchFamily="34" charset="-122"/>
-                <a:cs typeface="Arial" pitchFamily="34" charset="-120"/>
-              </a:rPr>
-              <a:t>Get Started</a:t>
-            </a:r>
-            <a:endParaRPr lang="en-US" sz="2200" dirty="0"/>
-          </a:p>
-        </p:txBody>
-      </p:sp>
-      <p:sp>
-        <p:nvSpPr>
-          <p:cNvPr id="24" name="Text 22"/>
-          <p:cNvSpPr/>
-          <p:nvPr/>
-        </p:nvSpPr>
-        <p:spPr>
-          <a:xfrm>
-            <a:off x="1371600" y="3840480"/>
-            <a:ext cx="6400800" cy="320040"/>
-          </a:xfrm>
-          <a:prstGeom prst="rect">
-            <a:avLst/>
-          </a:prstGeom>
-          <a:noFill/>
-          <a:ln/>
-        </p:spPr>
-        <p:txBody>
-          <a:bodyPr wrap="square" rtlCol="0" anchor="ctr"/>
-          <a:lstStyle/>
-          <a:p>
-            <a:pPr algn="ctr" indent="0" marL="0">
-              <a:buNone/>
-            </a:pPr>
-            <a:r>
-              <a:rPr lang="en-US" sz="1400" b="1" dirty="0">
+          <a:p>
+            <a:pPr>
+              <a:spcBef>
+                <a:spcPts val="600"/>
+              </a:spcBef>
+            </a:pPr>
+            <a:r>
+              <a:rPr lang="en-US" sz="1100" dirty="0">
                 <a:solidFill>
                   <a:srgbClr val="1E293B"/>
                 </a:solidFill>
@@ -9723,115 +10341,9 @@
                 <a:ea typeface="Arial" pitchFamily="34" charset="-122"/>
                 <a:cs typeface="Arial" pitchFamily="34" charset="-120"/>
               </a:rPr>
-              <a:t>GitHub: </a:t>
-            </a:r>
-            <a:pPr algn="ctr" indent="0" marL="0">
-              <a:buNone/>
-            </a:pPr>
-            <a:r>
-              <a:rPr lang="en-US" sz="1400" dirty="0">
-                <a:solidFill>
-                  <a:srgbClr val="1E293B"/>
-                </a:solidFill>
-                <a:latin typeface="Arial" pitchFamily="34" charset="0"/>
-                <a:ea typeface="Arial" pitchFamily="34" charset="-122"/>
-                <a:cs typeface="Arial" pitchFamily="34" charset="-120"/>
-              </a:rPr>
-              <a:t>github.com/vibhupb/financial-documents-processing</a:t>
-            </a:r>
-            <a:endParaRPr lang="en-US" sz="1400" dirty="0"/>
-          </a:p>
-        </p:txBody>
-      </p:sp>
-      <p:sp>
-        <p:nvSpPr>
-          <p:cNvPr id="25" name="Text 23"/>
-          <p:cNvSpPr/>
-          <p:nvPr/>
-        </p:nvSpPr>
-        <p:spPr>
-          <a:xfrm>
-            <a:off x="1371600" y="4206240"/>
-            <a:ext cx="6400800" cy="320040"/>
-          </a:xfrm>
-          <a:prstGeom prst="rect">
-            <a:avLst/>
-          </a:prstGeom>
-          <a:noFill/>
-          <a:ln/>
-        </p:spPr>
-        <p:txBody>
-          <a:bodyPr wrap="square" rtlCol="0" anchor="ctr"/>
-          <a:lstStyle/>
-          <a:p>
-            <a:pPr algn="ctr" indent="0" marL="0">
-              <a:buNone/>
-            </a:pPr>
-            <a:r>
-              <a:rPr lang="en-US" sz="1400" b="1" dirty="0">
-                <a:solidFill>
-                  <a:srgbClr val="1E293B"/>
-                </a:solidFill>
-                <a:latin typeface="Arial" pitchFamily="34" charset="0"/>
-                <a:ea typeface="Arial" pitchFamily="34" charset="-122"/>
-                <a:cs typeface="Arial" pitchFamily="34" charset="-120"/>
-              </a:rPr>
-              <a:t>Deploy: </a:t>
-            </a:r>
-            <a:pPr algn="ctr" indent="0" marL="0">
-              <a:buNone/>
-            </a:pPr>
-            <a:r>
-              <a:rPr lang="en-US" sz="1400" dirty="0">
-                <a:solidFill>
-                  <a:srgbClr val="1E293B"/>
-                </a:solidFill>
-                <a:latin typeface="Arial" pitchFamily="34" charset="0"/>
-                <a:ea typeface="Arial" pitchFamily="34" charset="-122"/>
-                <a:cs typeface="Arial" pitchFamily="34" charset="-120"/>
-              </a:rPr>
-              <a:t>npm install &amp;&amp; cdk deploy --all</a:t>
-            </a:r>
-            <a:endParaRPr lang="en-US" sz="1400" dirty="0"/>
-          </a:p>
-        </p:txBody>
-      </p:sp>
-      <p:sp>
-        <p:nvSpPr>
-          <p:cNvPr id="26" name="Text 24"/>
-          <p:cNvSpPr/>
-          <p:nvPr/>
-        </p:nvSpPr>
-        <p:spPr>
-          <a:xfrm>
-            <a:off x="1371600" y="4663440"/>
-            <a:ext cx="6400800" cy="274320"/>
-          </a:xfrm>
-          <a:prstGeom prst="rect">
-            <a:avLst/>
-          </a:prstGeom>
-          <a:noFill/>
-          <a:ln/>
-        </p:spPr>
-        <p:txBody>
-          <a:bodyPr wrap="square" rtlCol="0" anchor="ctr"/>
-          <a:lstStyle/>
-          <a:p>
-            <a:pPr algn="ctr" indent="0" marL="0">
-              <a:buNone/>
-            </a:pPr>
-            <a:r>
-              <a:rPr lang="en-US" sz="1200" b="1" dirty="0">
-                <a:solidFill>
-                  <a:srgbClr val="22C55E"/>
-                </a:solidFill>
-                <a:latin typeface="Arial" pitchFamily="34" charset="0"/>
-                <a:ea typeface="Arial" pitchFamily="34" charset="-122"/>
-                <a:cs typeface="Arial" pitchFamily="34" charset="-120"/>
-              </a:rPr>
-              <a:t>~$0.34/doc  |  92.5% savings  |  Production ready</a:t>
-            </a:r>
-            <a:endParaRPr lang="en-US" sz="1200" dirty="0"/>
+              <a:t>Covenants - Financial ratios, requirements</a:t>
+            </a:r>
+            <a:endParaRPr lang="en-US" sz="1100" dirty="0"/>
           </a:p>
         </p:txBody>
       </p:sp>

</xml_diff>

<commit_message>
feat: Add intelligent text quality detection for hybrid OCR extraction
- Router: Detect garbled text (glyph indices) and identify low-quality pages
- Extractor: Hybrid PyPDF/Textract extraction based on page quality
- Normalizer: Enhanced loan agreement prompts with comprehensive field extraction
- CDK: Pass lowQualityPages through Step Functions to extractor
- Frontend: Add loan agreement UI components and type definitions
- Docs: Update presentation with latest architecture

This replaces the hardcoded "first 10 pages" approach with intelligent
per-page text quality analysis. Pages with font encoding issues (glyph
indices like /0 /1 /2) are automatically routed to Textract OCR while
readable pages use fast PyPDF extraction.

Tested with MCS Contracting document (19 pages, 11 low-quality pages)
- Successfully extracts rate type, index rate, collateral, fees, etc.

Co-Authored-By: Claude <noreply@anthropic.com>
</commit_message>
<xml_diff>
--- a/docs/Financial-Documents-Processing-Router-Pattern.pptx
+++ b/docs/Financial-Documents-Processing-Router-Pattern.pptx
@@ -4,6 +4,9 @@
   <p:sldMasterIdLst>
     <p:sldMasterId id="2147483648" r:id="rId1"/>
   </p:sldMasterIdLst>
+  <p:notesMasterIdLst>
+    <p:notesMasterId r:id="rId12"/>
+  </p:notesMasterIdLst>
   <p:sldIdLst>
     <p:sldId id="256" r:id="rId2"/>
     <p:sldId id="257" r:id="rId3"/>
@@ -16,10 +19,7 @@
     <p:sldId id="264" r:id="rId10"/>
     <p:sldId id="265" r:id="rId11"/>
   </p:sldIdLst>
-  <p:notesMasterIdLst>
-    <p:notesMasterId r:id="rId12"/>
-  </p:notesMasterIdLst>
-  <p:sldSz cx="9144000" cy="5143500"/>
+  <p:sldSz cx="9144000" cy="5143500" type="screen16x9"/>
   <p:notesSz cx="5143500" cy="9144000"/>
   <p:defaultTextStyle>
     <a:lvl1pPr marL="0" algn="l" defTabSz="914400" rtl="0" eaLnBrk="1" latinLnBrk="0" hangingPunct="1">
@@ -113,13 +113,20 @@
       </a:defRPr>
     </a:lvl9pPr>
   </p:defaultTextStyle>
+  <p:extLst>
+    <p:ext uri="{EFAFB233-063F-42B5-8137-9DF3F51BA10A}">
+      <p15:sldGuideLst xmlns:p15="http://schemas.microsoft.com/office/powerpoint/2012/main"/>
+    </p:ext>
+  </p:extLst>
 </p:presentation>
 </file>
 
 <file path=ppt/charts/chart1.xml><?xml version="1.0" encoding="utf-8"?>
-<c:chartSpace xmlns:c="http://schemas.openxmlformats.org/drawingml/2006/chart" xmlns:a="http://schemas.openxmlformats.org/drawingml/2006/main" xmlns:r="http://schemas.openxmlformats.org/officeDocument/2006/relationships">
+<c:chartSpace xmlns:c="http://schemas.openxmlformats.org/drawingml/2006/chart" xmlns:a="http://schemas.openxmlformats.org/drawingml/2006/main" xmlns:r="http://schemas.openxmlformats.org/officeDocument/2006/relationships" xmlns:c16r2="http://schemas.microsoft.com/office/drawing/2015/06/chart">
   <c:date1904 val="0"/>
+  <c:lang val="en-US"/>
   <c:roundedCorners val="1"/>
+  <c:style val="2"/>
   <c:chart>
     <c:autoTitleDeleted val="1"/>
     <c:plotArea>
@@ -151,18 +158,26 @@
           <c:invertIfNegative val="0"/>
           <c:dLbls>
             <c:numFmt formatCode="#,##0" sourceLinked="0"/>
+            <c:spPr>
+              <a:noFill/>
+              <a:ln>
+                <a:noFill/>
+              </a:ln>
+              <a:effectLst/>
+            </c:spPr>
             <c:txPr>
               <a:bodyPr/>
               <a:lstStyle/>
               <a:p>
                 <a:pPr>
-                  <a:defRPr b="0" i="0" strike="noStrike" sz="1000" u="none">
+                  <a:defRPr sz="1000" b="0" i="0" u="none" strike="noStrike">
                     <a:solidFill>
                       <a:srgbClr val="000000"/>
                     </a:solidFill>
                     <a:latin typeface="Arial"/>
                   </a:defRPr>
                 </a:pPr>
+                <a:endParaRPr lang="en-US"/>
               </a:p>
             </c:txPr>
             <c:showLegendKey val="0"/>
@@ -172,25 +187,28 @@
             <c:showPercent val="0"/>
             <c:showBubbleSize val="0"/>
             <c:showLeaderLines val="0"/>
+            <c:extLst>
+              <c:ext xmlns:c15="http://schemas.microsoft.com/office/drawing/2012/chart" uri="{CE6537A1-D6FC-4f65-9D91-7224C49458BB}">
+                <c15:showLeaderLines val="0"/>
+              </c:ext>
+            </c:extLst>
           </c:dLbls>
           <c:cat>
-            <c:multiLvlStrRef>
+            <c:strRef>
               <c:f>Sheet1!$A$2:$A$4</c:f>
-              <c:multiLvlStrCache>
+              <c:strCache>
                 <c:ptCount val="3"/>
-                <c:lvl>
-                  <c:pt idx="0">
-                    <c:v>Router (Haiku)</c:v>
-                  </c:pt>
-                  <c:pt idx="1">
-                    <c:v>Extractor (Textract)</c:v>
-                  </c:pt>
-                  <c:pt idx="2">
-                    <c:v>Normalizer (Haiku)</c:v>
-                  </c:pt>
-                </c:lvl>
-              </c:multiLvlStrCache>
-            </c:multiLvlStrRef>
+                <c:pt idx="0">
+                  <c:v>Router (Haiku)</c:v>
+                </c:pt>
+                <c:pt idx="1">
+                  <c:v>Extractor (Textract)</c:v>
+                </c:pt>
+                <c:pt idx="2">
+                  <c:v>Normalizer (Haiku)</c:v>
+                </c:pt>
+              </c:strCache>
+            </c:strRef>
           </c:cat>
           <c:val>
             <c:numRef>
@@ -199,7 +217,7 @@
                 <c:formatCode>General</c:formatCode>
                 <c:ptCount val="3"/>
                 <c:pt idx="0">
-                  <c:v>0.006</c:v>
+                  <c:v>6.0000000000000001E-3</c:v>
                 </c:pt>
                 <c:pt idx="1">
                   <c:v>0.3</c:v>
@@ -210,36 +228,23 @@
               </c:numCache>
             </c:numRef>
           </c:val>
+          <c:extLst>
+            <c:ext xmlns:c16="http://schemas.microsoft.com/office/drawing/2014/chart" uri="{C3380CC4-5D6E-409C-BE32-E72D297353CC}">
+              <c16:uniqueId val="{00000000-47B0-C94A-A3AA-7E099830480C}"/>
+            </c:ext>
+          </c:extLst>
         </c:ser>
         <c:dLbls>
-          <c:numFmt formatCode="#,##0" sourceLinked="0"/>
-          <c:txPr>
-            <a:bodyPr/>
-            <a:lstStyle/>
-            <a:p>
-              <a:pPr>
-                <a:defRPr b="0" i="0" strike="noStrike" sz="1000" u="none">
-                  <a:solidFill>
-                    <a:srgbClr val="000000"/>
-                  </a:solidFill>
-                  <a:latin typeface="Arial"/>
-                </a:defRPr>
-              </a:pPr>
-            </a:p>
-          </c:txPr>
           <c:showLegendKey val="0"/>
           <c:showVal val="1"/>
           <c:showCatName val="0"/>
           <c:showSerName val="0"/>
           <c:showPercent val="0"/>
           <c:showBubbleSize val="0"/>
-          <c:showLeaderLines val="0"/>
         </c:dLbls>
         <c:gapWidth val="150"/>
-        <c:overlap val="0"/>
         <c:axId val="2094734554"/>
         <c:axId val="2094734552"/>
-        <c:axId val="2094734556"/>
       </c:barChart>
       <c:catAx>
         <c:axId val="2094734554"/>
@@ -280,6 +285,7 @@
         <c:crosses val="autoZero"/>
         <c:auto val="1"/>
         <c:lblAlgn val="ctr"/>
+        <c:lblOffset val="100"/>
         <c:noMultiLvlLbl val="1"/>
       </c:catAx>
       <c:valAx>
@@ -316,7 +322,7 @@
                   </a:defRPr>
                 </a:pPr>
                 <a:r>
-                  <a:rPr b="0" i="0" u="none" strike="noStrike">
+                  <a:rPr lang="en-US" b="0" i="0" u="none" strike="noStrike">
                     <a:solidFill>
                       <a:srgbClr val="000000"/>
                     </a:solidFill>
@@ -327,7 +333,6 @@
               </a:p>
             </c:rich>
           </c:tx>
-          <c:layout/>
           <c:overlay val="0"/>
         </c:title>
         <c:numFmt formatCode="General" sourceLinked="0"/>
@@ -372,6 +377,7 @@
     </c:plotArea>
     <c:plotVisOnly val="1"/>
     <c:dispBlanksAs val="span"/>
+    <c:showDLblsOverMax val="1"/>
   </c:chart>
   <c:spPr>
     <a:noFill/>
@@ -387,9 +393,11 @@
 </file>
 
 <file path=ppt/charts/chart2.xml><?xml version="1.0" encoding="utf-8"?>
-<c:chartSpace xmlns:c="http://schemas.openxmlformats.org/drawingml/2006/chart" xmlns:a="http://schemas.openxmlformats.org/drawingml/2006/main" xmlns:r="http://schemas.openxmlformats.org/officeDocument/2006/relationships">
+<c:chartSpace xmlns:c="http://schemas.openxmlformats.org/drawingml/2006/chart" xmlns:a="http://schemas.openxmlformats.org/drawingml/2006/main" xmlns:r="http://schemas.openxmlformats.org/officeDocument/2006/relationships" xmlns:c16r2="http://schemas.microsoft.com/office/drawing/2015/06/chart">
   <c:date1904 val="0"/>
+  <c:lang val="en-US"/>
   <c:roundedCorners val="1"/>
+  <c:style val="2"/>
   <c:chart>
     <c:autoTitleDeleted val="1"/>
     <c:plotArea>
@@ -432,6 +440,11 @@
               </a:solidFill>
               <a:effectLst/>
             </c:spPr>
+            <c:extLst>
+              <c:ext xmlns:c16="http://schemas.microsoft.com/office/drawing/2014/chart" uri="{C3380CC4-5D6E-409C-BE32-E72D297353CC}">
+                <c16:uniqueId val="{00000001-7A42-4F4B-8FF6-0B711BC882C3}"/>
+              </c:ext>
+            </c:extLst>
           </c:dPt>
           <c:dPt>
             <c:idx val="1"/>
@@ -442,6 +455,11 @@
               </a:solidFill>
               <a:effectLst/>
             </c:spPr>
+            <c:extLst>
+              <c:ext xmlns:c16="http://schemas.microsoft.com/office/drawing/2014/chart" uri="{C3380CC4-5D6E-409C-BE32-E72D297353CC}">
+                <c16:uniqueId val="{00000003-7A42-4F4B-8FF6-0B711BC882C3}"/>
+              </c:ext>
+            </c:extLst>
           </c:dPt>
           <c:dPt>
             <c:idx val="2"/>
@@ -452,6 +470,11 @@
               </a:solidFill>
               <a:effectLst/>
             </c:spPr>
+            <c:extLst>
+              <c:ext xmlns:c16="http://schemas.microsoft.com/office/drawing/2014/chart" uri="{C3380CC4-5D6E-409C-BE32-E72D297353CC}">
+                <c16:uniqueId val="{00000005-7A42-4F4B-8FF6-0B711BC882C3}"/>
+              </c:ext>
+            </c:extLst>
           </c:dPt>
           <c:dLbls>
             <c:dLbl>
@@ -470,6 +493,7 @@
                       <a:latin typeface="Arial"/>
                     </a:defRPr>
                   </a:pPr>
+                  <a:endParaRPr lang="en-US"/>
                 </a:p>
               </c:txPr>
               <c:showLegendKey val="0"/>
@@ -478,6 +502,12 @@
               <c:showSerName val="0"/>
               <c:showPercent val="1"/>
               <c:showBubbleSize val="0"/>
+              <c:extLst>
+                <c:ext xmlns:c15="http://schemas.microsoft.com/office/drawing/2012/chart" uri="{CE6537A1-D6FC-4f65-9D91-7224C49458BB}"/>
+                <c:ext xmlns:c16="http://schemas.microsoft.com/office/drawing/2014/chart" uri="{C3380CC4-5D6E-409C-BE32-E72D297353CC}">
+                  <c16:uniqueId val="{00000001-7A42-4F4B-8FF6-0B711BC882C3}"/>
+                </c:ext>
+              </c:extLst>
             </c:dLbl>
             <c:dLbl>
               <c:idx val="1"/>
@@ -495,6 +525,7 @@
                       <a:latin typeface="Arial"/>
                     </a:defRPr>
                   </a:pPr>
+                  <a:endParaRPr lang="en-US"/>
                 </a:p>
               </c:txPr>
               <c:showLegendKey val="0"/>
@@ -503,6 +534,12 @@
               <c:showSerName val="0"/>
               <c:showPercent val="1"/>
               <c:showBubbleSize val="0"/>
+              <c:extLst>
+                <c:ext xmlns:c15="http://schemas.microsoft.com/office/drawing/2012/chart" uri="{CE6537A1-D6FC-4f65-9D91-7224C49458BB}"/>
+                <c:ext xmlns:c16="http://schemas.microsoft.com/office/drawing/2014/chart" uri="{C3380CC4-5D6E-409C-BE32-E72D297353CC}">
+                  <c16:uniqueId val="{00000003-7A42-4F4B-8FF6-0B711BC882C3}"/>
+                </c:ext>
+              </c:extLst>
             </c:dLbl>
             <c:dLbl>
               <c:idx val="2"/>
@@ -520,6 +557,7 @@
                       <a:latin typeface="Arial"/>
                     </a:defRPr>
                   </a:pPr>
+                  <a:endParaRPr lang="en-US"/>
                 </a:p>
               </c:txPr>
               <c:showLegendKey val="0"/>
@@ -528,8 +566,21 @@
               <c:showSerName val="0"/>
               <c:showPercent val="1"/>
               <c:showBubbleSize val="0"/>
+              <c:extLst>
+                <c:ext xmlns:c15="http://schemas.microsoft.com/office/drawing/2012/chart" uri="{CE6537A1-D6FC-4f65-9D91-7224C49458BB}"/>
+                <c:ext xmlns:c16="http://schemas.microsoft.com/office/drawing/2014/chart" uri="{C3380CC4-5D6E-409C-BE32-E72D297353CC}">
+                  <c16:uniqueId val="{00000005-7A42-4F4B-8FF6-0B711BC882C3}"/>
+                </c:ext>
+              </c:extLst>
             </c:dLbl>
             <c:numFmt formatCode="0%" sourceLinked="0"/>
+            <c:spPr>
+              <a:noFill/>
+              <a:ln>
+                <a:noFill/>
+              </a:ln>
+              <a:effectLst/>
+            </c:spPr>
             <c:txPr>
               <a:bodyPr/>
               <a:lstStyle/>
@@ -542,6 +593,7 @@
                     <a:latin typeface="Arial"/>
                   </a:defRPr>
                 </a:pPr>
+                <a:endParaRPr lang="en-US"/>
               </a:p>
             </c:txPr>
             <c:dLblPos val="ctr"/>
@@ -552,6 +604,9 @@
             <c:showPercent val="1"/>
             <c:showBubbleSize val="0"/>
             <c:showLeaderLines val="0"/>
+            <c:extLst>
+              <c:ext xmlns:c15="http://schemas.microsoft.com/office/drawing/2012/chart" uri="{CE6537A1-D6FC-4f65-9D91-7224C49458BB}"/>
+            </c:extLst>
           </c:dLbls>
           <c:cat>
             <c:strRef>
@@ -574,6 +629,7 @@
             <c:numRef>
               <c:f>Sheet1!$B$2:$B$4</c:f>
               <c:numCache>
+                <c:formatCode>General</c:formatCode>
                 <c:ptCount val="3"/>
                 <c:pt idx="0">
                   <c:v>0.3</c:v>
@@ -582,12 +638,26 @@
                   <c:v>0.03</c:v>
                 </c:pt>
                 <c:pt idx="2">
-                  <c:v>0.006</c:v>
+                  <c:v>6.0000000000000001E-3</c:v>
                 </c:pt>
               </c:numCache>
             </c:numRef>
           </c:val>
+          <c:extLst>
+            <c:ext xmlns:c16="http://schemas.microsoft.com/office/drawing/2014/chart" uri="{C3380CC4-5D6E-409C-BE32-E72D297353CC}">
+              <c16:uniqueId val="{00000006-7A42-4F4B-8FF6-0B711BC882C3}"/>
+            </c:ext>
+          </c:extLst>
         </c:ser>
+        <c:dLbls>
+          <c:showLegendKey val="0"/>
+          <c:showVal val="0"/>
+          <c:showCatName val="0"/>
+          <c:showSerName val="0"/>
+          <c:showPercent val="0"/>
+          <c:showBubbleSize val="0"/>
+          <c:showLeaderLines val="0"/>
+        </c:dLbls>
         <c:firstSliceAng val="0"/>
       </c:pieChart>
       <c:spPr>
@@ -604,6 +674,7 @@
     </c:legend>
     <c:plotVisOnly val="1"/>
     <c:dispBlanksAs val="span"/>
+    <c:showDLblsOverMax val="1"/>
   </c:chart>
   <c:spPr>
     <a:noFill/>
@@ -640,234 +711,10 @@
           <a:chExt cx="0" cy="0"/>
         </a:xfrm>
       </p:grpSpPr>
-      <p:sp>
-        <p:nvSpPr>
-          <p:cNvPr id="2" name="Header Placeholder 1"/>
-          <p:cNvSpPr>
-            <a:spLocks noGrp="1"/>
-          </p:cNvSpPr>
-          <p:nvPr>
-            <p:ph type="hdr" sz="quarter"/>
-          </p:nvPr>
-        </p:nvSpPr>
-        <p:spPr>
-          <a:xfrm>
-            <a:off x="0" y="0"/>
-            <a:ext cx="2971800" cy="458788"/>
-          </a:xfrm>
-          <a:prstGeom prst="rect">
-            <a:avLst/>
-          </a:prstGeom>
-        </p:spPr>
-        <p:txBody>
-          <a:bodyPr vert="horz" lIns="91440" tIns="45720" rIns="91440" bIns="45720" rtlCol="0"/>
-          <a:lstStyle>
-            <a:lvl1pPr algn="l">
-              <a:defRPr sz="1200"/>
-            </a:lvl1pPr>
-          </a:lstStyle>
-          <a:p>
-            <a:endParaRPr lang="en-US"/>
-          </a:p>
-        </p:txBody>
-      </p:sp>
-      <p:sp>
-        <p:nvSpPr>
-          <p:cNvPr id="3" name="Date Placeholder 2"/>
-          <p:cNvSpPr>
-            <a:spLocks noGrp="1"/>
-          </p:cNvSpPr>
-          <p:nvPr>
-            <p:ph type="dt" idx="1"/>
-          </p:nvPr>
-        </p:nvSpPr>
-        <p:spPr>
-          <a:xfrm>
-            <a:off x="3884613" y="0"/>
-            <a:ext cx="2971800" cy="458788"/>
-          </a:xfrm>
-          <a:prstGeom prst="rect">
-            <a:avLst/>
-          </a:prstGeom>
-        </p:spPr>
-        <p:txBody>
-          <a:bodyPr vert="horz" lIns="91440" tIns="45720" rIns="91440" bIns="45720" rtlCol="0"/>
-          <a:lstStyle>
-            <a:lvl1pPr algn="r">
-              <a:defRPr sz="1200"/>
-            </a:lvl1pPr>
-          </a:lstStyle>
-          <a:p>
-            <a:fld id="{5282F153-3F37-0F45-9E97-73ACFA13230C}" type="datetimeFigureOut">
-              <a:rPr lang="en-US"/>
-              <a:t>7/23/19</a:t>
-            </a:fld>
-            <a:endParaRPr lang="en-US"/>
-          </a:p>
-        </p:txBody>
-      </p:sp>
-      <p:sp>
-        <p:nvSpPr>
-          <p:cNvPr id="4" name="Slide Image Placeholder 3"/>
-          <p:cNvSpPr>
-            <a:spLocks noGrp="1" noRot="1" noChangeAspect="1"/>
-          </p:cNvSpPr>
-          <p:nvPr>
-            <p:ph type="sldImg" idx="2"/>
-          </p:nvPr>
-        </p:nvSpPr>
-        <p:spPr>
-          <a:xfrm>
-            <a:off x="685800" y="1143000"/>
-            <a:ext cx="5486400" cy="3086100"/>
-          </a:xfrm>
-          <a:prstGeom prst="rect">
-            <a:avLst/>
-          </a:prstGeom>
-          <a:noFill/>
-          <a:ln w="12700">
-            <a:solidFill>
-              <a:prstClr val="black"/>
-            </a:solidFill>
-          </a:ln>
-        </p:spPr>
-        <p:txBody>
-          <a:bodyPr vert="horz" lIns="91440" tIns="45720" rIns="91440" bIns="45720" rtlCol="0" anchor="ctr"/>
-          <a:lstStyle/>
-          <a:p>
-            <a:endParaRPr lang="en-US"/>
-          </a:p>
-        </p:txBody>
-      </p:sp>
-      <p:sp>
-        <p:nvSpPr>
-          <p:cNvPr id="5" name="Notes Placeholder 4"/>
-          <p:cNvSpPr>
-            <a:spLocks noGrp="1"/>
-          </p:cNvSpPr>
-          <p:nvPr>
-            <p:ph type="body" sz="quarter" idx="3"/>
-          </p:nvPr>
-        </p:nvSpPr>
-        <p:spPr>
-          <a:xfrm>
-            <a:off x="685800" y="4400550"/>
-            <a:ext cx="5486400" cy="3600450"/>
-          </a:xfrm>
-          <a:prstGeom prst="rect">
-            <a:avLst/>
-          </a:prstGeom>
-        </p:spPr>
-        <p:txBody>
-          <a:bodyPr vert="horz" lIns="91440" tIns="45720" rIns="91440" bIns="45720" rtlCol="0"/>
-          <a:lstStyle/>
-          <a:p>
-            <a:pPr lvl="0"/>
-            <a:r>
-              <a:rPr lang="en-US"/>
-              <a:t>Click to edit Master text styles</a:t>
-            </a:r>
-          </a:p>
-          <a:p>
-            <a:pPr lvl="1"/>
-            <a:r>
-              <a:rPr lang="en-US"/>
-              <a:t>Second level</a:t>
-            </a:r>
-          </a:p>
-          <a:p>
-            <a:pPr lvl="2"/>
-            <a:r>
-              <a:rPr lang="en-US"/>
-              <a:t>Third level</a:t>
-            </a:r>
-          </a:p>
-          <a:p>
-            <a:pPr lvl="3"/>
-            <a:r>
-              <a:rPr lang="en-US"/>
-              <a:t>Fourth level</a:t>
-            </a:r>
-          </a:p>
-          <a:p>
-            <a:pPr lvl="4"/>
-            <a:r>
-              <a:rPr lang="en-US"/>
-              <a:t>Fifth level</a:t>
-            </a:r>
-          </a:p>
-        </p:txBody>
-      </p:sp>
-      <p:sp>
-        <p:nvSpPr>
-          <p:cNvPr id="6" name="Footer Placeholder 5"/>
-          <p:cNvSpPr>
-            <a:spLocks noGrp="1"/>
-          </p:cNvSpPr>
-          <p:nvPr>
-            <p:ph type="ftr" sz="quarter" idx="4"/>
-          </p:nvPr>
-        </p:nvSpPr>
-        <p:spPr>
-          <a:xfrm>
-            <a:off x="0" y="8685213"/>
-            <a:ext cx="2971800" cy="458787"/>
-          </a:xfrm>
-          <a:prstGeom prst="rect">
-            <a:avLst/>
-          </a:prstGeom>
-        </p:spPr>
-        <p:txBody>
-          <a:bodyPr vert="horz" lIns="91440" tIns="45720" rIns="91440" bIns="45720" rtlCol="0" anchor="b"/>
-          <a:lstStyle>
-            <a:lvl1pPr algn="l">
-              <a:defRPr sz="1200"/>
-            </a:lvl1pPr>
-          </a:lstStyle>
-          <a:p>
-            <a:endParaRPr lang="en-US"/>
-          </a:p>
-        </p:txBody>
-      </p:sp>
-      <p:sp>
-        <p:nvSpPr>
-          <p:cNvPr id="7" name="Slide Number Placeholder 6"/>
-          <p:cNvSpPr>
-            <a:spLocks noGrp="1"/>
-          </p:cNvSpPr>
-          <p:nvPr>
-            <p:ph type="sldNum" sz="quarter" idx="5"/>
-          </p:nvPr>
-        </p:nvSpPr>
-        <p:spPr>
-          <a:xfrm>
-            <a:off x="3884613" y="8685213"/>
-            <a:ext cx="2971800" cy="458787"/>
-          </a:xfrm>
-          <a:prstGeom prst="rect">
-            <a:avLst/>
-          </a:prstGeom>
-        </p:spPr>
-        <p:txBody>
-          <a:bodyPr vert="horz" lIns="91440" tIns="45720" rIns="91440" bIns="45720" rtlCol="0" anchor="b"/>
-          <a:lstStyle>
-            <a:lvl1pPr algn="r">
-              <a:defRPr sz="1200"/>
-            </a:lvl1pPr>
-          </a:lstStyle>
-          <a:p>
-            <a:fld id="{CE5E9CC1-C706-0F49-92D6-E571CC5EEA8F}" type="slidenum">
-              <a:rPr lang="en-US"/>
-              <a:t>‹#›</a:t>
-            </a:fld>
-            <a:endParaRPr lang="en-US"/>
-          </a:p>
-        </p:txBody>
-      </p:sp>
     </p:spTree>
     <p:extLst>
       <p:ext uri="{BB962C8B-B14F-4D97-AF65-F5344CB8AC3E}">
-        <p14:creationId xmlns:p14="http://schemas.microsoft.com/office/powerpoint/2010/main" val="1024086991"/>
+        <p14:creationId xmlns:p14="http://schemas.microsoft.com/office/powerpoint/2010/main" val="1804169446"/>
       </p:ext>
     </p:extLst>
   </p:cSld>
@@ -1011,10 +858,6 @@
           <a:bodyPr/>
           <a:lstStyle/>
           <a:p>
-            <a:r>
-              <a:rPr lang="en-US" dirty="0"/>
-              <a:t/>
-            </a:r>
             <a:endParaRPr lang="en-US" dirty="0"/>
           </a:p>
         </p:txBody>
@@ -1099,10 +942,6 @@
           <a:bodyPr/>
           <a:lstStyle/>
           <a:p>
-            <a:r>
-              <a:rPr lang="en-US" dirty="0"/>
-              <a:t/>
-            </a:r>
             <a:endParaRPr lang="en-US" dirty="0"/>
           </a:p>
         </p:txBody>
@@ -1187,10 +1026,6 @@
           <a:bodyPr/>
           <a:lstStyle/>
           <a:p>
-            <a:r>
-              <a:rPr lang="en-US" dirty="0"/>
-              <a:t/>
-            </a:r>
             <a:endParaRPr lang="en-US" dirty="0"/>
           </a:p>
         </p:txBody>
@@ -1275,10 +1110,6 @@
           <a:bodyPr/>
           <a:lstStyle/>
           <a:p>
-            <a:r>
-              <a:rPr lang="en-US" dirty="0"/>
-              <a:t/>
-            </a:r>
             <a:endParaRPr lang="en-US" dirty="0"/>
           </a:p>
         </p:txBody>
@@ -1363,10 +1194,6 @@
           <a:bodyPr/>
           <a:lstStyle/>
           <a:p>
-            <a:r>
-              <a:rPr lang="en-US" dirty="0"/>
-              <a:t/>
-            </a:r>
             <a:endParaRPr lang="en-US" dirty="0"/>
           </a:p>
         </p:txBody>
@@ -1451,10 +1278,6 @@
           <a:bodyPr/>
           <a:lstStyle/>
           <a:p>
-            <a:r>
-              <a:rPr lang="en-US" dirty="0"/>
-              <a:t/>
-            </a:r>
             <a:endParaRPr lang="en-US" dirty="0"/>
           </a:p>
         </p:txBody>
@@ -1539,10 +1362,6 @@
           <a:bodyPr/>
           <a:lstStyle/>
           <a:p>
-            <a:r>
-              <a:rPr lang="en-US" dirty="0"/>
-              <a:t/>
-            </a:r>
             <a:endParaRPr lang="en-US" dirty="0"/>
           </a:p>
         </p:txBody>
@@ -1627,10 +1446,6 @@
           <a:bodyPr/>
           <a:lstStyle/>
           <a:p>
-            <a:r>
-              <a:rPr lang="en-US" dirty="0"/>
-              <a:t/>
-            </a:r>
             <a:endParaRPr lang="en-US" dirty="0"/>
           </a:p>
         </p:txBody>
@@ -1715,10 +1530,6 @@
           <a:bodyPr/>
           <a:lstStyle/>
           <a:p>
-            <a:r>
-              <a:rPr lang="en-US" dirty="0"/>
-              <a:t/>
-            </a:r>
             <a:endParaRPr lang="en-US" dirty="0"/>
           </a:p>
         </p:txBody>
@@ -1803,10 +1614,6 @@
           <a:bodyPr/>
           <a:lstStyle/>
           <a:p>
-            <a:r>
-              <a:rPr lang="en-US" dirty="0"/>
-              <a:t/>
-            </a:r>
             <a:endParaRPr lang="en-US" dirty="0"/>
           </a:p>
         </p:txBody>
@@ -1880,6 +1687,11 @@
 <file path=ppt/slideMasters/slideMaster1.xml><?xml version="1.0" encoding="utf-8"?>
 <p:sldMaster xmlns:a="http://schemas.openxmlformats.org/drawingml/2006/main" xmlns:r="http://schemas.openxmlformats.org/officeDocument/2006/relationships" xmlns:p="http://schemas.openxmlformats.org/presentationml/2006/main">
   <p:cSld>
+    <p:bg>
+      <p:bgRef idx="1001">
+        <a:schemeClr val="bg1"/>
+      </p:bgRef>
+    </p:bg>
     <p:spTree>
       <p:nvGrpSpPr>
         <p:cNvPr id="1" name=""/>
@@ -2179,8 +1991,8 @@
         </p:nvSpPr>
         <p:spPr>
           <a:xfrm>
-            <a:off x="0" y="0"/>
-            <a:ext cx="9144000" cy="5143500"/>
+            <a:off x="0" y="-330591"/>
+            <a:ext cx="9144000" cy="5474091"/>
           </a:xfrm>
           <a:prstGeom prst="rect">
             <a:avLst/>
@@ -2190,6 +2002,13 @@
           </a:solidFill>
           <a:ln/>
         </p:spPr>
+        <p:txBody>
+          <a:bodyPr/>
+          <a:lstStyle/>
+          <a:p>
+            <a:endParaRPr lang="en-US"/>
+          </a:p>
+        </p:txBody>
       </p:sp>
       <p:sp>
         <p:nvSpPr>
@@ -2210,6 +2029,13 @@
           </a:solidFill>
           <a:ln/>
         </p:spPr>
+        <p:txBody>
+          <a:bodyPr/>
+          <a:lstStyle/>
+          <a:p>
+            <a:endParaRPr lang="en-US"/>
+          </a:p>
+        </p:txBody>
       </p:sp>
       <p:sp>
         <p:nvSpPr>
@@ -2230,6 +2056,13 @@
           </a:solidFill>
           <a:ln/>
         </p:spPr>
+        <p:txBody>
+          <a:bodyPr/>
+          <a:lstStyle/>
+          <a:p>
+            <a:endParaRPr lang="en-US"/>
+          </a:p>
+        </p:txBody>
       </p:sp>
       <p:sp>
         <p:nvSpPr>
@@ -2239,8 +2072,8 @@
         </p:nvSpPr>
         <p:spPr>
           <a:xfrm>
-            <a:off x="457200" y="1645920"/>
-            <a:ext cx="8229600" cy="731520"/>
+            <a:off x="189914" y="203982"/>
+            <a:ext cx="8496886" cy="2173458"/>
           </a:xfrm>
           <a:prstGeom prst="rect">
             <a:avLst/>
@@ -2252,7 +2085,7 @@
           <a:bodyPr wrap="square" rtlCol="0" anchor="ctr"/>
           <a:lstStyle/>
           <a:p>
-            <a:pPr indent="0" marL="0">
+            <a:pPr marL="0" indent="0">
               <a:buNone/>
             </a:pPr>
             <a:r>
@@ -2291,7 +2124,7 @@
           <a:bodyPr wrap="square" rtlCol="0" anchor="ctr"/>
           <a:lstStyle/>
           <a:p>
-            <a:pPr indent="0" marL="0">
+            <a:pPr marL="0" indent="0">
               <a:buNone/>
             </a:pPr>
             <a:r>
@@ -2330,7 +2163,7 @@
           <a:bodyPr wrap="square" rtlCol="0" anchor="ctr"/>
           <a:lstStyle/>
           <a:p>
-            <a:pPr indent="0" marL="0">
+            <a:pPr marL="0" indent="0">
               <a:buNone/>
             </a:pPr>
             <a:r>
@@ -2369,7 +2202,7 @@
           <a:bodyPr wrap="square" rtlCol="0" anchor="ctr"/>
           <a:lstStyle/>
           <a:p>
-            <a:pPr indent="0" marL="0">
+            <a:pPr marL="0" indent="0">
               <a:buNone/>
             </a:pPr>
             <a:r>
@@ -2383,9 +2216,6 @@
               </a:rPr>
               <a:t>92.5% Cost Reduction</a:t>
             </a:r>
-            <a:pPr indent="0" marL="0">
-              <a:buNone/>
-            </a:pPr>
             <a:r>
               <a:rPr lang="en-US" sz="1400" dirty="0">
                 <a:solidFill>
@@ -2395,49 +2225,7 @@
                 <a:ea typeface="Arial" pitchFamily="34" charset="-122"/>
                 <a:cs typeface="Arial" pitchFamily="34" charset="-120"/>
               </a:rPr>
-              <a:t>  |  </a:t>
-            </a:r>
-            <a:pPr indent="0" marL="0">
-              <a:buNone/>
-            </a:pPr>
-            <a:r>
-              <a:rPr lang="en-US" sz="1400" dirty="0">
-                <a:solidFill>
-                  <a:srgbClr val="1E293B"/>
-                </a:solidFill>
-                <a:latin typeface="Arial" pitchFamily="34" charset="0"/>
-                <a:ea typeface="Arial" pitchFamily="34" charset="-122"/>
-                <a:cs typeface="Arial" pitchFamily="34" charset="-120"/>
-              </a:rPr>
-              <a:t>Serverless AWS Architecture</a:t>
-            </a:r>
-            <a:pPr indent="0" marL="0">
-              <a:buNone/>
-            </a:pPr>
-            <a:r>
-              <a:rPr lang="en-US" sz="1400" dirty="0">
-                <a:solidFill>
-                  <a:srgbClr val="1E293B"/>
-                </a:solidFill>
-                <a:latin typeface="Arial" pitchFamily="34" charset="0"/>
-                <a:ea typeface="Arial" pitchFamily="34" charset="-122"/>
-                <a:cs typeface="Arial" pitchFamily="34" charset="-120"/>
-              </a:rPr>
-              <a:t>  |  </a:t>
-            </a:r>
-            <a:pPr indent="0" marL="0">
-              <a:buNone/>
-            </a:pPr>
-            <a:r>
-              <a:rPr lang="en-US" sz="1400" dirty="0">
-                <a:solidFill>
-                  <a:srgbClr val="1E293B"/>
-                </a:solidFill>
-                <a:latin typeface="Arial" pitchFamily="34" charset="0"/>
-                <a:ea typeface="Arial" pitchFamily="34" charset="-122"/>
-                <a:cs typeface="Arial" pitchFamily="34" charset="-120"/>
-              </a:rPr>
-              <a:t>AI-Powered Classification</a:t>
+              <a:t>  |  Serverless AWS Architecture  |  AI-Powered Classification</a:t>
             </a:r>
             <a:endParaRPr lang="en-US" sz="1400" dirty="0"/>
           </a:p>
@@ -2487,6 +2275,13 @@
           </a:solidFill>
           <a:ln/>
         </p:spPr>
+        <p:txBody>
+          <a:bodyPr/>
+          <a:lstStyle/>
+          <a:p>
+            <a:endParaRPr lang="en-US"/>
+          </a:p>
+        </p:txBody>
       </p:sp>
       <p:sp>
         <p:nvSpPr>
@@ -2509,7 +2304,7 @@
           <a:bodyPr wrap="square" rtlCol="0" anchor="ctr"/>
           <a:lstStyle/>
           <a:p>
-            <a:pPr indent="0" marL="0">
+            <a:pPr marL="0" indent="0">
               <a:buNone/>
             </a:pPr>
             <a:r>
@@ -2548,6 +2343,13 @@
           </a:solidFill>
           <a:ln/>
         </p:spPr>
+        <p:txBody>
+          <a:bodyPr/>
+          <a:lstStyle/>
+          <a:p>
+            <a:endParaRPr lang="en-US"/>
+          </a:p>
+        </p:txBody>
       </p:sp>
       <p:sp>
         <p:nvSpPr>
@@ -2570,7 +2372,7 @@
           <a:bodyPr wrap="square" rtlCol="0" anchor="ctr"/>
           <a:lstStyle/>
           <a:p>
-            <a:pPr algn="ctr" indent="0" marL="0">
+            <a:pPr marL="0" indent="0" algn="ctr">
               <a:buNone/>
             </a:pPr>
             <a:r>
@@ -2609,7 +2411,7 @@
           <a:bodyPr wrap="square" rtlCol="0" anchor="ctr"/>
           <a:lstStyle/>
           <a:p>
-            <a:pPr algn="ctr" indent="0" marL="0">
+            <a:pPr marL="0" indent="0" algn="ctr">
               <a:buNone/>
             </a:pPr>
             <a:r>
@@ -2648,6 +2450,13 @@
           </a:solidFill>
           <a:ln/>
         </p:spPr>
+        <p:txBody>
+          <a:bodyPr/>
+          <a:lstStyle/>
+          <a:p>
+            <a:endParaRPr lang="en-US"/>
+          </a:p>
+        </p:txBody>
       </p:sp>
       <p:sp>
         <p:nvSpPr>
@@ -2670,7 +2479,7 @@
           <a:bodyPr wrap="square" rtlCol="0" anchor="ctr"/>
           <a:lstStyle/>
           <a:p>
-            <a:pPr algn="ctr" indent="0" marL="0">
+            <a:pPr marL="0" indent="0" algn="ctr">
               <a:buNone/>
             </a:pPr>
             <a:r>
@@ -2709,7 +2518,7 @@
           <a:bodyPr wrap="square" rtlCol="0" anchor="ctr"/>
           <a:lstStyle/>
           <a:p>
-            <a:pPr algn="ctr" indent="0" marL="0">
+            <a:pPr marL="0" indent="0" algn="ctr">
               <a:buNone/>
             </a:pPr>
             <a:r>
@@ -2748,6 +2557,13 @@
           </a:solidFill>
           <a:ln/>
         </p:spPr>
+        <p:txBody>
+          <a:bodyPr/>
+          <a:lstStyle/>
+          <a:p>
+            <a:endParaRPr lang="en-US"/>
+          </a:p>
+        </p:txBody>
       </p:sp>
       <p:sp>
         <p:nvSpPr>
@@ -2770,7 +2586,7 @@
           <a:bodyPr wrap="square" rtlCol="0" anchor="ctr"/>
           <a:lstStyle/>
           <a:p>
-            <a:pPr algn="ctr" indent="0" marL="0">
+            <a:pPr marL="0" indent="0" algn="ctr">
               <a:buNone/>
             </a:pPr>
             <a:r>
@@ -2809,7 +2625,7 @@
           <a:bodyPr wrap="square" rtlCol="0" anchor="ctr"/>
           <a:lstStyle/>
           <a:p>
-            <a:pPr algn="ctr" indent="0" marL="0">
+            <a:pPr marL="0" indent="0" algn="ctr">
               <a:buNone/>
             </a:pPr>
             <a:r>
@@ -2848,6 +2664,13 @@
           </a:solidFill>
           <a:ln/>
         </p:spPr>
+        <p:txBody>
+          <a:bodyPr/>
+          <a:lstStyle/>
+          <a:p>
+            <a:endParaRPr lang="en-US"/>
+          </a:p>
+        </p:txBody>
       </p:sp>
       <p:sp>
         <p:nvSpPr>
@@ -2870,7 +2693,7 @@
           <a:bodyPr wrap="square" rtlCol="0" anchor="ctr"/>
           <a:lstStyle/>
           <a:p>
-            <a:pPr algn="ctr" indent="0" marL="0">
+            <a:pPr marL="0" indent="0" algn="ctr">
               <a:buNone/>
             </a:pPr>
             <a:r>
@@ -2909,7 +2732,7 @@
           <a:bodyPr wrap="square" rtlCol="0" anchor="ctr"/>
           <a:lstStyle/>
           <a:p>
-            <a:pPr algn="ctr" indent="0" marL="0">
+            <a:pPr marL="0" indent="0" algn="ctr">
               <a:buNone/>
             </a:pPr>
             <a:r>
@@ -2948,6 +2771,13 @@
           </a:solidFill>
           <a:ln/>
         </p:spPr>
+        <p:txBody>
+          <a:bodyPr/>
+          <a:lstStyle/>
+          <a:p>
+            <a:endParaRPr lang="en-US"/>
+          </a:p>
+        </p:txBody>
       </p:sp>
       <p:sp>
         <p:nvSpPr>
@@ -2970,7 +2800,7 @@
           <a:bodyPr wrap="square" rtlCol="0" anchor="ctr"/>
           <a:lstStyle/>
           <a:p>
-            <a:pPr algn="ctr" indent="0" marL="0">
+            <a:pPr marL="0" indent="0" algn="ctr">
               <a:buNone/>
             </a:pPr>
             <a:r>
@@ -3009,7 +2839,7 @@
           <a:bodyPr wrap="square" rtlCol="0" anchor="ctr"/>
           <a:lstStyle/>
           <a:p>
-            <a:pPr algn="ctr" indent="0" marL="0">
+            <a:pPr marL="0" indent="0" algn="ctr">
               <a:buNone/>
             </a:pPr>
             <a:r>
@@ -3048,6 +2878,13 @@
           </a:solidFill>
           <a:ln/>
         </p:spPr>
+        <p:txBody>
+          <a:bodyPr/>
+          <a:lstStyle/>
+          <a:p>
+            <a:endParaRPr lang="en-US"/>
+          </a:p>
+        </p:txBody>
       </p:sp>
       <p:sp>
         <p:nvSpPr>
@@ -3070,7 +2907,7 @@
           <a:bodyPr wrap="square" rtlCol="0" anchor="ctr"/>
           <a:lstStyle/>
           <a:p>
-            <a:pPr algn="ctr" indent="0" marL="0">
+            <a:pPr marL="0" indent="0" algn="ctr">
               <a:buNone/>
             </a:pPr>
             <a:r>
@@ -3109,7 +2946,7 @@
           <a:bodyPr wrap="square" rtlCol="0" anchor="ctr"/>
           <a:lstStyle/>
           <a:p>
-            <a:pPr algn="ctr" indent="0" marL="0">
+            <a:pPr marL="0" indent="0" algn="ctr">
               <a:buNone/>
             </a:pPr>
             <a:r>
@@ -3148,6 +2985,13 @@
           </a:solidFill>
           <a:ln/>
         </p:spPr>
+        <p:txBody>
+          <a:bodyPr/>
+          <a:lstStyle/>
+          <a:p>
+            <a:endParaRPr lang="en-US"/>
+          </a:p>
+        </p:txBody>
       </p:sp>
       <p:sp>
         <p:nvSpPr>
@@ -3170,7 +3014,7 @@
           <a:bodyPr wrap="square" rtlCol="0" anchor="ctr"/>
           <a:lstStyle/>
           <a:p>
-            <a:pPr algn="ctr" indent="0" marL="0">
+            <a:pPr marL="0" indent="0" algn="ctr">
               <a:buNone/>
             </a:pPr>
             <a:r>
@@ -3209,7 +3053,7 @@
           <a:bodyPr wrap="square" rtlCol="0" anchor="ctr"/>
           <a:lstStyle/>
           <a:p>
-            <a:pPr algn="ctr" indent="0" marL="0">
+            <a:pPr marL="0" indent="0" algn="ctr">
               <a:buNone/>
             </a:pPr>
             <a:r>
@@ -3223,9 +3067,6 @@
               </a:rPr>
               <a:t>GitHub: </a:t>
             </a:r>
-            <a:pPr algn="ctr" indent="0" marL="0">
-              <a:buNone/>
-            </a:pPr>
             <a:r>
               <a:rPr lang="en-US" sz="1400" dirty="0">
                 <a:solidFill>
@@ -3262,7 +3103,7 @@
           <a:bodyPr wrap="square" rtlCol="0" anchor="ctr"/>
           <a:lstStyle/>
           <a:p>
-            <a:pPr algn="ctr" indent="0" marL="0">
+            <a:pPr marL="0" indent="0" algn="ctr">
               <a:buNone/>
             </a:pPr>
             <a:r>
@@ -3276,9 +3117,6 @@
               </a:rPr>
               <a:t>Deploy: </a:t>
             </a:r>
-            <a:pPr algn="ctr" indent="0" marL="0">
-              <a:buNone/>
-            </a:pPr>
             <a:r>
               <a:rPr lang="en-US" sz="1400" dirty="0">
                 <a:solidFill>
@@ -3315,7 +3153,7 @@
           <a:bodyPr wrap="square" rtlCol="0" anchor="ctr"/>
           <a:lstStyle/>
           <a:p>
-            <a:pPr algn="ctr" indent="0" marL="0">
+            <a:pPr marL="0" indent="0" algn="ctr">
               <a:buNone/>
             </a:pPr>
             <a:r>
@@ -3377,6 +3215,13 @@
           </a:solidFill>
           <a:ln/>
         </p:spPr>
+        <p:txBody>
+          <a:bodyPr/>
+          <a:lstStyle/>
+          <a:p>
+            <a:endParaRPr lang="en-US"/>
+          </a:p>
+        </p:txBody>
       </p:sp>
       <p:sp>
         <p:nvSpPr>
@@ -3399,7 +3244,7 @@
           <a:bodyPr wrap="square" rtlCol="0" anchor="ctr"/>
           <a:lstStyle/>
           <a:p>
-            <a:pPr indent="0" marL="0">
+            <a:pPr marL="0" indent="0">
               <a:buNone/>
             </a:pPr>
             <a:r>
@@ -3443,6 +3288,13 @@
             <a:prstDash val="solid"/>
           </a:ln>
         </p:spPr>
+        <p:txBody>
+          <a:bodyPr/>
+          <a:lstStyle/>
+          <a:p>
+            <a:endParaRPr lang="en-US"/>
+          </a:p>
+        </p:txBody>
       </p:sp>
       <p:sp>
         <p:nvSpPr>
@@ -3465,7 +3317,7 @@
           <a:bodyPr wrap="square" rtlCol="0" anchor="ctr"/>
           <a:lstStyle/>
           <a:p>
-            <a:pPr algn="ctr" indent="0" marL="0">
+            <a:pPr marL="0" indent="0" algn="ctr">
               <a:buNone/>
             </a:pPr>
             <a:r>
@@ -3501,7 +3353,7 @@
           <a:bodyPr wrap="square" rtlCol="0" anchor="ctr"/>
           <a:lstStyle/>
           <a:p>
-            <a:pPr algn="ctr" indent="0" marL="0">
+            <a:pPr marL="0" indent="0" algn="ctr">
               <a:buNone/>
             </a:pPr>
             <a:r>
@@ -3540,7 +3392,7 @@
           <a:bodyPr wrap="square" rtlCol="0" anchor="ctr"/>
           <a:lstStyle/>
           <a:p>
-            <a:pPr algn="ctr" indent="0" marL="0">
+            <a:pPr marL="0" indent="0" algn="ctr">
               <a:buNone/>
             </a:pPr>
             <a:r>
@@ -3557,7 +3409,7 @@
             <a:endParaRPr lang="en-US" sz="1100" dirty="0"/>
           </a:p>
           <a:p>
-            <a:pPr algn="ctr" indent="0" marL="0">
+            <a:pPr marL="0" indent="0" algn="ctr">
               <a:buNone/>
             </a:pPr>
             <a:r>
@@ -3601,6 +3453,13 @@
             <a:prstDash val="solid"/>
           </a:ln>
         </p:spPr>
+        <p:txBody>
+          <a:bodyPr/>
+          <a:lstStyle/>
+          <a:p>
+            <a:endParaRPr lang="en-US"/>
+          </a:p>
+        </p:txBody>
       </p:sp>
       <p:sp>
         <p:nvSpPr>
@@ -3623,7 +3482,7 @@
           <a:bodyPr wrap="square" rtlCol="0" anchor="ctr"/>
           <a:lstStyle/>
           <a:p>
-            <a:pPr algn="ctr" indent="0" marL="0">
+            <a:pPr marL="0" indent="0" algn="ctr">
               <a:buNone/>
             </a:pPr>
             <a:r>
@@ -3659,7 +3518,7 @@
           <a:bodyPr wrap="square" rtlCol="0" anchor="ctr"/>
           <a:lstStyle/>
           <a:p>
-            <a:pPr algn="ctr" indent="0" marL="0">
+            <a:pPr marL="0" indent="0" algn="ctr">
               <a:buNone/>
             </a:pPr>
             <a:r>
@@ -3698,7 +3557,7 @@
           <a:bodyPr wrap="square" rtlCol="0" anchor="ctr"/>
           <a:lstStyle/>
           <a:p>
-            <a:pPr algn="ctr" indent="0" marL="0">
+            <a:pPr marL="0" indent="0" algn="ctr">
               <a:buNone/>
             </a:pPr>
             <a:r>
@@ -3715,7 +3574,7 @@
             <a:endParaRPr lang="en-US" sz="1100" dirty="0"/>
           </a:p>
           <a:p>
-            <a:pPr algn="ctr" indent="0" marL="0">
+            <a:pPr marL="0" indent="0" algn="ctr">
               <a:buNone/>
             </a:pPr>
             <a:r>
@@ -3759,6 +3618,13 @@
             <a:prstDash val="solid"/>
           </a:ln>
         </p:spPr>
+        <p:txBody>
+          <a:bodyPr/>
+          <a:lstStyle/>
+          <a:p>
+            <a:endParaRPr lang="en-US"/>
+          </a:p>
+        </p:txBody>
       </p:sp>
       <p:sp>
         <p:nvSpPr>
@@ -3781,7 +3647,7 @@
           <a:bodyPr wrap="square" rtlCol="0" anchor="ctr"/>
           <a:lstStyle/>
           <a:p>
-            <a:pPr algn="ctr" indent="0" marL="0">
+            <a:pPr marL="0" indent="0" algn="ctr">
               <a:buNone/>
             </a:pPr>
             <a:r>
@@ -3817,7 +3683,7 @@
           <a:bodyPr wrap="square" rtlCol="0" anchor="ctr"/>
           <a:lstStyle/>
           <a:p>
-            <a:pPr algn="ctr" indent="0" marL="0">
+            <a:pPr marL="0" indent="0" algn="ctr">
               <a:buNone/>
             </a:pPr>
             <a:r>
@@ -3856,7 +3722,7 @@
           <a:bodyPr wrap="square" rtlCol="0" anchor="ctr"/>
           <a:lstStyle/>
           <a:p>
-            <a:pPr algn="ctr" indent="0" marL="0">
+            <a:pPr marL="0" indent="0" algn="ctr">
               <a:buNone/>
             </a:pPr>
             <a:r>
@@ -3873,7 +3739,7 @@
             <a:endParaRPr lang="en-US" sz="1100" dirty="0"/>
           </a:p>
           <a:p>
-            <a:pPr algn="ctr" indent="0" marL="0">
+            <a:pPr marL="0" indent="0" algn="ctr">
               <a:buNone/>
             </a:pPr>
             <a:r>
@@ -3917,6 +3783,13 @@
             <a:prstDash val="solid"/>
           </a:ln>
         </p:spPr>
+        <p:txBody>
+          <a:bodyPr/>
+          <a:lstStyle/>
+          <a:p>
+            <a:endParaRPr lang="en-US"/>
+          </a:p>
+        </p:txBody>
       </p:sp>
       <p:sp>
         <p:nvSpPr>
@@ -3939,7 +3812,7 @@
           <a:bodyPr wrap="square" rtlCol="0" anchor="ctr"/>
           <a:lstStyle/>
           <a:p>
-            <a:pPr algn="ctr" indent="0" marL="0">
+            <a:pPr marL="0" indent="0" algn="ctr">
               <a:buNone/>
             </a:pPr>
             <a:r>
@@ -3975,7 +3848,7 @@
           <a:bodyPr wrap="square" rtlCol="0" anchor="ctr"/>
           <a:lstStyle/>
           <a:p>
-            <a:pPr algn="ctr" indent="0" marL="0">
+            <a:pPr marL="0" indent="0" algn="ctr">
               <a:buNone/>
             </a:pPr>
             <a:r>
@@ -4014,7 +3887,7 @@
           <a:bodyPr wrap="square" rtlCol="0" anchor="ctr"/>
           <a:lstStyle/>
           <a:p>
-            <a:pPr algn="ctr" indent="0" marL="0">
+            <a:pPr marL="0" indent="0" algn="ctr">
               <a:buNone/>
             </a:pPr>
             <a:r>
@@ -4031,7 +3904,7 @@
             <a:endParaRPr lang="en-US" sz="1100" dirty="0"/>
           </a:p>
           <a:p>
-            <a:pPr algn="ctr" indent="0" marL="0">
+            <a:pPr marL="0" indent="0" algn="ctr">
               <a:buNone/>
             </a:pPr>
             <a:r>
@@ -4070,7 +3943,7 @@
           <a:bodyPr wrap="square" rtlCol="0" anchor="ctr"/>
           <a:lstStyle/>
           <a:p>
-            <a:pPr algn="ctr" indent="0" marL="0">
+            <a:pPr marL="0" indent="0" algn="ctr">
               <a:buNone/>
             </a:pPr>
             <a:r>
@@ -4132,6 +4005,13 @@
           </a:solidFill>
           <a:ln/>
         </p:spPr>
+        <p:txBody>
+          <a:bodyPr/>
+          <a:lstStyle/>
+          <a:p>
+            <a:endParaRPr lang="en-US"/>
+          </a:p>
+        </p:txBody>
       </p:sp>
       <p:sp>
         <p:nvSpPr>
@@ -4154,7 +4034,7 @@
           <a:bodyPr wrap="square" rtlCol="0" anchor="ctr"/>
           <a:lstStyle/>
           <a:p>
-            <a:pPr indent="0" marL="0">
+            <a:pPr marL="0" indent="0">
               <a:buNone/>
             </a:pPr>
             <a:r>
@@ -4198,6 +4078,13 @@
             <a:prstDash val="solid"/>
           </a:ln>
         </p:spPr>
+        <p:txBody>
+          <a:bodyPr/>
+          <a:lstStyle/>
+          <a:p>
+            <a:endParaRPr lang="en-US"/>
+          </a:p>
+        </p:txBody>
       </p:sp>
       <p:sp>
         <p:nvSpPr>
@@ -4218,6 +4105,13 @@
           </a:solidFill>
           <a:ln/>
         </p:spPr>
+        <p:txBody>
+          <a:bodyPr/>
+          <a:lstStyle/>
+          <a:p>
+            <a:endParaRPr lang="en-US"/>
+          </a:p>
+        </p:txBody>
       </p:sp>
       <p:sp>
         <p:nvSpPr>
@@ -4240,7 +4134,7 @@
           <a:bodyPr wrap="square" rtlCol="0" anchor="ctr"/>
           <a:lstStyle/>
           <a:p>
-            <a:pPr algn="ctr" indent="0" marL="0">
+            <a:pPr marL="0" indent="0" algn="ctr">
               <a:buNone/>
             </a:pPr>
             <a:r>
@@ -4279,7 +4173,7 @@
           <a:bodyPr wrap="square" rtlCol="0" anchor="ctr"/>
           <a:lstStyle/>
           <a:p>
-            <a:pPr algn="ctr" indent="0" marL="0">
+            <a:pPr marL="0" indent="0" algn="ctr">
               <a:buNone/>
             </a:pPr>
             <a:r>
@@ -4318,7 +4212,7 @@
           <a:bodyPr wrap="square" rtlCol="0" anchor="ctr"/>
           <a:lstStyle/>
           <a:p>
-            <a:pPr algn="ctr" indent="0" marL="0">
+            <a:pPr marL="0" indent="0" algn="ctr">
               <a:buNone/>
             </a:pPr>
             <a:r>
@@ -4357,7 +4251,7 @@
           <a:bodyPr wrap="square" rtlCol="0" anchor="ctr"/>
           <a:lstStyle/>
           <a:p>
-            <a:pPr algn="ctr" indent="0" marL="0">
+            <a:pPr marL="0" indent="0" algn="ctr">
               <a:buNone/>
             </a:pPr>
             <a:r>
@@ -4374,7 +4268,7 @@
             <a:endParaRPr lang="en-US" sz="1100" dirty="0"/>
           </a:p>
           <a:p>
-            <a:pPr algn="ctr" indent="0" marL="0">
+            <a:pPr marL="0" indent="0" algn="ctr">
               <a:buNone/>
             </a:pPr>
             <a:r>
@@ -4391,7 +4285,7 @@
             <a:endParaRPr lang="en-US" sz="1100" dirty="0"/>
           </a:p>
           <a:p>
-            <a:pPr algn="ctr" indent="0" marL="0">
+            <a:pPr marL="0" indent="0" algn="ctr">
               <a:buNone/>
             </a:pPr>
             <a:r>
@@ -4430,7 +4324,7 @@
           <a:bodyPr wrap="square" rtlCol="0" anchor="ctr"/>
           <a:lstStyle/>
           <a:p>
-            <a:pPr algn="ctr" indent="0" marL="0">
+            <a:pPr marL="0" indent="0" algn="ctr">
               <a:buNone/>
             </a:pPr>
             <a:r>
@@ -4467,6 +4361,13 @@
           </a:solidFill>
           <a:ln/>
         </p:spPr>
+        <p:txBody>
+          <a:bodyPr/>
+          <a:lstStyle/>
+          <a:p>
+            <a:endParaRPr lang="en-US"/>
+          </a:p>
+        </p:txBody>
       </p:sp>
       <p:sp>
         <p:nvSpPr>
@@ -4494,6 +4395,13 @@
             <a:prstDash val="solid"/>
           </a:ln>
         </p:spPr>
+        <p:txBody>
+          <a:bodyPr/>
+          <a:lstStyle/>
+          <a:p>
+            <a:endParaRPr lang="en-US"/>
+          </a:p>
+        </p:txBody>
       </p:sp>
       <p:sp>
         <p:nvSpPr>
@@ -4514,6 +4422,13 @@
           </a:solidFill>
           <a:ln/>
         </p:spPr>
+        <p:txBody>
+          <a:bodyPr/>
+          <a:lstStyle/>
+          <a:p>
+            <a:endParaRPr lang="en-US"/>
+          </a:p>
+        </p:txBody>
       </p:sp>
       <p:sp>
         <p:nvSpPr>
@@ -4536,7 +4451,7 @@
           <a:bodyPr wrap="square" rtlCol="0" anchor="ctr"/>
           <a:lstStyle/>
           <a:p>
-            <a:pPr algn="ctr" indent="0" marL="0">
+            <a:pPr marL="0" indent="0" algn="ctr">
               <a:buNone/>
             </a:pPr>
             <a:r>
@@ -4575,7 +4490,7 @@
           <a:bodyPr wrap="square" rtlCol="0" anchor="ctr"/>
           <a:lstStyle/>
           <a:p>
-            <a:pPr algn="ctr" indent="0" marL="0">
+            <a:pPr marL="0" indent="0" algn="ctr">
               <a:buNone/>
             </a:pPr>
             <a:r>
@@ -4614,7 +4529,7 @@
           <a:bodyPr wrap="square" rtlCol="0" anchor="ctr"/>
           <a:lstStyle/>
           <a:p>
-            <a:pPr algn="ctr" indent="0" marL="0">
+            <a:pPr marL="0" indent="0" algn="ctr">
               <a:buNone/>
             </a:pPr>
             <a:r>
@@ -4653,7 +4568,7 @@
           <a:bodyPr wrap="square" rtlCol="0" anchor="ctr"/>
           <a:lstStyle/>
           <a:p>
-            <a:pPr algn="ctr" indent="0" marL="0">
+            <a:pPr marL="0" indent="0" algn="ctr">
               <a:buNone/>
             </a:pPr>
             <a:r>
@@ -4670,7 +4585,7 @@
             <a:endParaRPr lang="en-US" sz="1100" dirty="0"/>
           </a:p>
           <a:p>
-            <a:pPr algn="ctr" indent="0" marL="0">
+            <a:pPr marL="0" indent="0" algn="ctr">
               <a:buNone/>
             </a:pPr>
             <a:r>
@@ -4687,7 +4602,7 @@
             <a:endParaRPr lang="en-US" sz="1100" dirty="0"/>
           </a:p>
           <a:p>
-            <a:pPr algn="ctr" indent="0" marL="0">
+            <a:pPr marL="0" indent="0" algn="ctr">
               <a:buNone/>
             </a:pPr>
             <a:r>
@@ -4726,7 +4641,7 @@
           <a:bodyPr wrap="square" rtlCol="0" anchor="ctr"/>
           <a:lstStyle/>
           <a:p>
-            <a:pPr algn="ctr" indent="0" marL="0">
+            <a:pPr marL="0" indent="0" algn="ctr">
               <a:buNone/>
             </a:pPr>
             <a:r>
@@ -4763,6 +4678,13 @@
           </a:solidFill>
           <a:ln/>
         </p:spPr>
+        <p:txBody>
+          <a:bodyPr/>
+          <a:lstStyle/>
+          <a:p>
+            <a:endParaRPr lang="en-US"/>
+          </a:p>
+        </p:txBody>
       </p:sp>
       <p:sp>
         <p:nvSpPr>
@@ -4790,6 +4712,13 @@
             <a:prstDash val="solid"/>
           </a:ln>
         </p:spPr>
+        <p:txBody>
+          <a:bodyPr/>
+          <a:lstStyle/>
+          <a:p>
+            <a:endParaRPr lang="en-US"/>
+          </a:p>
+        </p:txBody>
       </p:sp>
       <p:sp>
         <p:nvSpPr>
@@ -4810,6 +4739,13 @@
           </a:solidFill>
           <a:ln/>
         </p:spPr>
+        <p:txBody>
+          <a:bodyPr/>
+          <a:lstStyle/>
+          <a:p>
+            <a:endParaRPr lang="en-US"/>
+          </a:p>
+        </p:txBody>
       </p:sp>
       <p:sp>
         <p:nvSpPr>
@@ -4832,7 +4768,7 @@
           <a:bodyPr wrap="square" rtlCol="0" anchor="ctr"/>
           <a:lstStyle/>
           <a:p>
-            <a:pPr algn="ctr" indent="0" marL="0">
+            <a:pPr marL="0" indent="0" algn="ctr">
               <a:buNone/>
             </a:pPr>
             <a:r>
@@ -4871,7 +4807,7 @@
           <a:bodyPr wrap="square" rtlCol="0" anchor="ctr"/>
           <a:lstStyle/>
           <a:p>
-            <a:pPr algn="ctr" indent="0" marL="0">
+            <a:pPr marL="0" indent="0" algn="ctr">
               <a:buNone/>
             </a:pPr>
             <a:r>
@@ -4910,7 +4846,7 @@
           <a:bodyPr wrap="square" rtlCol="0" anchor="ctr"/>
           <a:lstStyle/>
           <a:p>
-            <a:pPr algn="ctr" indent="0" marL="0">
+            <a:pPr marL="0" indent="0" algn="ctr">
               <a:buNone/>
             </a:pPr>
             <a:r>
@@ -4949,7 +4885,7 @@
           <a:bodyPr wrap="square" rtlCol="0" anchor="ctr"/>
           <a:lstStyle/>
           <a:p>
-            <a:pPr algn="ctr" indent="0" marL="0">
+            <a:pPr marL="0" indent="0" algn="ctr">
               <a:buNone/>
             </a:pPr>
             <a:r>
@@ -4966,7 +4902,7 @@
             <a:endParaRPr lang="en-US" sz="1100" dirty="0"/>
           </a:p>
           <a:p>
-            <a:pPr algn="ctr" indent="0" marL="0">
+            <a:pPr marL="0" indent="0" algn="ctr">
               <a:buNone/>
             </a:pPr>
             <a:r>
@@ -4983,7 +4919,7 @@
             <a:endParaRPr lang="en-US" sz="1100" dirty="0"/>
           </a:p>
           <a:p>
-            <a:pPr algn="ctr" indent="0" marL="0">
+            <a:pPr marL="0" indent="0" algn="ctr">
               <a:buNone/>
             </a:pPr>
             <a:r>
@@ -5022,7 +4958,7 @@
           <a:bodyPr wrap="square" rtlCol="0" anchor="ctr"/>
           <a:lstStyle/>
           <a:p>
-            <a:pPr algn="ctr" indent="0" marL="0">
+            <a:pPr marL="0" indent="0" algn="ctr">
               <a:buNone/>
             </a:pPr>
             <a:r>
@@ -5061,7 +4997,7 @@
           <a:bodyPr wrap="square" rtlCol="0" anchor="ctr"/>
           <a:lstStyle/>
           <a:p>
-            <a:pPr algn="ctr" indent="0" marL="0">
+            <a:pPr marL="0" indent="0" algn="ctr">
               <a:buNone/>
             </a:pPr>
             <a:r>
@@ -5123,6 +5059,13 @@
           </a:solidFill>
           <a:ln/>
         </p:spPr>
+        <p:txBody>
+          <a:bodyPr/>
+          <a:lstStyle/>
+          <a:p>
+            <a:endParaRPr lang="en-US"/>
+          </a:p>
+        </p:txBody>
       </p:sp>
       <p:sp>
         <p:nvSpPr>
@@ -5145,7 +5088,7 @@
           <a:bodyPr wrap="square" rtlCol="0" anchor="ctr"/>
           <a:lstStyle/>
           <a:p>
-            <a:pPr indent="0" marL="0">
+            <a:pPr marL="0" indent="0">
               <a:buNone/>
             </a:pPr>
             <a:r>
@@ -5172,7 +5115,7 @@
           <p:nvPr/>
         </p:nvPicPr>
         <p:blipFill>
-          <a:blip r:embed="rId1"/>
+          <a:blip r:embed="rId3"/>
           <a:stretch>
             <a:fillRect/>
           </a:stretch>
@@ -5231,6 +5174,13 @@
           </a:solidFill>
           <a:ln/>
         </p:spPr>
+        <p:txBody>
+          <a:bodyPr/>
+          <a:lstStyle/>
+          <a:p>
+            <a:endParaRPr lang="en-US"/>
+          </a:p>
+        </p:txBody>
       </p:sp>
       <p:sp>
         <p:nvSpPr>
@@ -5253,7 +5203,7 @@
           <a:bodyPr wrap="square" rtlCol="0" anchor="ctr"/>
           <a:lstStyle/>
           <a:p>
-            <a:pPr indent="0" marL="0">
+            <a:pPr marL="0" indent="0">
               <a:buNone/>
             </a:pPr>
             <a:r>
@@ -5280,7 +5230,7 @@
           <p:nvPr/>
         </p:nvPicPr>
         <p:blipFill>
-          <a:blip r:embed="rId1"/>
+          <a:blip r:embed="rId3"/>
           <a:stretch>
             <a:fillRect/>
           </a:stretch>
@@ -5321,6 +5271,13 @@
             <a:prstDash val="solid"/>
           </a:ln>
         </p:spPr>
+        <p:txBody>
+          <a:bodyPr/>
+          <a:lstStyle/>
+          <a:p>
+            <a:endParaRPr lang="en-US"/>
+          </a:p>
+        </p:txBody>
       </p:sp>
       <p:sp>
         <p:nvSpPr>
@@ -5343,7 +5300,7 @@
           <a:bodyPr wrap="square" rtlCol="0" anchor="ctr"/>
           <a:lstStyle/>
           <a:p>
-            <a:pPr algn="ctr" indent="0" marL="0">
+            <a:pPr marL="0" indent="0" algn="ctr">
               <a:buNone/>
             </a:pPr>
             <a:r>
@@ -5382,7 +5339,7 @@
           <a:bodyPr wrap="square" rtlCol="0" anchor="ctr"/>
           <a:lstStyle/>
           <a:p>
-            <a:pPr algn="ctr" indent="0" marL="0">
+            <a:pPr marL="0" indent="0" algn="ctr">
               <a:buNone/>
             </a:pPr>
             <a:r>
@@ -5426,6 +5383,13 @@
             <a:prstDash val="solid"/>
           </a:ln>
         </p:spPr>
+        <p:txBody>
+          <a:bodyPr/>
+          <a:lstStyle/>
+          <a:p>
+            <a:endParaRPr lang="en-US"/>
+          </a:p>
+        </p:txBody>
       </p:sp>
       <p:sp>
         <p:nvSpPr>
@@ -5448,7 +5412,7 @@
           <a:bodyPr wrap="square" rtlCol="0" anchor="ctr"/>
           <a:lstStyle/>
           <a:p>
-            <a:pPr algn="ctr" indent="0" marL="0">
+            <a:pPr marL="0" indent="0" algn="ctr">
               <a:buNone/>
             </a:pPr>
             <a:r>
@@ -5487,7 +5451,7 @@
           <a:bodyPr wrap="square" rtlCol="0" anchor="ctr"/>
           <a:lstStyle/>
           <a:p>
-            <a:pPr algn="ctr" indent="0" marL="0">
+            <a:pPr marL="0" indent="0" algn="ctr">
               <a:buNone/>
             </a:pPr>
             <a:r>
@@ -5531,6 +5495,13 @@
             <a:prstDash val="solid"/>
           </a:ln>
         </p:spPr>
+        <p:txBody>
+          <a:bodyPr/>
+          <a:lstStyle/>
+          <a:p>
+            <a:endParaRPr lang="en-US"/>
+          </a:p>
+        </p:txBody>
       </p:sp>
       <p:sp>
         <p:nvSpPr>
@@ -5553,7 +5524,7 @@
           <a:bodyPr wrap="square" rtlCol="0" anchor="ctr"/>
           <a:lstStyle/>
           <a:p>
-            <a:pPr algn="ctr" indent="0" marL="0">
+            <a:pPr marL="0" indent="0" algn="ctr">
               <a:buNone/>
             </a:pPr>
             <a:r>
@@ -5592,7 +5563,7 @@
           <a:bodyPr wrap="square" rtlCol="0" anchor="ctr"/>
           <a:lstStyle/>
           <a:p>
-            <a:pPr algn="ctr" indent="0" marL="0">
+            <a:pPr marL="0" indent="0" algn="ctr">
               <a:buNone/>
             </a:pPr>
             <a:r>
@@ -5654,6 +5625,13 @@
           </a:solidFill>
           <a:ln/>
         </p:spPr>
+        <p:txBody>
+          <a:bodyPr/>
+          <a:lstStyle/>
+          <a:p>
+            <a:endParaRPr lang="en-US"/>
+          </a:p>
+        </p:txBody>
       </p:sp>
       <p:sp>
         <p:nvSpPr>
@@ -5676,7 +5654,7 @@
           <a:bodyPr wrap="square" rtlCol="0" anchor="ctr"/>
           <a:lstStyle/>
           <a:p>
-            <a:pPr indent="0" marL="0">
+            <a:pPr marL="0" indent="0">
               <a:buNone/>
             </a:pPr>
             <a:r>
@@ -5717,10 +5695,34 @@
             <a:tbl>
               <a:tblPr/>
               <a:tblGrid>
-                <a:gridCol w="2286000"/>
-                <a:gridCol w="1645920"/>
-                <a:gridCol w="2148840"/>
-                <a:gridCol w="2148840"/>
+                <a:gridCol w="2286000">
+                  <a:extLst>
+                    <a:ext uri="{9D8B030D-6E8A-4147-A177-3AD203B41FA5}">
+                      <a16:colId xmlns:a16="http://schemas.microsoft.com/office/drawing/2014/main" val="20000"/>
+                    </a:ext>
+                  </a:extLst>
+                </a:gridCol>
+                <a:gridCol w="1645920">
+                  <a:extLst>
+                    <a:ext uri="{9D8B030D-6E8A-4147-A177-3AD203B41FA5}">
+                      <a16:colId xmlns:a16="http://schemas.microsoft.com/office/drawing/2014/main" val="20001"/>
+                    </a:ext>
+                  </a:extLst>
+                </a:gridCol>
+                <a:gridCol w="2148840">
+                  <a:extLst>
+                    <a:ext uri="{9D8B030D-6E8A-4147-A177-3AD203B41FA5}">
+                      <a16:colId xmlns:a16="http://schemas.microsoft.com/office/drawing/2014/main" val="20002"/>
+                    </a:ext>
+                  </a:extLst>
+                </a:gridCol>
+                <a:gridCol w="2148840">
+                  <a:extLst>
+                    <a:ext uri="{9D8B030D-6E8A-4147-A177-3AD203B41FA5}">
+                      <a16:colId xmlns:a16="http://schemas.microsoft.com/office/drawing/2014/main" val="20003"/>
+                    </a:ext>
+                  </a:extLst>
+                </a:gridCol>
               </a:tblGrid>
               <a:tr h="502920">
                 <a:tc>
@@ -5728,7 +5730,7 @@
                     <a:bodyPr/>
                     <a:lstStyle/>
                     <a:p>
-                      <a:pPr algn="ctr" indent="0" marL="0">
+                      <a:pPr marL="0" indent="0" algn="ctr">
                         <a:buNone/>
                       </a:pPr>
                       <a:r>
@@ -5749,7 +5751,7 @@
                       </a:endParaRPr>
                     </a:p>
                   </a:txBody>
-                  <a:tcPr marL="91440" marR="91440" marT="45720" marB="45720" anchor="ctr">
+                  <a:tcPr anchor="ctr">
                     <a:lnL w="12700" cap="flat" cmpd="sng" algn="ctr">
                       <a:solidFill>
                         <a:srgbClr val="DDDDDD"/>
@@ -5796,7 +5798,7 @@
                     <a:bodyPr/>
                     <a:lstStyle/>
                     <a:p>
-                      <a:pPr algn="ctr" indent="0" marL="0">
+                      <a:pPr marL="0" indent="0" algn="ctr">
                         <a:buNone/>
                       </a:pPr>
                       <a:r>
@@ -5817,7 +5819,7 @@
                       </a:endParaRPr>
                     </a:p>
                   </a:txBody>
-                  <a:tcPr marL="91440" marR="91440" marT="45720" marB="45720" anchor="ctr">
+                  <a:tcPr anchor="ctr">
                     <a:lnL w="12700" cap="flat" cmpd="sng" algn="ctr">
                       <a:solidFill>
                         <a:srgbClr val="DDDDDD"/>
@@ -5864,7 +5866,7 @@
                     <a:bodyPr/>
                     <a:lstStyle/>
                     <a:p>
-                      <a:pPr algn="ctr" indent="0" marL="0">
+                      <a:pPr marL="0" indent="0" algn="ctr">
                         <a:buNone/>
                       </a:pPr>
                       <a:r>
@@ -5885,7 +5887,7 @@
                       </a:endParaRPr>
                     </a:p>
                   </a:txBody>
-                  <a:tcPr marL="91440" marR="91440" marT="45720" marB="45720" anchor="ctr">
+                  <a:tcPr anchor="ctr">
                     <a:lnL w="12700" cap="flat" cmpd="sng" algn="ctr">
                       <a:solidFill>
                         <a:srgbClr val="DDDDDD"/>
@@ -5932,7 +5934,7 @@
                     <a:bodyPr/>
                     <a:lstStyle/>
                     <a:p>
-                      <a:pPr algn="ctr" indent="0" marL="0">
+                      <a:pPr marL="0" indent="0" algn="ctr">
                         <a:buNone/>
                       </a:pPr>
                       <a:r>
@@ -5953,7 +5955,7 @@
                       </a:endParaRPr>
                     </a:p>
                   </a:txBody>
-                  <a:tcPr marL="91440" marR="91440" marT="45720" marB="45720" anchor="ctr">
+                  <a:tcPr anchor="ctr">
                     <a:lnL w="12700" cap="flat" cmpd="sng" algn="ctr">
                       <a:solidFill>
                         <a:srgbClr val="DDDDDD"/>
@@ -5995,6 +5997,11 @@
                     </a:solidFill>
                   </a:tcPr>
                 </a:tc>
+                <a:extLst>
+                  <a:ext uri="{0D108BD9-81ED-4DB2-BD59-A6C34878D82A}">
+                    <a16:rowId xmlns:a16="http://schemas.microsoft.com/office/drawing/2014/main" val="10000"/>
+                  </a:ext>
+                </a:extLst>
               </a:tr>
               <a:tr h="502920">
                 <a:tc>
@@ -6002,7 +6009,7 @@
                     <a:bodyPr/>
                     <a:lstStyle/>
                     <a:p>
-                      <a:pPr algn="ctr" indent="0" marL="0">
+                      <a:pPr marL="0" indent="0" algn="ctr">
                         <a:buNone/>
                       </a:pPr>
                       <a:r>
@@ -6023,7 +6030,7 @@
                       </a:endParaRPr>
                     </a:p>
                   </a:txBody>
-                  <a:tcPr marL="91440" marR="91440" marT="45720" marB="45720" anchor="ctr">
+                  <a:tcPr anchor="ctr">
                     <a:lnL w="12700" cap="flat" cmpd="sng" algn="ctr">
                       <a:solidFill>
                         <a:srgbClr val="DDDDDD"/>
@@ -6070,7 +6077,7 @@
                     <a:bodyPr/>
                     <a:lstStyle/>
                     <a:p>
-                      <a:pPr algn="ctr" indent="0" marL="0">
+                      <a:pPr marL="0" indent="0" algn="ctr">
                         <a:buNone/>
                       </a:pPr>
                       <a:r>
@@ -6091,7 +6098,7 @@
                       </a:endParaRPr>
                     </a:p>
                   </a:txBody>
-                  <a:tcPr marL="91440" marR="91440" marT="45720" marB="45720" anchor="ctr">
+                  <a:tcPr anchor="ctr">
                     <a:lnL w="12700" cap="flat" cmpd="sng" algn="ctr">
                       <a:solidFill>
                         <a:srgbClr val="DDDDDD"/>
@@ -6138,7 +6145,7 @@
                     <a:bodyPr/>
                     <a:lstStyle/>
                     <a:p>
-                      <a:pPr algn="ctr" indent="0" marL="0">
+                      <a:pPr marL="0" indent="0" algn="ctr">
                         <a:buNone/>
                       </a:pPr>
                       <a:r>
@@ -6159,7 +6166,7 @@
                       </a:endParaRPr>
                     </a:p>
                   </a:txBody>
-                  <a:tcPr marL="91440" marR="91440" marT="45720" marB="45720" anchor="ctr">
+                  <a:tcPr anchor="ctr">
                     <a:lnL w="12700" cap="flat" cmpd="sng" algn="ctr">
                       <a:solidFill>
                         <a:srgbClr val="DDDDDD"/>
@@ -6206,7 +6213,7 @@
                     <a:bodyPr/>
                     <a:lstStyle/>
                     <a:p>
-                      <a:pPr algn="ctr" indent="0" marL="0">
+                      <a:pPr marL="0" indent="0" algn="ctr">
                         <a:buNone/>
                       </a:pPr>
                       <a:r>
@@ -6227,7 +6234,7 @@
                       </a:endParaRPr>
                     </a:p>
                   </a:txBody>
-                  <a:tcPr marL="91440" marR="91440" marT="45720" marB="45720" anchor="ctr">
+                  <a:tcPr anchor="ctr">
                     <a:lnL w="12700" cap="flat" cmpd="sng" algn="ctr">
                       <a:solidFill>
                         <a:srgbClr val="DDDDDD"/>
@@ -6269,6 +6276,11 @@
                     </a:solidFill>
                   </a:tcPr>
                 </a:tc>
+                <a:extLst>
+                  <a:ext uri="{0D108BD9-81ED-4DB2-BD59-A6C34878D82A}">
+                    <a16:rowId xmlns:a16="http://schemas.microsoft.com/office/drawing/2014/main" val="10001"/>
+                  </a:ext>
+                </a:extLst>
               </a:tr>
               <a:tr h="502920">
                 <a:tc>
@@ -6276,7 +6288,7 @@
                     <a:bodyPr/>
                     <a:lstStyle/>
                     <a:p>
-                      <a:pPr algn="ctr" indent="0" marL="0">
+                      <a:pPr marL="0" indent="0" algn="ctr">
                         <a:buNone/>
                       </a:pPr>
                       <a:r>
@@ -6297,7 +6309,7 @@
                       </a:endParaRPr>
                     </a:p>
                   </a:txBody>
-                  <a:tcPr marL="91440" marR="91440" marT="45720" marB="45720" anchor="ctr">
+                  <a:tcPr anchor="ctr">
                     <a:lnL w="12700" cap="flat" cmpd="sng" algn="ctr">
                       <a:solidFill>
                         <a:srgbClr val="DDDDDD"/>
@@ -6344,7 +6356,7 @@
                     <a:bodyPr/>
                     <a:lstStyle/>
                     <a:p>
-                      <a:pPr algn="ctr" indent="0" marL="0">
+                      <a:pPr marL="0" indent="0" algn="ctr">
                         <a:buNone/>
                       </a:pPr>
                       <a:r>
@@ -6365,7 +6377,7 @@
                       </a:endParaRPr>
                     </a:p>
                   </a:txBody>
-                  <a:tcPr marL="91440" marR="91440" marT="45720" marB="45720" anchor="ctr">
+                  <a:tcPr anchor="ctr">
                     <a:lnL w="12700" cap="flat" cmpd="sng" algn="ctr">
                       <a:solidFill>
                         <a:srgbClr val="DDDDDD"/>
@@ -6412,7 +6424,7 @@
                     <a:bodyPr/>
                     <a:lstStyle/>
                     <a:p>
-                      <a:pPr algn="ctr" indent="0" marL="0">
+                      <a:pPr marL="0" indent="0" algn="ctr">
                         <a:buNone/>
                       </a:pPr>
                       <a:r>
@@ -6433,7 +6445,7 @@
                       </a:endParaRPr>
                     </a:p>
                   </a:txBody>
-                  <a:tcPr marL="91440" marR="91440" marT="45720" marB="45720" anchor="ctr">
+                  <a:tcPr anchor="ctr">
                     <a:lnL w="12700" cap="flat" cmpd="sng" algn="ctr">
                       <a:solidFill>
                         <a:srgbClr val="DDDDDD"/>
@@ -6480,7 +6492,7 @@
                     <a:bodyPr/>
                     <a:lstStyle/>
                     <a:p>
-                      <a:pPr algn="ctr" indent="0" marL="0">
+                      <a:pPr marL="0" indent="0" algn="ctr">
                         <a:buNone/>
                       </a:pPr>
                       <a:r>
@@ -6501,7 +6513,7 @@
                       </a:endParaRPr>
                     </a:p>
                   </a:txBody>
-                  <a:tcPr marL="91440" marR="91440" marT="45720" marB="45720" anchor="ctr">
+                  <a:tcPr anchor="ctr">
                     <a:lnL w="12700" cap="flat" cmpd="sng" algn="ctr">
                       <a:solidFill>
                         <a:srgbClr val="DDDDDD"/>
@@ -6543,6 +6555,11 @@
                     </a:solidFill>
                   </a:tcPr>
                 </a:tc>
+                <a:extLst>
+                  <a:ext uri="{0D108BD9-81ED-4DB2-BD59-A6C34878D82A}">
+                    <a16:rowId xmlns:a16="http://schemas.microsoft.com/office/drawing/2014/main" val="10002"/>
+                  </a:ext>
+                </a:extLst>
               </a:tr>
               <a:tr h="502920">
                 <a:tc>
@@ -6550,7 +6567,7 @@
                     <a:bodyPr/>
                     <a:lstStyle/>
                     <a:p>
-                      <a:pPr algn="ctr" indent="0" marL="0">
+                      <a:pPr marL="0" indent="0" algn="ctr">
                         <a:buNone/>
                       </a:pPr>
                       <a:r>
@@ -6571,7 +6588,7 @@
                       </a:endParaRPr>
                     </a:p>
                   </a:txBody>
-                  <a:tcPr marL="91440" marR="91440" marT="45720" marB="45720" anchor="ctr">
+                  <a:tcPr anchor="ctr">
                     <a:lnL w="12700" cap="flat" cmpd="sng" algn="ctr">
                       <a:solidFill>
                         <a:srgbClr val="DDDDDD"/>
@@ -6618,7 +6635,7 @@
                     <a:bodyPr/>
                     <a:lstStyle/>
                     <a:p>
-                      <a:pPr algn="ctr" indent="0" marL="0">
+                      <a:pPr marL="0" indent="0" algn="ctr">
                         <a:buNone/>
                       </a:pPr>
                       <a:r>
@@ -6639,7 +6656,7 @@
                       </a:endParaRPr>
                     </a:p>
                   </a:txBody>
-                  <a:tcPr marL="91440" marR="91440" marT="45720" marB="45720" anchor="ctr">
+                  <a:tcPr anchor="ctr">
                     <a:lnL w="12700" cap="flat" cmpd="sng" algn="ctr">
                       <a:solidFill>
                         <a:srgbClr val="DDDDDD"/>
@@ -6686,7 +6703,7 @@
                     <a:bodyPr/>
                     <a:lstStyle/>
                     <a:p>
-                      <a:pPr algn="ctr" indent="0" marL="0">
+                      <a:pPr marL="0" indent="0" algn="ctr">
                         <a:buNone/>
                       </a:pPr>
                       <a:r>
@@ -6707,7 +6724,7 @@
                       </a:endParaRPr>
                     </a:p>
                   </a:txBody>
-                  <a:tcPr marL="91440" marR="91440" marT="45720" marB="45720" anchor="ctr">
+                  <a:tcPr anchor="ctr">
                     <a:lnL w="12700" cap="flat" cmpd="sng" algn="ctr">
                       <a:solidFill>
                         <a:srgbClr val="DDDDDD"/>
@@ -6754,7 +6771,7 @@
                     <a:bodyPr/>
                     <a:lstStyle/>
                     <a:p>
-                      <a:pPr algn="ctr" indent="0" marL="0">
+                      <a:pPr marL="0" indent="0" algn="ctr">
                         <a:buNone/>
                       </a:pPr>
                       <a:r>
@@ -6775,7 +6792,7 @@
                       </a:endParaRPr>
                     </a:p>
                   </a:txBody>
-                  <a:tcPr marL="91440" marR="91440" marT="45720" marB="45720" anchor="ctr">
+                  <a:tcPr anchor="ctr">
                     <a:lnL w="12700" cap="flat" cmpd="sng" algn="ctr">
                       <a:solidFill>
                         <a:srgbClr val="DDDDDD"/>
@@ -6817,6 +6834,11 @@
                     </a:solidFill>
                   </a:tcPr>
                 </a:tc>
+                <a:extLst>
+                  <a:ext uri="{0D108BD9-81ED-4DB2-BD59-A6C34878D82A}">
+                    <a16:rowId xmlns:a16="http://schemas.microsoft.com/office/drawing/2014/main" val="10003"/>
+                  </a:ext>
+                </a:extLst>
               </a:tr>
             </a:tbl>
           </a:graphicData>
@@ -6843,7 +6865,7 @@
           <a:bodyPr wrap="square" rtlCol="0" anchor="ctr"/>
           <a:lstStyle/>
           <a:p>
-            <a:pPr indent="0" marL="0">
+            <a:pPr marL="0" indent="0">
               <a:buNone/>
             </a:pPr>
             <a:r>
@@ -6863,7 +6885,7 @@
       </p:sp>
       <p:graphicFrame>
         <p:nvGraphicFramePr>
-          <p:cNvPr id="6" name="Chart 0" descr=""/>
+          <p:cNvPr id="6" name="Chart 0"/>
           <p:cNvGraphicFramePr/>
           <p:nvPr/>
         </p:nvGraphicFramePr>
@@ -6871,15 +6893,15 @@
           <a:off x="457200" y="3840480"/>
           <a:ext cx="4114800" cy="1188720"/>
         </p:xfrm>
-        <a:graphic xmlns:a="http://schemas.openxmlformats.org/drawingml/2006/main">
+        <a:graphic>
           <a:graphicData uri="http://schemas.openxmlformats.org/drawingml/2006/chart">
-            <c:chart xmlns:c="http://schemas.openxmlformats.org/drawingml/2006/chart" r:id="rId1"/>
+            <c:chart xmlns:c="http://schemas.openxmlformats.org/drawingml/2006/chart" xmlns:r="http://schemas.openxmlformats.org/officeDocument/2006/relationships" r:id="rId3"/>
           </a:graphicData>
         </a:graphic>
       </p:graphicFrame>
       <p:graphicFrame>
         <p:nvGraphicFramePr>
-          <p:cNvPr id="7" name="Chart 1" descr=""/>
+          <p:cNvPr id="4" name="Chart 1"/>
           <p:cNvGraphicFramePr/>
           <p:nvPr/>
         </p:nvGraphicFramePr>
@@ -6887,9 +6909,9 @@
           <a:off x="4846320" y="3749040"/>
           <a:ext cx="3840480" cy="1371600"/>
         </p:xfrm>
-        <a:graphic xmlns:a="http://schemas.openxmlformats.org/drawingml/2006/main">
+        <a:graphic>
           <a:graphicData uri="http://schemas.openxmlformats.org/drawingml/2006/chart">
-            <c:chart xmlns:c="http://schemas.openxmlformats.org/drawingml/2006/chart" r:id="rId2"/>
+            <c:chart xmlns:c="http://schemas.openxmlformats.org/drawingml/2006/chart" xmlns:r="http://schemas.openxmlformats.org/officeDocument/2006/relationships" r:id="rId4"/>
           </a:graphicData>
         </a:graphic>
       </p:graphicFrame>
@@ -6937,6 +6959,13 @@
           </a:solidFill>
           <a:ln/>
         </p:spPr>
+        <p:txBody>
+          <a:bodyPr/>
+          <a:lstStyle/>
+          <a:p>
+            <a:endParaRPr lang="en-US"/>
+          </a:p>
+        </p:txBody>
       </p:sp>
       <p:sp>
         <p:nvSpPr>
@@ -6959,7 +6988,7 @@
           <a:bodyPr wrap="square" rtlCol="0" anchor="ctr"/>
           <a:lstStyle/>
           <a:p>
-            <a:pPr indent="0" marL="0">
+            <a:pPr marL="0" indent="0">
               <a:buNone/>
             </a:pPr>
             <a:r>
@@ -6993,17 +7022,41 @@
         </p:nvGraphicFramePr>
         <p:xfrm>
           <a:off x="274320" y="1280160"/>
-          <a:ext cx="8595360" cy="1828800"/>
+          <a:ext cx="8595360" cy="1920240"/>
         </p:xfrm>
         <a:graphic>
           <a:graphicData uri="http://schemas.openxmlformats.org/drawingml/2006/table">
             <a:tbl>
               <a:tblPr/>
               <a:tblGrid>
-                <a:gridCol w="1828800"/>
-                <a:gridCol w="1188720"/>
-                <a:gridCol w="1371600"/>
-                <a:gridCol w="4206240"/>
+                <a:gridCol w="1828800">
+                  <a:extLst>
+                    <a:ext uri="{9D8B030D-6E8A-4147-A177-3AD203B41FA5}">
+                      <a16:colId xmlns:a16="http://schemas.microsoft.com/office/drawing/2014/main" val="20000"/>
+                    </a:ext>
+                  </a:extLst>
+                </a:gridCol>
+                <a:gridCol w="1188720">
+                  <a:extLst>
+                    <a:ext uri="{9D8B030D-6E8A-4147-A177-3AD203B41FA5}">
+                      <a16:colId xmlns:a16="http://schemas.microsoft.com/office/drawing/2014/main" val="20001"/>
+                    </a:ext>
+                  </a:extLst>
+                </a:gridCol>
+                <a:gridCol w="1371600">
+                  <a:extLst>
+                    <a:ext uri="{9D8B030D-6E8A-4147-A177-3AD203B41FA5}">
+                      <a16:colId xmlns:a16="http://schemas.microsoft.com/office/drawing/2014/main" val="20002"/>
+                    </a:ext>
+                  </a:extLst>
+                </a:gridCol>
+                <a:gridCol w="4206240">
+                  <a:extLst>
+                    <a:ext uri="{9D8B030D-6E8A-4147-A177-3AD203B41FA5}">
+                      <a16:colId xmlns:a16="http://schemas.microsoft.com/office/drawing/2014/main" val="20003"/>
+                    </a:ext>
+                  </a:extLst>
+                </a:gridCol>
               </a:tblGrid>
               <a:tr h="365760">
                 <a:tc>
@@ -7011,7 +7064,7 @@
                     <a:bodyPr/>
                     <a:lstStyle/>
                     <a:p>
-                      <a:pPr algn="ctr" indent="0" marL="0">
+                      <a:pPr marL="0" indent="0" algn="ctr">
                         <a:buNone/>
                       </a:pPr>
                       <a:r>
@@ -7032,7 +7085,7 @@
                       </a:endParaRPr>
                     </a:p>
                   </a:txBody>
-                  <a:tcPr marL="91440" marR="91440" marT="45720" marB="45720" anchor="ctr">
+                  <a:tcPr anchor="ctr">
                     <a:lnL w="12700" cap="flat" cmpd="sng" algn="ctr">
                       <a:solidFill>
                         <a:srgbClr val="DDDDDD"/>
@@ -7079,7 +7132,7 @@
                     <a:bodyPr/>
                     <a:lstStyle/>
                     <a:p>
-                      <a:pPr algn="ctr" indent="0" marL="0">
+                      <a:pPr marL="0" indent="0" algn="ctr">
                         <a:buNone/>
                       </a:pPr>
                       <a:r>
@@ -7100,7 +7153,7 @@
                       </a:endParaRPr>
                     </a:p>
                   </a:txBody>
-                  <a:tcPr marL="91440" marR="91440" marT="45720" marB="45720" anchor="ctr">
+                  <a:tcPr anchor="ctr">
                     <a:lnL w="12700" cap="flat" cmpd="sng" algn="ctr">
                       <a:solidFill>
                         <a:srgbClr val="DDDDDD"/>
@@ -7147,7 +7200,7 @@
                     <a:bodyPr/>
                     <a:lstStyle/>
                     <a:p>
-                      <a:pPr algn="ctr" indent="0" marL="0">
+                      <a:pPr marL="0" indent="0" algn="ctr">
                         <a:buNone/>
                       </a:pPr>
                       <a:r>
@@ -7168,7 +7221,7 @@
                       </a:endParaRPr>
                     </a:p>
                   </a:txBody>
-                  <a:tcPr marL="91440" marR="91440" marT="45720" marB="45720" anchor="ctr">
+                  <a:tcPr anchor="ctr">
                     <a:lnL w="12700" cap="flat" cmpd="sng" algn="ctr">
                       <a:solidFill>
                         <a:srgbClr val="DDDDDD"/>
@@ -7215,7 +7268,7 @@
                     <a:bodyPr/>
                     <a:lstStyle/>
                     <a:p>
-                      <a:pPr algn="ctr" indent="0" marL="0">
+                      <a:pPr marL="0" indent="0" algn="ctr">
                         <a:buNone/>
                       </a:pPr>
                       <a:r>
@@ -7236,7 +7289,7 @@
                       </a:endParaRPr>
                     </a:p>
                   </a:txBody>
-                  <a:tcPr marL="91440" marR="91440" marT="45720" marB="45720" anchor="ctr">
+                  <a:tcPr anchor="ctr">
                     <a:lnL w="12700" cap="flat" cmpd="sng" algn="ctr">
                       <a:solidFill>
                         <a:srgbClr val="DDDDDD"/>
@@ -7278,6 +7331,11 @@
                     </a:solidFill>
                   </a:tcPr>
                 </a:tc>
+                <a:extLst>
+                  <a:ext uri="{0D108BD9-81ED-4DB2-BD59-A6C34878D82A}">
+                    <a16:rowId xmlns:a16="http://schemas.microsoft.com/office/drawing/2014/main" val="10000"/>
+                  </a:ext>
+                </a:extLst>
               </a:tr>
               <a:tr h="365760">
                 <a:tc>
@@ -7285,7 +7343,7 @@
                     <a:bodyPr/>
                     <a:lstStyle/>
                     <a:p>
-                      <a:pPr algn="ctr" indent="0" marL="0">
+                      <a:pPr marL="0" indent="0" algn="ctr">
                         <a:buNone/>
                       </a:pPr>
                       <a:r>
@@ -7306,7 +7364,7 @@
                       </a:endParaRPr>
                     </a:p>
                     <a:p>
-                      <a:pPr algn="ctr" indent="0" marL="0">
+                      <a:pPr marL="0" indent="0" algn="ctr">
                         <a:buNone/>
                       </a:pPr>
                       <a:r>
@@ -7327,7 +7385,7 @@
                       </a:endParaRPr>
                     </a:p>
                   </a:txBody>
-                  <a:tcPr marL="91440" marR="91440" marT="45720" marB="45720" anchor="ctr">
+                  <a:tcPr anchor="ctr">
                     <a:lnL w="12700" cap="flat" cmpd="sng" algn="ctr">
                       <a:solidFill>
                         <a:srgbClr val="DDDDDD"/>
@@ -7374,7 +7432,7 @@
                     <a:bodyPr/>
                     <a:lstStyle/>
                     <a:p>
-                      <a:pPr algn="ctr" indent="0" marL="0">
+                      <a:pPr marL="0" indent="0" algn="ctr">
                         <a:buNone/>
                       </a:pPr>
                       <a:r>
@@ -7395,7 +7453,7 @@
                       </a:endParaRPr>
                     </a:p>
                   </a:txBody>
-                  <a:tcPr marL="91440" marR="91440" marT="45720" marB="45720" anchor="ctr">
+                  <a:tcPr anchor="ctr">
                     <a:lnL w="12700" cap="flat" cmpd="sng" algn="ctr">
                       <a:solidFill>
                         <a:srgbClr val="DDDDDD"/>
@@ -7442,7 +7500,7 @@
                     <a:bodyPr/>
                     <a:lstStyle/>
                     <a:p>
-                      <a:pPr algn="ctr" indent="0" marL="0">
+                      <a:pPr marL="0" indent="0" algn="ctr">
                         <a:buNone/>
                       </a:pPr>
                       <a:r>
@@ -7463,7 +7521,7 @@
                       </a:endParaRPr>
                     </a:p>
                   </a:txBody>
-                  <a:tcPr marL="91440" marR="91440" marT="45720" marB="45720" anchor="ctr">
+                  <a:tcPr anchor="ctr">
                     <a:lnL w="12700" cap="flat" cmpd="sng" algn="ctr">
                       <a:solidFill>
                         <a:srgbClr val="DDDDDD"/>
@@ -7510,7 +7568,7 @@
                     <a:bodyPr/>
                     <a:lstStyle/>
                     <a:p>
-                      <a:pPr algn="ctr" indent="0" marL="0">
+                      <a:pPr marL="0" indent="0" algn="ctr">
                         <a:buNone/>
                       </a:pPr>
                       <a:r>
@@ -7531,7 +7589,7 @@
                       </a:endParaRPr>
                     </a:p>
                   </a:txBody>
-                  <a:tcPr marL="91440" marR="91440" marT="45720" marB="45720" anchor="ctr">
+                  <a:tcPr anchor="ctr">
                     <a:lnL w="12700" cap="flat" cmpd="sng" algn="ctr">
                       <a:solidFill>
                         <a:srgbClr val="DDDDDD"/>
@@ -7573,6 +7631,11 @@
                     </a:solidFill>
                   </a:tcPr>
                 </a:tc>
+                <a:extLst>
+                  <a:ext uri="{0D108BD9-81ED-4DB2-BD59-A6C34878D82A}">
+                    <a16:rowId xmlns:a16="http://schemas.microsoft.com/office/drawing/2014/main" val="10001"/>
+                  </a:ext>
+                </a:extLst>
               </a:tr>
               <a:tr h="365760">
                 <a:tc>
@@ -7580,7 +7643,7 @@
                     <a:bodyPr/>
                     <a:lstStyle/>
                     <a:p>
-                      <a:pPr algn="ctr" indent="0" marL="0">
+                      <a:pPr marL="0" indent="0" algn="ctr">
                         <a:buNone/>
                       </a:pPr>
                       <a:r>
@@ -7601,7 +7664,7 @@
                       </a:endParaRPr>
                     </a:p>
                     <a:p>
-                      <a:pPr algn="ctr" indent="0" marL="0">
+                      <a:pPr marL="0" indent="0" algn="ctr">
                         <a:buNone/>
                       </a:pPr>
                       <a:r>
@@ -7622,7 +7685,7 @@
                       </a:endParaRPr>
                     </a:p>
                   </a:txBody>
-                  <a:tcPr marL="91440" marR="91440" marT="45720" marB="45720" anchor="ctr">
+                  <a:tcPr anchor="ctr">
                     <a:lnL w="12700" cap="flat" cmpd="sng" algn="ctr">
                       <a:solidFill>
                         <a:srgbClr val="DDDDDD"/>
@@ -7669,7 +7732,7 @@
                     <a:bodyPr/>
                     <a:lstStyle/>
                     <a:p>
-                      <a:pPr algn="ctr" indent="0" marL="0">
+                      <a:pPr marL="0" indent="0" algn="ctr">
                         <a:buNone/>
                       </a:pPr>
                       <a:r>
@@ -7690,7 +7753,7 @@
                       </a:endParaRPr>
                     </a:p>
                   </a:txBody>
-                  <a:tcPr marL="91440" marR="91440" marT="45720" marB="45720" anchor="ctr">
+                  <a:tcPr anchor="ctr">
                     <a:lnL w="12700" cap="flat" cmpd="sng" algn="ctr">
                       <a:solidFill>
                         <a:srgbClr val="DDDDDD"/>
@@ -7737,7 +7800,7 @@
                     <a:bodyPr/>
                     <a:lstStyle/>
                     <a:p>
-                      <a:pPr algn="ctr" indent="0" marL="0">
+                      <a:pPr marL="0" indent="0" algn="ctr">
                         <a:buNone/>
                       </a:pPr>
                       <a:r>
@@ -7758,7 +7821,7 @@
                       </a:endParaRPr>
                     </a:p>
                   </a:txBody>
-                  <a:tcPr marL="91440" marR="91440" marT="45720" marB="45720" anchor="ctr">
+                  <a:tcPr anchor="ctr">
                     <a:lnL w="12700" cap="flat" cmpd="sng" algn="ctr">
                       <a:solidFill>
                         <a:srgbClr val="DDDDDD"/>
@@ -7805,7 +7868,7 @@
                     <a:bodyPr/>
                     <a:lstStyle/>
                     <a:p>
-                      <a:pPr algn="ctr" indent="0" marL="0">
+                      <a:pPr marL="0" indent="0" algn="ctr">
                         <a:buNone/>
                       </a:pPr>
                       <a:r>
@@ -7826,7 +7889,7 @@
                       </a:endParaRPr>
                     </a:p>
                   </a:txBody>
-                  <a:tcPr marL="91440" marR="91440" marT="45720" marB="45720" anchor="ctr">
+                  <a:tcPr anchor="ctr">
                     <a:lnL w="12700" cap="flat" cmpd="sng" algn="ctr">
                       <a:solidFill>
                         <a:srgbClr val="DDDDDD"/>
@@ -7868,6 +7931,11 @@
                     </a:solidFill>
                   </a:tcPr>
                 </a:tc>
+                <a:extLst>
+                  <a:ext uri="{0D108BD9-81ED-4DB2-BD59-A6C34878D82A}">
+                    <a16:rowId xmlns:a16="http://schemas.microsoft.com/office/drawing/2014/main" val="10002"/>
+                  </a:ext>
+                </a:extLst>
               </a:tr>
               <a:tr h="365760">
                 <a:tc>
@@ -7875,7 +7943,7 @@
                     <a:bodyPr/>
                     <a:lstStyle/>
                     <a:p>
-                      <a:pPr algn="ctr" indent="0" marL="0">
+                      <a:pPr marL="0" indent="0" algn="ctr">
                         <a:buNone/>
                       </a:pPr>
                       <a:r>
@@ -7896,7 +7964,7 @@
                       </a:endParaRPr>
                     </a:p>
                     <a:p>
-                      <a:pPr algn="ctr" indent="0" marL="0">
+                      <a:pPr marL="0" indent="0" algn="ctr">
                         <a:buNone/>
                       </a:pPr>
                       <a:r>
@@ -7917,7 +7985,7 @@
                       </a:endParaRPr>
                     </a:p>
                   </a:txBody>
-                  <a:tcPr marL="91440" marR="91440" marT="45720" marB="45720" anchor="ctr">
+                  <a:tcPr anchor="ctr">
                     <a:lnL w="12700" cap="flat" cmpd="sng" algn="ctr">
                       <a:solidFill>
                         <a:srgbClr val="DDDDDD"/>
@@ -7964,7 +8032,7 @@
                     <a:bodyPr/>
                     <a:lstStyle/>
                     <a:p>
-                      <a:pPr algn="ctr" indent="0" marL="0">
+                      <a:pPr marL="0" indent="0" algn="ctr">
                         <a:buNone/>
                       </a:pPr>
                       <a:r>
@@ -7985,7 +8053,7 @@
                       </a:endParaRPr>
                     </a:p>
                   </a:txBody>
-                  <a:tcPr marL="91440" marR="91440" marT="45720" marB="45720" anchor="ctr">
+                  <a:tcPr anchor="ctr">
                     <a:lnL w="12700" cap="flat" cmpd="sng" algn="ctr">
                       <a:solidFill>
                         <a:srgbClr val="DDDDDD"/>
@@ -8032,7 +8100,7 @@
                     <a:bodyPr/>
                     <a:lstStyle/>
                     <a:p>
-                      <a:pPr algn="ctr" indent="0" marL="0">
+                      <a:pPr marL="0" indent="0" algn="ctr">
                         <a:buNone/>
                       </a:pPr>
                       <a:r>
@@ -8053,7 +8121,7 @@
                       </a:endParaRPr>
                     </a:p>
                   </a:txBody>
-                  <a:tcPr marL="91440" marR="91440" marT="45720" marB="45720" anchor="ctr">
+                  <a:tcPr anchor="ctr">
                     <a:lnL w="12700" cap="flat" cmpd="sng" algn="ctr">
                       <a:solidFill>
                         <a:srgbClr val="DDDDDD"/>
@@ -8100,7 +8168,7 @@
                     <a:bodyPr/>
                     <a:lstStyle/>
                     <a:p>
-                      <a:pPr algn="ctr" indent="0" marL="0">
+                      <a:pPr marL="0" indent="0" algn="ctr">
                         <a:buNone/>
                       </a:pPr>
                       <a:r>
@@ -8121,7 +8189,7 @@
                       </a:endParaRPr>
                     </a:p>
                   </a:txBody>
-                  <a:tcPr marL="91440" marR="91440" marT="45720" marB="45720" anchor="ctr">
+                  <a:tcPr anchor="ctr">
                     <a:lnL w="12700" cap="flat" cmpd="sng" algn="ctr">
                       <a:solidFill>
                         <a:srgbClr val="DDDDDD"/>
@@ -8163,6 +8231,11 @@
                     </a:solidFill>
                   </a:tcPr>
                 </a:tc>
+                <a:extLst>
+                  <a:ext uri="{0D108BD9-81ED-4DB2-BD59-A6C34878D82A}">
+                    <a16:rowId xmlns:a16="http://schemas.microsoft.com/office/drawing/2014/main" val="10003"/>
+                  </a:ext>
+                </a:extLst>
               </a:tr>
               <a:tr h="365760">
                 <a:tc>
@@ -8170,7 +8243,7 @@
                     <a:bodyPr/>
                     <a:lstStyle/>
                     <a:p>
-                      <a:pPr algn="ctr" indent="0" marL="0">
+                      <a:pPr marL="0" indent="0" algn="ctr">
                         <a:buNone/>
                       </a:pPr>
                       <a:r>
@@ -8191,7 +8264,7 @@
                       </a:endParaRPr>
                     </a:p>
                   </a:txBody>
-                  <a:tcPr marL="91440" marR="91440" marT="45720" marB="45720" anchor="ctr">
+                  <a:tcPr anchor="ctr">
                     <a:lnL w="12700" cap="flat" cmpd="sng" algn="ctr">
                       <a:solidFill>
                         <a:srgbClr val="DDDDDD"/>
@@ -8238,7 +8311,7 @@
                     <a:bodyPr/>
                     <a:lstStyle/>
                     <a:p>
-                      <a:pPr algn="ctr" indent="0" marL="0">
+                      <a:pPr marL="0" indent="0" algn="ctr">
                         <a:buNone/>
                       </a:pPr>
                       <a:r>
@@ -8259,7 +8332,7 @@
                       </a:endParaRPr>
                     </a:p>
                   </a:txBody>
-                  <a:tcPr marL="91440" marR="91440" marT="45720" marB="45720" anchor="ctr">
+                  <a:tcPr anchor="ctr">
                     <a:lnL w="12700" cap="flat" cmpd="sng" algn="ctr">
                       <a:solidFill>
                         <a:srgbClr val="DDDDDD"/>
@@ -8306,7 +8379,7 @@
                     <a:bodyPr/>
                     <a:lstStyle/>
                     <a:p>
-                      <a:pPr algn="ctr" indent="0" marL="0">
+                      <a:pPr marL="0" indent="0" algn="ctr">
                         <a:buNone/>
                       </a:pPr>
                       <a:r>
@@ -8327,7 +8400,7 @@
                       </a:endParaRPr>
                     </a:p>
                   </a:txBody>
-                  <a:tcPr marL="91440" marR="91440" marT="45720" marB="45720" anchor="ctr">
+                  <a:tcPr anchor="ctr">
                     <a:lnL w="12700" cap="flat" cmpd="sng" algn="ctr">
                       <a:solidFill>
                         <a:srgbClr val="DDDDDD"/>
@@ -8374,7 +8447,7 @@
                     <a:bodyPr/>
                     <a:lstStyle/>
                     <a:p>
-                      <a:pPr algn="ctr" indent="0" marL="0">
+                      <a:pPr marL="0" indent="0" algn="ctr">
                         <a:buNone/>
                       </a:pPr>
                       <a:r>
@@ -8395,7 +8468,7 @@
                       </a:endParaRPr>
                     </a:p>
                   </a:txBody>
-                  <a:tcPr marL="91440" marR="91440" marT="45720" marB="45720" anchor="ctr">
+                  <a:tcPr anchor="ctr">
                     <a:lnL w="12700" cap="flat" cmpd="sng" algn="ctr">
                       <a:solidFill>
                         <a:srgbClr val="DDDDDD"/>
@@ -8437,6 +8510,11 @@
                     </a:solidFill>
                   </a:tcPr>
                 </a:tc>
+                <a:extLst>
+                  <a:ext uri="{0D108BD9-81ED-4DB2-BD59-A6C34878D82A}">
+                    <a16:rowId xmlns:a16="http://schemas.microsoft.com/office/drawing/2014/main" val="10004"/>
+                  </a:ext>
+                </a:extLst>
               </a:tr>
             </a:tbl>
           </a:graphicData>
@@ -8463,6 +8541,13 @@
           </a:solidFill>
           <a:ln/>
         </p:spPr>
+        <p:txBody>
+          <a:bodyPr/>
+          <a:lstStyle/>
+          <a:p>
+            <a:endParaRPr lang="en-US"/>
+          </a:p>
+        </p:txBody>
       </p:sp>
       <p:sp>
         <p:nvSpPr>
@@ -8485,7 +8570,7 @@
           <a:bodyPr wrap="square" rtlCol="0" anchor="ctr"/>
           <a:lstStyle/>
           <a:p>
-            <a:pPr algn="ctr" indent="0" marL="0">
+            <a:pPr marL="0" indent="0" algn="ctr">
               <a:buNone/>
             </a:pPr>
             <a:r>
@@ -8529,10 +8614,17 @@
             <a:prstDash val="solid"/>
           </a:ln>
         </p:spPr>
-      </p:sp>
-      <p:sp>
-        <p:nvSpPr>
-          <p:cNvPr id="8" name="Text 5"/>
+        <p:txBody>
+          <a:bodyPr/>
+          <a:lstStyle/>
+          <a:p>
+            <a:endParaRPr lang="en-US"/>
+          </a:p>
+        </p:txBody>
+      </p:sp>
+      <p:sp>
+        <p:nvSpPr>
+          <p:cNvPr id="4" name="Text 5"/>
           <p:cNvSpPr/>
           <p:nvPr/>
         </p:nvSpPr>
@@ -8551,7 +8643,7 @@
           <a:bodyPr wrap="square" rtlCol="0" anchor="ctr"/>
           <a:lstStyle/>
           <a:p>
-            <a:pPr algn="ctr" indent="0" marL="0">
+            <a:pPr marL="0" indent="0" algn="ctr">
               <a:buNone/>
             </a:pPr>
             <a:r>
@@ -8590,7 +8682,7 @@
           <a:bodyPr wrap="square" rtlCol="0" anchor="ctr"/>
           <a:lstStyle/>
           <a:p>
-            <a:pPr algn="ctr" indent="0" marL="0">
+            <a:pPr marL="0" indent="0" algn="ctr">
               <a:buNone/>
             </a:pPr>
             <a:r>
@@ -8607,7 +8699,7 @@
             <a:endParaRPr lang="en-US" sz="900" dirty="0"/>
           </a:p>
           <a:p>
-            <a:pPr algn="ctr" indent="0" marL="0">
+            <a:pPr marL="0" indent="0" algn="ctr">
               <a:buNone/>
             </a:pPr>
             <a:r>
@@ -8646,7 +8738,7 @@
           <a:bodyPr wrap="square" rtlCol="0" anchor="ctr"/>
           <a:lstStyle/>
           <a:p>
-            <a:pPr algn="ctr" indent="0" marL="0">
+            <a:pPr marL="0" indent="0" algn="ctr">
               <a:buNone/>
             </a:pPr>
             <a:r>
@@ -8690,6 +8782,13 @@
             <a:prstDash val="solid"/>
           </a:ln>
         </p:spPr>
+        <p:txBody>
+          <a:bodyPr/>
+          <a:lstStyle/>
+          <a:p>
+            <a:endParaRPr lang="en-US"/>
+          </a:p>
+        </p:txBody>
       </p:sp>
       <p:sp>
         <p:nvSpPr>
@@ -8712,7 +8811,7 @@
           <a:bodyPr wrap="square" rtlCol="0" anchor="ctr"/>
           <a:lstStyle/>
           <a:p>
-            <a:pPr algn="ctr" indent="0" marL="0">
+            <a:pPr marL="0" indent="0" algn="ctr">
               <a:buNone/>
             </a:pPr>
             <a:r>
@@ -8751,7 +8850,7 @@
           <a:bodyPr wrap="square" rtlCol="0" anchor="ctr"/>
           <a:lstStyle/>
           <a:p>
-            <a:pPr algn="ctr" indent="0" marL="0">
+            <a:pPr marL="0" indent="0" algn="ctr">
               <a:buNone/>
             </a:pPr>
             <a:r>
@@ -8768,7 +8867,7 @@
             <a:endParaRPr lang="en-US" sz="900" dirty="0"/>
           </a:p>
           <a:p>
-            <a:pPr algn="ctr" indent="0" marL="0">
+            <a:pPr marL="0" indent="0" algn="ctr">
               <a:buNone/>
             </a:pPr>
             <a:r>
@@ -8807,7 +8906,7 @@
           <a:bodyPr wrap="square" rtlCol="0" anchor="ctr"/>
           <a:lstStyle/>
           <a:p>
-            <a:pPr algn="ctr" indent="0" marL="0">
+            <a:pPr marL="0" indent="0" algn="ctr">
               <a:buNone/>
             </a:pPr>
             <a:r>
@@ -8851,6 +8950,13 @@
             <a:prstDash val="solid"/>
           </a:ln>
         </p:spPr>
+        <p:txBody>
+          <a:bodyPr/>
+          <a:lstStyle/>
+          <a:p>
+            <a:endParaRPr lang="en-US"/>
+          </a:p>
+        </p:txBody>
       </p:sp>
       <p:sp>
         <p:nvSpPr>
@@ -8873,7 +8979,7 @@
           <a:bodyPr wrap="square" rtlCol="0" anchor="ctr"/>
           <a:lstStyle/>
           <a:p>
-            <a:pPr algn="ctr" indent="0" marL="0">
+            <a:pPr marL="0" indent="0" algn="ctr">
               <a:buNone/>
             </a:pPr>
             <a:r>
@@ -8912,7 +9018,7 @@
           <a:bodyPr wrap="square" rtlCol="0" anchor="ctr"/>
           <a:lstStyle/>
           <a:p>
-            <a:pPr algn="ctr" indent="0" marL="0">
+            <a:pPr marL="0" indent="0" algn="ctr">
               <a:buNone/>
             </a:pPr>
             <a:r>
@@ -8929,7 +9035,7 @@
             <a:endParaRPr lang="en-US" sz="900" dirty="0"/>
           </a:p>
           <a:p>
-            <a:pPr algn="ctr" indent="0" marL="0">
+            <a:pPr marL="0" indent="0" algn="ctr">
               <a:buNone/>
             </a:pPr>
             <a:r>
@@ -8968,7 +9074,7 @@
           <a:bodyPr wrap="square" rtlCol="0" anchor="ctr"/>
           <a:lstStyle/>
           <a:p>
-            <a:pPr algn="ctr" indent="0" marL="0">
+            <a:pPr marL="0" indent="0" algn="ctr">
               <a:buNone/>
             </a:pPr>
             <a:r>
@@ -9030,6 +9136,13 @@
           </a:solidFill>
           <a:ln/>
         </p:spPr>
+        <p:txBody>
+          <a:bodyPr/>
+          <a:lstStyle/>
+          <a:p>
+            <a:endParaRPr lang="en-US"/>
+          </a:p>
+        </p:txBody>
       </p:sp>
       <p:sp>
         <p:nvSpPr>
@@ -9052,7 +9165,7 @@
           <a:bodyPr wrap="square" rtlCol="0" anchor="ctr"/>
           <a:lstStyle/>
           <a:p>
-            <a:pPr indent="0" marL="0">
+            <a:pPr marL="0" indent="0">
               <a:buNone/>
             </a:pPr>
             <a:r>
@@ -9096,6 +9209,13 @@
             <a:prstDash val="solid"/>
           </a:ln>
         </p:spPr>
+        <p:txBody>
+          <a:bodyPr/>
+          <a:lstStyle/>
+          <a:p>
+            <a:endParaRPr lang="en-US"/>
+          </a:p>
+        </p:txBody>
       </p:sp>
       <p:sp>
         <p:nvSpPr>
@@ -9118,7 +9238,7 @@
           <a:bodyPr wrap="square" rtlCol="0" anchor="ctr"/>
           <a:lstStyle/>
           <a:p>
-            <a:pPr indent="0" marL="0">
+            <a:pPr marL="0" indent="0">
               <a:buNone/>
             </a:pPr>
             <a:r>
@@ -9154,7 +9274,7 @@
           <a:bodyPr wrap="square" rtlCol="0" anchor="ctr"/>
           <a:lstStyle/>
           <a:p>
-            <a:pPr indent="0" marL="0">
+            <a:pPr marL="0" indent="0">
               <a:buNone/>
             </a:pPr>
             <a:r>
@@ -9193,7 +9313,7 @@
           <a:bodyPr wrap="square" rtlCol="0" anchor="ctr"/>
           <a:lstStyle/>
           <a:p>
-            <a:pPr indent="0" marL="0">
+            <a:pPr marL="0" indent="0">
               <a:buNone/>
             </a:pPr>
             <a:r>
@@ -9237,6 +9357,13 @@
             <a:prstDash val="solid"/>
           </a:ln>
         </p:spPr>
+        <p:txBody>
+          <a:bodyPr/>
+          <a:lstStyle/>
+          <a:p>
+            <a:endParaRPr lang="en-US"/>
+          </a:p>
+        </p:txBody>
       </p:sp>
       <p:sp>
         <p:nvSpPr>
@@ -9259,7 +9386,7 @@
           <a:bodyPr wrap="square" rtlCol="0" anchor="ctr"/>
           <a:lstStyle/>
           <a:p>
-            <a:pPr indent="0" marL="0">
+            <a:pPr marL="0" indent="0">
               <a:buNone/>
             </a:pPr>
             <a:r>
@@ -9295,7 +9422,7 @@
           <a:bodyPr wrap="square" rtlCol="0" anchor="ctr"/>
           <a:lstStyle/>
           <a:p>
-            <a:pPr indent="0" marL="0">
+            <a:pPr marL="0" indent="0">
               <a:buNone/>
             </a:pPr>
             <a:r>
@@ -9334,7 +9461,7 @@
           <a:bodyPr wrap="square" rtlCol="0" anchor="ctr"/>
           <a:lstStyle/>
           <a:p>
-            <a:pPr indent="0" marL="0">
+            <a:pPr marL="0" indent="0">
               <a:buNone/>
             </a:pPr>
             <a:r>
@@ -9378,6 +9505,13 @@
             <a:prstDash val="solid"/>
           </a:ln>
         </p:spPr>
+        <p:txBody>
+          <a:bodyPr/>
+          <a:lstStyle/>
+          <a:p>
+            <a:endParaRPr lang="en-US"/>
+          </a:p>
+        </p:txBody>
       </p:sp>
       <p:sp>
         <p:nvSpPr>
@@ -9400,7 +9534,7 @@
           <a:bodyPr wrap="square" rtlCol="0" anchor="ctr"/>
           <a:lstStyle/>
           <a:p>
-            <a:pPr indent="0" marL="0">
+            <a:pPr marL="0" indent="0">
               <a:buNone/>
             </a:pPr>
             <a:r>
@@ -9436,7 +9570,7 @@
           <a:bodyPr wrap="square" rtlCol="0" anchor="ctr"/>
           <a:lstStyle/>
           <a:p>
-            <a:pPr indent="0" marL="0">
+            <a:pPr marL="0" indent="0">
               <a:buNone/>
             </a:pPr>
             <a:r>
@@ -9475,7 +9609,7 @@
           <a:bodyPr wrap="square" rtlCol="0" anchor="ctr"/>
           <a:lstStyle/>
           <a:p>
-            <a:pPr indent="0" marL="0">
+            <a:pPr marL="0" indent="0">
               <a:buNone/>
             </a:pPr>
             <a:r>
@@ -9519,6 +9653,13 @@
             <a:prstDash val="solid"/>
           </a:ln>
         </p:spPr>
+        <p:txBody>
+          <a:bodyPr/>
+          <a:lstStyle/>
+          <a:p>
+            <a:endParaRPr lang="en-US"/>
+          </a:p>
+        </p:txBody>
       </p:sp>
       <p:sp>
         <p:nvSpPr>
@@ -9541,7 +9682,7 @@
           <a:bodyPr wrap="square" rtlCol="0" anchor="ctr"/>
           <a:lstStyle/>
           <a:p>
-            <a:pPr indent="0" marL="0">
+            <a:pPr marL="0" indent="0">
               <a:buNone/>
             </a:pPr>
             <a:r>
@@ -9577,7 +9718,7 @@
           <a:bodyPr wrap="square" rtlCol="0" anchor="ctr"/>
           <a:lstStyle/>
           <a:p>
-            <a:pPr indent="0" marL="0">
+            <a:pPr marL="0" indent="0">
               <a:buNone/>
             </a:pPr>
             <a:r>
@@ -9616,7 +9757,7 @@
           <a:bodyPr wrap="square" rtlCol="0" anchor="ctr"/>
           <a:lstStyle/>
           <a:p>
-            <a:pPr indent="0" marL="0">
+            <a:pPr marL="0" indent="0">
               <a:buNone/>
             </a:pPr>
             <a:r>
@@ -9660,6 +9801,13 @@
             <a:prstDash val="solid"/>
           </a:ln>
         </p:spPr>
+        <p:txBody>
+          <a:bodyPr/>
+          <a:lstStyle/>
+          <a:p>
+            <a:endParaRPr lang="en-US"/>
+          </a:p>
+        </p:txBody>
       </p:sp>
       <p:sp>
         <p:nvSpPr>
@@ -9682,7 +9830,7 @@
           <a:bodyPr wrap="square" rtlCol="0" anchor="ctr"/>
           <a:lstStyle/>
           <a:p>
-            <a:pPr indent="0" marL="0">
+            <a:pPr marL="0" indent="0">
               <a:buNone/>
             </a:pPr>
             <a:r>
@@ -9718,7 +9866,7 @@
           <a:bodyPr wrap="square" rtlCol="0" anchor="ctr"/>
           <a:lstStyle/>
           <a:p>
-            <a:pPr indent="0" marL="0">
+            <a:pPr marL="0" indent="0">
               <a:buNone/>
             </a:pPr>
             <a:r>
@@ -9757,7 +9905,7 @@
           <a:bodyPr wrap="square" rtlCol="0" anchor="ctr"/>
           <a:lstStyle/>
           <a:p>
-            <a:pPr indent="0" marL="0">
+            <a:pPr marL="0" indent="0">
               <a:buNone/>
             </a:pPr>
             <a:r>
@@ -9801,6 +9949,13 @@
             <a:prstDash val="solid"/>
           </a:ln>
         </p:spPr>
+        <p:txBody>
+          <a:bodyPr/>
+          <a:lstStyle/>
+          <a:p>
+            <a:endParaRPr lang="en-US"/>
+          </a:p>
+        </p:txBody>
       </p:sp>
       <p:sp>
         <p:nvSpPr>
@@ -9823,7 +9978,7 @@
           <a:bodyPr wrap="square" rtlCol="0" anchor="ctr"/>
           <a:lstStyle/>
           <a:p>
-            <a:pPr indent="0" marL="0">
+            <a:pPr marL="0" indent="0">
               <a:buNone/>
             </a:pPr>
             <a:r>
@@ -9859,7 +10014,7 @@
           <a:bodyPr wrap="square" rtlCol="0" anchor="ctr"/>
           <a:lstStyle/>
           <a:p>
-            <a:pPr indent="0" marL="0">
+            <a:pPr marL="0" indent="0">
               <a:buNone/>
             </a:pPr>
             <a:r>
@@ -9898,7 +10053,7 @@
           <a:bodyPr wrap="square" rtlCol="0" anchor="ctr"/>
           <a:lstStyle/>
           <a:p>
-            <a:pPr indent="0" marL="0">
+            <a:pPr marL="0" indent="0">
               <a:buNone/>
             </a:pPr>
             <a:r>
@@ -9960,6 +10115,13 @@
           </a:solidFill>
           <a:ln/>
         </p:spPr>
+        <p:txBody>
+          <a:bodyPr/>
+          <a:lstStyle/>
+          <a:p>
+            <a:endParaRPr lang="en-US"/>
+          </a:p>
+        </p:txBody>
       </p:sp>
       <p:sp>
         <p:nvSpPr>
@@ -9982,7 +10144,7 @@
           <a:bodyPr wrap="square" rtlCol="0" anchor="ctr"/>
           <a:lstStyle/>
           <a:p>
-            <a:pPr indent="0" marL="0">
+            <a:pPr marL="0" indent="0">
               <a:buNone/>
             </a:pPr>
             <a:r>
@@ -10026,6 +10188,13 @@
             <a:prstDash val="solid"/>
           </a:ln>
         </p:spPr>
+        <p:txBody>
+          <a:bodyPr/>
+          <a:lstStyle/>
+          <a:p>
+            <a:endParaRPr lang="en-US"/>
+          </a:p>
+        </p:txBody>
       </p:sp>
       <p:sp>
         <p:nvSpPr>
@@ -10048,7 +10217,7 @@
           <a:bodyPr wrap="square" rtlCol="0" anchor="ctr"/>
           <a:lstStyle/>
           <a:p>
-            <a:pPr indent="0" marL="0">
+            <a:pPr marL="0" indent="0">
               <a:buNone/>
             </a:pPr>
             <a:r>
@@ -10171,6 +10340,13 @@
             <a:prstDash val="solid"/>
           </a:ln>
         </p:spPr>
+        <p:txBody>
+          <a:bodyPr/>
+          <a:lstStyle/>
+          <a:p>
+            <a:endParaRPr lang="en-US"/>
+          </a:p>
+        </p:txBody>
       </p:sp>
       <p:sp>
         <p:nvSpPr>
@@ -10193,7 +10369,7 @@
           <a:bodyPr wrap="square" rtlCol="0" anchor="ctr"/>
           <a:lstStyle/>
           <a:p>
-            <a:pPr indent="0" marL="0">
+            <a:pPr marL="0" indent="0">
               <a:buNone/>
             </a:pPr>
             <a:r>
@@ -10648,4 +10824,319 @@
     </a:ext>
   </a:extLst>
 </a:theme>
+</file>
+
+<file path=ppt/theme/theme2.xml><?xml version="1.0" encoding="utf-8"?>
+<a:theme xmlns:a="http://schemas.openxmlformats.org/drawingml/2006/main" name="Office Theme">
+  <a:themeElements>
+    <a:clrScheme name="Office">
+      <a:dk1>
+        <a:sysClr val="windowText" lastClr="000000"/>
+      </a:dk1>
+      <a:lt1>
+        <a:sysClr val="window" lastClr="FFFFFF"/>
+      </a:lt1>
+      <a:dk2>
+        <a:srgbClr val="0E2841"/>
+      </a:dk2>
+      <a:lt2>
+        <a:srgbClr val="E8E8E8"/>
+      </a:lt2>
+      <a:accent1>
+        <a:srgbClr val="156082"/>
+      </a:accent1>
+      <a:accent2>
+        <a:srgbClr val="E97132"/>
+      </a:accent2>
+      <a:accent3>
+        <a:srgbClr val="196B24"/>
+      </a:accent3>
+      <a:accent4>
+        <a:srgbClr val="0F9ED5"/>
+      </a:accent4>
+      <a:accent5>
+        <a:srgbClr val="A02B93"/>
+      </a:accent5>
+      <a:accent6>
+        <a:srgbClr val="4EA72E"/>
+      </a:accent6>
+      <a:hlink>
+        <a:srgbClr val="467886"/>
+      </a:hlink>
+      <a:folHlink>
+        <a:srgbClr val="96607D"/>
+      </a:folHlink>
+    </a:clrScheme>
+    <a:fontScheme name="Office">
+      <a:majorFont>
+        <a:latin typeface="Aptos Display" panose="02110004020202020204"/>
+        <a:ea typeface=""/>
+        <a:cs typeface=""/>
+        <a:font script="Jpan" typeface="游ゴシック Light"/>
+        <a:font script="Hang" typeface="맑은 고딕"/>
+        <a:font script="Hans" typeface="等线 Light"/>
+        <a:font script="Hant" typeface="新細明體"/>
+        <a:font script="Arab" typeface="Times New Roman"/>
+        <a:font script="Hebr" typeface="Times New Roman"/>
+        <a:font script="Thai" typeface="Angsana New"/>
+        <a:font script="Ethi" typeface="Nyala"/>
+        <a:font script="Beng" typeface="Vrinda"/>
+        <a:font script="Gujr" typeface="Shruti"/>
+        <a:font script="Khmr" typeface="MoolBoran"/>
+        <a:font script="Knda" typeface="Tunga"/>
+        <a:font script="Guru" typeface="Raavi"/>
+        <a:font script="Cans" typeface="Euphemia"/>
+        <a:font script="Cher" typeface="Plantagenet Cherokee"/>
+        <a:font script="Yiii" typeface="Microsoft Yi Baiti"/>
+        <a:font script="Tibt" typeface="Microsoft Himalaya"/>
+        <a:font script="Thaa" typeface="MV Boli"/>
+        <a:font script="Deva" typeface="Mangal"/>
+        <a:font script="Telu" typeface="Gautami"/>
+        <a:font script="Taml" typeface="Latha"/>
+        <a:font script="Syrc" typeface="Estrangelo Edessa"/>
+        <a:font script="Orya" typeface="Kalinga"/>
+        <a:font script="Mlym" typeface="Kartika"/>
+        <a:font script="Laoo" typeface="DokChampa"/>
+        <a:font script="Sinh" typeface="Iskoola Pota"/>
+        <a:font script="Mong" typeface="Mongolian Baiti"/>
+        <a:font script="Viet" typeface="Times New Roman"/>
+        <a:font script="Uigh" typeface="Microsoft Uighur"/>
+        <a:font script="Geor" typeface="Sylfaen"/>
+        <a:font script="Armn" typeface="Arial"/>
+        <a:font script="Bugi" typeface="Leelawadee UI"/>
+        <a:font script="Bopo" typeface="Microsoft JhengHei"/>
+        <a:font script="Java" typeface="Javanese Text"/>
+        <a:font script="Lisu" typeface="Segoe UI"/>
+        <a:font script="Mymr" typeface="Myanmar Text"/>
+        <a:font script="Nkoo" typeface="Ebrima"/>
+        <a:font script="Olck" typeface="Nirmala UI"/>
+        <a:font script="Osma" typeface="Ebrima"/>
+        <a:font script="Phag" typeface="Phagspa"/>
+        <a:font script="Syrn" typeface="Estrangelo Edessa"/>
+        <a:font script="Syrj" typeface="Estrangelo Edessa"/>
+        <a:font script="Syre" typeface="Estrangelo Edessa"/>
+        <a:font script="Sora" typeface="Nirmala UI"/>
+        <a:font script="Tale" typeface="Microsoft Tai Le"/>
+        <a:font script="Talu" typeface="Microsoft New Tai Lue"/>
+        <a:font script="Tfng" typeface="Ebrima"/>
+      </a:majorFont>
+      <a:minorFont>
+        <a:latin typeface="Aptos" panose="02110004020202020204"/>
+        <a:ea typeface=""/>
+        <a:cs typeface=""/>
+        <a:font script="Jpan" typeface="游ゴシック"/>
+        <a:font script="Hang" typeface="맑은 고딕"/>
+        <a:font script="Hans" typeface="等线"/>
+        <a:font script="Hant" typeface="新細明體"/>
+        <a:font script="Arab" typeface="Arial"/>
+        <a:font script="Hebr" typeface="Arial"/>
+        <a:font script="Thai" typeface="Cordia New"/>
+        <a:font script="Ethi" typeface="Nyala"/>
+        <a:font script="Beng" typeface="Vrinda"/>
+        <a:font script="Gujr" typeface="Shruti"/>
+        <a:font script="Khmr" typeface="DaunPenh"/>
+        <a:font script="Knda" typeface="Tunga"/>
+        <a:font script="Guru" typeface="Raavi"/>
+        <a:font script="Cans" typeface="Euphemia"/>
+        <a:font script="Cher" typeface="Plantagenet Cherokee"/>
+        <a:font script="Yiii" typeface="Microsoft Yi Baiti"/>
+        <a:font script="Tibt" typeface="Microsoft Himalaya"/>
+        <a:font script="Thaa" typeface="MV Boli"/>
+        <a:font script="Deva" typeface="Mangal"/>
+        <a:font script="Telu" typeface="Gautami"/>
+        <a:font script="Taml" typeface="Latha"/>
+        <a:font script="Syrc" typeface="Estrangelo Edessa"/>
+        <a:font script="Orya" typeface="Kalinga"/>
+        <a:font script="Mlym" typeface="Kartika"/>
+        <a:font script="Laoo" typeface="DokChampa"/>
+        <a:font script="Sinh" typeface="Iskoola Pota"/>
+        <a:font script="Mong" typeface="Mongolian Baiti"/>
+        <a:font script="Viet" typeface="Arial"/>
+        <a:font script="Uigh" typeface="Microsoft Uighur"/>
+        <a:font script="Geor" typeface="Sylfaen"/>
+        <a:font script="Armn" typeface="Arial"/>
+        <a:font script="Bugi" typeface="Leelawadee UI"/>
+        <a:font script="Bopo" typeface="Microsoft JhengHei"/>
+        <a:font script="Java" typeface="Javanese Text"/>
+        <a:font script="Lisu" typeface="Segoe UI"/>
+        <a:font script="Mymr" typeface="Myanmar Text"/>
+        <a:font script="Nkoo" typeface="Ebrima"/>
+        <a:font script="Olck" typeface="Nirmala UI"/>
+        <a:font script="Osma" typeface="Ebrima"/>
+        <a:font script="Phag" typeface="Phagspa"/>
+        <a:font script="Syrn" typeface="Estrangelo Edessa"/>
+        <a:font script="Syrj" typeface="Estrangelo Edessa"/>
+        <a:font script="Syre" typeface="Estrangelo Edessa"/>
+        <a:font script="Sora" typeface="Nirmala UI"/>
+        <a:font script="Tale" typeface="Microsoft Tai Le"/>
+        <a:font script="Talu" typeface="Microsoft New Tai Lue"/>
+        <a:font script="Tfng" typeface="Ebrima"/>
+      </a:minorFont>
+    </a:fontScheme>
+    <a:fmtScheme name="Office">
+      <a:fillStyleLst>
+        <a:solidFill>
+          <a:schemeClr val="phClr"/>
+        </a:solidFill>
+        <a:gradFill rotWithShape="1">
+          <a:gsLst>
+            <a:gs pos="0">
+              <a:schemeClr val="phClr">
+                <a:lumMod val="110000"/>
+                <a:satMod val="105000"/>
+                <a:tint val="67000"/>
+              </a:schemeClr>
+            </a:gs>
+            <a:gs pos="50000">
+              <a:schemeClr val="phClr">
+                <a:lumMod val="105000"/>
+                <a:satMod val="103000"/>
+                <a:tint val="73000"/>
+              </a:schemeClr>
+            </a:gs>
+            <a:gs pos="100000">
+              <a:schemeClr val="phClr">
+                <a:lumMod val="105000"/>
+                <a:satMod val="109000"/>
+                <a:tint val="81000"/>
+              </a:schemeClr>
+            </a:gs>
+          </a:gsLst>
+          <a:lin ang="5400000" scaled="0"/>
+        </a:gradFill>
+        <a:gradFill rotWithShape="1">
+          <a:gsLst>
+            <a:gs pos="0">
+              <a:schemeClr val="phClr">
+                <a:satMod val="103000"/>
+                <a:lumMod val="102000"/>
+                <a:tint val="94000"/>
+              </a:schemeClr>
+            </a:gs>
+            <a:gs pos="50000">
+              <a:schemeClr val="phClr">
+                <a:satMod val="110000"/>
+                <a:lumMod val="100000"/>
+                <a:shade val="100000"/>
+              </a:schemeClr>
+            </a:gs>
+            <a:gs pos="100000">
+              <a:schemeClr val="phClr">
+                <a:lumMod val="99000"/>
+                <a:satMod val="120000"/>
+                <a:shade val="78000"/>
+              </a:schemeClr>
+            </a:gs>
+          </a:gsLst>
+          <a:lin ang="5400000" scaled="0"/>
+        </a:gradFill>
+      </a:fillStyleLst>
+      <a:lnStyleLst>
+        <a:ln w="12700" cap="flat" cmpd="sng" algn="ctr">
+          <a:solidFill>
+            <a:schemeClr val="phClr"/>
+          </a:solidFill>
+          <a:prstDash val="solid"/>
+          <a:miter lim="800000"/>
+        </a:ln>
+        <a:ln w="19050" cap="flat" cmpd="sng" algn="ctr">
+          <a:solidFill>
+            <a:schemeClr val="phClr"/>
+          </a:solidFill>
+          <a:prstDash val="solid"/>
+          <a:miter lim="800000"/>
+        </a:ln>
+        <a:ln w="25400" cap="flat" cmpd="sng" algn="ctr">
+          <a:solidFill>
+            <a:schemeClr val="phClr"/>
+          </a:solidFill>
+          <a:prstDash val="solid"/>
+          <a:miter lim="800000"/>
+        </a:ln>
+      </a:lnStyleLst>
+      <a:effectStyleLst>
+        <a:effectStyle>
+          <a:effectLst/>
+        </a:effectStyle>
+        <a:effectStyle>
+          <a:effectLst/>
+        </a:effectStyle>
+        <a:effectStyle>
+          <a:effectLst>
+            <a:outerShdw blurRad="57150" dist="19050" dir="5400000" algn="ctr" rotWithShape="0">
+              <a:srgbClr val="000000">
+                <a:alpha val="63000"/>
+              </a:srgbClr>
+            </a:outerShdw>
+          </a:effectLst>
+        </a:effectStyle>
+      </a:effectStyleLst>
+      <a:bgFillStyleLst>
+        <a:solidFill>
+          <a:schemeClr val="phClr"/>
+        </a:solidFill>
+        <a:solidFill>
+          <a:schemeClr val="phClr">
+            <a:tint val="95000"/>
+            <a:satMod val="170000"/>
+          </a:schemeClr>
+        </a:solidFill>
+        <a:gradFill rotWithShape="1">
+          <a:gsLst>
+            <a:gs pos="0">
+              <a:schemeClr val="phClr">
+                <a:tint val="93000"/>
+                <a:satMod val="150000"/>
+                <a:shade val="98000"/>
+                <a:lumMod val="102000"/>
+              </a:schemeClr>
+            </a:gs>
+            <a:gs pos="50000">
+              <a:schemeClr val="phClr">
+                <a:tint val="98000"/>
+                <a:satMod val="130000"/>
+                <a:shade val="90000"/>
+                <a:lumMod val="103000"/>
+              </a:schemeClr>
+            </a:gs>
+            <a:gs pos="100000">
+              <a:schemeClr val="phClr">
+                <a:shade val="63000"/>
+                <a:satMod val="120000"/>
+              </a:schemeClr>
+            </a:gs>
+          </a:gsLst>
+          <a:lin ang="5400000" scaled="0"/>
+        </a:gradFill>
+      </a:bgFillStyleLst>
+    </a:fmtScheme>
+  </a:themeElements>
+  <a:objectDefaults>
+    <a:lnDef>
+      <a:spPr/>
+      <a:bodyPr/>
+      <a:lstStyle/>
+      <a:style>
+        <a:lnRef idx="2">
+          <a:schemeClr val="accent1"/>
+        </a:lnRef>
+        <a:fillRef idx="0">
+          <a:schemeClr val="accent1"/>
+        </a:fillRef>
+        <a:effectRef idx="1">
+          <a:schemeClr val="accent1"/>
+        </a:effectRef>
+        <a:fontRef idx="minor">
+          <a:schemeClr val="tx1"/>
+        </a:fontRef>
+      </a:style>
+    </a:lnDef>
+  </a:objectDefaults>
+  <a:extraClrSchemeLst/>
+  <a:extLst>
+    <a:ext uri="{05A4C25C-085E-4340-85A3-A5531E510DB2}">
+      <thm15:themeFamily xmlns:thm15="http://schemas.microsoft.com/office/thememl/2012/main" name="Office Theme" id="{2E142A2C-CD16-42D6-873A-C26D2A0506FA}" vid="{1BDDFF52-6CD6-40A5-AB3C-68EB2F1E4D0A}"/>
+    </a:ext>
+  </a:extLst>
+</a:theme>
 </file>
</xml_diff>